<commit_message>
add tutorial and home page
</commit_message>
<xml_diff>
--- a/tutorial.pptx
+++ b/tutorial.pptx
@@ -3004,10 +3004,6 @@
               </a:rPr>
               <a:t>旋轉棋</a:t>
             </a:r>
-            <a:endParaRPr lang="zh-TW" altLang="en-US" sz="4000" b="1" dirty="0">
-              <a:latin typeface="微軟正黑體" panose="020B0604030504040204" pitchFamily="34" charset="-120"/>
-              <a:ea typeface="微軟正黑體" panose="020B0604030504040204" pitchFamily="34" charset="-120"/>
-            </a:endParaRPr>
           </a:p>
         </p:txBody>
       </p:sp>
@@ -3192,16 +3188,15 @@
           </p:cNvPicPr>
           <p:nvPr/>
         </p:nvPicPr>
-        <p:blipFill>
+        <p:blipFill rotWithShape="1">
           <a:blip r:embed="rId2"/>
-          <a:stretch>
-            <a:fillRect/>
-          </a:stretch>
+          <a:srcRect t="1813" b="2924"/>
+          <a:stretch/>
         </p:blipFill>
         <p:spPr>
           <a:xfrm>
-            <a:off x="314915" y="2553878"/>
-            <a:ext cx="3858163" cy="3820058"/>
+            <a:off x="314915" y="2623126"/>
+            <a:ext cx="3858163" cy="3639129"/>
           </a:xfrm>
           <a:prstGeom prst="rect">
             <a:avLst/>
@@ -3307,6 +3302,52 @@
           </a:p>
         </p:txBody>
       </p:sp>
+      <p:sp>
+        <p:nvSpPr>
+          <p:cNvPr id="2" name="矩形 1"/>
+          <p:cNvSpPr/>
+          <p:nvPr/>
+        </p:nvSpPr>
+        <p:spPr>
+          <a:xfrm>
+            <a:off x="18473" y="6262255"/>
+            <a:ext cx="12192000" cy="498763"/>
+          </a:xfrm>
+          <a:prstGeom prst="rect">
+            <a:avLst/>
+          </a:prstGeom>
+          <a:solidFill>
+            <a:schemeClr val="bg1"/>
+          </a:solidFill>
+          <a:ln>
+            <a:noFill/>
+          </a:ln>
+        </p:spPr>
+        <p:style>
+          <a:lnRef idx="2">
+            <a:schemeClr val="accent1">
+              <a:shade val="50000"/>
+            </a:schemeClr>
+          </a:lnRef>
+          <a:fillRef idx="1">
+            <a:schemeClr val="accent1"/>
+          </a:fillRef>
+          <a:effectRef idx="0">
+            <a:schemeClr val="accent1"/>
+          </a:effectRef>
+          <a:fontRef idx="minor">
+            <a:schemeClr val="lt1"/>
+          </a:fontRef>
+        </p:style>
+        <p:txBody>
+          <a:bodyPr rtlCol="0" anchor="ctr"/>
+          <a:lstStyle/>
+          <a:p>
+            <a:pPr algn="ctr"/>
+            <a:endParaRPr lang="zh-TW" altLang="en-US"/>
+          </a:p>
+        </p:txBody>
+      </p:sp>
     </p:spTree>
     <p:extLst>
       <p:ext uri="{BB962C8B-B14F-4D97-AF65-F5344CB8AC3E}">
@@ -3450,14 +3491,28 @@
                 <a:latin typeface="微軟正黑體" panose="020B0604030504040204" pitchFamily="34" charset="-120"/>
                 <a:ea typeface="微軟正黑體" panose="020B0604030504040204" pitchFamily="34" charset="-120"/>
               </a:rPr>
-              <a:t>(must)</a:t>
+              <a:t>(must</a:t>
+            </a:r>
+            <a:r>
+              <a:rPr lang="en-US" altLang="zh-TW" sz="3600" dirty="0" smtClean="0">
+                <a:latin typeface="微軟正黑體" panose="020B0604030504040204" pitchFamily="34" charset="-120"/>
+                <a:ea typeface="微軟正黑體" panose="020B0604030504040204" pitchFamily="34" charset="-120"/>
+              </a:rPr>
+              <a:t>)</a:t>
             </a:r>
             <a:r>
               <a:rPr lang="zh-TW" altLang="en-US" sz="3600" dirty="0" smtClean="0">
                 <a:latin typeface="微軟正黑體" panose="020B0604030504040204" pitchFamily="34" charset="-120"/>
                 <a:ea typeface="微軟正黑體" panose="020B0604030504040204" pitchFamily="34" charset="-120"/>
               </a:rPr>
-              <a:t>旋轉棋盤</a:t>
+              <a:t> 旋轉</a:t>
+            </a:r>
+            <a:r>
+              <a:rPr lang="zh-TW" altLang="en-US" sz="3600" dirty="0" smtClean="0">
+                <a:latin typeface="微軟正黑體" panose="020B0604030504040204" pitchFamily="34" charset="-120"/>
+                <a:ea typeface="微軟正黑體" panose="020B0604030504040204" pitchFamily="34" charset="-120"/>
+              </a:rPr>
+              <a:t>棋盤</a:t>
             </a:r>
             <a:endParaRPr lang="en-US" altLang="zh-TW" sz="3600" dirty="0" smtClean="0">
               <a:latin typeface="微軟正黑體" panose="020B0604030504040204" pitchFamily="34" charset="-120"/>
@@ -3832,7 +3887,7 @@
         <p:spPr>
           <a:xfrm>
             <a:off x="1136149" y="802409"/>
-            <a:ext cx="4161717" cy="2252924"/>
+            <a:ext cx="4277133" cy="2252924"/>
           </a:xfrm>
           <a:prstGeom prst="rect">
             <a:avLst/>
@@ -3875,14 +3930,28 @@
                 <a:latin typeface="微軟正黑體" panose="020B0604030504040204" pitchFamily="34" charset="-120"/>
                 <a:ea typeface="微軟正黑體" panose="020B0604030504040204" pitchFamily="34" charset="-120"/>
               </a:rPr>
-              <a:t>(must)</a:t>
+              <a:t>(must</a:t>
+            </a:r>
+            <a:r>
+              <a:rPr lang="en-US" altLang="zh-TW" sz="3600" dirty="0" smtClean="0">
+                <a:latin typeface="微軟正黑體" panose="020B0604030504040204" pitchFamily="34" charset="-120"/>
+                <a:ea typeface="微軟正黑體" panose="020B0604030504040204" pitchFamily="34" charset="-120"/>
+              </a:rPr>
+              <a:t>)</a:t>
             </a:r>
             <a:r>
               <a:rPr lang="zh-TW" altLang="en-US" sz="3600" dirty="0" smtClean="0">
                 <a:latin typeface="微軟正黑體" panose="020B0604030504040204" pitchFamily="34" charset="-120"/>
                 <a:ea typeface="微軟正黑體" panose="020B0604030504040204" pitchFamily="34" charset="-120"/>
               </a:rPr>
-              <a:t>旋轉棋盤</a:t>
+              <a:t> 旋轉</a:t>
+            </a:r>
+            <a:r>
+              <a:rPr lang="zh-TW" altLang="en-US" sz="3600" dirty="0" smtClean="0">
+                <a:latin typeface="微軟正黑體" panose="020B0604030504040204" pitchFamily="34" charset="-120"/>
+                <a:ea typeface="微軟正黑體" panose="020B0604030504040204" pitchFamily="34" charset="-120"/>
+              </a:rPr>
+              <a:t>棋盤</a:t>
             </a:r>
             <a:endParaRPr lang="en-US" altLang="zh-TW" sz="3600" dirty="0" smtClean="0">
               <a:latin typeface="微軟正黑體" panose="020B0604030504040204" pitchFamily="34" charset="-120"/>
@@ -3965,6 +4034,52 @@
           </p:spPr>
         </p:pic>
       </p:grpSp>
+      <p:sp>
+        <p:nvSpPr>
+          <p:cNvPr id="2" name="向右箭號 1"/>
+          <p:cNvSpPr/>
+          <p:nvPr/>
+        </p:nvSpPr>
+        <p:spPr>
+          <a:xfrm>
+            <a:off x="5900390" y="3971057"/>
+            <a:ext cx="475796" cy="566883"/>
+          </a:xfrm>
+          <a:prstGeom prst="rightArrow">
+            <a:avLst/>
+          </a:prstGeom>
+          <a:solidFill>
+            <a:srgbClr val="25AEF2"/>
+          </a:solidFill>
+          <a:ln>
+            <a:noFill/>
+          </a:ln>
+        </p:spPr>
+        <p:style>
+          <a:lnRef idx="2">
+            <a:schemeClr val="accent1">
+              <a:shade val="50000"/>
+            </a:schemeClr>
+          </a:lnRef>
+          <a:fillRef idx="1">
+            <a:schemeClr val="accent1"/>
+          </a:fillRef>
+          <a:effectRef idx="0">
+            <a:schemeClr val="accent1"/>
+          </a:effectRef>
+          <a:fontRef idx="minor">
+            <a:schemeClr val="lt1"/>
+          </a:fontRef>
+        </p:style>
+        <p:txBody>
+          <a:bodyPr rtlCol="0" anchor="ctr"/>
+          <a:lstStyle/>
+          <a:p>
+            <a:pPr algn="ctr"/>
+            <a:endParaRPr lang="zh-TW" altLang="en-US"/>
+          </a:p>
+        </p:txBody>
+      </p:sp>
     </p:spTree>
     <p:extLst>
       <p:ext uri="{BB962C8B-B14F-4D97-AF65-F5344CB8AC3E}">

</xml_diff>

<commit_message>
add tutorial and update jpg
</commit_message>
<xml_diff>
--- a/tutorial.pptx
+++ b/tutorial.pptx
@@ -6,11 +6,14 @@
   </p:sldMasterIdLst>
   <p:sldIdLst>
     <p:sldId id="258" r:id="rId2"/>
-    <p:sldId id="264" r:id="rId3"/>
-    <p:sldId id="260" r:id="rId4"/>
-    <p:sldId id="261" r:id="rId5"/>
-    <p:sldId id="262" r:id="rId6"/>
-    <p:sldId id="263" r:id="rId7"/>
+    <p:sldId id="267" r:id="rId3"/>
+    <p:sldId id="265" r:id="rId4"/>
+    <p:sldId id="264" r:id="rId5"/>
+    <p:sldId id="260" r:id="rId6"/>
+    <p:sldId id="261" r:id="rId7"/>
+    <p:sldId id="262" r:id="rId8"/>
+    <p:sldId id="263" r:id="rId9"/>
+    <p:sldId id="266" r:id="rId10"/>
   </p:sldIdLst>
   <p:sldSz cx="12192000" cy="6858000"/>
   <p:notesSz cx="6858000" cy="9144000"/>
@@ -110,6 +113,27 @@
     </a:lvl9pPr>
   </p:defaultTextStyle>
   <p:extLst>
+    <p:ext uri="{521415D9-36F7-43E2-AB2F-B90AF26B5E84}">
+      <p14:sectionLst xmlns:p14="http://schemas.microsoft.com/office/powerpoint/2010/main">
+        <p14:section name="預設章節" id="{F7342470-C2D2-4549-B5FF-759974171638}">
+          <p14:sldIdLst>
+            <p14:sldId id="258"/>
+            <p14:sldId id="267"/>
+          </p14:sldIdLst>
+        </p14:section>
+        <p14:section name="rotate game" id="{0E479545-5496-4D98-AD23-1767E77B9C47}">
+          <p14:sldIdLst>
+            <p14:sldId id="265"/>
+            <p14:sldId id="264"/>
+            <p14:sldId id="260"/>
+            <p14:sldId id="261"/>
+            <p14:sldId id="262"/>
+            <p14:sldId id="263"/>
+            <p14:sldId id="266"/>
+          </p14:sldIdLst>
+        </p14:section>
+      </p14:sectionLst>
+    </p:ext>
     <p:ext uri="{EFAFB233-063F-42B5-8137-9DF3F51BA10A}">
       <p15:sldGuideLst xmlns:p15="http://schemas.microsoft.com/office/powerpoint/2012/main"/>
     </p:ext>
@@ -248,7 +272,7 @@
           <a:p>
             <a:fld id="{60F4A83D-2D3B-48AC-A900-77C718F04BD5}" type="datetimeFigureOut">
               <a:rPr lang="zh-TW" altLang="en-US" smtClean="0"/>
-              <a:t>2024/6/10</a:t>
+              <a:t>2024/6/12</a:t>
             </a:fld>
             <a:endParaRPr lang="zh-TW" altLang="en-US"/>
           </a:p>
@@ -418,7 +442,7 @@
           <a:p>
             <a:fld id="{60F4A83D-2D3B-48AC-A900-77C718F04BD5}" type="datetimeFigureOut">
               <a:rPr lang="zh-TW" altLang="en-US" smtClean="0"/>
-              <a:t>2024/6/10</a:t>
+              <a:t>2024/6/12</a:t>
             </a:fld>
             <a:endParaRPr lang="zh-TW" altLang="en-US"/>
           </a:p>
@@ -598,7 +622,7 @@
           <a:p>
             <a:fld id="{60F4A83D-2D3B-48AC-A900-77C718F04BD5}" type="datetimeFigureOut">
               <a:rPr lang="zh-TW" altLang="en-US" smtClean="0"/>
-              <a:t>2024/6/10</a:t>
+              <a:t>2024/6/12</a:t>
             </a:fld>
             <a:endParaRPr lang="zh-TW" altLang="en-US"/>
           </a:p>
@@ -768,7 +792,7 @@
           <a:p>
             <a:fld id="{60F4A83D-2D3B-48AC-A900-77C718F04BD5}" type="datetimeFigureOut">
               <a:rPr lang="zh-TW" altLang="en-US" smtClean="0"/>
-              <a:t>2024/6/10</a:t>
+              <a:t>2024/6/12</a:t>
             </a:fld>
             <a:endParaRPr lang="zh-TW" altLang="en-US"/>
           </a:p>
@@ -1014,7 +1038,7 @@
           <a:p>
             <a:fld id="{60F4A83D-2D3B-48AC-A900-77C718F04BD5}" type="datetimeFigureOut">
               <a:rPr lang="zh-TW" altLang="en-US" smtClean="0"/>
-              <a:t>2024/6/10</a:t>
+              <a:t>2024/6/12</a:t>
             </a:fld>
             <a:endParaRPr lang="zh-TW" altLang="en-US"/>
           </a:p>
@@ -1246,7 +1270,7 @@
           <a:p>
             <a:fld id="{60F4A83D-2D3B-48AC-A900-77C718F04BD5}" type="datetimeFigureOut">
               <a:rPr lang="zh-TW" altLang="en-US" smtClean="0"/>
-              <a:t>2024/6/10</a:t>
+              <a:t>2024/6/12</a:t>
             </a:fld>
             <a:endParaRPr lang="zh-TW" altLang="en-US"/>
           </a:p>
@@ -1613,7 +1637,7 @@
           <a:p>
             <a:fld id="{60F4A83D-2D3B-48AC-A900-77C718F04BD5}" type="datetimeFigureOut">
               <a:rPr lang="zh-TW" altLang="en-US" smtClean="0"/>
-              <a:t>2024/6/10</a:t>
+              <a:t>2024/6/12</a:t>
             </a:fld>
             <a:endParaRPr lang="zh-TW" altLang="en-US"/>
           </a:p>
@@ -1731,7 +1755,7 @@
           <a:p>
             <a:fld id="{60F4A83D-2D3B-48AC-A900-77C718F04BD5}" type="datetimeFigureOut">
               <a:rPr lang="zh-TW" altLang="en-US" smtClean="0"/>
-              <a:t>2024/6/10</a:t>
+              <a:t>2024/6/12</a:t>
             </a:fld>
             <a:endParaRPr lang="zh-TW" altLang="en-US"/>
           </a:p>
@@ -1826,7 +1850,7 @@
           <a:p>
             <a:fld id="{60F4A83D-2D3B-48AC-A900-77C718F04BD5}" type="datetimeFigureOut">
               <a:rPr lang="zh-TW" altLang="en-US" smtClean="0"/>
-              <a:t>2024/6/10</a:t>
+              <a:t>2024/6/12</a:t>
             </a:fld>
             <a:endParaRPr lang="zh-TW" altLang="en-US"/>
           </a:p>
@@ -2103,7 +2127,7 @@
           <a:p>
             <a:fld id="{60F4A83D-2D3B-48AC-A900-77C718F04BD5}" type="datetimeFigureOut">
               <a:rPr lang="zh-TW" altLang="en-US" smtClean="0"/>
-              <a:t>2024/6/10</a:t>
+              <a:t>2024/6/12</a:t>
             </a:fld>
             <a:endParaRPr lang="zh-TW" altLang="en-US"/>
           </a:p>
@@ -2356,7 +2380,7 @@
           <a:p>
             <a:fld id="{60F4A83D-2D3B-48AC-A900-77C718F04BD5}" type="datetimeFigureOut">
               <a:rPr lang="zh-TW" altLang="en-US" smtClean="0"/>
-              <a:t>2024/6/10</a:t>
+              <a:t>2024/6/12</a:t>
             </a:fld>
             <a:endParaRPr lang="zh-TW" altLang="en-US"/>
           </a:p>
@@ -2569,7 +2593,7 @@
           <a:p>
             <a:fld id="{60F4A83D-2D3B-48AC-A900-77C718F04BD5}" type="datetimeFigureOut">
               <a:rPr lang="zh-TW" altLang="en-US" smtClean="0"/>
-              <a:t>2024/6/10</a:t>
+              <a:t>2024/6/12</a:t>
             </a:fld>
             <a:endParaRPr lang="zh-TW" altLang="en-US"/>
           </a:p>
@@ -2982,6 +3006,447 @@
         </p:nvSpPr>
         <p:spPr>
           <a:xfrm>
+            <a:off x="4885855" y="650009"/>
+            <a:ext cx="2542683" cy="707886"/>
+          </a:xfrm>
+          <a:prstGeom prst="rect">
+            <a:avLst/>
+          </a:prstGeom>
+          <a:noFill/>
+        </p:spPr>
+        <p:txBody>
+          <a:bodyPr wrap="none" rtlCol="0">
+            <a:spAutoFit/>
+          </a:bodyPr>
+          <a:lstStyle/>
+          <a:p>
+            <a:pPr algn="ctr"/>
+            <a:r>
+              <a:rPr lang="en-US" altLang="zh-TW" sz="4000" b="1" dirty="0" smtClean="0">
+                <a:latin typeface="微軟正黑體" panose="020B0604030504040204" pitchFamily="34" charset="-120"/>
+                <a:ea typeface="微軟正黑體" panose="020B0604030504040204" pitchFamily="34" charset="-120"/>
+              </a:rPr>
+              <a:t>5</a:t>
+            </a:r>
+            <a:r>
+              <a:rPr lang="zh-TW" altLang="en-US" sz="4000" b="1" dirty="0" smtClean="0">
+                <a:latin typeface="微軟正黑體" panose="020B0604030504040204" pitchFamily="34" charset="-120"/>
+                <a:ea typeface="微軟正黑體" panose="020B0604030504040204" pitchFamily="34" charset="-120"/>
+              </a:rPr>
+              <a:t>秒反應力</a:t>
+            </a:r>
+            <a:endParaRPr lang="zh-TW" altLang="en-US" sz="4000" b="1" dirty="0">
+              <a:latin typeface="微軟正黑體" panose="020B0604030504040204" pitchFamily="34" charset="-120"/>
+              <a:ea typeface="微軟正黑體" panose="020B0604030504040204" pitchFamily="34" charset="-120"/>
+            </a:endParaRPr>
+          </a:p>
+        </p:txBody>
+      </p:sp>
+      <p:sp>
+        <p:nvSpPr>
+          <p:cNvPr id="8" name="文字方塊 7"/>
+          <p:cNvSpPr txBox="1"/>
+          <p:nvPr/>
+        </p:nvSpPr>
+        <p:spPr>
+          <a:xfrm>
+            <a:off x="6567131" y="2388420"/>
+            <a:ext cx="4418197" cy="2252924"/>
+          </a:xfrm>
+          <a:prstGeom prst="rect">
+            <a:avLst/>
+          </a:prstGeom>
+          <a:noFill/>
+        </p:spPr>
+        <p:txBody>
+          <a:bodyPr wrap="none" rtlCol="0">
+            <a:spAutoFit/>
+          </a:bodyPr>
+          <a:lstStyle/>
+          <a:p>
+            <a:pPr>
+              <a:lnSpc>
+                <a:spcPct val="130000"/>
+              </a:lnSpc>
+            </a:pPr>
+            <a:r>
+              <a:rPr lang="zh-TW" altLang="en-US" sz="3600" dirty="0" smtClean="0">
+                <a:latin typeface="微軟正黑體" panose="020B0604030504040204" pitchFamily="34" charset="-120"/>
+                <a:ea typeface="微軟正黑體" panose="020B0604030504040204" pitchFamily="34" charset="-120"/>
+              </a:rPr>
+              <a:t>遊戲人數</a:t>
+            </a:r>
+            <a:r>
+              <a:rPr lang="zh-TW" altLang="en-US" sz="3600" dirty="0" smtClean="0">
+                <a:latin typeface="微軟正黑體" panose="020B0604030504040204" pitchFamily="34" charset="-120"/>
+                <a:ea typeface="微軟正黑體" panose="020B0604030504040204" pitchFamily="34" charset="-120"/>
+              </a:rPr>
+              <a:t>：不限</a:t>
+            </a:r>
+            <a:endParaRPr lang="en-US" altLang="zh-TW" sz="3600" dirty="0" smtClean="0">
+              <a:latin typeface="微軟正黑體" panose="020B0604030504040204" pitchFamily="34" charset="-120"/>
+              <a:ea typeface="微軟正黑體" panose="020B0604030504040204" pitchFamily="34" charset="-120"/>
+            </a:endParaRPr>
+          </a:p>
+          <a:p>
+            <a:pPr>
+              <a:lnSpc>
+                <a:spcPct val="130000"/>
+              </a:lnSpc>
+            </a:pPr>
+            <a:r>
+              <a:rPr lang="zh-TW" altLang="en-US" sz="3600" dirty="0">
+                <a:latin typeface="微軟正黑體" panose="020B0604030504040204" pitchFamily="34" charset="-120"/>
+                <a:ea typeface="微軟正黑體" panose="020B0604030504040204" pitchFamily="34" charset="-120"/>
+              </a:rPr>
+              <a:t>遊戲</a:t>
+            </a:r>
+            <a:r>
+              <a:rPr lang="zh-TW" altLang="en-US" sz="3600" dirty="0" smtClean="0">
+                <a:latin typeface="微軟正黑體" panose="020B0604030504040204" pitchFamily="34" charset="-120"/>
+                <a:ea typeface="微軟正黑體" panose="020B0604030504040204" pitchFamily="34" charset="-120"/>
+              </a:rPr>
+              <a:t>時間：</a:t>
+            </a:r>
+            <a:r>
+              <a:rPr lang="en-US" altLang="zh-TW" sz="3600" dirty="0" smtClean="0">
+                <a:latin typeface="微軟正黑體" panose="020B0604030504040204" pitchFamily="34" charset="-120"/>
+                <a:ea typeface="微軟正黑體" panose="020B0604030504040204" pitchFamily="34" charset="-120"/>
+              </a:rPr>
+              <a:t>5-10</a:t>
+            </a:r>
+            <a:r>
+              <a:rPr lang="zh-TW" altLang="en-US" sz="3600" dirty="0" smtClean="0">
+                <a:latin typeface="微軟正黑體" panose="020B0604030504040204" pitchFamily="34" charset="-120"/>
+                <a:ea typeface="微軟正黑體" panose="020B0604030504040204" pitchFamily="34" charset="-120"/>
+              </a:rPr>
+              <a:t>分鐘</a:t>
+            </a:r>
+            <a:endParaRPr lang="en-US" altLang="zh-TW" sz="3600" dirty="0" smtClean="0">
+              <a:latin typeface="微軟正黑體" panose="020B0604030504040204" pitchFamily="34" charset="-120"/>
+              <a:ea typeface="微軟正黑體" panose="020B0604030504040204" pitchFamily="34" charset="-120"/>
+            </a:endParaRPr>
+          </a:p>
+          <a:p>
+            <a:pPr>
+              <a:lnSpc>
+                <a:spcPct val="130000"/>
+              </a:lnSpc>
+            </a:pPr>
+            <a:r>
+              <a:rPr lang="zh-TW" altLang="en-US" sz="3600" dirty="0" smtClean="0">
+                <a:latin typeface="微軟正黑體" panose="020B0604030504040204" pitchFamily="34" charset="-120"/>
+                <a:ea typeface="微軟正黑體" panose="020B0604030504040204" pitchFamily="34" charset="-120"/>
+              </a:rPr>
+              <a:t>難易度：★</a:t>
+            </a:r>
+            <a:r>
+              <a:rPr lang="zh-TW" altLang="en-US" sz="3600" dirty="0">
+                <a:latin typeface="微軟正黑體" panose="020B0604030504040204" pitchFamily="34" charset="-120"/>
+                <a:ea typeface="微軟正黑體" panose="020B0604030504040204" pitchFamily="34" charset="-120"/>
+              </a:rPr>
+              <a:t> </a:t>
+            </a:r>
+            <a:endParaRPr lang="en-US" altLang="zh-TW" sz="3600" dirty="0" smtClean="0">
+              <a:latin typeface="微軟正黑體" panose="020B0604030504040204" pitchFamily="34" charset="-120"/>
+              <a:ea typeface="微軟正黑體" panose="020B0604030504040204" pitchFamily="34" charset="-120"/>
+            </a:endParaRPr>
+          </a:p>
+        </p:txBody>
+      </p:sp>
+      <p:pic>
+        <p:nvPicPr>
+          <p:cNvPr id="3" name="圖片 2"/>
+          <p:cNvPicPr>
+            <a:picLocks noChangeAspect="1"/>
+          </p:cNvPicPr>
+          <p:nvPr/>
+        </p:nvPicPr>
+        <p:blipFill>
+          <a:blip r:embed="rId2"/>
+          <a:stretch>
+            <a:fillRect/>
+          </a:stretch>
+        </p:blipFill>
+        <p:spPr>
+          <a:xfrm>
+            <a:off x="683490" y="1989664"/>
+            <a:ext cx="5404247" cy="3050436"/>
+          </a:xfrm>
+          <a:prstGeom prst="rect">
+            <a:avLst/>
+          </a:prstGeom>
+        </p:spPr>
+      </p:pic>
+    </p:spTree>
+    <p:extLst>
+      <p:ext uri="{BB962C8B-B14F-4D97-AF65-F5344CB8AC3E}">
+        <p14:creationId xmlns:p14="http://schemas.microsoft.com/office/powerpoint/2010/main" val="3415740417"/>
+      </p:ext>
+    </p:extLst>
+  </p:cSld>
+  <p:clrMapOvr>
+    <a:masterClrMapping/>
+  </p:clrMapOvr>
+</p:sld>
+</file>
+
+<file path=ppt/slides/slide2.xml><?xml version="1.0" encoding="utf-8"?>
+<p:sld xmlns:a="http://schemas.openxmlformats.org/drawingml/2006/main" xmlns:r="http://schemas.openxmlformats.org/officeDocument/2006/relationships" xmlns:p="http://schemas.openxmlformats.org/presentationml/2006/main">
+  <p:cSld>
+    <p:spTree>
+      <p:nvGrpSpPr>
+        <p:cNvPr id="1" name=""/>
+        <p:cNvGrpSpPr/>
+        <p:nvPr/>
+      </p:nvGrpSpPr>
+      <p:grpSpPr>
+        <a:xfrm>
+          <a:off x="0" y="0"/>
+          <a:ext cx="0" cy="0"/>
+          <a:chOff x="0" y="0"/>
+          <a:chExt cx="0" cy="0"/>
+        </a:xfrm>
+      </p:grpSpPr>
+      <p:sp>
+        <p:nvSpPr>
+          <p:cNvPr id="6" name="文字方塊 5"/>
+          <p:cNvSpPr txBox="1"/>
+          <p:nvPr/>
+        </p:nvSpPr>
+        <p:spPr>
+          <a:xfrm>
+            <a:off x="3859929" y="650009"/>
+            <a:ext cx="4594526" cy="1323439"/>
+          </a:xfrm>
+          <a:prstGeom prst="rect">
+            <a:avLst/>
+          </a:prstGeom>
+          <a:noFill/>
+        </p:spPr>
+        <p:txBody>
+          <a:bodyPr wrap="none" rtlCol="0">
+            <a:spAutoFit/>
+          </a:bodyPr>
+          <a:lstStyle/>
+          <a:p>
+            <a:pPr algn="ctr"/>
+            <a:r>
+              <a:rPr lang="zh-TW" altLang="en-US" sz="4000" dirty="0" smtClean="0">
+                <a:latin typeface="微軟正黑體" panose="020B0604030504040204" pitchFamily="34" charset="-120"/>
+                <a:ea typeface="微軟正黑體" panose="020B0604030504040204" pitchFamily="34" charset="-120"/>
+              </a:rPr>
+              <a:t>遊戲勝利條件</a:t>
+            </a:r>
+            <a:endParaRPr lang="en-US" altLang="zh-TW" sz="4000" dirty="0" smtClean="0">
+              <a:latin typeface="微軟正黑體" panose="020B0604030504040204" pitchFamily="34" charset="-120"/>
+              <a:ea typeface="微軟正黑體" panose="020B0604030504040204" pitchFamily="34" charset="-120"/>
+            </a:endParaRPr>
+          </a:p>
+          <a:p>
+            <a:pPr algn="ctr"/>
+            <a:r>
+              <a:rPr lang="en-US" altLang="zh-TW" sz="4000" b="1" dirty="0" smtClean="0">
+                <a:latin typeface="微軟正黑體" panose="020B0604030504040204" pitchFamily="34" charset="-120"/>
+                <a:ea typeface="微軟正黑體" panose="020B0604030504040204" pitchFamily="34" charset="-120"/>
+              </a:rPr>
+              <a:t>5</a:t>
+            </a:r>
+            <a:r>
+              <a:rPr lang="zh-TW" altLang="en-US" sz="4000" b="1" dirty="0" smtClean="0">
+                <a:latin typeface="微軟正黑體" panose="020B0604030504040204" pitchFamily="34" charset="-120"/>
+                <a:ea typeface="微軟正黑體" panose="020B0604030504040204" pitchFamily="34" charset="-120"/>
+              </a:rPr>
+              <a:t>秒內回答指定問題</a:t>
+            </a:r>
+            <a:endParaRPr lang="zh-TW" altLang="en-US" sz="4000" b="1" dirty="0">
+              <a:latin typeface="微軟正黑體" panose="020B0604030504040204" pitchFamily="34" charset="-120"/>
+              <a:ea typeface="微軟正黑體" panose="020B0604030504040204" pitchFamily="34" charset="-120"/>
+            </a:endParaRPr>
+          </a:p>
+        </p:txBody>
+      </p:sp>
+      <p:sp>
+        <p:nvSpPr>
+          <p:cNvPr id="2" name="矩形 1"/>
+          <p:cNvSpPr/>
+          <p:nvPr/>
+        </p:nvSpPr>
+        <p:spPr>
+          <a:xfrm>
+            <a:off x="18473" y="6262255"/>
+            <a:ext cx="12192000" cy="498763"/>
+          </a:xfrm>
+          <a:prstGeom prst="rect">
+            <a:avLst/>
+          </a:prstGeom>
+          <a:solidFill>
+            <a:schemeClr val="bg1"/>
+          </a:solidFill>
+          <a:ln>
+            <a:noFill/>
+          </a:ln>
+        </p:spPr>
+        <p:style>
+          <a:lnRef idx="2">
+            <a:schemeClr val="accent1">
+              <a:shade val="50000"/>
+            </a:schemeClr>
+          </a:lnRef>
+          <a:fillRef idx="1">
+            <a:schemeClr val="accent1"/>
+          </a:fillRef>
+          <a:effectRef idx="0">
+            <a:schemeClr val="accent1"/>
+          </a:effectRef>
+          <a:fontRef idx="minor">
+            <a:schemeClr val="lt1"/>
+          </a:fontRef>
+        </p:style>
+        <p:txBody>
+          <a:bodyPr rtlCol="0" anchor="ctr"/>
+          <a:lstStyle/>
+          <a:p>
+            <a:pPr algn="ctr"/>
+            <a:endParaRPr lang="zh-TW" altLang="en-US"/>
+          </a:p>
+        </p:txBody>
+      </p:sp>
+      <p:sp>
+        <p:nvSpPr>
+          <p:cNvPr id="8" name="文字方塊 7"/>
+          <p:cNvSpPr txBox="1"/>
+          <p:nvPr/>
+        </p:nvSpPr>
+        <p:spPr>
+          <a:xfrm>
+            <a:off x="6612444" y="3116518"/>
+            <a:ext cx="3684022" cy="1458669"/>
+          </a:xfrm>
+          <a:prstGeom prst="rect">
+            <a:avLst/>
+          </a:prstGeom>
+          <a:noFill/>
+        </p:spPr>
+        <p:txBody>
+          <a:bodyPr wrap="none" rtlCol="0">
+            <a:spAutoFit/>
+          </a:bodyPr>
+          <a:lstStyle/>
+          <a:p>
+            <a:pPr>
+              <a:lnSpc>
+                <a:spcPct val="130000"/>
+              </a:lnSpc>
+            </a:pPr>
+            <a:r>
+              <a:rPr lang="zh-TW" altLang="en-US" sz="3600" dirty="0" smtClean="0">
+                <a:latin typeface="微軟正黑體" panose="020B0604030504040204" pitchFamily="34" charset="-120"/>
+                <a:ea typeface="微軟正黑體" panose="020B0604030504040204" pitchFamily="34" charset="-120"/>
+              </a:rPr>
+              <a:t>題目皆為列出</a:t>
+            </a:r>
+            <a:r>
+              <a:rPr lang="en-US" altLang="zh-TW" sz="3600" dirty="0" smtClean="0">
+                <a:latin typeface="微軟正黑體" panose="020B0604030504040204" pitchFamily="34" charset="-120"/>
+                <a:ea typeface="微軟正黑體" panose="020B0604030504040204" pitchFamily="34" charset="-120"/>
+              </a:rPr>
+              <a:t>3</a:t>
+            </a:r>
+            <a:r>
+              <a:rPr lang="zh-TW" altLang="en-US" sz="3600" dirty="0" smtClean="0">
+                <a:latin typeface="微軟正黑體" panose="020B0604030504040204" pitchFamily="34" charset="-120"/>
+                <a:ea typeface="微軟正黑體" panose="020B0604030504040204" pitchFamily="34" charset="-120"/>
+              </a:rPr>
+              <a:t>個</a:t>
+            </a:r>
+            <a:endParaRPr lang="en-US" altLang="zh-TW" sz="3600" dirty="0" smtClean="0">
+              <a:latin typeface="微軟正黑體" panose="020B0604030504040204" pitchFamily="34" charset="-120"/>
+              <a:ea typeface="微軟正黑體" panose="020B0604030504040204" pitchFamily="34" charset="-120"/>
+            </a:endParaRPr>
+          </a:p>
+          <a:p>
+            <a:pPr>
+              <a:lnSpc>
+                <a:spcPct val="130000"/>
+              </a:lnSpc>
+            </a:pPr>
+            <a:r>
+              <a:rPr lang="zh-TW" altLang="en-US" sz="3600" dirty="0" smtClean="0">
+                <a:latin typeface="微軟正黑體" panose="020B0604030504040204" pitchFamily="34" charset="-120"/>
+                <a:ea typeface="微軟正黑體" panose="020B0604030504040204" pitchFamily="34" charset="-120"/>
+              </a:rPr>
+              <a:t>相同類型項目</a:t>
+            </a:r>
+            <a:endParaRPr lang="en-US" altLang="zh-TW" sz="3600" dirty="0" smtClean="0">
+              <a:latin typeface="微軟正黑體" panose="020B0604030504040204" pitchFamily="34" charset="-120"/>
+              <a:ea typeface="微軟正黑體" panose="020B0604030504040204" pitchFamily="34" charset="-120"/>
+            </a:endParaRPr>
+          </a:p>
+        </p:txBody>
+      </p:sp>
+      <p:pic>
+        <p:nvPicPr>
+          <p:cNvPr id="9" name="圖片 8"/>
+          <p:cNvPicPr>
+            <a:picLocks noChangeAspect="1"/>
+          </p:cNvPicPr>
+          <p:nvPr/>
+        </p:nvPicPr>
+        <p:blipFill>
+          <a:blip r:embed="rId2"/>
+          <a:stretch>
+            <a:fillRect/>
+          </a:stretch>
+        </p:blipFill>
+        <p:spPr>
+          <a:xfrm>
+            <a:off x="683490" y="2592633"/>
+            <a:ext cx="5404247" cy="3050436"/>
+          </a:xfrm>
+          <a:prstGeom prst="rect">
+            <a:avLst/>
+          </a:prstGeom>
+        </p:spPr>
+      </p:pic>
+    </p:spTree>
+    <p:extLst>
+      <p:ext uri="{BB962C8B-B14F-4D97-AF65-F5344CB8AC3E}">
+        <p14:creationId xmlns:p14="http://schemas.microsoft.com/office/powerpoint/2010/main" val="82391255"/>
+      </p:ext>
+    </p:extLst>
+  </p:cSld>
+  <p:clrMapOvr>
+    <a:masterClrMapping/>
+  </p:clrMapOvr>
+</p:sld>
+</file>
+
+<file path=ppt/slides/slide3.xml><?xml version="1.0" encoding="utf-8"?>
+<p:sld xmlns:a="http://schemas.openxmlformats.org/drawingml/2006/main" xmlns:r="http://schemas.openxmlformats.org/officeDocument/2006/relationships" xmlns:p="http://schemas.openxmlformats.org/presentationml/2006/main">
+  <p:cSld>
+    <p:spTree>
+      <p:nvGrpSpPr>
+        <p:cNvPr id="1" name=""/>
+        <p:cNvGrpSpPr/>
+        <p:nvPr/>
+      </p:nvGrpSpPr>
+      <p:grpSpPr>
+        <a:xfrm>
+          <a:off x="0" y="0"/>
+          <a:ext cx="0" cy="0"/>
+          <a:chOff x="0" y="0"/>
+          <a:chExt cx="0" cy="0"/>
+        </a:xfrm>
+      </p:grpSpPr>
+      <p:sp>
+        <p:nvSpPr>
+          <p:cNvPr id="6" name="文字方塊 5"/>
+          <p:cNvSpPr txBox="1"/>
+          <p:nvPr/>
+        </p:nvSpPr>
+        <p:spPr>
+          <a:xfrm>
             <a:off x="5295418" y="650009"/>
             <a:ext cx="1723549" cy="707886"/>
           </a:xfrm>
@@ -3153,7 +3618,7 @@
     </p:spTree>
     <p:extLst>
       <p:ext uri="{BB962C8B-B14F-4D97-AF65-F5344CB8AC3E}">
-        <p14:creationId xmlns:p14="http://schemas.microsoft.com/office/powerpoint/2010/main" val="3415740417"/>
+        <p14:creationId xmlns:p14="http://schemas.microsoft.com/office/powerpoint/2010/main" val="1713599051"/>
       </p:ext>
     </p:extLst>
   </p:cSld>
@@ -3163,7 +3628,7 @@
 </p:sld>
 </file>
 
-<file path=ppt/slides/slide2.xml><?xml version="1.0" encoding="utf-8"?>
+<file path=ppt/slides/slide4.xml><?xml version="1.0" encoding="utf-8"?>
 <p:sld xmlns:a="http://schemas.openxmlformats.org/drawingml/2006/main" xmlns:r="http://schemas.openxmlformats.org/officeDocument/2006/relationships" xmlns:p="http://schemas.openxmlformats.org/presentationml/2006/main">
   <p:cSld>
     <p:spTree>
@@ -3361,7 +3826,7 @@
 </p:sld>
 </file>
 
-<file path=ppt/slides/slide3.xml><?xml version="1.0" encoding="utf-8"?>
+<file path=ppt/slides/slide5.xml><?xml version="1.0" encoding="utf-8"?>
 <p:sld xmlns:a="http://schemas.openxmlformats.org/drawingml/2006/main" xmlns:r="http://schemas.openxmlformats.org/officeDocument/2006/relationships" xmlns:p="http://schemas.openxmlformats.org/presentationml/2006/main">
   <p:cSld>
     <p:spTree>
@@ -3491,28 +3956,14 @@
                 <a:latin typeface="微軟正黑體" panose="020B0604030504040204" pitchFamily="34" charset="-120"/>
                 <a:ea typeface="微軟正黑體" panose="020B0604030504040204" pitchFamily="34" charset="-120"/>
               </a:rPr>
-              <a:t>(must</a:t>
-            </a:r>
-            <a:r>
-              <a:rPr lang="en-US" altLang="zh-TW" sz="3600" dirty="0" smtClean="0">
-                <a:latin typeface="微軟正黑體" panose="020B0604030504040204" pitchFamily="34" charset="-120"/>
-                <a:ea typeface="微軟正黑體" panose="020B0604030504040204" pitchFamily="34" charset="-120"/>
-              </a:rPr>
-              <a:t>)</a:t>
+              <a:t>(must)</a:t>
             </a:r>
             <a:r>
               <a:rPr lang="zh-TW" altLang="en-US" sz="3600" dirty="0" smtClean="0">
                 <a:latin typeface="微軟正黑體" panose="020B0604030504040204" pitchFamily="34" charset="-120"/>
                 <a:ea typeface="微軟正黑體" panose="020B0604030504040204" pitchFamily="34" charset="-120"/>
               </a:rPr>
-              <a:t> 旋轉</a:t>
-            </a:r>
-            <a:r>
-              <a:rPr lang="zh-TW" altLang="en-US" sz="3600" dirty="0" smtClean="0">
-                <a:latin typeface="微軟正黑體" panose="020B0604030504040204" pitchFamily="34" charset="-120"/>
-                <a:ea typeface="微軟正黑體" panose="020B0604030504040204" pitchFamily="34" charset="-120"/>
-              </a:rPr>
-              <a:t>棋盤</a:t>
+              <a:t> 旋轉棋盤</a:t>
             </a:r>
             <a:endParaRPr lang="en-US" altLang="zh-TW" sz="3600" dirty="0" smtClean="0">
               <a:latin typeface="微軟正黑體" panose="020B0604030504040204" pitchFamily="34" charset="-120"/>
@@ -3546,7 +3997,7 @@
 </p:sld>
 </file>
 
-<file path=ppt/slides/slide4.xml><?xml version="1.0" encoding="utf-8"?>
+<file path=ppt/slides/slide6.xml><?xml version="1.0" encoding="utf-8"?>
 <p:sld xmlns:a="http://schemas.openxmlformats.org/drawingml/2006/main" xmlns:r="http://schemas.openxmlformats.org/officeDocument/2006/relationships" xmlns:p="http://schemas.openxmlformats.org/presentationml/2006/main">
   <p:cSld>
     <p:spTree>
@@ -3735,7 +4186,7 @@
 </p:sld>
 </file>
 
-<file path=ppt/slides/slide5.xml><?xml version="1.0" encoding="utf-8"?>
+<file path=ppt/slides/slide7.xml><?xml version="1.0" encoding="utf-8"?>
 <p:sld xmlns:a="http://schemas.openxmlformats.org/drawingml/2006/main" xmlns:r="http://schemas.openxmlformats.org/officeDocument/2006/relationships" xmlns:p="http://schemas.openxmlformats.org/presentationml/2006/main">
   <p:cSld>
     <p:spTree>
@@ -3861,7 +4312,7 @@
 </p:sld>
 </file>
 
-<file path=ppt/slides/slide6.xml><?xml version="1.0" encoding="utf-8"?>
+<file path=ppt/slides/slide8.xml><?xml version="1.0" encoding="utf-8"?>
 <p:sld xmlns:a="http://schemas.openxmlformats.org/drawingml/2006/main" xmlns:r="http://schemas.openxmlformats.org/officeDocument/2006/relationships" xmlns:p="http://schemas.openxmlformats.org/presentationml/2006/main">
   <p:cSld>
     <p:spTree>
@@ -3930,28 +4381,14 @@
                 <a:latin typeface="微軟正黑體" panose="020B0604030504040204" pitchFamily="34" charset="-120"/>
                 <a:ea typeface="微軟正黑體" panose="020B0604030504040204" pitchFamily="34" charset="-120"/>
               </a:rPr>
-              <a:t>(must</a:t>
-            </a:r>
-            <a:r>
-              <a:rPr lang="en-US" altLang="zh-TW" sz="3600" dirty="0" smtClean="0">
-                <a:latin typeface="微軟正黑體" panose="020B0604030504040204" pitchFamily="34" charset="-120"/>
-                <a:ea typeface="微軟正黑體" panose="020B0604030504040204" pitchFamily="34" charset="-120"/>
-              </a:rPr>
-              <a:t>)</a:t>
+              <a:t>(must)</a:t>
             </a:r>
             <a:r>
               <a:rPr lang="zh-TW" altLang="en-US" sz="3600" dirty="0" smtClean="0">
                 <a:latin typeface="微軟正黑體" panose="020B0604030504040204" pitchFamily="34" charset="-120"/>
                 <a:ea typeface="微軟正黑體" panose="020B0604030504040204" pitchFamily="34" charset="-120"/>
               </a:rPr>
-              <a:t> 旋轉</a:t>
-            </a:r>
-            <a:r>
-              <a:rPr lang="zh-TW" altLang="en-US" sz="3600" dirty="0" smtClean="0">
-                <a:latin typeface="微軟正黑體" panose="020B0604030504040204" pitchFamily="34" charset="-120"/>
-                <a:ea typeface="微軟正黑體" panose="020B0604030504040204" pitchFamily="34" charset="-120"/>
-              </a:rPr>
-              <a:t>棋盤</a:t>
+              <a:t> 旋轉棋盤</a:t>
             </a:r>
             <a:endParaRPr lang="en-US" altLang="zh-TW" sz="3600" dirty="0" smtClean="0">
               <a:latin typeface="微軟正黑體" panose="020B0604030504040204" pitchFamily="34" charset="-120"/>
@@ -4084,6 +4521,511 @@
     <p:extLst>
       <p:ext uri="{BB962C8B-B14F-4D97-AF65-F5344CB8AC3E}">
         <p14:creationId xmlns:p14="http://schemas.microsoft.com/office/powerpoint/2010/main" val="3026181878"/>
+      </p:ext>
+    </p:extLst>
+  </p:cSld>
+  <p:clrMapOvr>
+    <a:masterClrMapping/>
+  </p:clrMapOvr>
+</p:sld>
+</file>
+
+<file path=ppt/slides/slide9.xml><?xml version="1.0" encoding="utf-8"?>
+<p:sld xmlns:a="http://schemas.openxmlformats.org/drawingml/2006/main" xmlns:r="http://schemas.openxmlformats.org/officeDocument/2006/relationships" xmlns:p="http://schemas.openxmlformats.org/presentationml/2006/main">
+  <p:cSld>
+    <p:spTree>
+      <p:nvGrpSpPr>
+        <p:cNvPr id="1" name=""/>
+        <p:cNvGrpSpPr/>
+        <p:nvPr/>
+      </p:nvGrpSpPr>
+      <p:grpSpPr>
+        <a:xfrm>
+          <a:off x="0" y="0"/>
+          <a:ext cx="0" cy="0"/>
+          <a:chOff x="0" y="0"/>
+          <a:chExt cx="0" cy="0"/>
+        </a:xfrm>
+      </p:grpSpPr>
+      <p:sp>
+        <p:nvSpPr>
+          <p:cNvPr id="6" name="文字方塊 5"/>
+          <p:cNvSpPr txBox="1"/>
+          <p:nvPr/>
+        </p:nvSpPr>
+        <p:spPr>
+          <a:xfrm>
+            <a:off x="1136149" y="802409"/>
+            <a:ext cx="1285929" cy="738472"/>
+          </a:xfrm>
+          <a:prstGeom prst="rect">
+            <a:avLst/>
+          </a:prstGeom>
+          <a:noFill/>
+        </p:spPr>
+        <p:txBody>
+          <a:bodyPr wrap="none" rtlCol="0">
+            <a:spAutoFit/>
+          </a:bodyPr>
+          <a:lstStyle/>
+          <a:p>
+            <a:pPr>
+              <a:lnSpc>
+                <a:spcPct val="130000"/>
+              </a:lnSpc>
+            </a:pPr>
+            <a:r>
+              <a:rPr lang="en-US" altLang="zh-TW" sz="3600" dirty="0" smtClean="0">
+                <a:latin typeface="微軟正黑體" panose="020B0604030504040204" pitchFamily="34" charset="-120"/>
+                <a:ea typeface="微軟正黑體" panose="020B0604030504040204" pitchFamily="34" charset="-120"/>
+              </a:rPr>
+              <a:t>SPEC</a:t>
+            </a:r>
+            <a:endParaRPr lang="zh-TW" altLang="en-US" sz="3600" dirty="0">
+              <a:latin typeface="微軟正黑體" panose="020B0604030504040204" pitchFamily="34" charset="-120"/>
+              <a:ea typeface="微軟正黑體" panose="020B0604030504040204" pitchFamily="34" charset="-120"/>
+            </a:endParaRPr>
+          </a:p>
+        </p:txBody>
+      </p:sp>
+      <p:pic>
+        <p:nvPicPr>
+          <p:cNvPr id="7" name="圖片 6"/>
+          <p:cNvPicPr>
+            <a:picLocks noChangeAspect="1"/>
+          </p:cNvPicPr>
+          <p:nvPr/>
+        </p:nvPicPr>
+        <p:blipFill>
+          <a:blip r:embed="rId2"/>
+          <a:stretch>
+            <a:fillRect/>
+          </a:stretch>
+        </p:blipFill>
+        <p:spPr>
+          <a:xfrm>
+            <a:off x="1205193" y="2009640"/>
+            <a:ext cx="3683164" cy="3658445"/>
+          </a:xfrm>
+          <a:prstGeom prst="rect">
+            <a:avLst/>
+          </a:prstGeom>
+        </p:spPr>
+      </p:pic>
+      <p:graphicFrame>
+        <p:nvGraphicFramePr>
+          <p:cNvPr id="8" name="表格 7"/>
+          <p:cNvGraphicFramePr>
+            <a:graphicFrameLocks noGrp="1"/>
+          </p:cNvGraphicFramePr>
+          <p:nvPr>
+            <p:extLst>
+              <p:ext uri="{D42A27DB-BD31-4B8C-83A1-F6EECF244321}">
+                <p14:modId xmlns:p14="http://schemas.microsoft.com/office/powerpoint/2010/main" val="2583368440"/>
+              </p:ext>
+            </p:extLst>
+          </p:nvPr>
+        </p:nvGraphicFramePr>
+        <p:xfrm>
+          <a:off x="5504872" y="2230158"/>
+          <a:ext cx="3240000" cy="3240000"/>
+        </p:xfrm>
+        <a:graphic>
+          <a:graphicData uri="http://schemas.openxmlformats.org/drawingml/2006/table">
+            <a:tbl>
+              <a:tblPr firstRow="1" bandRow="1">
+                <a:tableStyleId>{5940675A-B579-460E-94D1-54222C63F5DA}</a:tableStyleId>
+              </a:tblPr>
+              <a:tblGrid>
+                <a:gridCol w="810000">
+                  <a:extLst>
+                    <a:ext uri="{9D8B030D-6E8A-4147-A177-3AD203B41FA5}">
+                      <a16:colId xmlns:a16="http://schemas.microsoft.com/office/drawing/2014/main" val="4154758723"/>
+                    </a:ext>
+                  </a:extLst>
+                </a:gridCol>
+                <a:gridCol w="810000">
+                  <a:extLst>
+                    <a:ext uri="{9D8B030D-6E8A-4147-A177-3AD203B41FA5}">
+                      <a16:colId xmlns:a16="http://schemas.microsoft.com/office/drawing/2014/main" val="2413484256"/>
+                    </a:ext>
+                  </a:extLst>
+                </a:gridCol>
+                <a:gridCol w="810000">
+                  <a:extLst>
+                    <a:ext uri="{9D8B030D-6E8A-4147-A177-3AD203B41FA5}">
+                      <a16:colId xmlns:a16="http://schemas.microsoft.com/office/drawing/2014/main" val="232552660"/>
+                    </a:ext>
+                  </a:extLst>
+                </a:gridCol>
+                <a:gridCol w="810000">
+                  <a:extLst>
+                    <a:ext uri="{9D8B030D-6E8A-4147-A177-3AD203B41FA5}">
+                      <a16:colId xmlns:a16="http://schemas.microsoft.com/office/drawing/2014/main" val="645051837"/>
+                    </a:ext>
+                  </a:extLst>
+                </a:gridCol>
+              </a:tblGrid>
+              <a:tr h="810000">
+                <a:tc>
+                  <a:txBody>
+                    <a:bodyPr/>
+                    <a:lstStyle/>
+                    <a:p>
+                      <a:pPr algn="ctr"/>
+                      <a:r>
+                        <a:rPr lang="en-US" altLang="zh-TW" dirty="0" smtClean="0"/>
+                        <a:t>0</a:t>
+                      </a:r>
+                      <a:endParaRPr lang="zh-TW" altLang="en-US" dirty="0"/>
+                    </a:p>
+                  </a:txBody>
+                  <a:tcPr anchor="ctr"/>
+                </a:tc>
+                <a:tc>
+                  <a:txBody>
+                    <a:bodyPr/>
+                    <a:lstStyle/>
+                    <a:p>
+                      <a:pPr algn="ctr"/>
+                      <a:r>
+                        <a:rPr lang="en-US" altLang="zh-TW" dirty="0" smtClean="0"/>
+                        <a:t>1</a:t>
+                      </a:r>
+                      <a:endParaRPr lang="zh-TW" altLang="en-US" dirty="0"/>
+                    </a:p>
+                  </a:txBody>
+                  <a:tcPr anchor="ctr"/>
+                </a:tc>
+                <a:tc>
+                  <a:txBody>
+                    <a:bodyPr/>
+                    <a:lstStyle/>
+                    <a:p>
+                      <a:pPr algn="ctr"/>
+                      <a:r>
+                        <a:rPr lang="en-US" altLang="zh-TW" dirty="0" smtClean="0"/>
+                        <a:t>2</a:t>
+                      </a:r>
+                      <a:endParaRPr lang="zh-TW" altLang="en-US" dirty="0"/>
+                    </a:p>
+                  </a:txBody>
+                  <a:tcPr anchor="ctr"/>
+                </a:tc>
+                <a:tc>
+                  <a:txBody>
+                    <a:bodyPr/>
+                    <a:lstStyle/>
+                    <a:p>
+                      <a:pPr algn="ctr"/>
+                      <a:r>
+                        <a:rPr lang="en-US" altLang="zh-TW" dirty="0" smtClean="0"/>
+                        <a:t>3</a:t>
+                      </a:r>
+                      <a:endParaRPr lang="zh-TW" altLang="en-US" dirty="0"/>
+                    </a:p>
+                  </a:txBody>
+                  <a:tcPr anchor="ctr"/>
+                </a:tc>
+                <a:extLst>
+                  <a:ext uri="{0D108BD9-81ED-4DB2-BD59-A6C34878D82A}">
+                    <a16:rowId xmlns:a16="http://schemas.microsoft.com/office/drawing/2014/main" val="959135872"/>
+                  </a:ext>
+                </a:extLst>
+              </a:tr>
+              <a:tr h="810000">
+                <a:tc>
+                  <a:txBody>
+                    <a:bodyPr/>
+                    <a:lstStyle/>
+                    <a:p>
+                      <a:pPr algn="ctr"/>
+                      <a:r>
+                        <a:rPr lang="en-US" altLang="zh-TW" dirty="0" smtClean="0"/>
+                        <a:t>11</a:t>
+                      </a:r>
+                      <a:endParaRPr lang="zh-TW" altLang="en-US" dirty="0"/>
+                    </a:p>
+                  </a:txBody>
+                  <a:tcPr anchor="ctr"/>
+                </a:tc>
+                <a:tc>
+                  <a:txBody>
+                    <a:bodyPr/>
+                    <a:lstStyle/>
+                    <a:p>
+                      <a:pPr algn="ctr"/>
+                      <a:r>
+                        <a:rPr lang="en-US" altLang="zh-TW" dirty="0" smtClean="0"/>
+                        <a:t>0</a:t>
+                      </a:r>
+                      <a:endParaRPr lang="zh-TW" altLang="en-US" dirty="0"/>
+                    </a:p>
+                  </a:txBody>
+                  <a:tcPr anchor="ctr">
+                    <a:solidFill>
+                      <a:schemeClr val="bg2">
+                        <a:lumMod val="90000"/>
+                      </a:schemeClr>
+                    </a:solidFill>
+                  </a:tcPr>
+                </a:tc>
+                <a:tc>
+                  <a:txBody>
+                    <a:bodyPr/>
+                    <a:lstStyle/>
+                    <a:p>
+                      <a:pPr algn="ctr"/>
+                      <a:r>
+                        <a:rPr lang="en-US" altLang="zh-TW" dirty="0" smtClean="0"/>
+                        <a:t>1</a:t>
+                      </a:r>
+                      <a:endParaRPr lang="zh-TW" altLang="en-US" dirty="0"/>
+                    </a:p>
+                  </a:txBody>
+                  <a:tcPr anchor="ctr">
+                    <a:solidFill>
+                      <a:schemeClr val="bg2">
+                        <a:lumMod val="90000"/>
+                      </a:schemeClr>
+                    </a:solidFill>
+                  </a:tcPr>
+                </a:tc>
+                <a:tc>
+                  <a:txBody>
+                    <a:bodyPr/>
+                    <a:lstStyle/>
+                    <a:p>
+                      <a:pPr algn="ctr"/>
+                      <a:r>
+                        <a:rPr lang="en-US" altLang="zh-TW" dirty="0" smtClean="0"/>
+                        <a:t>4</a:t>
+                      </a:r>
+                      <a:endParaRPr lang="zh-TW" altLang="en-US" dirty="0"/>
+                    </a:p>
+                  </a:txBody>
+                  <a:tcPr anchor="ctr"/>
+                </a:tc>
+                <a:extLst>
+                  <a:ext uri="{0D108BD9-81ED-4DB2-BD59-A6C34878D82A}">
+                    <a16:rowId xmlns:a16="http://schemas.microsoft.com/office/drawing/2014/main" val="801912394"/>
+                  </a:ext>
+                </a:extLst>
+              </a:tr>
+              <a:tr h="810000">
+                <a:tc>
+                  <a:txBody>
+                    <a:bodyPr/>
+                    <a:lstStyle/>
+                    <a:p>
+                      <a:pPr algn="ctr"/>
+                      <a:r>
+                        <a:rPr lang="en-US" altLang="zh-TW" dirty="0" smtClean="0"/>
+                        <a:t>10</a:t>
+                      </a:r>
+                      <a:endParaRPr lang="zh-TW" altLang="en-US" dirty="0"/>
+                    </a:p>
+                  </a:txBody>
+                  <a:tcPr anchor="ctr"/>
+                </a:tc>
+                <a:tc>
+                  <a:txBody>
+                    <a:bodyPr/>
+                    <a:lstStyle/>
+                    <a:p>
+                      <a:pPr algn="ctr"/>
+                      <a:r>
+                        <a:rPr lang="en-US" altLang="zh-TW" dirty="0" smtClean="0"/>
+                        <a:t>3</a:t>
+                      </a:r>
+                      <a:endParaRPr lang="zh-TW" altLang="en-US" dirty="0"/>
+                    </a:p>
+                  </a:txBody>
+                  <a:tcPr anchor="ctr">
+                    <a:solidFill>
+                      <a:schemeClr val="bg2">
+                        <a:lumMod val="90000"/>
+                      </a:schemeClr>
+                    </a:solidFill>
+                  </a:tcPr>
+                </a:tc>
+                <a:tc>
+                  <a:txBody>
+                    <a:bodyPr/>
+                    <a:lstStyle/>
+                    <a:p>
+                      <a:pPr algn="ctr"/>
+                      <a:r>
+                        <a:rPr lang="en-US" altLang="zh-TW" dirty="0" smtClean="0"/>
+                        <a:t>2</a:t>
+                      </a:r>
+                      <a:endParaRPr lang="zh-TW" altLang="en-US" dirty="0"/>
+                    </a:p>
+                  </a:txBody>
+                  <a:tcPr anchor="ctr">
+                    <a:solidFill>
+                      <a:schemeClr val="bg2">
+                        <a:lumMod val="90000"/>
+                      </a:schemeClr>
+                    </a:solidFill>
+                  </a:tcPr>
+                </a:tc>
+                <a:tc>
+                  <a:txBody>
+                    <a:bodyPr/>
+                    <a:lstStyle/>
+                    <a:p>
+                      <a:pPr algn="ctr"/>
+                      <a:r>
+                        <a:rPr lang="en-US" altLang="zh-TW" dirty="0" smtClean="0"/>
+                        <a:t>5</a:t>
+                      </a:r>
+                      <a:endParaRPr lang="zh-TW" altLang="en-US" dirty="0"/>
+                    </a:p>
+                  </a:txBody>
+                  <a:tcPr anchor="ctr"/>
+                </a:tc>
+                <a:extLst>
+                  <a:ext uri="{0D108BD9-81ED-4DB2-BD59-A6C34878D82A}">
+                    <a16:rowId xmlns:a16="http://schemas.microsoft.com/office/drawing/2014/main" val="3403392571"/>
+                  </a:ext>
+                </a:extLst>
+              </a:tr>
+              <a:tr h="810000">
+                <a:tc>
+                  <a:txBody>
+                    <a:bodyPr/>
+                    <a:lstStyle/>
+                    <a:p>
+                      <a:pPr algn="ctr"/>
+                      <a:r>
+                        <a:rPr lang="en-US" altLang="zh-TW" dirty="0" smtClean="0"/>
+                        <a:t>9</a:t>
+                      </a:r>
+                      <a:endParaRPr lang="zh-TW" altLang="en-US" dirty="0"/>
+                    </a:p>
+                  </a:txBody>
+                  <a:tcPr anchor="ctr"/>
+                </a:tc>
+                <a:tc>
+                  <a:txBody>
+                    <a:bodyPr/>
+                    <a:lstStyle/>
+                    <a:p>
+                      <a:pPr algn="ctr"/>
+                      <a:r>
+                        <a:rPr lang="en-US" altLang="zh-TW" dirty="0" smtClean="0"/>
+                        <a:t>8</a:t>
+                      </a:r>
+                      <a:endParaRPr lang="zh-TW" altLang="en-US" dirty="0"/>
+                    </a:p>
+                  </a:txBody>
+                  <a:tcPr anchor="ctr"/>
+                </a:tc>
+                <a:tc>
+                  <a:txBody>
+                    <a:bodyPr/>
+                    <a:lstStyle/>
+                    <a:p>
+                      <a:pPr algn="ctr"/>
+                      <a:r>
+                        <a:rPr lang="en-US" altLang="zh-TW" dirty="0" smtClean="0"/>
+                        <a:t>7</a:t>
+                      </a:r>
+                      <a:endParaRPr lang="zh-TW" altLang="en-US" dirty="0"/>
+                    </a:p>
+                  </a:txBody>
+                  <a:tcPr anchor="ctr"/>
+                </a:tc>
+                <a:tc>
+                  <a:txBody>
+                    <a:bodyPr/>
+                    <a:lstStyle/>
+                    <a:p>
+                      <a:pPr algn="ctr"/>
+                      <a:r>
+                        <a:rPr lang="en-US" altLang="zh-TW" dirty="0" smtClean="0"/>
+                        <a:t>6</a:t>
+                      </a:r>
+                      <a:endParaRPr lang="zh-TW" altLang="en-US" dirty="0"/>
+                    </a:p>
+                  </a:txBody>
+                  <a:tcPr anchor="ctr"/>
+                </a:tc>
+                <a:extLst>
+                  <a:ext uri="{0D108BD9-81ED-4DB2-BD59-A6C34878D82A}">
+                    <a16:rowId xmlns:a16="http://schemas.microsoft.com/office/drawing/2014/main" val="937172180"/>
+                  </a:ext>
+                </a:extLst>
+              </a:tr>
+            </a:tbl>
+          </a:graphicData>
+        </a:graphic>
+      </p:graphicFrame>
+      <p:sp>
+        <p:nvSpPr>
+          <p:cNvPr id="9" name="文字方塊 8"/>
+          <p:cNvSpPr txBox="1"/>
+          <p:nvPr/>
+        </p:nvSpPr>
+        <p:spPr>
+          <a:xfrm>
+            <a:off x="8839200" y="2475346"/>
+            <a:ext cx="812800" cy="369332"/>
+          </a:xfrm>
+          <a:prstGeom prst="rect">
+            <a:avLst/>
+          </a:prstGeom>
+          <a:noFill/>
+        </p:spPr>
+        <p:txBody>
+          <a:bodyPr wrap="square" rtlCol="0">
+            <a:spAutoFit/>
+          </a:bodyPr>
+          <a:lstStyle/>
+          <a:p>
+            <a:r>
+              <a:rPr lang="en-US" altLang="zh-TW" dirty="0" smtClean="0"/>
+              <a:t>outer</a:t>
+            </a:r>
+            <a:endParaRPr lang="zh-TW" altLang="en-US" dirty="0"/>
+          </a:p>
+        </p:txBody>
+      </p:sp>
+      <p:sp>
+        <p:nvSpPr>
+          <p:cNvPr id="10" name="文字方塊 9"/>
+          <p:cNvSpPr txBox="1"/>
+          <p:nvPr/>
+        </p:nvSpPr>
+        <p:spPr>
+          <a:xfrm>
+            <a:off x="7124872" y="3480826"/>
+            <a:ext cx="812800" cy="369332"/>
+          </a:xfrm>
+          <a:prstGeom prst="rect">
+            <a:avLst/>
+          </a:prstGeom>
+          <a:noFill/>
+        </p:spPr>
+        <p:txBody>
+          <a:bodyPr wrap="square" rtlCol="0">
+            <a:spAutoFit/>
+          </a:bodyPr>
+          <a:lstStyle/>
+          <a:p>
+            <a:r>
+              <a:rPr lang="en-US" altLang="zh-TW" dirty="0" smtClean="0"/>
+              <a:t>inner</a:t>
+            </a:r>
+            <a:endParaRPr lang="zh-TW" altLang="en-US" dirty="0"/>
+          </a:p>
+        </p:txBody>
+      </p:sp>
+    </p:spTree>
+    <p:extLst>
+      <p:ext uri="{BB962C8B-B14F-4D97-AF65-F5344CB8AC3E}">
+        <p14:creationId xmlns:p14="http://schemas.microsoft.com/office/powerpoint/2010/main" val="3351523311"/>
       </p:ext>
     </p:extLst>
   </p:cSld>

</xml_diff>

<commit_message>
polish bomb game feature
</commit_message>
<xml_diff>
--- a/tutorial.pptx
+++ b/tutorial.pptx
@@ -5,15 +5,21 @@
     <p:sldMasterId id="2147483648" r:id="rId1"/>
   </p:sldMasterIdLst>
   <p:sldIdLst>
-    <p:sldId id="258" r:id="rId2"/>
-    <p:sldId id="267" r:id="rId3"/>
-    <p:sldId id="265" r:id="rId4"/>
-    <p:sldId id="264" r:id="rId5"/>
-    <p:sldId id="260" r:id="rId6"/>
-    <p:sldId id="261" r:id="rId7"/>
-    <p:sldId id="262" r:id="rId8"/>
-    <p:sldId id="263" r:id="rId9"/>
-    <p:sldId id="266" r:id="rId10"/>
+    <p:sldId id="268" r:id="rId2"/>
+    <p:sldId id="269" r:id="rId3"/>
+    <p:sldId id="271" r:id="rId4"/>
+    <p:sldId id="272" r:id="rId5"/>
+    <p:sldId id="273" r:id="rId6"/>
+    <p:sldId id="270" r:id="rId7"/>
+    <p:sldId id="258" r:id="rId8"/>
+    <p:sldId id="267" r:id="rId9"/>
+    <p:sldId id="265" r:id="rId10"/>
+    <p:sldId id="264" r:id="rId11"/>
+    <p:sldId id="260" r:id="rId12"/>
+    <p:sldId id="261" r:id="rId13"/>
+    <p:sldId id="262" r:id="rId14"/>
+    <p:sldId id="263" r:id="rId15"/>
+    <p:sldId id="266" r:id="rId16"/>
   </p:sldIdLst>
   <p:sldSz cx="12192000" cy="6858000"/>
   <p:notesSz cx="6858000" cy="9144000"/>
@@ -117,6 +123,16 @@
       <p14:sectionLst xmlns:p14="http://schemas.microsoft.com/office/powerpoint/2010/main">
         <p14:section name="預設章節" id="{F7342470-C2D2-4549-B5FF-759974171638}">
           <p14:sldIdLst>
+            <p14:sldId id="268"/>
+            <p14:sldId id="269"/>
+            <p14:sldId id="271"/>
+            <p14:sldId id="272"/>
+            <p14:sldId id="273"/>
+            <p14:sldId id="270"/>
+          </p14:sldIdLst>
+        </p14:section>
+        <p14:section name="5秒反應力" id="{59AA1579-FD27-458D-87E6-DF317C387D2C}">
+          <p14:sldIdLst>
             <p14:sldId id="258"/>
             <p14:sldId id="267"/>
           </p14:sldIdLst>
@@ -272,7 +288,7 @@
           <a:p>
             <a:fld id="{60F4A83D-2D3B-48AC-A900-77C718F04BD5}" type="datetimeFigureOut">
               <a:rPr lang="zh-TW" altLang="en-US" smtClean="0"/>
-              <a:t>2024/6/12</a:t>
+              <a:t>2024/6/25</a:t>
             </a:fld>
             <a:endParaRPr lang="zh-TW" altLang="en-US"/>
           </a:p>
@@ -442,7 +458,7 @@
           <a:p>
             <a:fld id="{60F4A83D-2D3B-48AC-A900-77C718F04BD5}" type="datetimeFigureOut">
               <a:rPr lang="zh-TW" altLang="en-US" smtClean="0"/>
-              <a:t>2024/6/12</a:t>
+              <a:t>2024/6/25</a:t>
             </a:fld>
             <a:endParaRPr lang="zh-TW" altLang="en-US"/>
           </a:p>
@@ -622,7 +638,7 @@
           <a:p>
             <a:fld id="{60F4A83D-2D3B-48AC-A900-77C718F04BD5}" type="datetimeFigureOut">
               <a:rPr lang="zh-TW" altLang="en-US" smtClean="0"/>
-              <a:t>2024/6/12</a:t>
+              <a:t>2024/6/25</a:t>
             </a:fld>
             <a:endParaRPr lang="zh-TW" altLang="en-US"/>
           </a:p>
@@ -792,7 +808,7 @@
           <a:p>
             <a:fld id="{60F4A83D-2D3B-48AC-A900-77C718F04BD5}" type="datetimeFigureOut">
               <a:rPr lang="zh-TW" altLang="en-US" smtClean="0"/>
-              <a:t>2024/6/12</a:t>
+              <a:t>2024/6/25</a:t>
             </a:fld>
             <a:endParaRPr lang="zh-TW" altLang="en-US"/>
           </a:p>
@@ -1038,7 +1054,7 @@
           <a:p>
             <a:fld id="{60F4A83D-2D3B-48AC-A900-77C718F04BD5}" type="datetimeFigureOut">
               <a:rPr lang="zh-TW" altLang="en-US" smtClean="0"/>
-              <a:t>2024/6/12</a:t>
+              <a:t>2024/6/25</a:t>
             </a:fld>
             <a:endParaRPr lang="zh-TW" altLang="en-US"/>
           </a:p>
@@ -1270,7 +1286,7 @@
           <a:p>
             <a:fld id="{60F4A83D-2D3B-48AC-A900-77C718F04BD5}" type="datetimeFigureOut">
               <a:rPr lang="zh-TW" altLang="en-US" smtClean="0"/>
-              <a:t>2024/6/12</a:t>
+              <a:t>2024/6/25</a:t>
             </a:fld>
             <a:endParaRPr lang="zh-TW" altLang="en-US"/>
           </a:p>
@@ -1637,7 +1653,7 @@
           <a:p>
             <a:fld id="{60F4A83D-2D3B-48AC-A900-77C718F04BD5}" type="datetimeFigureOut">
               <a:rPr lang="zh-TW" altLang="en-US" smtClean="0"/>
-              <a:t>2024/6/12</a:t>
+              <a:t>2024/6/25</a:t>
             </a:fld>
             <a:endParaRPr lang="zh-TW" altLang="en-US"/>
           </a:p>
@@ -1755,7 +1771,7 @@
           <a:p>
             <a:fld id="{60F4A83D-2D3B-48AC-A900-77C718F04BD5}" type="datetimeFigureOut">
               <a:rPr lang="zh-TW" altLang="en-US" smtClean="0"/>
-              <a:t>2024/6/12</a:t>
+              <a:t>2024/6/25</a:t>
             </a:fld>
             <a:endParaRPr lang="zh-TW" altLang="en-US"/>
           </a:p>
@@ -1850,7 +1866,7 @@
           <a:p>
             <a:fld id="{60F4A83D-2D3B-48AC-A900-77C718F04BD5}" type="datetimeFigureOut">
               <a:rPr lang="zh-TW" altLang="en-US" smtClean="0"/>
-              <a:t>2024/6/12</a:t>
+              <a:t>2024/6/25</a:t>
             </a:fld>
             <a:endParaRPr lang="zh-TW" altLang="en-US"/>
           </a:p>
@@ -2127,7 +2143,7 @@
           <a:p>
             <a:fld id="{60F4A83D-2D3B-48AC-A900-77C718F04BD5}" type="datetimeFigureOut">
               <a:rPr lang="zh-TW" altLang="en-US" smtClean="0"/>
-              <a:t>2024/6/12</a:t>
+              <a:t>2024/6/25</a:t>
             </a:fld>
             <a:endParaRPr lang="zh-TW" altLang="en-US"/>
           </a:p>
@@ -2380,7 +2396,7 @@
           <a:p>
             <a:fld id="{60F4A83D-2D3B-48AC-A900-77C718F04BD5}" type="datetimeFigureOut">
               <a:rPr lang="zh-TW" altLang="en-US" smtClean="0"/>
-              <a:t>2024/6/12</a:t>
+              <a:t>2024/6/25</a:t>
             </a:fld>
             <a:endParaRPr lang="zh-TW" altLang="en-US"/>
           </a:p>
@@ -2593,7 +2609,7 @@
           <a:p>
             <a:fld id="{60F4A83D-2D3B-48AC-A900-77C718F04BD5}" type="datetimeFigureOut">
               <a:rPr lang="zh-TW" altLang="en-US" smtClean="0"/>
-              <a:t>2024/6/12</a:t>
+              <a:t>2024/6/25</a:t>
             </a:fld>
             <a:endParaRPr lang="zh-TW" altLang="en-US"/>
           </a:p>
@@ -3006,8 +3022,8 @@
         </p:nvSpPr>
         <p:spPr>
           <a:xfrm>
-            <a:off x="4885855" y="650009"/>
-            <a:ext cx="2542683" cy="707886"/>
+            <a:off x="5295423" y="650009"/>
+            <a:ext cx="1723549" cy="707886"/>
           </a:xfrm>
           <a:prstGeom prst="rect">
             <a:avLst/>
@@ -3022,18 +3038,11 @@
           <a:p>
             <a:pPr algn="ctr"/>
             <a:r>
-              <a:rPr lang="en-US" altLang="zh-TW" sz="4000" b="1" dirty="0" smtClean="0">
-                <a:latin typeface="微軟正黑體" panose="020B0604030504040204" pitchFamily="34" charset="-120"/>
-                <a:ea typeface="微軟正黑體" panose="020B0604030504040204" pitchFamily="34" charset="-120"/>
-              </a:rPr>
-              <a:t>5</a:t>
-            </a:r>
-            <a:r>
               <a:rPr lang="zh-TW" altLang="en-US" sz="4000" b="1" dirty="0" smtClean="0">
                 <a:latin typeface="微軟正黑體" panose="020B0604030504040204" pitchFamily="34" charset="-120"/>
                 <a:ea typeface="微軟正黑體" panose="020B0604030504040204" pitchFamily="34" charset="-120"/>
               </a:rPr>
-              <a:t>秒反應力</a:t>
+              <a:t>海戰棋</a:t>
             </a:r>
             <a:endParaRPr lang="zh-TW" altLang="en-US" sz="4000" b="1" dirty="0">
               <a:latin typeface="微軟正黑體" panose="020B0604030504040204" pitchFamily="34" charset="-120"/>
@@ -3074,14 +3083,21 @@
                 <a:latin typeface="微軟正黑體" panose="020B0604030504040204" pitchFamily="34" charset="-120"/>
                 <a:ea typeface="微軟正黑體" panose="020B0604030504040204" pitchFamily="34" charset="-120"/>
               </a:rPr>
-              <a:t>遊戲人數</a:t>
+              <a:t>遊戲人數：</a:t>
+            </a:r>
+            <a:r>
+              <a:rPr lang="en-US" altLang="zh-TW" sz="3600" dirty="0" smtClean="0">
+                <a:latin typeface="微軟正黑體" panose="020B0604030504040204" pitchFamily="34" charset="-120"/>
+                <a:ea typeface="微軟正黑體" panose="020B0604030504040204" pitchFamily="34" charset="-120"/>
+              </a:rPr>
+              <a:t>2</a:t>
             </a:r>
             <a:r>
               <a:rPr lang="zh-TW" altLang="en-US" sz="3600" dirty="0" smtClean="0">
                 <a:latin typeface="微軟正黑體" panose="020B0604030504040204" pitchFamily="34" charset="-120"/>
                 <a:ea typeface="微軟正黑體" panose="020B0604030504040204" pitchFamily="34" charset="-120"/>
               </a:rPr>
-              <a:t>：不限</a:t>
+              <a:t>人</a:t>
             </a:r>
             <a:endParaRPr lang="en-US" altLang="zh-TW" sz="3600" dirty="0" smtClean="0">
               <a:latin typeface="微軟正黑體" panose="020B0604030504040204" pitchFamily="34" charset="-120"/>
@@ -3138,337 +3154,19 @@
                 <a:latin typeface="微軟正黑體" panose="020B0604030504040204" pitchFamily="34" charset="-120"/>
                 <a:ea typeface="微軟正黑體" panose="020B0604030504040204" pitchFamily="34" charset="-120"/>
               </a:rPr>
-              <a:t>難易度：★</a:t>
+              <a:t>難易度：</a:t>
             </a:r>
             <a:r>
               <a:rPr lang="zh-TW" altLang="en-US" sz="3600" dirty="0">
                 <a:latin typeface="微軟正黑體" panose="020B0604030504040204" pitchFamily="34" charset="-120"/>
                 <a:ea typeface="微軟正黑體" panose="020B0604030504040204" pitchFamily="34" charset="-120"/>
               </a:rPr>
-              <a:t> </a:t>
+              <a:t>★ ★ </a:t>
             </a:r>
             <a:endParaRPr lang="en-US" altLang="zh-TW" sz="3600" dirty="0" smtClean="0">
               <a:latin typeface="微軟正黑體" panose="020B0604030504040204" pitchFamily="34" charset="-120"/>
               <a:ea typeface="微軟正黑體" panose="020B0604030504040204" pitchFamily="34" charset="-120"/>
             </a:endParaRPr>
-          </a:p>
-        </p:txBody>
-      </p:sp>
-      <p:pic>
-        <p:nvPicPr>
-          <p:cNvPr id="3" name="圖片 2"/>
-          <p:cNvPicPr>
-            <a:picLocks noChangeAspect="1"/>
-          </p:cNvPicPr>
-          <p:nvPr/>
-        </p:nvPicPr>
-        <p:blipFill>
-          <a:blip r:embed="rId2"/>
-          <a:stretch>
-            <a:fillRect/>
-          </a:stretch>
-        </p:blipFill>
-        <p:spPr>
-          <a:xfrm>
-            <a:off x="683490" y="1989664"/>
-            <a:ext cx="5404247" cy="3050436"/>
-          </a:xfrm>
-          <a:prstGeom prst="rect">
-            <a:avLst/>
-          </a:prstGeom>
-        </p:spPr>
-      </p:pic>
-    </p:spTree>
-    <p:extLst>
-      <p:ext uri="{BB962C8B-B14F-4D97-AF65-F5344CB8AC3E}">
-        <p14:creationId xmlns:p14="http://schemas.microsoft.com/office/powerpoint/2010/main" val="3415740417"/>
-      </p:ext>
-    </p:extLst>
-  </p:cSld>
-  <p:clrMapOvr>
-    <a:masterClrMapping/>
-  </p:clrMapOvr>
-</p:sld>
-</file>
-
-<file path=ppt/slides/slide2.xml><?xml version="1.0" encoding="utf-8"?>
-<p:sld xmlns:a="http://schemas.openxmlformats.org/drawingml/2006/main" xmlns:r="http://schemas.openxmlformats.org/officeDocument/2006/relationships" xmlns:p="http://schemas.openxmlformats.org/presentationml/2006/main">
-  <p:cSld>
-    <p:spTree>
-      <p:nvGrpSpPr>
-        <p:cNvPr id="1" name=""/>
-        <p:cNvGrpSpPr/>
-        <p:nvPr/>
-      </p:nvGrpSpPr>
-      <p:grpSpPr>
-        <a:xfrm>
-          <a:off x="0" y="0"/>
-          <a:ext cx="0" cy="0"/>
-          <a:chOff x="0" y="0"/>
-          <a:chExt cx="0" cy="0"/>
-        </a:xfrm>
-      </p:grpSpPr>
-      <p:sp>
-        <p:nvSpPr>
-          <p:cNvPr id="6" name="文字方塊 5"/>
-          <p:cNvSpPr txBox="1"/>
-          <p:nvPr/>
-        </p:nvSpPr>
-        <p:spPr>
-          <a:xfrm>
-            <a:off x="3859929" y="650009"/>
-            <a:ext cx="4594526" cy="1323439"/>
-          </a:xfrm>
-          <a:prstGeom prst="rect">
-            <a:avLst/>
-          </a:prstGeom>
-          <a:noFill/>
-        </p:spPr>
-        <p:txBody>
-          <a:bodyPr wrap="none" rtlCol="0">
-            <a:spAutoFit/>
-          </a:bodyPr>
-          <a:lstStyle/>
-          <a:p>
-            <a:pPr algn="ctr"/>
-            <a:r>
-              <a:rPr lang="zh-TW" altLang="en-US" sz="4000" dirty="0" smtClean="0">
-                <a:latin typeface="微軟正黑體" panose="020B0604030504040204" pitchFamily="34" charset="-120"/>
-                <a:ea typeface="微軟正黑體" panose="020B0604030504040204" pitchFamily="34" charset="-120"/>
-              </a:rPr>
-              <a:t>遊戲勝利條件</a:t>
-            </a:r>
-            <a:endParaRPr lang="en-US" altLang="zh-TW" sz="4000" dirty="0" smtClean="0">
-              <a:latin typeface="微軟正黑體" panose="020B0604030504040204" pitchFamily="34" charset="-120"/>
-              <a:ea typeface="微軟正黑體" panose="020B0604030504040204" pitchFamily="34" charset="-120"/>
-            </a:endParaRPr>
-          </a:p>
-          <a:p>
-            <a:pPr algn="ctr"/>
-            <a:r>
-              <a:rPr lang="en-US" altLang="zh-TW" sz="4000" b="1" dirty="0" smtClean="0">
-                <a:latin typeface="微軟正黑體" panose="020B0604030504040204" pitchFamily="34" charset="-120"/>
-                <a:ea typeface="微軟正黑體" panose="020B0604030504040204" pitchFamily="34" charset="-120"/>
-              </a:rPr>
-              <a:t>5</a:t>
-            </a:r>
-            <a:r>
-              <a:rPr lang="zh-TW" altLang="en-US" sz="4000" b="1" dirty="0" smtClean="0">
-                <a:latin typeface="微軟正黑體" panose="020B0604030504040204" pitchFamily="34" charset="-120"/>
-                <a:ea typeface="微軟正黑體" panose="020B0604030504040204" pitchFamily="34" charset="-120"/>
-              </a:rPr>
-              <a:t>秒內回答指定問題</a:t>
-            </a:r>
-            <a:endParaRPr lang="zh-TW" altLang="en-US" sz="4000" b="1" dirty="0">
-              <a:latin typeface="微軟正黑體" panose="020B0604030504040204" pitchFamily="34" charset="-120"/>
-              <a:ea typeface="微軟正黑體" panose="020B0604030504040204" pitchFamily="34" charset="-120"/>
-            </a:endParaRPr>
-          </a:p>
-        </p:txBody>
-      </p:sp>
-      <p:sp>
-        <p:nvSpPr>
-          <p:cNvPr id="2" name="矩形 1"/>
-          <p:cNvSpPr/>
-          <p:nvPr/>
-        </p:nvSpPr>
-        <p:spPr>
-          <a:xfrm>
-            <a:off x="18473" y="6262255"/>
-            <a:ext cx="12192000" cy="498763"/>
-          </a:xfrm>
-          <a:prstGeom prst="rect">
-            <a:avLst/>
-          </a:prstGeom>
-          <a:solidFill>
-            <a:schemeClr val="bg1"/>
-          </a:solidFill>
-          <a:ln>
-            <a:noFill/>
-          </a:ln>
-        </p:spPr>
-        <p:style>
-          <a:lnRef idx="2">
-            <a:schemeClr val="accent1">
-              <a:shade val="50000"/>
-            </a:schemeClr>
-          </a:lnRef>
-          <a:fillRef idx="1">
-            <a:schemeClr val="accent1"/>
-          </a:fillRef>
-          <a:effectRef idx="0">
-            <a:schemeClr val="accent1"/>
-          </a:effectRef>
-          <a:fontRef idx="minor">
-            <a:schemeClr val="lt1"/>
-          </a:fontRef>
-        </p:style>
-        <p:txBody>
-          <a:bodyPr rtlCol="0" anchor="ctr"/>
-          <a:lstStyle/>
-          <a:p>
-            <a:pPr algn="ctr"/>
-            <a:endParaRPr lang="zh-TW" altLang="en-US"/>
-          </a:p>
-        </p:txBody>
-      </p:sp>
-      <p:sp>
-        <p:nvSpPr>
-          <p:cNvPr id="8" name="文字方塊 7"/>
-          <p:cNvSpPr txBox="1"/>
-          <p:nvPr/>
-        </p:nvSpPr>
-        <p:spPr>
-          <a:xfrm>
-            <a:off x="6612444" y="3116518"/>
-            <a:ext cx="3684022" cy="1458669"/>
-          </a:xfrm>
-          <a:prstGeom prst="rect">
-            <a:avLst/>
-          </a:prstGeom>
-          <a:noFill/>
-        </p:spPr>
-        <p:txBody>
-          <a:bodyPr wrap="none" rtlCol="0">
-            <a:spAutoFit/>
-          </a:bodyPr>
-          <a:lstStyle/>
-          <a:p>
-            <a:pPr>
-              <a:lnSpc>
-                <a:spcPct val="130000"/>
-              </a:lnSpc>
-            </a:pPr>
-            <a:r>
-              <a:rPr lang="zh-TW" altLang="en-US" sz="3600" dirty="0" smtClean="0">
-                <a:latin typeface="微軟正黑體" panose="020B0604030504040204" pitchFamily="34" charset="-120"/>
-                <a:ea typeface="微軟正黑體" panose="020B0604030504040204" pitchFamily="34" charset="-120"/>
-              </a:rPr>
-              <a:t>題目皆為列出</a:t>
-            </a:r>
-            <a:r>
-              <a:rPr lang="en-US" altLang="zh-TW" sz="3600" dirty="0" smtClean="0">
-                <a:latin typeface="微軟正黑體" panose="020B0604030504040204" pitchFamily="34" charset="-120"/>
-                <a:ea typeface="微軟正黑體" panose="020B0604030504040204" pitchFamily="34" charset="-120"/>
-              </a:rPr>
-              <a:t>3</a:t>
-            </a:r>
-            <a:r>
-              <a:rPr lang="zh-TW" altLang="en-US" sz="3600" dirty="0" smtClean="0">
-                <a:latin typeface="微軟正黑體" panose="020B0604030504040204" pitchFamily="34" charset="-120"/>
-                <a:ea typeface="微軟正黑體" panose="020B0604030504040204" pitchFamily="34" charset="-120"/>
-              </a:rPr>
-              <a:t>個</a:t>
-            </a:r>
-            <a:endParaRPr lang="en-US" altLang="zh-TW" sz="3600" dirty="0" smtClean="0">
-              <a:latin typeface="微軟正黑體" panose="020B0604030504040204" pitchFamily="34" charset="-120"/>
-              <a:ea typeface="微軟正黑體" panose="020B0604030504040204" pitchFamily="34" charset="-120"/>
-            </a:endParaRPr>
-          </a:p>
-          <a:p>
-            <a:pPr>
-              <a:lnSpc>
-                <a:spcPct val="130000"/>
-              </a:lnSpc>
-            </a:pPr>
-            <a:r>
-              <a:rPr lang="zh-TW" altLang="en-US" sz="3600" dirty="0" smtClean="0">
-                <a:latin typeface="微軟正黑體" panose="020B0604030504040204" pitchFamily="34" charset="-120"/>
-                <a:ea typeface="微軟正黑體" panose="020B0604030504040204" pitchFamily="34" charset="-120"/>
-              </a:rPr>
-              <a:t>相同類型項目</a:t>
-            </a:r>
-            <a:endParaRPr lang="en-US" altLang="zh-TW" sz="3600" dirty="0" smtClean="0">
-              <a:latin typeface="微軟正黑體" panose="020B0604030504040204" pitchFamily="34" charset="-120"/>
-              <a:ea typeface="微軟正黑體" panose="020B0604030504040204" pitchFamily="34" charset="-120"/>
-            </a:endParaRPr>
-          </a:p>
-        </p:txBody>
-      </p:sp>
-      <p:pic>
-        <p:nvPicPr>
-          <p:cNvPr id="9" name="圖片 8"/>
-          <p:cNvPicPr>
-            <a:picLocks noChangeAspect="1"/>
-          </p:cNvPicPr>
-          <p:nvPr/>
-        </p:nvPicPr>
-        <p:blipFill>
-          <a:blip r:embed="rId2"/>
-          <a:stretch>
-            <a:fillRect/>
-          </a:stretch>
-        </p:blipFill>
-        <p:spPr>
-          <a:xfrm>
-            <a:off x="683490" y="2592633"/>
-            <a:ext cx="5404247" cy="3050436"/>
-          </a:xfrm>
-          <a:prstGeom prst="rect">
-            <a:avLst/>
-          </a:prstGeom>
-        </p:spPr>
-      </p:pic>
-    </p:spTree>
-    <p:extLst>
-      <p:ext uri="{BB962C8B-B14F-4D97-AF65-F5344CB8AC3E}">
-        <p14:creationId xmlns:p14="http://schemas.microsoft.com/office/powerpoint/2010/main" val="82391255"/>
-      </p:ext>
-    </p:extLst>
-  </p:cSld>
-  <p:clrMapOvr>
-    <a:masterClrMapping/>
-  </p:clrMapOvr>
-</p:sld>
-</file>
-
-<file path=ppt/slides/slide3.xml><?xml version="1.0" encoding="utf-8"?>
-<p:sld xmlns:a="http://schemas.openxmlformats.org/drawingml/2006/main" xmlns:r="http://schemas.openxmlformats.org/officeDocument/2006/relationships" xmlns:p="http://schemas.openxmlformats.org/presentationml/2006/main">
-  <p:cSld>
-    <p:spTree>
-      <p:nvGrpSpPr>
-        <p:cNvPr id="1" name=""/>
-        <p:cNvGrpSpPr/>
-        <p:nvPr/>
-      </p:nvGrpSpPr>
-      <p:grpSpPr>
-        <a:xfrm>
-          <a:off x="0" y="0"/>
-          <a:ext cx="0" cy="0"/>
-          <a:chOff x="0" y="0"/>
-          <a:chExt cx="0" cy="0"/>
-        </a:xfrm>
-      </p:grpSpPr>
-      <p:sp>
-        <p:nvSpPr>
-          <p:cNvPr id="6" name="文字方塊 5"/>
-          <p:cNvSpPr txBox="1"/>
-          <p:nvPr/>
-        </p:nvSpPr>
-        <p:spPr>
-          <a:xfrm>
-            <a:off x="5295418" y="650009"/>
-            <a:ext cx="1723549" cy="707886"/>
-          </a:xfrm>
-          <a:prstGeom prst="rect">
-            <a:avLst/>
-          </a:prstGeom>
-          <a:noFill/>
-        </p:spPr>
-        <p:txBody>
-          <a:bodyPr wrap="none" rtlCol="0">
-            <a:spAutoFit/>
-          </a:bodyPr>
-          <a:lstStyle/>
-          <a:p>
-            <a:pPr algn="ctr"/>
-            <a:r>
-              <a:rPr lang="zh-TW" altLang="en-US" sz="4000" b="1" dirty="0">
-                <a:latin typeface="微軟正黑體" panose="020B0604030504040204" pitchFamily="34" charset="-120"/>
-                <a:ea typeface="微軟正黑體" panose="020B0604030504040204" pitchFamily="34" charset="-120"/>
-              </a:rPr>
-              <a:t>旋轉棋</a:t>
-            </a:r>
           </a:p>
         </p:txBody>
       </p:sp>
@@ -3488,137 +3186,18 @@
         </p:blipFill>
         <p:spPr>
           <a:xfrm>
-            <a:off x="1445340" y="1685660"/>
-            <a:ext cx="3683164" cy="3658445"/>
+            <a:off x="972766" y="1913763"/>
+            <a:ext cx="5101098" cy="3358628"/>
           </a:xfrm>
           <a:prstGeom prst="rect">
             <a:avLst/>
           </a:prstGeom>
         </p:spPr>
       </p:pic>
-      <p:sp>
-        <p:nvSpPr>
-          <p:cNvPr id="8" name="文字方塊 7"/>
-          <p:cNvSpPr txBox="1"/>
-          <p:nvPr/>
-        </p:nvSpPr>
-        <p:spPr>
-          <a:xfrm>
-            <a:off x="5643495" y="2388420"/>
-            <a:ext cx="4418197" cy="2252924"/>
-          </a:xfrm>
-          <a:prstGeom prst="rect">
-            <a:avLst/>
-          </a:prstGeom>
-          <a:noFill/>
-        </p:spPr>
-        <p:txBody>
-          <a:bodyPr wrap="none" rtlCol="0">
-            <a:spAutoFit/>
-          </a:bodyPr>
-          <a:lstStyle/>
-          <a:p>
-            <a:pPr>
-              <a:lnSpc>
-                <a:spcPct val="130000"/>
-              </a:lnSpc>
-            </a:pPr>
-            <a:r>
-              <a:rPr lang="zh-TW" altLang="en-US" sz="3600" dirty="0" smtClean="0">
-                <a:latin typeface="微軟正黑體" panose="020B0604030504040204" pitchFamily="34" charset="-120"/>
-                <a:ea typeface="微軟正黑體" panose="020B0604030504040204" pitchFamily="34" charset="-120"/>
-              </a:rPr>
-              <a:t>遊戲人數：</a:t>
-            </a:r>
-            <a:r>
-              <a:rPr lang="en-US" altLang="zh-TW" sz="3600" dirty="0" smtClean="0">
-                <a:latin typeface="微軟正黑體" panose="020B0604030504040204" pitchFamily="34" charset="-120"/>
-                <a:ea typeface="微軟正黑體" panose="020B0604030504040204" pitchFamily="34" charset="-120"/>
-              </a:rPr>
-              <a:t>2</a:t>
-            </a:r>
-            <a:r>
-              <a:rPr lang="zh-TW" altLang="en-US" sz="3600" dirty="0" smtClean="0">
-                <a:latin typeface="微軟正黑體" panose="020B0604030504040204" pitchFamily="34" charset="-120"/>
-                <a:ea typeface="微軟正黑體" panose="020B0604030504040204" pitchFamily="34" charset="-120"/>
-              </a:rPr>
-              <a:t>人</a:t>
-            </a:r>
-            <a:endParaRPr lang="en-US" altLang="zh-TW" sz="3600" dirty="0" smtClean="0">
-              <a:latin typeface="微軟正黑體" panose="020B0604030504040204" pitchFamily="34" charset="-120"/>
-              <a:ea typeface="微軟正黑體" panose="020B0604030504040204" pitchFamily="34" charset="-120"/>
-            </a:endParaRPr>
-          </a:p>
-          <a:p>
-            <a:pPr>
-              <a:lnSpc>
-                <a:spcPct val="130000"/>
-              </a:lnSpc>
-            </a:pPr>
-            <a:r>
-              <a:rPr lang="zh-TW" altLang="en-US" sz="3600" dirty="0">
-                <a:latin typeface="微軟正黑體" panose="020B0604030504040204" pitchFamily="34" charset="-120"/>
-                <a:ea typeface="微軟正黑體" panose="020B0604030504040204" pitchFamily="34" charset="-120"/>
-              </a:rPr>
-              <a:t>遊戲</a:t>
-            </a:r>
-            <a:r>
-              <a:rPr lang="zh-TW" altLang="en-US" sz="3600" dirty="0" smtClean="0">
-                <a:latin typeface="微軟正黑體" panose="020B0604030504040204" pitchFamily="34" charset="-120"/>
-                <a:ea typeface="微軟正黑體" panose="020B0604030504040204" pitchFamily="34" charset="-120"/>
-              </a:rPr>
-              <a:t>時間：</a:t>
-            </a:r>
-            <a:r>
-              <a:rPr lang="en-US" altLang="zh-TW" sz="3600" dirty="0" smtClean="0">
-                <a:latin typeface="微軟正黑體" panose="020B0604030504040204" pitchFamily="34" charset="-120"/>
-                <a:ea typeface="微軟正黑體" panose="020B0604030504040204" pitchFamily="34" charset="-120"/>
-              </a:rPr>
-              <a:t>5-10</a:t>
-            </a:r>
-            <a:r>
-              <a:rPr lang="zh-TW" altLang="en-US" sz="3600" dirty="0" smtClean="0">
-                <a:latin typeface="微軟正黑體" panose="020B0604030504040204" pitchFamily="34" charset="-120"/>
-                <a:ea typeface="微軟正黑體" panose="020B0604030504040204" pitchFamily="34" charset="-120"/>
-              </a:rPr>
-              <a:t>分鐘</a:t>
-            </a:r>
-            <a:endParaRPr lang="en-US" altLang="zh-TW" sz="3600" dirty="0" smtClean="0">
-              <a:latin typeface="微軟正黑體" panose="020B0604030504040204" pitchFamily="34" charset="-120"/>
-              <a:ea typeface="微軟正黑體" panose="020B0604030504040204" pitchFamily="34" charset="-120"/>
-            </a:endParaRPr>
-          </a:p>
-          <a:p>
-            <a:pPr>
-              <a:lnSpc>
-                <a:spcPct val="130000"/>
-              </a:lnSpc>
-            </a:pPr>
-            <a:r>
-              <a:rPr lang="zh-TW" altLang="en-US" sz="3600" dirty="0" smtClean="0">
-                <a:latin typeface="微軟正黑體" panose="020B0604030504040204" pitchFamily="34" charset="-120"/>
-                <a:ea typeface="微軟正黑體" panose="020B0604030504040204" pitchFamily="34" charset="-120"/>
-              </a:rPr>
-              <a:t>難易度：★</a:t>
-            </a:r>
-            <a:r>
-              <a:rPr lang="zh-TW" altLang="en-US" sz="3600" dirty="0">
-                <a:latin typeface="微軟正黑體" panose="020B0604030504040204" pitchFamily="34" charset="-120"/>
-                <a:ea typeface="微軟正黑體" panose="020B0604030504040204" pitchFamily="34" charset="-120"/>
-              </a:rPr>
-              <a:t> ★</a:t>
-            </a:r>
-            <a:endParaRPr lang="en-US" altLang="zh-TW" sz="3600" dirty="0" smtClean="0">
-              <a:latin typeface="微軟正黑體" panose="020B0604030504040204" pitchFamily="34" charset="-120"/>
-              <a:ea typeface="微軟正黑體" panose="020B0604030504040204" pitchFamily="34" charset="-120"/>
-            </a:endParaRPr>
-          </a:p>
-        </p:txBody>
-      </p:sp>
     </p:spTree>
     <p:extLst>
       <p:ext uri="{BB962C8B-B14F-4D97-AF65-F5344CB8AC3E}">
-        <p14:creationId xmlns:p14="http://schemas.microsoft.com/office/powerpoint/2010/main" val="1713599051"/>
+        <p14:creationId xmlns:p14="http://schemas.microsoft.com/office/powerpoint/2010/main" val="1332306982"/>
       </p:ext>
     </p:extLst>
   </p:cSld>
@@ -3628,7 +3207,7 @@
 </p:sld>
 </file>
 
-<file path=ppt/slides/slide4.xml><?xml version="1.0" encoding="utf-8"?>
+<file path=ppt/slides/slide10.xml><?xml version="1.0" encoding="utf-8"?>
 <p:sld xmlns:a="http://schemas.openxmlformats.org/drawingml/2006/main" xmlns:r="http://schemas.openxmlformats.org/officeDocument/2006/relationships" xmlns:p="http://schemas.openxmlformats.org/presentationml/2006/main">
   <p:cSld>
     <p:spTree>
@@ -3826,7 +3405,7 @@
 </p:sld>
 </file>
 
-<file path=ppt/slides/slide5.xml><?xml version="1.0" encoding="utf-8"?>
+<file path=ppt/slides/slide11.xml><?xml version="1.0" encoding="utf-8"?>
 <p:sld xmlns:a="http://schemas.openxmlformats.org/drawingml/2006/main" xmlns:r="http://schemas.openxmlformats.org/officeDocument/2006/relationships" xmlns:p="http://schemas.openxmlformats.org/presentationml/2006/main">
   <p:cSld>
     <p:spTree>
@@ -3997,7 +3576,7 @@
 </p:sld>
 </file>
 
-<file path=ppt/slides/slide6.xml><?xml version="1.0" encoding="utf-8"?>
+<file path=ppt/slides/slide12.xml><?xml version="1.0" encoding="utf-8"?>
 <p:sld xmlns:a="http://schemas.openxmlformats.org/drawingml/2006/main" xmlns:r="http://schemas.openxmlformats.org/officeDocument/2006/relationships" xmlns:p="http://schemas.openxmlformats.org/presentationml/2006/main">
   <p:cSld>
     <p:spTree>
@@ -4186,7 +3765,7 @@
 </p:sld>
 </file>
 
-<file path=ppt/slides/slide7.xml><?xml version="1.0" encoding="utf-8"?>
+<file path=ppt/slides/slide13.xml><?xml version="1.0" encoding="utf-8"?>
 <p:sld xmlns:a="http://schemas.openxmlformats.org/drawingml/2006/main" xmlns:r="http://schemas.openxmlformats.org/officeDocument/2006/relationships" xmlns:p="http://schemas.openxmlformats.org/presentationml/2006/main">
   <p:cSld>
     <p:spTree>
@@ -4312,7 +3891,7 @@
 </p:sld>
 </file>
 
-<file path=ppt/slides/slide8.xml><?xml version="1.0" encoding="utf-8"?>
+<file path=ppt/slides/slide14.xml><?xml version="1.0" encoding="utf-8"?>
 <p:sld xmlns:a="http://schemas.openxmlformats.org/drawingml/2006/main" xmlns:r="http://schemas.openxmlformats.org/officeDocument/2006/relationships" xmlns:p="http://schemas.openxmlformats.org/presentationml/2006/main">
   <p:cSld>
     <p:spTree>
@@ -4530,7 +4109,7 @@
 </p:sld>
 </file>
 
-<file path=ppt/slides/slide9.xml><?xml version="1.0" encoding="utf-8"?>
+<file path=ppt/slides/slide15.xml><?xml version="1.0" encoding="utf-8"?>
 <p:sld xmlns:a="http://schemas.openxmlformats.org/drawingml/2006/main" xmlns:r="http://schemas.openxmlformats.org/officeDocument/2006/relationships" xmlns:p="http://schemas.openxmlformats.org/presentationml/2006/main">
   <p:cSld>
     <p:spTree>
@@ -5035,6 +4614,2632 @@
 </p:sld>
 </file>
 
+<file path=ppt/slides/slide2.xml><?xml version="1.0" encoding="utf-8"?>
+<p:sld xmlns:a="http://schemas.openxmlformats.org/drawingml/2006/main" xmlns:r="http://schemas.openxmlformats.org/officeDocument/2006/relationships" xmlns:p="http://schemas.openxmlformats.org/presentationml/2006/main">
+  <p:cSld>
+    <p:spTree>
+      <p:nvGrpSpPr>
+        <p:cNvPr id="1" name=""/>
+        <p:cNvGrpSpPr/>
+        <p:nvPr/>
+      </p:nvGrpSpPr>
+      <p:grpSpPr>
+        <a:xfrm>
+          <a:off x="0" y="0"/>
+          <a:ext cx="0" cy="0"/>
+          <a:chOff x="0" y="0"/>
+          <a:chExt cx="0" cy="0"/>
+        </a:xfrm>
+      </p:grpSpPr>
+      <p:sp>
+        <p:nvSpPr>
+          <p:cNvPr id="6" name="文字方塊 5"/>
+          <p:cNvSpPr txBox="1"/>
+          <p:nvPr/>
+        </p:nvSpPr>
+        <p:spPr>
+          <a:xfrm>
+            <a:off x="3603450" y="650009"/>
+            <a:ext cx="5107488" cy="1323439"/>
+          </a:xfrm>
+          <a:prstGeom prst="rect">
+            <a:avLst/>
+          </a:prstGeom>
+          <a:noFill/>
+        </p:spPr>
+        <p:txBody>
+          <a:bodyPr wrap="none" rtlCol="0">
+            <a:spAutoFit/>
+          </a:bodyPr>
+          <a:lstStyle/>
+          <a:p>
+            <a:pPr algn="ctr"/>
+            <a:r>
+              <a:rPr lang="zh-TW" altLang="en-US" sz="4000" dirty="0" smtClean="0">
+                <a:latin typeface="微軟正黑體" panose="020B0604030504040204" pitchFamily="34" charset="-120"/>
+                <a:ea typeface="微軟正黑體" panose="020B0604030504040204" pitchFamily="34" charset="-120"/>
+              </a:rPr>
+              <a:t>遊戲勝利條件</a:t>
+            </a:r>
+            <a:endParaRPr lang="en-US" altLang="zh-TW" sz="4000" dirty="0" smtClean="0">
+              <a:latin typeface="微軟正黑體" panose="020B0604030504040204" pitchFamily="34" charset="-120"/>
+              <a:ea typeface="微軟正黑體" panose="020B0604030504040204" pitchFamily="34" charset="-120"/>
+            </a:endParaRPr>
+          </a:p>
+          <a:p>
+            <a:pPr algn="ctr"/>
+            <a:r>
+              <a:rPr lang="zh-TW" altLang="en-US" sz="4000" b="1" dirty="0" smtClean="0">
+                <a:latin typeface="微軟正黑體" panose="020B0604030504040204" pitchFamily="34" charset="-120"/>
+                <a:ea typeface="微軟正黑體" panose="020B0604030504040204" pitchFamily="34" charset="-120"/>
+              </a:rPr>
+              <a:t>擊沉對方</a:t>
+            </a:r>
+            <a:r>
+              <a:rPr lang="en-US" altLang="zh-TW" sz="4000" b="1" dirty="0" smtClean="0">
+                <a:latin typeface="微軟正黑體" panose="020B0604030504040204" pitchFamily="34" charset="-120"/>
+                <a:ea typeface="微軟正黑體" panose="020B0604030504040204" pitchFamily="34" charset="-120"/>
+              </a:rPr>
+              <a:t>3</a:t>
+            </a:r>
+            <a:r>
+              <a:rPr lang="zh-TW" altLang="en-US" sz="4000" b="1" dirty="0" smtClean="0">
+                <a:latin typeface="微軟正黑體" panose="020B0604030504040204" pitchFamily="34" charset="-120"/>
+                <a:ea typeface="微軟正黑體" panose="020B0604030504040204" pitchFamily="34" charset="-120"/>
+              </a:rPr>
+              <a:t>艘以上船艦</a:t>
+            </a:r>
+            <a:endParaRPr lang="zh-TW" altLang="en-US" sz="4000" b="1" dirty="0">
+              <a:latin typeface="微軟正黑體" panose="020B0604030504040204" pitchFamily="34" charset="-120"/>
+              <a:ea typeface="微軟正黑體" panose="020B0604030504040204" pitchFamily="34" charset="-120"/>
+            </a:endParaRPr>
+          </a:p>
+        </p:txBody>
+      </p:sp>
+      <p:sp>
+        <p:nvSpPr>
+          <p:cNvPr id="2" name="矩形 1"/>
+          <p:cNvSpPr/>
+          <p:nvPr/>
+        </p:nvSpPr>
+        <p:spPr>
+          <a:xfrm>
+            <a:off x="18473" y="6262255"/>
+            <a:ext cx="12192000" cy="498763"/>
+          </a:xfrm>
+          <a:prstGeom prst="rect">
+            <a:avLst/>
+          </a:prstGeom>
+          <a:solidFill>
+            <a:schemeClr val="bg1"/>
+          </a:solidFill>
+          <a:ln>
+            <a:noFill/>
+          </a:ln>
+        </p:spPr>
+        <p:style>
+          <a:lnRef idx="2">
+            <a:schemeClr val="accent1">
+              <a:shade val="50000"/>
+            </a:schemeClr>
+          </a:lnRef>
+          <a:fillRef idx="1">
+            <a:schemeClr val="accent1"/>
+          </a:fillRef>
+          <a:effectRef idx="0">
+            <a:schemeClr val="accent1"/>
+          </a:effectRef>
+          <a:fontRef idx="minor">
+            <a:schemeClr val="lt1"/>
+          </a:fontRef>
+        </p:style>
+        <p:txBody>
+          <a:bodyPr rtlCol="0" anchor="ctr"/>
+          <a:lstStyle/>
+          <a:p>
+            <a:pPr algn="ctr"/>
+            <a:endParaRPr lang="zh-TW" altLang="en-US"/>
+          </a:p>
+        </p:txBody>
+      </p:sp>
+      <p:pic>
+        <p:nvPicPr>
+          <p:cNvPr id="3" name="圖片 2"/>
+          <p:cNvPicPr>
+            <a:picLocks noChangeAspect="1"/>
+          </p:cNvPicPr>
+          <p:nvPr/>
+        </p:nvPicPr>
+        <p:blipFill>
+          <a:blip r:embed="rId2"/>
+          <a:stretch>
+            <a:fillRect/>
+          </a:stretch>
+        </p:blipFill>
+        <p:spPr>
+          <a:xfrm>
+            <a:off x="2267410" y="2320164"/>
+            <a:ext cx="7779567" cy="3942091"/>
+          </a:xfrm>
+          <a:prstGeom prst="rect">
+            <a:avLst/>
+          </a:prstGeom>
+        </p:spPr>
+      </p:pic>
+    </p:spTree>
+    <p:extLst>
+      <p:ext uri="{BB962C8B-B14F-4D97-AF65-F5344CB8AC3E}">
+        <p14:creationId xmlns:p14="http://schemas.microsoft.com/office/powerpoint/2010/main" val="4242682005"/>
+      </p:ext>
+    </p:extLst>
+  </p:cSld>
+  <p:clrMapOvr>
+    <a:masterClrMapping/>
+  </p:clrMapOvr>
+</p:sld>
+</file>
+
+<file path=ppt/slides/slide3.xml><?xml version="1.0" encoding="utf-8"?>
+<p:sld xmlns:a="http://schemas.openxmlformats.org/drawingml/2006/main" xmlns:r="http://schemas.openxmlformats.org/officeDocument/2006/relationships" xmlns:p="http://schemas.openxmlformats.org/presentationml/2006/main">
+  <p:cSld>
+    <p:spTree>
+      <p:nvGrpSpPr>
+        <p:cNvPr id="1" name=""/>
+        <p:cNvGrpSpPr/>
+        <p:nvPr/>
+      </p:nvGrpSpPr>
+      <p:grpSpPr>
+        <a:xfrm>
+          <a:off x="0" y="0"/>
+          <a:ext cx="0" cy="0"/>
+          <a:chOff x="0" y="0"/>
+          <a:chExt cx="0" cy="0"/>
+        </a:xfrm>
+      </p:grpSpPr>
+      <p:sp>
+        <p:nvSpPr>
+          <p:cNvPr id="6" name="文字方塊 5"/>
+          <p:cNvSpPr txBox="1"/>
+          <p:nvPr/>
+        </p:nvSpPr>
+        <p:spPr>
+          <a:xfrm>
+            <a:off x="1136149" y="802409"/>
+            <a:ext cx="4166525" cy="2252924"/>
+          </a:xfrm>
+          <a:prstGeom prst="rect">
+            <a:avLst/>
+          </a:prstGeom>
+          <a:noFill/>
+        </p:spPr>
+        <p:txBody>
+          <a:bodyPr wrap="none" rtlCol="0">
+            <a:spAutoFit/>
+          </a:bodyPr>
+          <a:lstStyle/>
+          <a:p>
+            <a:pPr>
+              <a:lnSpc>
+                <a:spcPct val="130000"/>
+              </a:lnSpc>
+            </a:pPr>
+            <a:r>
+              <a:rPr lang="zh-TW" altLang="en-US" sz="3600" b="1" dirty="0" smtClean="0">
+                <a:latin typeface="微軟正黑體" panose="020B0604030504040204" pitchFamily="34" charset="-120"/>
+                <a:ea typeface="微軟正黑體" panose="020B0604030504040204" pitchFamily="34" charset="-120"/>
+              </a:rPr>
+              <a:t>遊戲步驟</a:t>
+            </a:r>
+            <a:endParaRPr lang="en-US" altLang="zh-TW" sz="3600" b="1" dirty="0" smtClean="0">
+              <a:latin typeface="微軟正黑體" panose="020B0604030504040204" pitchFamily="34" charset="-120"/>
+              <a:ea typeface="微軟正黑體" panose="020B0604030504040204" pitchFamily="34" charset="-120"/>
+            </a:endParaRPr>
+          </a:p>
+          <a:p>
+            <a:pPr marL="742950" indent="-742950">
+              <a:lnSpc>
+                <a:spcPct val="130000"/>
+              </a:lnSpc>
+              <a:buAutoNum type="arabicPeriod"/>
+            </a:pPr>
+            <a:r>
+              <a:rPr lang="zh-TW" altLang="en-US" sz="3600" dirty="0" smtClean="0">
+                <a:latin typeface="微軟正黑體" panose="020B0604030504040204" pitchFamily="34" charset="-120"/>
+                <a:ea typeface="微軟正黑體" panose="020B0604030504040204" pitchFamily="34" charset="-120"/>
+              </a:rPr>
+              <a:t>放置船艦</a:t>
+            </a:r>
+            <a:endParaRPr lang="en-US" altLang="zh-TW" sz="3600" dirty="0" smtClean="0">
+              <a:latin typeface="微軟正黑體" panose="020B0604030504040204" pitchFamily="34" charset="-120"/>
+              <a:ea typeface="微軟正黑體" panose="020B0604030504040204" pitchFamily="34" charset="-120"/>
+            </a:endParaRPr>
+          </a:p>
+          <a:p>
+            <a:pPr marL="742950" indent="-742950">
+              <a:lnSpc>
+                <a:spcPct val="130000"/>
+              </a:lnSpc>
+              <a:buAutoNum type="arabicPeriod"/>
+            </a:pPr>
+            <a:r>
+              <a:rPr lang="zh-TW" altLang="en-US" sz="3600" dirty="0" smtClean="0">
+                <a:latin typeface="微軟正黑體" panose="020B0604030504040204" pitchFamily="34" charset="-120"/>
+                <a:ea typeface="微軟正黑體" panose="020B0604030504040204" pitchFamily="34" charset="-120"/>
+              </a:rPr>
+              <a:t>放置炸彈並引爆</a:t>
+            </a:r>
+            <a:endParaRPr lang="en-US" altLang="zh-TW" sz="3600" dirty="0" smtClean="0">
+              <a:latin typeface="微軟正黑體" panose="020B0604030504040204" pitchFamily="34" charset="-120"/>
+              <a:ea typeface="微軟正黑體" panose="020B0604030504040204" pitchFamily="34" charset="-120"/>
+            </a:endParaRPr>
+          </a:p>
+        </p:txBody>
+      </p:sp>
+    </p:spTree>
+    <p:extLst>
+      <p:ext uri="{BB962C8B-B14F-4D97-AF65-F5344CB8AC3E}">
+        <p14:creationId xmlns:p14="http://schemas.microsoft.com/office/powerpoint/2010/main" val="2383523182"/>
+      </p:ext>
+    </p:extLst>
+  </p:cSld>
+  <p:clrMapOvr>
+    <a:masterClrMapping/>
+  </p:clrMapOvr>
+</p:sld>
+</file>
+
+<file path=ppt/slides/slide4.xml><?xml version="1.0" encoding="utf-8"?>
+<p:sld xmlns:a="http://schemas.openxmlformats.org/drawingml/2006/main" xmlns:r="http://schemas.openxmlformats.org/officeDocument/2006/relationships" xmlns:p="http://schemas.openxmlformats.org/presentationml/2006/main">
+  <p:cSld>
+    <p:spTree>
+      <p:nvGrpSpPr>
+        <p:cNvPr id="1" name=""/>
+        <p:cNvGrpSpPr/>
+        <p:nvPr/>
+      </p:nvGrpSpPr>
+      <p:grpSpPr>
+        <a:xfrm>
+          <a:off x="0" y="0"/>
+          <a:ext cx="0" cy="0"/>
+          <a:chOff x="0" y="0"/>
+          <a:chExt cx="0" cy="0"/>
+        </a:xfrm>
+      </p:grpSpPr>
+      <p:sp>
+        <p:nvSpPr>
+          <p:cNvPr id="6" name="文字方塊 5"/>
+          <p:cNvSpPr txBox="1"/>
+          <p:nvPr/>
+        </p:nvSpPr>
+        <p:spPr>
+          <a:xfrm>
+            <a:off x="1136149" y="802409"/>
+            <a:ext cx="2781531" cy="1532727"/>
+          </a:xfrm>
+          <a:prstGeom prst="rect">
+            <a:avLst/>
+          </a:prstGeom>
+          <a:noFill/>
+        </p:spPr>
+        <p:txBody>
+          <a:bodyPr wrap="none" rtlCol="0">
+            <a:spAutoFit/>
+          </a:bodyPr>
+          <a:lstStyle/>
+          <a:p>
+            <a:pPr>
+              <a:lnSpc>
+                <a:spcPct val="130000"/>
+              </a:lnSpc>
+            </a:pPr>
+            <a:r>
+              <a:rPr lang="zh-TW" altLang="en-US" sz="3600" b="1" dirty="0" smtClean="0">
+                <a:latin typeface="微軟正黑體" panose="020B0604030504040204" pitchFamily="34" charset="-120"/>
+                <a:ea typeface="微軟正黑體" panose="020B0604030504040204" pitchFamily="34" charset="-120"/>
+              </a:rPr>
+              <a:t>遊戲步驟</a:t>
+            </a:r>
+            <a:endParaRPr lang="en-US" altLang="zh-TW" sz="3600" b="1" dirty="0" smtClean="0">
+              <a:latin typeface="微軟正黑體" panose="020B0604030504040204" pitchFamily="34" charset="-120"/>
+              <a:ea typeface="微軟正黑體" panose="020B0604030504040204" pitchFamily="34" charset="-120"/>
+            </a:endParaRPr>
+          </a:p>
+          <a:p>
+            <a:pPr marL="742950" indent="-742950">
+              <a:lnSpc>
+                <a:spcPct val="130000"/>
+              </a:lnSpc>
+              <a:buAutoNum type="arabicPeriod"/>
+            </a:pPr>
+            <a:r>
+              <a:rPr lang="zh-TW" altLang="en-US" sz="3600" dirty="0" smtClean="0">
+                <a:latin typeface="微軟正黑體" panose="020B0604030504040204" pitchFamily="34" charset="-120"/>
+                <a:ea typeface="微軟正黑體" panose="020B0604030504040204" pitchFamily="34" charset="-120"/>
+              </a:rPr>
+              <a:t>放置船艦</a:t>
+            </a:r>
+            <a:endParaRPr lang="en-US" altLang="zh-TW" sz="3600" dirty="0" smtClean="0">
+              <a:latin typeface="微軟正黑體" panose="020B0604030504040204" pitchFamily="34" charset="-120"/>
+              <a:ea typeface="微軟正黑體" panose="020B0604030504040204" pitchFamily="34" charset="-120"/>
+            </a:endParaRPr>
+          </a:p>
+        </p:txBody>
+      </p:sp>
+      <p:pic>
+        <p:nvPicPr>
+          <p:cNvPr id="2" name="圖片 1"/>
+          <p:cNvPicPr>
+            <a:picLocks noChangeAspect="1"/>
+          </p:cNvPicPr>
+          <p:nvPr/>
+        </p:nvPicPr>
+        <p:blipFill>
+          <a:blip r:embed="rId2"/>
+          <a:stretch>
+            <a:fillRect/>
+          </a:stretch>
+        </p:blipFill>
+        <p:spPr>
+          <a:xfrm>
+            <a:off x="7019636" y="2335136"/>
+            <a:ext cx="4889970" cy="3494284"/>
+          </a:xfrm>
+          <a:prstGeom prst="rect">
+            <a:avLst/>
+          </a:prstGeom>
+        </p:spPr>
+      </p:pic>
+      <p:sp>
+        <p:nvSpPr>
+          <p:cNvPr id="4" name="文字方塊 3"/>
+          <p:cNvSpPr txBox="1"/>
+          <p:nvPr/>
+        </p:nvSpPr>
+        <p:spPr>
+          <a:xfrm>
+            <a:off x="1136149" y="2643929"/>
+            <a:ext cx="5262979" cy="2973122"/>
+          </a:xfrm>
+          <a:prstGeom prst="rect">
+            <a:avLst/>
+          </a:prstGeom>
+          <a:noFill/>
+        </p:spPr>
+        <p:txBody>
+          <a:bodyPr wrap="none" rtlCol="0">
+            <a:spAutoFit/>
+          </a:bodyPr>
+          <a:lstStyle/>
+          <a:p>
+            <a:pPr>
+              <a:lnSpc>
+                <a:spcPct val="130000"/>
+              </a:lnSpc>
+            </a:pPr>
+            <a:r>
+              <a:rPr lang="zh-TW" altLang="en-US" sz="3600" b="1" dirty="0" smtClean="0">
+                <a:latin typeface="微軟正黑體" panose="020B0604030504040204" pitchFamily="34" charset="-120"/>
+                <a:ea typeface="微軟正黑體" panose="020B0604030504040204" pitchFamily="34" charset="-120"/>
+              </a:rPr>
+              <a:t>動作</a:t>
+            </a:r>
+            <a:endParaRPr lang="en-US" altLang="zh-TW" sz="3600" b="1" dirty="0" smtClean="0">
+              <a:latin typeface="微軟正黑體" panose="020B0604030504040204" pitchFamily="34" charset="-120"/>
+              <a:ea typeface="微軟正黑體" panose="020B0604030504040204" pitchFamily="34" charset="-120"/>
+            </a:endParaRPr>
+          </a:p>
+          <a:p>
+            <a:pPr>
+              <a:lnSpc>
+                <a:spcPct val="130000"/>
+              </a:lnSpc>
+            </a:pPr>
+            <a:r>
+              <a:rPr lang="zh-TW" altLang="en-US" sz="3600" dirty="0" smtClean="0">
+                <a:latin typeface="微軟正黑體" panose="020B0604030504040204" pitchFamily="34" charset="-120"/>
+                <a:ea typeface="微軟正黑體" panose="020B0604030504040204" pitchFamily="34" charset="-120"/>
+              </a:rPr>
+              <a:t>拖曳：放置於方格內</a:t>
+            </a:r>
+            <a:endParaRPr lang="en-US" altLang="zh-TW" sz="3600" dirty="0" smtClean="0">
+              <a:latin typeface="微軟正黑體" panose="020B0604030504040204" pitchFamily="34" charset="-120"/>
+              <a:ea typeface="微軟正黑體" panose="020B0604030504040204" pitchFamily="34" charset="-120"/>
+            </a:endParaRPr>
+          </a:p>
+          <a:p>
+            <a:pPr>
+              <a:lnSpc>
+                <a:spcPct val="130000"/>
+              </a:lnSpc>
+            </a:pPr>
+            <a:r>
+              <a:rPr lang="zh-TW" altLang="en-US" sz="3600" dirty="0">
+                <a:latin typeface="微軟正黑體" panose="020B0604030504040204" pitchFamily="34" charset="-120"/>
+                <a:ea typeface="微軟正黑體" panose="020B0604030504040204" pitchFamily="34" charset="-120"/>
+              </a:rPr>
+              <a:t>單</a:t>
+            </a:r>
+            <a:r>
+              <a:rPr lang="zh-TW" altLang="en-US" sz="3600" dirty="0" smtClean="0">
+                <a:latin typeface="微軟正黑體" panose="020B0604030504040204" pitchFamily="34" charset="-120"/>
+                <a:ea typeface="微軟正黑體" panose="020B0604030504040204" pitchFamily="34" charset="-120"/>
+              </a:rPr>
+              <a:t>擊：旋轉船艦</a:t>
+            </a:r>
+            <a:endParaRPr lang="en-US" altLang="zh-TW" sz="3600" dirty="0" smtClean="0">
+              <a:latin typeface="微軟正黑體" panose="020B0604030504040204" pitchFamily="34" charset="-120"/>
+              <a:ea typeface="微軟正黑體" panose="020B0604030504040204" pitchFamily="34" charset="-120"/>
+            </a:endParaRPr>
+          </a:p>
+          <a:p>
+            <a:pPr>
+              <a:lnSpc>
+                <a:spcPct val="130000"/>
+              </a:lnSpc>
+            </a:pPr>
+            <a:r>
+              <a:rPr lang="zh-TW" altLang="en-US" sz="3600" dirty="0">
+                <a:latin typeface="微軟正黑體" panose="020B0604030504040204" pitchFamily="34" charset="-120"/>
+                <a:ea typeface="微軟正黑體" panose="020B0604030504040204" pitchFamily="34" charset="-120"/>
+              </a:rPr>
+              <a:t>雙</a:t>
+            </a:r>
+            <a:r>
+              <a:rPr lang="zh-TW" altLang="en-US" sz="3600" dirty="0" smtClean="0">
+                <a:latin typeface="微軟正黑體" panose="020B0604030504040204" pitchFamily="34" charset="-120"/>
+                <a:ea typeface="微軟正黑體" panose="020B0604030504040204" pitchFamily="34" charset="-120"/>
+              </a:rPr>
+              <a:t>擊：船艦回到起始位置</a:t>
+            </a:r>
+            <a:endParaRPr lang="en-US" altLang="zh-TW" sz="3600" dirty="0" smtClean="0">
+              <a:latin typeface="微軟正黑體" panose="020B0604030504040204" pitchFamily="34" charset="-120"/>
+              <a:ea typeface="微軟正黑體" panose="020B0604030504040204" pitchFamily="34" charset="-120"/>
+            </a:endParaRPr>
+          </a:p>
+        </p:txBody>
+      </p:sp>
+    </p:spTree>
+    <p:extLst>
+      <p:ext uri="{BB962C8B-B14F-4D97-AF65-F5344CB8AC3E}">
+        <p14:creationId xmlns:p14="http://schemas.microsoft.com/office/powerpoint/2010/main" val="3432753172"/>
+      </p:ext>
+    </p:extLst>
+  </p:cSld>
+  <p:clrMapOvr>
+    <a:masterClrMapping/>
+  </p:clrMapOvr>
+</p:sld>
+</file>
+
+<file path=ppt/slides/slide5.xml><?xml version="1.0" encoding="utf-8"?>
+<p:sld xmlns:a="http://schemas.openxmlformats.org/drawingml/2006/main" xmlns:r="http://schemas.openxmlformats.org/officeDocument/2006/relationships" xmlns:p="http://schemas.openxmlformats.org/presentationml/2006/main">
+  <p:cSld>
+    <p:spTree>
+      <p:nvGrpSpPr>
+        <p:cNvPr id="1" name=""/>
+        <p:cNvGrpSpPr/>
+        <p:nvPr/>
+      </p:nvGrpSpPr>
+      <p:grpSpPr>
+        <a:xfrm>
+          <a:off x="0" y="0"/>
+          <a:ext cx="0" cy="0"/>
+          <a:chOff x="0" y="0"/>
+          <a:chExt cx="0" cy="0"/>
+        </a:xfrm>
+      </p:grpSpPr>
+      <p:sp>
+        <p:nvSpPr>
+          <p:cNvPr id="6" name="文字方塊 5"/>
+          <p:cNvSpPr txBox="1"/>
+          <p:nvPr/>
+        </p:nvSpPr>
+        <p:spPr>
+          <a:xfrm>
+            <a:off x="1136149" y="802409"/>
+            <a:ext cx="4166525" cy="1532727"/>
+          </a:xfrm>
+          <a:prstGeom prst="rect">
+            <a:avLst/>
+          </a:prstGeom>
+          <a:noFill/>
+        </p:spPr>
+        <p:txBody>
+          <a:bodyPr wrap="none" rtlCol="0">
+            <a:spAutoFit/>
+          </a:bodyPr>
+          <a:lstStyle/>
+          <a:p>
+            <a:pPr>
+              <a:lnSpc>
+                <a:spcPct val="130000"/>
+              </a:lnSpc>
+            </a:pPr>
+            <a:r>
+              <a:rPr lang="zh-TW" altLang="en-US" sz="3600" b="1" dirty="0" smtClean="0">
+                <a:latin typeface="微軟正黑體" panose="020B0604030504040204" pitchFamily="34" charset="-120"/>
+                <a:ea typeface="微軟正黑體" panose="020B0604030504040204" pitchFamily="34" charset="-120"/>
+              </a:rPr>
+              <a:t>遊戲步驟</a:t>
+            </a:r>
+            <a:endParaRPr lang="en-US" altLang="zh-TW" sz="3600" b="1" dirty="0" smtClean="0">
+              <a:latin typeface="微軟正黑體" panose="020B0604030504040204" pitchFamily="34" charset="-120"/>
+              <a:ea typeface="微軟正黑體" panose="020B0604030504040204" pitchFamily="34" charset="-120"/>
+            </a:endParaRPr>
+          </a:p>
+          <a:p>
+            <a:pPr marL="742950" indent="-742950">
+              <a:lnSpc>
+                <a:spcPct val="130000"/>
+              </a:lnSpc>
+              <a:buFont typeface="+mj-lt"/>
+              <a:buAutoNum type="arabicPeriod" startAt="2"/>
+            </a:pPr>
+            <a:r>
+              <a:rPr lang="zh-TW" altLang="en-US" sz="3600" dirty="0">
+                <a:latin typeface="微軟正黑體" panose="020B0604030504040204" pitchFamily="34" charset="-120"/>
+                <a:ea typeface="微軟正黑體" panose="020B0604030504040204" pitchFamily="34" charset="-120"/>
+              </a:rPr>
+              <a:t>放置炸彈並引爆</a:t>
+            </a:r>
+            <a:endParaRPr lang="en-US" altLang="zh-TW" sz="3600" dirty="0">
+              <a:latin typeface="微軟正黑體" panose="020B0604030504040204" pitchFamily="34" charset="-120"/>
+              <a:ea typeface="微軟正黑體" panose="020B0604030504040204" pitchFamily="34" charset="-120"/>
+            </a:endParaRPr>
+          </a:p>
+        </p:txBody>
+      </p:sp>
+      <p:grpSp>
+        <p:nvGrpSpPr>
+          <p:cNvPr id="8" name="群組 7"/>
+          <p:cNvGrpSpPr/>
+          <p:nvPr/>
+        </p:nvGrpSpPr>
+        <p:grpSpPr>
+          <a:xfrm>
+            <a:off x="121595" y="2512290"/>
+            <a:ext cx="11932562" cy="3166149"/>
+            <a:chOff x="370976" y="2549236"/>
+            <a:chExt cx="11932562" cy="3166149"/>
+          </a:xfrm>
+        </p:grpSpPr>
+        <p:pic>
+          <p:nvPicPr>
+            <p:cNvPr id="3" name="圖片 2"/>
+            <p:cNvPicPr>
+              <a:picLocks noChangeAspect="1"/>
+            </p:cNvPicPr>
+            <p:nvPr/>
+          </p:nvPicPr>
+          <p:blipFill>
+            <a:blip r:embed="rId2"/>
+            <a:stretch>
+              <a:fillRect/>
+            </a:stretch>
+          </p:blipFill>
+          <p:spPr>
+            <a:xfrm>
+              <a:off x="370976" y="2551625"/>
+              <a:ext cx="5696870" cy="3163760"/>
+            </a:xfrm>
+            <a:prstGeom prst="rect">
+              <a:avLst/>
+            </a:prstGeom>
+          </p:spPr>
+        </p:pic>
+        <p:pic>
+          <p:nvPicPr>
+            <p:cNvPr id="7" name="圖片 6"/>
+            <p:cNvPicPr>
+              <a:picLocks noChangeAspect="1"/>
+            </p:cNvPicPr>
+            <p:nvPr/>
+          </p:nvPicPr>
+          <p:blipFill rotWithShape="1">
+            <a:blip r:embed="rId3"/>
+            <a:srcRect t="3972"/>
+            <a:stretch/>
+          </p:blipFill>
+          <p:spPr>
+            <a:xfrm>
+              <a:off x="6188363" y="2549236"/>
+              <a:ext cx="6115175" cy="3166148"/>
+            </a:xfrm>
+            <a:prstGeom prst="rect">
+              <a:avLst/>
+            </a:prstGeom>
+          </p:spPr>
+        </p:pic>
+      </p:grpSp>
+    </p:spTree>
+    <p:extLst>
+      <p:ext uri="{BB962C8B-B14F-4D97-AF65-F5344CB8AC3E}">
+        <p14:creationId xmlns:p14="http://schemas.microsoft.com/office/powerpoint/2010/main" val="2606784554"/>
+      </p:ext>
+    </p:extLst>
+  </p:cSld>
+  <p:clrMapOvr>
+    <a:masterClrMapping/>
+  </p:clrMapOvr>
+</p:sld>
+</file>
+
+<file path=ppt/slides/slide6.xml><?xml version="1.0" encoding="utf-8"?>
+<p:sld xmlns:a="http://schemas.openxmlformats.org/drawingml/2006/main" xmlns:r="http://schemas.openxmlformats.org/officeDocument/2006/relationships" xmlns:p="http://schemas.openxmlformats.org/presentationml/2006/main">
+  <p:cSld>
+    <p:spTree>
+      <p:nvGrpSpPr>
+        <p:cNvPr id="1" name=""/>
+        <p:cNvGrpSpPr/>
+        <p:nvPr/>
+      </p:nvGrpSpPr>
+      <p:grpSpPr>
+        <a:xfrm>
+          <a:off x="0" y="0"/>
+          <a:ext cx="0" cy="0"/>
+          <a:chOff x="0" y="0"/>
+          <a:chExt cx="0" cy="0"/>
+        </a:xfrm>
+      </p:grpSpPr>
+      <p:sp>
+        <p:nvSpPr>
+          <p:cNvPr id="2" name="矩形 1"/>
+          <p:cNvSpPr/>
+          <p:nvPr/>
+        </p:nvSpPr>
+        <p:spPr>
+          <a:xfrm>
+            <a:off x="18473" y="6262255"/>
+            <a:ext cx="12192000" cy="498763"/>
+          </a:xfrm>
+          <a:prstGeom prst="rect">
+            <a:avLst/>
+          </a:prstGeom>
+          <a:solidFill>
+            <a:schemeClr val="bg1"/>
+          </a:solidFill>
+          <a:ln>
+            <a:noFill/>
+          </a:ln>
+        </p:spPr>
+        <p:style>
+          <a:lnRef idx="2">
+            <a:schemeClr val="accent1">
+              <a:shade val="50000"/>
+            </a:schemeClr>
+          </a:lnRef>
+          <a:fillRef idx="1">
+            <a:schemeClr val="accent1"/>
+          </a:fillRef>
+          <a:effectRef idx="0">
+            <a:schemeClr val="accent1"/>
+          </a:effectRef>
+          <a:fontRef idx="minor">
+            <a:schemeClr val="lt1"/>
+          </a:fontRef>
+        </p:style>
+        <p:txBody>
+          <a:bodyPr rtlCol="0" anchor="ctr"/>
+          <a:lstStyle/>
+          <a:p>
+            <a:pPr algn="ctr"/>
+            <a:endParaRPr lang="zh-TW" altLang="en-US"/>
+          </a:p>
+        </p:txBody>
+      </p:sp>
+      <p:sp>
+        <p:nvSpPr>
+          <p:cNvPr id="3" name="文字方塊 2"/>
+          <p:cNvSpPr txBox="1"/>
+          <p:nvPr/>
+        </p:nvSpPr>
+        <p:spPr>
+          <a:xfrm>
+            <a:off x="600364" y="387927"/>
+            <a:ext cx="609462" cy="369332"/>
+          </a:xfrm>
+          <a:prstGeom prst="rect">
+            <a:avLst/>
+          </a:prstGeom>
+          <a:noFill/>
+        </p:spPr>
+        <p:txBody>
+          <a:bodyPr wrap="none" rtlCol="0">
+            <a:spAutoFit/>
+          </a:bodyPr>
+          <a:lstStyle/>
+          <a:p>
+            <a:r>
+              <a:rPr lang="en-US" altLang="zh-TW" dirty="0" smtClean="0"/>
+              <a:t>spec</a:t>
+            </a:r>
+            <a:endParaRPr lang="zh-TW" altLang="en-US" dirty="0"/>
+          </a:p>
+        </p:txBody>
+      </p:sp>
+      <p:graphicFrame>
+        <p:nvGraphicFramePr>
+          <p:cNvPr id="4" name="表格 3"/>
+          <p:cNvGraphicFramePr>
+            <a:graphicFrameLocks noGrp="1"/>
+          </p:cNvGraphicFramePr>
+          <p:nvPr>
+            <p:extLst>
+              <p:ext uri="{D42A27DB-BD31-4B8C-83A1-F6EECF244321}">
+                <p14:modId xmlns:p14="http://schemas.microsoft.com/office/powerpoint/2010/main" val="3441919541"/>
+              </p:ext>
+            </p:extLst>
+          </p:nvPr>
+        </p:nvGraphicFramePr>
+        <p:xfrm>
+          <a:off x="905095" y="913629"/>
+          <a:ext cx="3011125" cy="1854200"/>
+        </p:xfrm>
+        <a:graphic>
+          <a:graphicData uri="http://schemas.openxmlformats.org/drawingml/2006/table">
+            <a:tbl>
+              <a:tblPr firstRow="1" bandRow="1">
+                <a:tableStyleId>{5940675A-B579-460E-94D1-54222C63F5DA}</a:tableStyleId>
+              </a:tblPr>
+              <a:tblGrid>
+                <a:gridCol w="602225">
+                  <a:extLst>
+                    <a:ext uri="{9D8B030D-6E8A-4147-A177-3AD203B41FA5}">
+                      <a16:colId xmlns:a16="http://schemas.microsoft.com/office/drawing/2014/main" val="569689443"/>
+                    </a:ext>
+                  </a:extLst>
+                </a:gridCol>
+                <a:gridCol w="602225">
+                  <a:extLst>
+                    <a:ext uri="{9D8B030D-6E8A-4147-A177-3AD203B41FA5}">
+                      <a16:colId xmlns:a16="http://schemas.microsoft.com/office/drawing/2014/main" val="993562783"/>
+                    </a:ext>
+                  </a:extLst>
+                </a:gridCol>
+                <a:gridCol w="602225">
+                  <a:extLst>
+                    <a:ext uri="{9D8B030D-6E8A-4147-A177-3AD203B41FA5}">
+                      <a16:colId xmlns:a16="http://schemas.microsoft.com/office/drawing/2014/main" val="569899060"/>
+                    </a:ext>
+                  </a:extLst>
+                </a:gridCol>
+                <a:gridCol w="602225">
+                  <a:extLst>
+                    <a:ext uri="{9D8B030D-6E8A-4147-A177-3AD203B41FA5}">
+                      <a16:colId xmlns:a16="http://schemas.microsoft.com/office/drawing/2014/main" val="369712834"/>
+                    </a:ext>
+                  </a:extLst>
+                </a:gridCol>
+                <a:gridCol w="602225">
+                  <a:extLst>
+                    <a:ext uri="{9D8B030D-6E8A-4147-A177-3AD203B41FA5}">
+                      <a16:colId xmlns:a16="http://schemas.microsoft.com/office/drawing/2014/main" val="1233888139"/>
+                    </a:ext>
+                  </a:extLst>
+                </a:gridCol>
+              </a:tblGrid>
+              <a:tr h="370840">
+                <a:tc>
+                  <a:txBody>
+                    <a:bodyPr/>
+                    <a:lstStyle/>
+                    <a:p>
+                      <a:pPr algn="ctr"/>
+                      <a:r>
+                        <a:rPr lang="en-US" altLang="zh-TW" dirty="0" smtClean="0"/>
+                        <a:t>0</a:t>
+                      </a:r>
+                      <a:endParaRPr lang="zh-TW" altLang="en-US" dirty="0"/>
+                    </a:p>
+                  </a:txBody>
+                  <a:tcPr/>
+                </a:tc>
+                <a:tc>
+                  <a:txBody>
+                    <a:bodyPr/>
+                    <a:lstStyle/>
+                    <a:p>
+                      <a:pPr algn="ctr"/>
+                      <a:r>
+                        <a:rPr lang="en-US" altLang="zh-TW" dirty="0" smtClean="0"/>
+                        <a:t>1</a:t>
+                      </a:r>
+                      <a:endParaRPr lang="zh-TW" altLang="en-US" dirty="0"/>
+                    </a:p>
+                  </a:txBody>
+                  <a:tcPr/>
+                </a:tc>
+                <a:tc>
+                  <a:txBody>
+                    <a:bodyPr/>
+                    <a:lstStyle/>
+                    <a:p>
+                      <a:pPr algn="ctr"/>
+                      <a:r>
+                        <a:rPr lang="en-US" altLang="zh-TW" dirty="0" smtClean="0"/>
+                        <a:t>2</a:t>
+                      </a:r>
+                      <a:endParaRPr lang="zh-TW" altLang="en-US" dirty="0"/>
+                    </a:p>
+                  </a:txBody>
+                  <a:tcPr/>
+                </a:tc>
+                <a:tc>
+                  <a:txBody>
+                    <a:bodyPr/>
+                    <a:lstStyle/>
+                    <a:p>
+                      <a:pPr algn="ctr"/>
+                      <a:r>
+                        <a:rPr lang="en-US" altLang="zh-TW" dirty="0" smtClean="0"/>
+                        <a:t>3</a:t>
+                      </a:r>
+                      <a:endParaRPr lang="zh-TW" altLang="en-US" dirty="0"/>
+                    </a:p>
+                  </a:txBody>
+                  <a:tcPr/>
+                </a:tc>
+                <a:tc>
+                  <a:txBody>
+                    <a:bodyPr/>
+                    <a:lstStyle/>
+                    <a:p>
+                      <a:pPr algn="ctr"/>
+                      <a:r>
+                        <a:rPr lang="en-US" altLang="zh-TW" dirty="0" smtClean="0"/>
+                        <a:t>4</a:t>
+                      </a:r>
+                      <a:endParaRPr lang="zh-TW" altLang="en-US" dirty="0"/>
+                    </a:p>
+                  </a:txBody>
+                  <a:tcPr/>
+                </a:tc>
+                <a:extLst>
+                  <a:ext uri="{0D108BD9-81ED-4DB2-BD59-A6C34878D82A}">
+                    <a16:rowId xmlns:a16="http://schemas.microsoft.com/office/drawing/2014/main" val="2434006814"/>
+                  </a:ext>
+                </a:extLst>
+              </a:tr>
+              <a:tr h="370840">
+                <a:tc>
+                  <a:txBody>
+                    <a:bodyPr/>
+                    <a:lstStyle/>
+                    <a:p>
+                      <a:pPr algn="ctr"/>
+                      <a:r>
+                        <a:rPr lang="en-US" altLang="zh-TW" dirty="0" smtClean="0"/>
+                        <a:t>5</a:t>
+                      </a:r>
+                      <a:endParaRPr lang="zh-TW" altLang="en-US" dirty="0"/>
+                    </a:p>
+                  </a:txBody>
+                  <a:tcPr/>
+                </a:tc>
+                <a:tc>
+                  <a:txBody>
+                    <a:bodyPr/>
+                    <a:lstStyle/>
+                    <a:p>
+                      <a:pPr algn="ctr"/>
+                      <a:r>
+                        <a:rPr lang="en-US" altLang="zh-TW" dirty="0" smtClean="0"/>
+                        <a:t>6</a:t>
+                      </a:r>
+                      <a:endParaRPr lang="zh-TW" altLang="en-US" dirty="0"/>
+                    </a:p>
+                  </a:txBody>
+                  <a:tcPr/>
+                </a:tc>
+                <a:tc>
+                  <a:txBody>
+                    <a:bodyPr/>
+                    <a:lstStyle/>
+                    <a:p>
+                      <a:pPr algn="ctr"/>
+                      <a:r>
+                        <a:rPr lang="en-US" altLang="zh-TW" dirty="0" smtClean="0"/>
+                        <a:t>7</a:t>
+                      </a:r>
+                      <a:endParaRPr lang="zh-TW" altLang="en-US" dirty="0"/>
+                    </a:p>
+                  </a:txBody>
+                  <a:tcPr/>
+                </a:tc>
+                <a:tc>
+                  <a:txBody>
+                    <a:bodyPr/>
+                    <a:lstStyle/>
+                    <a:p>
+                      <a:pPr algn="ctr"/>
+                      <a:r>
+                        <a:rPr lang="en-US" altLang="zh-TW" dirty="0" smtClean="0"/>
+                        <a:t>8</a:t>
+                      </a:r>
+                      <a:endParaRPr lang="zh-TW" altLang="en-US" dirty="0"/>
+                    </a:p>
+                  </a:txBody>
+                  <a:tcPr/>
+                </a:tc>
+                <a:tc>
+                  <a:txBody>
+                    <a:bodyPr/>
+                    <a:lstStyle/>
+                    <a:p>
+                      <a:pPr algn="ctr"/>
+                      <a:r>
+                        <a:rPr lang="en-US" altLang="zh-TW" dirty="0" smtClean="0"/>
+                        <a:t>9</a:t>
+                      </a:r>
+                      <a:endParaRPr lang="zh-TW" altLang="en-US" dirty="0"/>
+                    </a:p>
+                  </a:txBody>
+                  <a:tcPr/>
+                </a:tc>
+                <a:extLst>
+                  <a:ext uri="{0D108BD9-81ED-4DB2-BD59-A6C34878D82A}">
+                    <a16:rowId xmlns:a16="http://schemas.microsoft.com/office/drawing/2014/main" val="3266982605"/>
+                  </a:ext>
+                </a:extLst>
+              </a:tr>
+              <a:tr h="370840">
+                <a:tc>
+                  <a:txBody>
+                    <a:bodyPr/>
+                    <a:lstStyle/>
+                    <a:p>
+                      <a:pPr algn="ctr"/>
+                      <a:r>
+                        <a:rPr lang="en-US" altLang="zh-TW" dirty="0" smtClean="0"/>
+                        <a:t>10</a:t>
+                      </a:r>
+                      <a:endParaRPr lang="zh-TW" altLang="en-US" dirty="0"/>
+                    </a:p>
+                  </a:txBody>
+                  <a:tcPr/>
+                </a:tc>
+                <a:tc>
+                  <a:txBody>
+                    <a:bodyPr/>
+                    <a:lstStyle/>
+                    <a:p>
+                      <a:pPr algn="ctr"/>
+                      <a:r>
+                        <a:rPr lang="en-US" altLang="zh-TW" dirty="0" smtClean="0"/>
+                        <a:t>11</a:t>
+                      </a:r>
+                      <a:endParaRPr lang="zh-TW" altLang="en-US" dirty="0"/>
+                    </a:p>
+                  </a:txBody>
+                  <a:tcPr/>
+                </a:tc>
+                <a:tc>
+                  <a:txBody>
+                    <a:bodyPr/>
+                    <a:lstStyle/>
+                    <a:p>
+                      <a:pPr algn="ctr"/>
+                      <a:r>
+                        <a:rPr lang="en-US" altLang="zh-TW" dirty="0" smtClean="0"/>
+                        <a:t>12</a:t>
+                      </a:r>
+                      <a:endParaRPr lang="zh-TW" altLang="en-US" dirty="0"/>
+                    </a:p>
+                  </a:txBody>
+                  <a:tcPr/>
+                </a:tc>
+                <a:tc>
+                  <a:txBody>
+                    <a:bodyPr/>
+                    <a:lstStyle/>
+                    <a:p>
+                      <a:pPr algn="ctr"/>
+                      <a:r>
+                        <a:rPr lang="en-US" altLang="zh-TW" dirty="0" smtClean="0"/>
+                        <a:t>13</a:t>
+                      </a:r>
+                      <a:endParaRPr lang="zh-TW" altLang="en-US" dirty="0"/>
+                    </a:p>
+                  </a:txBody>
+                  <a:tcPr/>
+                </a:tc>
+                <a:tc>
+                  <a:txBody>
+                    <a:bodyPr/>
+                    <a:lstStyle/>
+                    <a:p>
+                      <a:pPr algn="ctr"/>
+                      <a:r>
+                        <a:rPr lang="en-US" altLang="zh-TW" dirty="0" smtClean="0"/>
+                        <a:t>14</a:t>
+                      </a:r>
+                      <a:endParaRPr lang="zh-TW" altLang="en-US" dirty="0"/>
+                    </a:p>
+                  </a:txBody>
+                  <a:tcPr/>
+                </a:tc>
+                <a:extLst>
+                  <a:ext uri="{0D108BD9-81ED-4DB2-BD59-A6C34878D82A}">
+                    <a16:rowId xmlns:a16="http://schemas.microsoft.com/office/drawing/2014/main" val="951926461"/>
+                  </a:ext>
+                </a:extLst>
+              </a:tr>
+              <a:tr h="370840">
+                <a:tc>
+                  <a:txBody>
+                    <a:bodyPr/>
+                    <a:lstStyle/>
+                    <a:p>
+                      <a:pPr algn="ctr"/>
+                      <a:r>
+                        <a:rPr lang="en-US" altLang="zh-TW" dirty="0" smtClean="0"/>
+                        <a:t>15</a:t>
+                      </a:r>
+                      <a:endParaRPr lang="zh-TW" altLang="en-US" dirty="0"/>
+                    </a:p>
+                  </a:txBody>
+                  <a:tcPr/>
+                </a:tc>
+                <a:tc>
+                  <a:txBody>
+                    <a:bodyPr/>
+                    <a:lstStyle/>
+                    <a:p>
+                      <a:pPr algn="ctr"/>
+                      <a:r>
+                        <a:rPr lang="en-US" altLang="zh-TW" dirty="0" smtClean="0"/>
+                        <a:t>16</a:t>
+                      </a:r>
+                      <a:endParaRPr lang="zh-TW" altLang="en-US" dirty="0"/>
+                    </a:p>
+                  </a:txBody>
+                  <a:tcPr/>
+                </a:tc>
+                <a:tc>
+                  <a:txBody>
+                    <a:bodyPr/>
+                    <a:lstStyle/>
+                    <a:p>
+                      <a:pPr algn="ctr"/>
+                      <a:r>
+                        <a:rPr lang="en-US" altLang="zh-TW" dirty="0" smtClean="0"/>
+                        <a:t>17</a:t>
+                      </a:r>
+                      <a:endParaRPr lang="zh-TW" altLang="en-US" dirty="0"/>
+                    </a:p>
+                  </a:txBody>
+                  <a:tcPr/>
+                </a:tc>
+                <a:tc>
+                  <a:txBody>
+                    <a:bodyPr/>
+                    <a:lstStyle/>
+                    <a:p>
+                      <a:pPr algn="ctr"/>
+                      <a:r>
+                        <a:rPr lang="en-US" altLang="zh-TW" dirty="0" smtClean="0"/>
+                        <a:t>18</a:t>
+                      </a:r>
+                      <a:endParaRPr lang="zh-TW" altLang="en-US" dirty="0"/>
+                    </a:p>
+                  </a:txBody>
+                  <a:tcPr/>
+                </a:tc>
+                <a:tc>
+                  <a:txBody>
+                    <a:bodyPr/>
+                    <a:lstStyle/>
+                    <a:p>
+                      <a:pPr algn="ctr"/>
+                      <a:r>
+                        <a:rPr lang="en-US" altLang="zh-TW" dirty="0" smtClean="0"/>
+                        <a:t>19</a:t>
+                      </a:r>
+                      <a:endParaRPr lang="zh-TW" altLang="en-US" dirty="0"/>
+                    </a:p>
+                  </a:txBody>
+                  <a:tcPr/>
+                </a:tc>
+                <a:extLst>
+                  <a:ext uri="{0D108BD9-81ED-4DB2-BD59-A6C34878D82A}">
+                    <a16:rowId xmlns:a16="http://schemas.microsoft.com/office/drawing/2014/main" val="3155720017"/>
+                  </a:ext>
+                </a:extLst>
+              </a:tr>
+              <a:tr h="370840">
+                <a:tc>
+                  <a:txBody>
+                    <a:bodyPr/>
+                    <a:lstStyle/>
+                    <a:p>
+                      <a:pPr algn="ctr"/>
+                      <a:r>
+                        <a:rPr lang="en-US" altLang="zh-TW" dirty="0" smtClean="0"/>
+                        <a:t>20</a:t>
+                      </a:r>
+                      <a:endParaRPr lang="zh-TW" altLang="en-US" dirty="0"/>
+                    </a:p>
+                  </a:txBody>
+                  <a:tcPr/>
+                </a:tc>
+                <a:tc>
+                  <a:txBody>
+                    <a:bodyPr/>
+                    <a:lstStyle/>
+                    <a:p>
+                      <a:pPr algn="ctr"/>
+                      <a:r>
+                        <a:rPr lang="en-US" altLang="zh-TW" dirty="0" smtClean="0"/>
+                        <a:t>21</a:t>
+                      </a:r>
+                      <a:endParaRPr lang="zh-TW" altLang="en-US" dirty="0"/>
+                    </a:p>
+                  </a:txBody>
+                  <a:tcPr/>
+                </a:tc>
+                <a:tc>
+                  <a:txBody>
+                    <a:bodyPr/>
+                    <a:lstStyle/>
+                    <a:p>
+                      <a:pPr algn="ctr"/>
+                      <a:r>
+                        <a:rPr lang="en-US" altLang="zh-TW" dirty="0" smtClean="0"/>
+                        <a:t>22</a:t>
+                      </a:r>
+                      <a:endParaRPr lang="zh-TW" altLang="en-US" dirty="0"/>
+                    </a:p>
+                  </a:txBody>
+                  <a:tcPr/>
+                </a:tc>
+                <a:tc>
+                  <a:txBody>
+                    <a:bodyPr/>
+                    <a:lstStyle/>
+                    <a:p>
+                      <a:pPr algn="ctr"/>
+                      <a:r>
+                        <a:rPr lang="en-US" altLang="zh-TW" dirty="0" smtClean="0"/>
+                        <a:t>23</a:t>
+                      </a:r>
+                      <a:endParaRPr lang="zh-TW" altLang="en-US" dirty="0"/>
+                    </a:p>
+                  </a:txBody>
+                  <a:tcPr/>
+                </a:tc>
+                <a:tc>
+                  <a:txBody>
+                    <a:bodyPr/>
+                    <a:lstStyle/>
+                    <a:p>
+                      <a:pPr algn="ctr"/>
+                      <a:r>
+                        <a:rPr lang="en-US" altLang="zh-TW" dirty="0" smtClean="0"/>
+                        <a:t>34</a:t>
+                      </a:r>
+                      <a:endParaRPr lang="zh-TW" altLang="en-US" dirty="0"/>
+                    </a:p>
+                  </a:txBody>
+                  <a:tcPr/>
+                </a:tc>
+                <a:extLst>
+                  <a:ext uri="{0D108BD9-81ED-4DB2-BD59-A6C34878D82A}">
+                    <a16:rowId xmlns:a16="http://schemas.microsoft.com/office/drawing/2014/main" val="11773324"/>
+                  </a:ext>
+                </a:extLst>
+              </a:tr>
+            </a:tbl>
+          </a:graphicData>
+        </a:graphic>
+      </p:graphicFrame>
+      <p:graphicFrame>
+        <p:nvGraphicFramePr>
+          <p:cNvPr id="5" name="表格 4"/>
+          <p:cNvGraphicFramePr>
+            <a:graphicFrameLocks noGrp="1"/>
+          </p:cNvGraphicFramePr>
+          <p:nvPr>
+            <p:extLst>
+              <p:ext uri="{D42A27DB-BD31-4B8C-83A1-F6EECF244321}">
+                <p14:modId xmlns:p14="http://schemas.microsoft.com/office/powerpoint/2010/main" val="1485044193"/>
+              </p:ext>
+            </p:extLst>
+          </p:nvPr>
+        </p:nvGraphicFramePr>
+        <p:xfrm>
+          <a:off x="905095" y="3670683"/>
+          <a:ext cx="3011125" cy="1854200"/>
+        </p:xfrm>
+        <a:graphic>
+          <a:graphicData uri="http://schemas.openxmlformats.org/drawingml/2006/table">
+            <a:tbl>
+              <a:tblPr firstRow="1" bandRow="1">
+                <a:tableStyleId>{5940675A-B579-460E-94D1-54222C63F5DA}</a:tableStyleId>
+              </a:tblPr>
+              <a:tblGrid>
+                <a:gridCol w="602225">
+                  <a:extLst>
+                    <a:ext uri="{9D8B030D-6E8A-4147-A177-3AD203B41FA5}">
+                      <a16:colId xmlns:a16="http://schemas.microsoft.com/office/drawing/2014/main" val="569689443"/>
+                    </a:ext>
+                  </a:extLst>
+                </a:gridCol>
+                <a:gridCol w="602225">
+                  <a:extLst>
+                    <a:ext uri="{9D8B030D-6E8A-4147-A177-3AD203B41FA5}">
+                      <a16:colId xmlns:a16="http://schemas.microsoft.com/office/drawing/2014/main" val="993562783"/>
+                    </a:ext>
+                  </a:extLst>
+                </a:gridCol>
+                <a:gridCol w="602225">
+                  <a:extLst>
+                    <a:ext uri="{9D8B030D-6E8A-4147-A177-3AD203B41FA5}">
+                      <a16:colId xmlns:a16="http://schemas.microsoft.com/office/drawing/2014/main" val="569899060"/>
+                    </a:ext>
+                  </a:extLst>
+                </a:gridCol>
+                <a:gridCol w="602225">
+                  <a:extLst>
+                    <a:ext uri="{9D8B030D-6E8A-4147-A177-3AD203B41FA5}">
+                      <a16:colId xmlns:a16="http://schemas.microsoft.com/office/drawing/2014/main" val="369712834"/>
+                    </a:ext>
+                  </a:extLst>
+                </a:gridCol>
+                <a:gridCol w="602225">
+                  <a:extLst>
+                    <a:ext uri="{9D8B030D-6E8A-4147-A177-3AD203B41FA5}">
+                      <a16:colId xmlns:a16="http://schemas.microsoft.com/office/drawing/2014/main" val="1233888139"/>
+                    </a:ext>
+                  </a:extLst>
+                </a:gridCol>
+              </a:tblGrid>
+              <a:tr h="370840">
+                <a:tc>
+                  <a:txBody>
+                    <a:bodyPr/>
+                    <a:lstStyle/>
+                    <a:p>
+                      <a:pPr algn="ctr"/>
+                      <a:r>
+                        <a:rPr lang="en-US" altLang="zh-TW" dirty="0" smtClean="0"/>
+                        <a:t>0</a:t>
+                      </a:r>
+                      <a:endParaRPr lang="zh-TW" altLang="en-US" dirty="0"/>
+                    </a:p>
+                  </a:txBody>
+                  <a:tcPr/>
+                </a:tc>
+                <a:tc>
+                  <a:txBody>
+                    <a:bodyPr/>
+                    <a:lstStyle/>
+                    <a:p>
+                      <a:pPr algn="ctr"/>
+                      <a:r>
+                        <a:rPr lang="en-US" altLang="zh-TW" dirty="0" smtClean="0"/>
+                        <a:t>1</a:t>
+                      </a:r>
+                      <a:endParaRPr lang="zh-TW" altLang="en-US" dirty="0"/>
+                    </a:p>
+                  </a:txBody>
+                  <a:tcPr/>
+                </a:tc>
+                <a:tc>
+                  <a:txBody>
+                    <a:bodyPr/>
+                    <a:lstStyle/>
+                    <a:p>
+                      <a:pPr algn="ctr"/>
+                      <a:r>
+                        <a:rPr lang="en-US" altLang="zh-TW" dirty="0" smtClean="0"/>
+                        <a:t>2</a:t>
+                      </a:r>
+                      <a:endParaRPr lang="zh-TW" altLang="en-US" dirty="0"/>
+                    </a:p>
+                  </a:txBody>
+                  <a:tcPr/>
+                </a:tc>
+                <a:tc>
+                  <a:txBody>
+                    <a:bodyPr/>
+                    <a:lstStyle/>
+                    <a:p>
+                      <a:pPr algn="ctr"/>
+                      <a:r>
+                        <a:rPr lang="en-US" altLang="zh-TW" dirty="0" smtClean="0"/>
+                        <a:t>3</a:t>
+                      </a:r>
+                      <a:endParaRPr lang="zh-TW" altLang="en-US" dirty="0"/>
+                    </a:p>
+                  </a:txBody>
+                  <a:tcPr/>
+                </a:tc>
+                <a:tc>
+                  <a:txBody>
+                    <a:bodyPr/>
+                    <a:lstStyle/>
+                    <a:p>
+                      <a:pPr algn="ctr"/>
+                      <a:r>
+                        <a:rPr lang="en-US" altLang="zh-TW" dirty="0" smtClean="0"/>
+                        <a:t>4</a:t>
+                      </a:r>
+                      <a:endParaRPr lang="zh-TW" altLang="en-US" dirty="0"/>
+                    </a:p>
+                  </a:txBody>
+                  <a:tcPr/>
+                </a:tc>
+                <a:extLst>
+                  <a:ext uri="{0D108BD9-81ED-4DB2-BD59-A6C34878D82A}">
+                    <a16:rowId xmlns:a16="http://schemas.microsoft.com/office/drawing/2014/main" val="2434006814"/>
+                  </a:ext>
+                </a:extLst>
+              </a:tr>
+              <a:tr h="370840">
+                <a:tc>
+                  <a:txBody>
+                    <a:bodyPr/>
+                    <a:lstStyle/>
+                    <a:p>
+                      <a:pPr algn="ctr"/>
+                      <a:r>
+                        <a:rPr lang="en-US" altLang="zh-TW" dirty="0" smtClean="0"/>
+                        <a:t>5</a:t>
+                      </a:r>
+                      <a:endParaRPr lang="zh-TW" altLang="en-US" dirty="0"/>
+                    </a:p>
+                  </a:txBody>
+                  <a:tcPr/>
+                </a:tc>
+                <a:tc>
+                  <a:txBody>
+                    <a:bodyPr/>
+                    <a:lstStyle/>
+                    <a:p>
+                      <a:pPr algn="ctr"/>
+                      <a:r>
+                        <a:rPr lang="en-US" altLang="zh-TW" dirty="0" smtClean="0"/>
+                        <a:t>6</a:t>
+                      </a:r>
+                      <a:endParaRPr lang="zh-TW" altLang="en-US" dirty="0"/>
+                    </a:p>
+                  </a:txBody>
+                  <a:tcPr/>
+                </a:tc>
+                <a:tc>
+                  <a:txBody>
+                    <a:bodyPr/>
+                    <a:lstStyle/>
+                    <a:p>
+                      <a:pPr algn="ctr"/>
+                      <a:r>
+                        <a:rPr lang="en-US" altLang="zh-TW" dirty="0" smtClean="0"/>
+                        <a:t>7</a:t>
+                      </a:r>
+                      <a:endParaRPr lang="zh-TW" altLang="en-US" dirty="0"/>
+                    </a:p>
+                  </a:txBody>
+                  <a:tcPr/>
+                </a:tc>
+                <a:tc>
+                  <a:txBody>
+                    <a:bodyPr/>
+                    <a:lstStyle/>
+                    <a:p>
+                      <a:pPr algn="ctr"/>
+                      <a:r>
+                        <a:rPr lang="en-US" altLang="zh-TW" dirty="0" smtClean="0"/>
+                        <a:t>8</a:t>
+                      </a:r>
+                      <a:endParaRPr lang="zh-TW" altLang="en-US" dirty="0"/>
+                    </a:p>
+                  </a:txBody>
+                  <a:tcPr/>
+                </a:tc>
+                <a:tc>
+                  <a:txBody>
+                    <a:bodyPr/>
+                    <a:lstStyle/>
+                    <a:p>
+                      <a:pPr algn="ctr"/>
+                      <a:r>
+                        <a:rPr lang="en-US" altLang="zh-TW" dirty="0" smtClean="0"/>
+                        <a:t>9</a:t>
+                      </a:r>
+                      <a:endParaRPr lang="zh-TW" altLang="en-US" dirty="0"/>
+                    </a:p>
+                  </a:txBody>
+                  <a:tcPr/>
+                </a:tc>
+                <a:extLst>
+                  <a:ext uri="{0D108BD9-81ED-4DB2-BD59-A6C34878D82A}">
+                    <a16:rowId xmlns:a16="http://schemas.microsoft.com/office/drawing/2014/main" val="3266982605"/>
+                  </a:ext>
+                </a:extLst>
+              </a:tr>
+              <a:tr h="370840">
+                <a:tc>
+                  <a:txBody>
+                    <a:bodyPr/>
+                    <a:lstStyle/>
+                    <a:p>
+                      <a:pPr algn="ctr"/>
+                      <a:r>
+                        <a:rPr lang="en-US" altLang="zh-TW" dirty="0" smtClean="0"/>
+                        <a:t>10</a:t>
+                      </a:r>
+                      <a:endParaRPr lang="zh-TW" altLang="en-US" dirty="0"/>
+                    </a:p>
+                  </a:txBody>
+                  <a:tcPr/>
+                </a:tc>
+                <a:tc>
+                  <a:txBody>
+                    <a:bodyPr/>
+                    <a:lstStyle/>
+                    <a:p>
+                      <a:pPr algn="ctr"/>
+                      <a:r>
+                        <a:rPr lang="en-US" altLang="zh-TW" dirty="0" smtClean="0"/>
+                        <a:t>11</a:t>
+                      </a:r>
+                      <a:endParaRPr lang="zh-TW" altLang="en-US" dirty="0"/>
+                    </a:p>
+                  </a:txBody>
+                  <a:tcPr/>
+                </a:tc>
+                <a:tc>
+                  <a:txBody>
+                    <a:bodyPr/>
+                    <a:lstStyle/>
+                    <a:p>
+                      <a:pPr algn="ctr"/>
+                      <a:r>
+                        <a:rPr lang="en-US" altLang="zh-TW" dirty="0" smtClean="0"/>
+                        <a:t>12</a:t>
+                      </a:r>
+                      <a:endParaRPr lang="zh-TW" altLang="en-US" dirty="0"/>
+                    </a:p>
+                  </a:txBody>
+                  <a:tcPr/>
+                </a:tc>
+                <a:tc>
+                  <a:txBody>
+                    <a:bodyPr/>
+                    <a:lstStyle/>
+                    <a:p>
+                      <a:pPr algn="ctr"/>
+                      <a:r>
+                        <a:rPr lang="en-US" altLang="zh-TW" dirty="0" smtClean="0"/>
+                        <a:t>13</a:t>
+                      </a:r>
+                      <a:endParaRPr lang="zh-TW" altLang="en-US" dirty="0"/>
+                    </a:p>
+                  </a:txBody>
+                  <a:tcPr/>
+                </a:tc>
+                <a:tc>
+                  <a:txBody>
+                    <a:bodyPr/>
+                    <a:lstStyle/>
+                    <a:p>
+                      <a:pPr algn="ctr"/>
+                      <a:r>
+                        <a:rPr lang="en-US" altLang="zh-TW" dirty="0" smtClean="0"/>
+                        <a:t>14</a:t>
+                      </a:r>
+                      <a:endParaRPr lang="zh-TW" altLang="en-US" dirty="0"/>
+                    </a:p>
+                  </a:txBody>
+                  <a:tcPr/>
+                </a:tc>
+                <a:extLst>
+                  <a:ext uri="{0D108BD9-81ED-4DB2-BD59-A6C34878D82A}">
+                    <a16:rowId xmlns:a16="http://schemas.microsoft.com/office/drawing/2014/main" val="951926461"/>
+                  </a:ext>
+                </a:extLst>
+              </a:tr>
+              <a:tr h="370840">
+                <a:tc>
+                  <a:txBody>
+                    <a:bodyPr/>
+                    <a:lstStyle/>
+                    <a:p>
+                      <a:pPr algn="ctr"/>
+                      <a:r>
+                        <a:rPr lang="en-US" altLang="zh-TW" dirty="0" smtClean="0"/>
+                        <a:t>15</a:t>
+                      </a:r>
+                      <a:endParaRPr lang="zh-TW" altLang="en-US" dirty="0"/>
+                    </a:p>
+                  </a:txBody>
+                  <a:tcPr/>
+                </a:tc>
+                <a:tc>
+                  <a:txBody>
+                    <a:bodyPr/>
+                    <a:lstStyle/>
+                    <a:p>
+                      <a:pPr algn="ctr"/>
+                      <a:r>
+                        <a:rPr lang="en-US" altLang="zh-TW" dirty="0" smtClean="0"/>
+                        <a:t>16</a:t>
+                      </a:r>
+                      <a:endParaRPr lang="zh-TW" altLang="en-US" dirty="0"/>
+                    </a:p>
+                  </a:txBody>
+                  <a:tcPr/>
+                </a:tc>
+                <a:tc>
+                  <a:txBody>
+                    <a:bodyPr/>
+                    <a:lstStyle/>
+                    <a:p>
+                      <a:pPr algn="ctr"/>
+                      <a:r>
+                        <a:rPr lang="en-US" altLang="zh-TW" dirty="0" smtClean="0"/>
+                        <a:t>17</a:t>
+                      </a:r>
+                      <a:endParaRPr lang="zh-TW" altLang="en-US" dirty="0"/>
+                    </a:p>
+                  </a:txBody>
+                  <a:tcPr/>
+                </a:tc>
+                <a:tc>
+                  <a:txBody>
+                    <a:bodyPr/>
+                    <a:lstStyle/>
+                    <a:p>
+                      <a:pPr algn="ctr"/>
+                      <a:r>
+                        <a:rPr lang="en-US" altLang="zh-TW" dirty="0" smtClean="0"/>
+                        <a:t>18</a:t>
+                      </a:r>
+                      <a:endParaRPr lang="zh-TW" altLang="en-US" dirty="0"/>
+                    </a:p>
+                  </a:txBody>
+                  <a:tcPr/>
+                </a:tc>
+                <a:tc>
+                  <a:txBody>
+                    <a:bodyPr/>
+                    <a:lstStyle/>
+                    <a:p>
+                      <a:pPr algn="ctr"/>
+                      <a:r>
+                        <a:rPr lang="en-US" altLang="zh-TW" dirty="0" smtClean="0"/>
+                        <a:t>19</a:t>
+                      </a:r>
+                      <a:endParaRPr lang="zh-TW" altLang="en-US" dirty="0"/>
+                    </a:p>
+                  </a:txBody>
+                  <a:tcPr/>
+                </a:tc>
+                <a:extLst>
+                  <a:ext uri="{0D108BD9-81ED-4DB2-BD59-A6C34878D82A}">
+                    <a16:rowId xmlns:a16="http://schemas.microsoft.com/office/drawing/2014/main" val="3155720017"/>
+                  </a:ext>
+                </a:extLst>
+              </a:tr>
+              <a:tr h="370840">
+                <a:tc>
+                  <a:txBody>
+                    <a:bodyPr/>
+                    <a:lstStyle/>
+                    <a:p>
+                      <a:pPr algn="ctr"/>
+                      <a:r>
+                        <a:rPr lang="en-US" altLang="zh-TW" dirty="0" smtClean="0"/>
+                        <a:t>20</a:t>
+                      </a:r>
+                      <a:endParaRPr lang="zh-TW" altLang="en-US" dirty="0"/>
+                    </a:p>
+                  </a:txBody>
+                  <a:tcPr/>
+                </a:tc>
+                <a:tc>
+                  <a:txBody>
+                    <a:bodyPr/>
+                    <a:lstStyle/>
+                    <a:p>
+                      <a:pPr algn="ctr"/>
+                      <a:r>
+                        <a:rPr lang="en-US" altLang="zh-TW" dirty="0" smtClean="0"/>
+                        <a:t>21</a:t>
+                      </a:r>
+                      <a:endParaRPr lang="zh-TW" altLang="en-US" dirty="0"/>
+                    </a:p>
+                  </a:txBody>
+                  <a:tcPr/>
+                </a:tc>
+                <a:tc>
+                  <a:txBody>
+                    <a:bodyPr/>
+                    <a:lstStyle/>
+                    <a:p>
+                      <a:pPr algn="ctr"/>
+                      <a:r>
+                        <a:rPr lang="en-US" altLang="zh-TW" dirty="0" smtClean="0"/>
+                        <a:t>22</a:t>
+                      </a:r>
+                      <a:endParaRPr lang="zh-TW" altLang="en-US" dirty="0"/>
+                    </a:p>
+                  </a:txBody>
+                  <a:tcPr/>
+                </a:tc>
+                <a:tc>
+                  <a:txBody>
+                    <a:bodyPr/>
+                    <a:lstStyle/>
+                    <a:p>
+                      <a:pPr algn="ctr"/>
+                      <a:r>
+                        <a:rPr lang="en-US" altLang="zh-TW" dirty="0" smtClean="0"/>
+                        <a:t>23</a:t>
+                      </a:r>
+                      <a:endParaRPr lang="zh-TW" altLang="en-US" dirty="0"/>
+                    </a:p>
+                  </a:txBody>
+                  <a:tcPr/>
+                </a:tc>
+                <a:tc>
+                  <a:txBody>
+                    <a:bodyPr/>
+                    <a:lstStyle/>
+                    <a:p>
+                      <a:pPr algn="ctr"/>
+                      <a:r>
+                        <a:rPr lang="en-US" altLang="zh-TW" dirty="0" smtClean="0"/>
+                        <a:t>34</a:t>
+                      </a:r>
+                      <a:endParaRPr lang="zh-TW" altLang="en-US" dirty="0"/>
+                    </a:p>
+                  </a:txBody>
+                  <a:tcPr/>
+                </a:tc>
+                <a:extLst>
+                  <a:ext uri="{0D108BD9-81ED-4DB2-BD59-A6C34878D82A}">
+                    <a16:rowId xmlns:a16="http://schemas.microsoft.com/office/drawing/2014/main" val="11773324"/>
+                  </a:ext>
+                </a:extLst>
+              </a:tr>
+            </a:tbl>
+          </a:graphicData>
+        </a:graphic>
+      </p:graphicFrame>
+      <p:sp>
+        <p:nvSpPr>
+          <p:cNvPr id="6" name="文字方塊 5"/>
+          <p:cNvSpPr txBox="1"/>
+          <p:nvPr/>
+        </p:nvSpPr>
+        <p:spPr>
+          <a:xfrm>
+            <a:off x="775855" y="3334327"/>
+            <a:ext cx="3343563" cy="369332"/>
+          </a:xfrm>
+          <a:prstGeom prst="rect">
+            <a:avLst/>
+          </a:prstGeom>
+          <a:noFill/>
+        </p:spPr>
+        <p:txBody>
+          <a:bodyPr wrap="square" rtlCol="0">
+            <a:spAutoFit/>
+          </a:bodyPr>
+          <a:lstStyle/>
+          <a:p>
+            <a:r>
+              <a:rPr lang="en-US" altLang="zh-TW" dirty="0" smtClean="0"/>
+              <a:t>1         2         3</a:t>
+            </a:r>
+            <a:r>
+              <a:rPr lang="en-US" altLang="zh-TW" dirty="0"/>
+              <a:t>  </a:t>
+            </a:r>
+            <a:r>
+              <a:rPr lang="en-US" altLang="zh-TW" dirty="0" smtClean="0"/>
+              <a:t>       4         5          6</a:t>
+            </a:r>
+            <a:endParaRPr lang="zh-TW" altLang="en-US" dirty="0"/>
+          </a:p>
+        </p:txBody>
+      </p:sp>
+      <p:sp>
+        <p:nvSpPr>
+          <p:cNvPr id="7" name="文字方塊 6"/>
+          <p:cNvSpPr txBox="1"/>
+          <p:nvPr/>
+        </p:nvSpPr>
+        <p:spPr>
+          <a:xfrm>
+            <a:off x="369531" y="3557483"/>
+            <a:ext cx="461665" cy="2116926"/>
+          </a:xfrm>
+          <a:prstGeom prst="rect">
+            <a:avLst/>
+          </a:prstGeom>
+          <a:noFill/>
+        </p:spPr>
+        <p:txBody>
+          <a:bodyPr vert="eaVert" wrap="none" rtlCol="0">
+            <a:spAutoFit/>
+          </a:bodyPr>
+          <a:lstStyle/>
+          <a:p>
+            <a:r>
+              <a:rPr lang="en-US" altLang="zh-TW" dirty="0" smtClean="0"/>
+              <a:t>1    2      3     4     5     6</a:t>
+            </a:r>
+            <a:endParaRPr lang="zh-TW" altLang="en-US" dirty="0"/>
+          </a:p>
+        </p:txBody>
+      </p:sp>
+      <p:grpSp>
+        <p:nvGrpSpPr>
+          <p:cNvPr id="14" name="群組 13"/>
+          <p:cNvGrpSpPr/>
+          <p:nvPr/>
+        </p:nvGrpSpPr>
+        <p:grpSpPr>
+          <a:xfrm>
+            <a:off x="4872567" y="731527"/>
+            <a:ext cx="2603500" cy="2602800"/>
+            <a:chOff x="4965700" y="423683"/>
+            <a:chExt cx="2603500" cy="2602800"/>
+          </a:xfrm>
+        </p:grpSpPr>
+        <p:sp>
+          <p:nvSpPr>
+            <p:cNvPr id="13" name="矩形 12"/>
+            <p:cNvSpPr/>
+            <p:nvPr/>
+          </p:nvSpPr>
+          <p:spPr>
+            <a:xfrm>
+              <a:off x="4965700" y="423683"/>
+              <a:ext cx="2602800" cy="2602800"/>
+            </a:xfrm>
+            <a:prstGeom prst="rect">
+              <a:avLst/>
+            </a:prstGeom>
+            <a:noFill/>
+            <a:ln>
+              <a:solidFill>
+                <a:schemeClr val="tx1"/>
+              </a:solidFill>
+            </a:ln>
+          </p:spPr>
+          <p:style>
+            <a:lnRef idx="2">
+              <a:schemeClr val="accent1">
+                <a:shade val="50000"/>
+              </a:schemeClr>
+            </a:lnRef>
+            <a:fillRef idx="1">
+              <a:schemeClr val="accent1"/>
+            </a:fillRef>
+            <a:effectRef idx="0">
+              <a:schemeClr val="accent1"/>
+            </a:effectRef>
+            <a:fontRef idx="minor">
+              <a:schemeClr val="lt1"/>
+            </a:fontRef>
+          </p:style>
+          <p:txBody>
+            <a:bodyPr rtlCol="0" anchor="ctr"/>
+            <a:lstStyle/>
+            <a:p>
+              <a:pPr algn="ctr"/>
+              <a:endParaRPr lang="zh-TW" altLang="en-US"/>
+            </a:p>
+          </p:txBody>
+        </p:sp>
+        <p:grpSp>
+          <p:nvGrpSpPr>
+            <p:cNvPr id="12" name="群組 11"/>
+            <p:cNvGrpSpPr/>
+            <p:nvPr/>
+          </p:nvGrpSpPr>
+          <p:grpSpPr>
+            <a:xfrm>
+              <a:off x="4965700" y="1358900"/>
+              <a:ext cx="2603500" cy="732369"/>
+              <a:chOff x="6493933" y="1515533"/>
+              <a:chExt cx="2603500" cy="732369"/>
+            </a:xfrm>
+          </p:grpSpPr>
+          <p:sp>
+            <p:nvSpPr>
+              <p:cNvPr id="10" name="梯形 9"/>
+              <p:cNvSpPr/>
+              <p:nvPr/>
+            </p:nvSpPr>
+            <p:spPr>
+              <a:xfrm>
+                <a:off x="6493933" y="1515533"/>
+                <a:ext cx="1883834" cy="732367"/>
+              </a:xfrm>
+              <a:prstGeom prst="trapezoid">
+                <a:avLst>
+                  <a:gd name="adj" fmla="val 0"/>
+                </a:avLst>
+              </a:prstGeom>
+              <a:ln>
+                <a:noFill/>
+              </a:ln>
+            </p:spPr>
+            <p:style>
+              <a:lnRef idx="2">
+                <a:schemeClr val="accent1">
+                  <a:shade val="50000"/>
+                </a:schemeClr>
+              </a:lnRef>
+              <a:fillRef idx="1">
+                <a:schemeClr val="accent1"/>
+              </a:fillRef>
+              <a:effectRef idx="0">
+                <a:schemeClr val="accent1"/>
+              </a:effectRef>
+              <a:fontRef idx="minor">
+                <a:schemeClr val="lt1"/>
+              </a:fontRef>
+            </p:style>
+            <p:txBody>
+              <a:bodyPr rtlCol="0" anchor="ctr"/>
+              <a:lstStyle/>
+              <a:p>
+                <a:pPr algn="ctr"/>
+                <a:endParaRPr lang="zh-TW" altLang="en-US"/>
+              </a:p>
+            </p:txBody>
+          </p:sp>
+          <p:sp>
+            <p:nvSpPr>
+              <p:cNvPr id="11" name="等腰三角形 10"/>
+              <p:cNvSpPr/>
+              <p:nvPr/>
+            </p:nvSpPr>
+            <p:spPr>
+              <a:xfrm rot="5400000">
+                <a:off x="8371416" y="1521884"/>
+                <a:ext cx="732368" cy="719667"/>
+              </a:xfrm>
+              <a:prstGeom prst="triangle">
+                <a:avLst/>
+              </a:prstGeom>
+              <a:ln>
+                <a:noFill/>
+              </a:ln>
+            </p:spPr>
+            <p:style>
+              <a:lnRef idx="2">
+                <a:schemeClr val="accent1">
+                  <a:shade val="50000"/>
+                </a:schemeClr>
+              </a:lnRef>
+              <a:fillRef idx="1">
+                <a:schemeClr val="accent1"/>
+              </a:fillRef>
+              <a:effectRef idx="0">
+                <a:schemeClr val="accent1"/>
+              </a:effectRef>
+              <a:fontRef idx="minor">
+                <a:schemeClr val="lt1"/>
+              </a:fontRef>
+            </p:style>
+            <p:txBody>
+              <a:bodyPr rtlCol="0" anchor="ctr"/>
+              <a:lstStyle/>
+              <a:p>
+                <a:pPr algn="ctr"/>
+                <a:endParaRPr lang="zh-TW" altLang="en-US"/>
+              </a:p>
+            </p:txBody>
+          </p:sp>
+        </p:grpSp>
+      </p:grpSp>
+      <p:sp>
+        <p:nvSpPr>
+          <p:cNvPr id="15" name="橢圓 14"/>
+          <p:cNvSpPr/>
+          <p:nvPr/>
+        </p:nvSpPr>
+        <p:spPr>
+          <a:xfrm>
+            <a:off x="6045200" y="1977047"/>
+            <a:ext cx="108000" cy="108000"/>
+          </a:xfrm>
+          <a:prstGeom prst="ellipse">
+            <a:avLst/>
+          </a:prstGeom>
+          <a:solidFill>
+            <a:srgbClr val="FF0000"/>
+          </a:solidFill>
+          <a:ln>
+            <a:solidFill>
+              <a:srgbClr val="FF0000"/>
+            </a:solidFill>
+          </a:ln>
+        </p:spPr>
+        <p:style>
+          <a:lnRef idx="2">
+            <a:schemeClr val="accent1">
+              <a:shade val="50000"/>
+            </a:schemeClr>
+          </a:lnRef>
+          <a:fillRef idx="1">
+            <a:schemeClr val="accent1"/>
+          </a:fillRef>
+          <a:effectRef idx="0">
+            <a:schemeClr val="accent1"/>
+          </a:effectRef>
+          <a:fontRef idx="minor">
+            <a:schemeClr val="lt1"/>
+          </a:fontRef>
+        </p:style>
+        <p:txBody>
+          <a:bodyPr rtlCol="0" anchor="ctr"/>
+          <a:lstStyle/>
+          <a:p>
+            <a:pPr algn="ctr"/>
+            <a:endParaRPr lang="zh-TW" altLang="en-US"/>
+          </a:p>
+        </p:txBody>
+      </p:sp>
+    </p:spTree>
+    <p:extLst>
+      <p:ext uri="{BB962C8B-B14F-4D97-AF65-F5344CB8AC3E}">
+        <p14:creationId xmlns:p14="http://schemas.microsoft.com/office/powerpoint/2010/main" val="2989400979"/>
+      </p:ext>
+    </p:extLst>
+  </p:cSld>
+  <p:clrMapOvr>
+    <a:masterClrMapping/>
+  </p:clrMapOvr>
+</p:sld>
+</file>
+
+<file path=ppt/slides/slide7.xml><?xml version="1.0" encoding="utf-8"?>
+<p:sld xmlns:a="http://schemas.openxmlformats.org/drawingml/2006/main" xmlns:r="http://schemas.openxmlformats.org/officeDocument/2006/relationships" xmlns:p="http://schemas.openxmlformats.org/presentationml/2006/main">
+  <p:cSld>
+    <p:spTree>
+      <p:nvGrpSpPr>
+        <p:cNvPr id="1" name=""/>
+        <p:cNvGrpSpPr/>
+        <p:nvPr/>
+      </p:nvGrpSpPr>
+      <p:grpSpPr>
+        <a:xfrm>
+          <a:off x="0" y="0"/>
+          <a:ext cx="0" cy="0"/>
+          <a:chOff x="0" y="0"/>
+          <a:chExt cx="0" cy="0"/>
+        </a:xfrm>
+      </p:grpSpPr>
+      <p:sp>
+        <p:nvSpPr>
+          <p:cNvPr id="6" name="文字方塊 5"/>
+          <p:cNvSpPr txBox="1"/>
+          <p:nvPr/>
+        </p:nvSpPr>
+        <p:spPr>
+          <a:xfrm>
+            <a:off x="4885855" y="650009"/>
+            <a:ext cx="2542683" cy="707886"/>
+          </a:xfrm>
+          <a:prstGeom prst="rect">
+            <a:avLst/>
+          </a:prstGeom>
+          <a:noFill/>
+        </p:spPr>
+        <p:txBody>
+          <a:bodyPr wrap="none" rtlCol="0">
+            <a:spAutoFit/>
+          </a:bodyPr>
+          <a:lstStyle/>
+          <a:p>
+            <a:pPr algn="ctr"/>
+            <a:r>
+              <a:rPr lang="en-US" altLang="zh-TW" sz="4000" b="1" dirty="0" smtClean="0">
+                <a:latin typeface="微軟正黑體" panose="020B0604030504040204" pitchFamily="34" charset="-120"/>
+                <a:ea typeface="微軟正黑體" panose="020B0604030504040204" pitchFamily="34" charset="-120"/>
+              </a:rPr>
+              <a:t>5</a:t>
+            </a:r>
+            <a:r>
+              <a:rPr lang="zh-TW" altLang="en-US" sz="4000" b="1" dirty="0" smtClean="0">
+                <a:latin typeface="微軟正黑體" panose="020B0604030504040204" pitchFamily="34" charset="-120"/>
+                <a:ea typeface="微軟正黑體" panose="020B0604030504040204" pitchFamily="34" charset="-120"/>
+              </a:rPr>
+              <a:t>秒反應力</a:t>
+            </a:r>
+            <a:endParaRPr lang="zh-TW" altLang="en-US" sz="4000" b="1" dirty="0">
+              <a:latin typeface="微軟正黑體" panose="020B0604030504040204" pitchFamily="34" charset="-120"/>
+              <a:ea typeface="微軟正黑體" panose="020B0604030504040204" pitchFamily="34" charset="-120"/>
+            </a:endParaRPr>
+          </a:p>
+        </p:txBody>
+      </p:sp>
+      <p:sp>
+        <p:nvSpPr>
+          <p:cNvPr id="8" name="文字方塊 7"/>
+          <p:cNvSpPr txBox="1"/>
+          <p:nvPr/>
+        </p:nvSpPr>
+        <p:spPr>
+          <a:xfrm>
+            <a:off x="6567131" y="2388420"/>
+            <a:ext cx="4418197" cy="2252924"/>
+          </a:xfrm>
+          <a:prstGeom prst="rect">
+            <a:avLst/>
+          </a:prstGeom>
+          <a:noFill/>
+        </p:spPr>
+        <p:txBody>
+          <a:bodyPr wrap="none" rtlCol="0">
+            <a:spAutoFit/>
+          </a:bodyPr>
+          <a:lstStyle/>
+          <a:p>
+            <a:pPr>
+              <a:lnSpc>
+                <a:spcPct val="130000"/>
+              </a:lnSpc>
+            </a:pPr>
+            <a:r>
+              <a:rPr lang="zh-TW" altLang="en-US" sz="3600" dirty="0" smtClean="0">
+                <a:latin typeface="微軟正黑體" panose="020B0604030504040204" pitchFamily="34" charset="-120"/>
+                <a:ea typeface="微軟正黑體" panose="020B0604030504040204" pitchFamily="34" charset="-120"/>
+              </a:rPr>
+              <a:t>遊戲人數：不限</a:t>
+            </a:r>
+            <a:endParaRPr lang="en-US" altLang="zh-TW" sz="3600" dirty="0" smtClean="0">
+              <a:latin typeface="微軟正黑體" panose="020B0604030504040204" pitchFamily="34" charset="-120"/>
+              <a:ea typeface="微軟正黑體" panose="020B0604030504040204" pitchFamily="34" charset="-120"/>
+            </a:endParaRPr>
+          </a:p>
+          <a:p>
+            <a:pPr>
+              <a:lnSpc>
+                <a:spcPct val="130000"/>
+              </a:lnSpc>
+            </a:pPr>
+            <a:r>
+              <a:rPr lang="zh-TW" altLang="en-US" sz="3600" dirty="0">
+                <a:latin typeface="微軟正黑體" panose="020B0604030504040204" pitchFamily="34" charset="-120"/>
+                <a:ea typeface="微軟正黑體" panose="020B0604030504040204" pitchFamily="34" charset="-120"/>
+              </a:rPr>
+              <a:t>遊戲</a:t>
+            </a:r>
+            <a:r>
+              <a:rPr lang="zh-TW" altLang="en-US" sz="3600" dirty="0" smtClean="0">
+                <a:latin typeface="微軟正黑體" panose="020B0604030504040204" pitchFamily="34" charset="-120"/>
+                <a:ea typeface="微軟正黑體" panose="020B0604030504040204" pitchFamily="34" charset="-120"/>
+              </a:rPr>
+              <a:t>時間：</a:t>
+            </a:r>
+            <a:r>
+              <a:rPr lang="en-US" altLang="zh-TW" sz="3600" dirty="0" smtClean="0">
+                <a:latin typeface="微軟正黑體" panose="020B0604030504040204" pitchFamily="34" charset="-120"/>
+                <a:ea typeface="微軟正黑體" panose="020B0604030504040204" pitchFamily="34" charset="-120"/>
+              </a:rPr>
+              <a:t>5-10</a:t>
+            </a:r>
+            <a:r>
+              <a:rPr lang="zh-TW" altLang="en-US" sz="3600" dirty="0" smtClean="0">
+                <a:latin typeface="微軟正黑體" panose="020B0604030504040204" pitchFamily="34" charset="-120"/>
+                <a:ea typeface="微軟正黑體" panose="020B0604030504040204" pitchFamily="34" charset="-120"/>
+              </a:rPr>
+              <a:t>分鐘</a:t>
+            </a:r>
+            <a:endParaRPr lang="en-US" altLang="zh-TW" sz="3600" dirty="0" smtClean="0">
+              <a:latin typeface="微軟正黑體" panose="020B0604030504040204" pitchFamily="34" charset="-120"/>
+              <a:ea typeface="微軟正黑體" panose="020B0604030504040204" pitchFamily="34" charset="-120"/>
+            </a:endParaRPr>
+          </a:p>
+          <a:p>
+            <a:pPr>
+              <a:lnSpc>
+                <a:spcPct val="130000"/>
+              </a:lnSpc>
+            </a:pPr>
+            <a:r>
+              <a:rPr lang="zh-TW" altLang="en-US" sz="3600" dirty="0" smtClean="0">
+                <a:latin typeface="微軟正黑體" panose="020B0604030504040204" pitchFamily="34" charset="-120"/>
+                <a:ea typeface="微軟正黑體" panose="020B0604030504040204" pitchFamily="34" charset="-120"/>
+              </a:rPr>
+              <a:t>難易度：★</a:t>
+            </a:r>
+            <a:r>
+              <a:rPr lang="zh-TW" altLang="en-US" sz="3600" dirty="0">
+                <a:latin typeface="微軟正黑體" panose="020B0604030504040204" pitchFamily="34" charset="-120"/>
+                <a:ea typeface="微軟正黑體" panose="020B0604030504040204" pitchFamily="34" charset="-120"/>
+              </a:rPr>
+              <a:t> </a:t>
+            </a:r>
+            <a:endParaRPr lang="en-US" altLang="zh-TW" sz="3600" dirty="0" smtClean="0">
+              <a:latin typeface="微軟正黑體" panose="020B0604030504040204" pitchFamily="34" charset="-120"/>
+              <a:ea typeface="微軟正黑體" panose="020B0604030504040204" pitchFamily="34" charset="-120"/>
+            </a:endParaRPr>
+          </a:p>
+        </p:txBody>
+      </p:sp>
+      <p:pic>
+        <p:nvPicPr>
+          <p:cNvPr id="3" name="圖片 2"/>
+          <p:cNvPicPr>
+            <a:picLocks noChangeAspect="1"/>
+          </p:cNvPicPr>
+          <p:nvPr/>
+        </p:nvPicPr>
+        <p:blipFill>
+          <a:blip r:embed="rId2"/>
+          <a:stretch>
+            <a:fillRect/>
+          </a:stretch>
+        </p:blipFill>
+        <p:spPr>
+          <a:xfrm>
+            <a:off x="683490" y="1989664"/>
+            <a:ext cx="5404247" cy="3050436"/>
+          </a:xfrm>
+          <a:prstGeom prst="rect">
+            <a:avLst/>
+          </a:prstGeom>
+        </p:spPr>
+      </p:pic>
+    </p:spTree>
+    <p:extLst>
+      <p:ext uri="{BB962C8B-B14F-4D97-AF65-F5344CB8AC3E}">
+        <p14:creationId xmlns:p14="http://schemas.microsoft.com/office/powerpoint/2010/main" val="3415740417"/>
+      </p:ext>
+    </p:extLst>
+  </p:cSld>
+  <p:clrMapOvr>
+    <a:masterClrMapping/>
+  </p:clrMapOvr>
+</p:sld>
+</file>
+
+<file path=ppt/slides/slide8.xml><?xml version="1.0" encoding="utf-8"?>
+<p:sld xmlns:a="http://schemas.openxmlformats.org/drawingml/2006/main" xmlns:r="http://schemas.openxmlformats.org/officeDocument/2006/relationships" xmlns:p="http://schemas.openxmlformats.org/presentationml/2006/main">
+  <p:cSld>
+    <p:spTree>
+      <p:nvGrpSpPr>
+        <p:cNvPr id="1" name=""/>
+        <p:cNvGrpSpPr/>
+        <p:nvPr/>
+      </p:nvGrpSpPr>
+      <p:grpSpPr>
+        <a:xfrm>
+          <a:off x="0" y="0"/>
+          <a:ext cx="0" cy="0"/>
+          <a:chOff x="0" y="0"/>
+          <a:chExt cx="0" cy="0"/>
+        </a:xfrm>
+      </p:grpSpPr>
+      <p:sp>
+        <p:nvSpPr>
+          <p:cNvPr id="6" name="文字方塊 5"/>
+          <p:cNvSpPr txBox="1"/>
+          <p:nvPr/>
+        </p:nvSpPr>
+        <p:spPr>
+          <a:xfrm>
+            <a:off x="3859929" y="650009"/>
+            <a:ext cx="4594526" cy="1323439"/>
+          </a:xfrm>
+          <a:prstGeom prst="rect">
+            <a:avLst/>
+          </a:prstGeom>
+          <a:noFill/>
+        </p:spPr>
+        <p:txBody>
+          <a:bodyPr wrap="none" rtlCol="0">
+            <a:spAutoFit/>
+          </a:bodyPr>
+          <a:lstStyle/>
+          <a:p>
+            <a:pPr algn="ctr"/>
+            <a:r>
+              <a:rPr lang="zh-TW" altLang="en-US" sz="4000" dirty="0" smtClean="0">
+                <a:latin typeface="微軟正黑體" panose="020B0604030504040204" pitchFamily="34" charset="-120"/>
+                <a:ea typeface="微軟正黑體" panose="020B0604030504040204" pitchFamily="34" charset="-120"/>
+              </a:rPr>
+              <a:t>遊戲勝利條件</a:t>
+            </a:r>
+            <a:endParaRPr lang="en-US" altLang="zh-TW" sz="4000" dirty="0" smtClean="0">
+              <a:latin typeface="微軟正黑體" panose="020B0604030504040204" pitchFamily="34" charset="-120"/>
+              <a:ea typeface="微軟正黑體" panose="020B0604030504040204" pitchFamily="34" charset="-120"/>
+            </a:endParaRPr>
+          </a:p>
+          <a:p>
+            <a:pPr algn="ctr"/>
+            <a:r>
+              <a:rPr lang="en-US" altLang="zh-TW" sz="4000" b="1" dirty="0" smtClean="0">
+                <a:latin typeface="微軟正黑體" panose="020B0604030504040204" pitchFamily="34" charset="-120"/>
+                <a:ea typeface="微軟正黑體" panose="020B0604030504040204" pitchFamily="34" charset="-120"/>
+              </a:rPr>
+              <a:t>5</a:t>
+            </a:r>
+            <a:r>
+              <a:rPr lang="zh-TW" altLang="en-US" sz="4000" b="1" dirty="0" smtClean="0">
+                <a:latin typeface="微軟正黑體" panose="020B0604030504040204" pitchFamily="34" charset="-120"/>
+                <a:ea typeface="微軟正黑體" panose="020B0604030504040204" pitchFamily="34" charset="-120"/>
+              </a:rPr>
+              <a:t>秒內回答指定問題</a:t>
+            </a:r>
+            <a:endParaRPr lang="zh-TW" altLang="en-US" sz="4000" b="1" dirty="0">
+              <a:latin typeface="微軟正黑體" panose="020B0604030504040204" pitchFamily="34" charset="-120"/>
+              <a:ea typeface="微軟正黑體" panose="020B0604030504040204" pitchFamily="34" charset="-120"/>
+            </a:endParaRPr>
+          </a:p>
+        </p:txBody>
+      </p:sp>
+      <p:sp>
+        <p:nvSpPr>
+          <p:cNvPr id="2" name="矩形 1"/>
+          <p:cNvSpPr/>
+          <p:nvPr/>
+        </p:nvSpPr>
+        <p:spPr>
+          <a:xfrm>
+            <a:off x="18473" y="6262255"/>
+            <a:ext cx="12192000" cy="498763"/>
+          </a:xfrm>
+          <a:prstGeom prst="rect">
+            <a:avLst/>
+          </a:prstGeom>
+          <a:solidFill>
+            <a:schemeClr val="bg1"/>
+          </a:solidFill>
+          <a:ln>
+            <a:noFill/>
+          </a:ln>
+        </p:spPr>
+        <p:style>
+          <a:lnRef idx="2">
+            <a:schemeClr val="accent1">
+              <a:shade val="50000"/>
+            </a:schemeClr>
+          </a:lnRef>
+          <a:fillRef idx="1">
+            <a:schemeClr val="accent1"/>
+          </a:fillRef>
+          <a:effectRef idx="0">
+            <a:schemeClr val="accent1"/>
+          </a:effectRef>
+          <a:fontRef idx="minor">
+            <a:schemeClr val="lt1"/>
+          </a:fontRef>
+        </p:style>
+        <p:txBody>
+          <a:bodyPr rtlCol="0" anchor="ctr"/>
+          <a:lstStyle/>
+          <a:p>
+            <a:pPr algn="ctr"/>
+            <a:endParaRPr lang="zh-TW" altLang="en-US"/>
+          </a:p>
+        </p:txBody>
+      </p:sp>
+      <p:sp>
+        <p:nvSpPr>
+          <p:cNvPr id="8" name="文字方塊 7"/>
+          <p:cNvSpPr txBox="1"/>
+          <p:nvPr/>
+        </p:nvSpPr>
+        <p:spPr>
+          <a:xfrm>
+            <a:off x="6612444" y="3116518"/>
+            <a:ext cx="3684022" cy="1458669"/>
+          </a:xfrm>
+          <a:prstGeom prst="rect">
+            <a:avLst/>
+          </a:prstGeom>
+          <a:noFill/>
+        </p:spPr>
+        <p:txBody>
+          <a:bodyPr wrap="none" rtlCol="0">
+            <a:spAutoFit/>
+          </a:bodyPr>
+          <a:lstStyle/>
+          <a:p>
+            <a:pPr>
+              <a:lnSpc>
+                <a:spcPct val="130000"/>
+              </a:lnSpc>
+            </a:pPr>
+            <a:r>
+              <a:rPr lang="zh-TW" altLang="en-US" sz="3600" dirty="0" smtClean="0">
+                <a:latin typeface="微軟正黑體" panose="020B0604030504040204" pitchFamily="34" charset="-120"/>
+                <a:ea typeface="微軟正黑體" panose="020B0604030504040204" pitchFamily="34" charset="-120"/>
+              </a:rPr>
+              <a:t>題目皆為列出</a:t>
+            </a:r>
+            <a:r>
+              <a:rPr lang="en-US" altLang="zh-TW" sz="3600" dirty="0" smtClean="0">
+                <a:latin typeface="微軟正黑體" panose="020B0604030504040204" pitchFamily="34" charset="-120"/>
+                <a:ea typeface="微軟正黑體" panose="020B0604030504040204" pitchFamily="34" charset="-120"/>
+              </a:rPr>
+              <a:t>3</a:t>
+            </a:r>
+            <a:r>
+              <a:rPr lang="zh-TW" altLang="en-US" sz="3600" dirty="0" smtClean="0">
+                <a:latin typeface="微軟正黑體" panose="020B0604030504040204" pitchFamily="34" charset="-120"/>
+                <a:ea typeface="微軟正黑體" panose="020B0604030504040204" pitchFamily="34" charset="-120"/>
+              </a:rPr>
+              <a:t>個</a:t>
+            </a:r>
+            <a:endParaRPr lang="en-US" altLang="zh-TW" sz="3600" dirty="0" smtClean="0">
+              <a:latin typeface="微軟正黑體" panose="020B0604030504040204" pitchFamily="34" charset="-120"/>
+              <a:ea typeface="微軟正黑體" panose="020B0604030504040204" pitchFamily="34" charset="-120"/>
+            </a:endParaRPr>
+          </a:p>
+          <a:p>
+            <a:pPr>
+              <a:lnSpc>
+                <a:spcPct val="130000"/>
+              </a:lnSpc>
+            </a:pPr>
+            <a:r>
+              <a:rPr lang="zh-TW" altLang="en-US" sz="3600" dirty="0" smtClean="0">
+                <a:latin typeface="微軟正黑體" panose="020B0604030504040204" pitchFamily="34" charset="-120"/>
+                <a:ea typeface="微軟正黑體" panose="020B0604030504040204" pitchFamily="34" charset="-120"/>
+              </a:rPr>
+              <a:t>相同類型項目</a:t>
+            </a:r>
+            <a:endParaRPr lang="en-US" altLang="zh-TW" sz="3600" dirty="0" smtClean="0">
+              <a:latin typeface="微軟正黑體" panose="020B0604030504040204" pitchFamily="34" charset="-120"/>
+              <a:ea typeface="微軟正黑體" panose="020B0604030504040204" pitchFamily="34" charset="-120"/>
+            </a:endParaRPr>
+          </a:p>
+        </p:txBody>
+      </p:sp>
+      <p:pic>
+        <p:nvPicPr>
+          <p:cNvPr id="9" name="圖片 8"/>
+          <p:cNvPicPr>
+            <a:picLocks noChangeAspect="1"/>
+          </p:cNvPicPr>
+          <p:nvPr/>
+        </p:nvPicPr>
+        <p:blipFill>
+          <a:blip r:embed="rId2"/>
+          <a:stretch>
+            <a:fillRect/>
+          </a:stretch>
+        </p:blipFill>
+        <p:spPr>
+          <a:xfrm>
+            <a:off x="683490" y="2592633"/>
+            <a:ext cx="5404247" cy="3050436"/>
+          </a:xfrm>
+          <a:prstGeom prst="rect">
+            <a:avLst/>
+          </a:prstGeom>
+        </p:spPr>
+      </p:pic>
+    </p:spTree>
+    <p:extLst>
+      <p:ext uri="{BB962C8B-B14F-4D97-AF65-F5344CB8AC3E}">
+        <p14:creationId xmlns:p14="http://schemas.microsoft.com/office/powerpoint/2010/main" val="82391255"/>
+      </p:ext>
+    </p:extLst>
+  </p:cSld>
+  <p:clrMapOvr>
+    <a:masterClrMapping/>
+  </p:clrMapOvr>
+</p:sld>
+</file>
+
+<file path=ppt/slides/slide9.xml><?xml version="1.0" encoding="utf-8"?>
+<p:sld xmlns:a="http://schemas.openxmlformats.org/drawingml/2006/main" xmlns:r="http://schemas.openxmlformats.org/officeDocument/2006/relationships" xmlns:p="http://schemas.openxmlformats.org/presentationml/2006/main">
+  <p:cSld>
+    <p:spTree>
+      <p:nvGrpSpPr>
+        <p:cNvPr id="1" name=""/>
+        <p:cNvGrpSpPr/>
+        <p:nvPr/>
+      </p:nvGrpSpPr>
+      <p:grpSpPr>
+        <a:xfrm>
+          <a:off x="0" y="0"/>
+          <a:ext cx="0" cy="0"/>
+          <a:chOff x="0" y="0"/>
+          <a:chExt cx="0" cy="0"/>
+        </a:xfrm>
+      </p:grpSpPr>
+      <p:sp>
+        <p:nvSpPr>
+          <p:cNvPr id="6" name="文字方塊 5"/>
+          <p:cNvSpPr txBox="1"/>
+          <p:nvPr/>
+        </p:nvSpPr>
+        <p:spPr>
+          <a:xfrm>
+            <a:off x="5295418" y="650009"/>
+            <a:ext cx="1723549" cy="707886"/>
+          </a:xfrm>
+          <a:prstGeom prst="rect">
+            <a:avLst/>
+          </a:prstGeom>
+          <a:noFill/>
+        </p:spPr>
+        <p:txBody>
+          <a:bodyPr wrap="none" rtlCol="0">
+            <a:spAutoFit/>
+          </a:bodyPr>
+          <a:lstStyle/>
+          <a:p>
+            <a:pPr algn="ctr"/>
+            <a:r>
+              <a:rPr lang="zh-TW" altLang="en-US" sz="4000" b="1" dirty="0">
+                <a:latin typeface="微軟正黑體" panose="020B0604030504040204" pitchFamily="34" charset="-120"/>
+                <a:ea typeface="微軟正黑體" panose="020B0604030504040204" pitchFamily="34" charset="-120"/>
+              </a:rPr>
+              <a:t>旋轉棋</a:t>
+            </a:r>
+          </a:p>
+        </p:txBody>
+      </p:sp>
+      <p:pic>
+        <p:nvPicPr>
+          <p:cNvPr id="2" name="圖片 1"/>
+          <p:cNvPicPr>
+            <a:picLocks noChangeAspect="1"/>
+          </p:cNvPicPr>
+          <p:nvPr/>
+        </p:nvPicPr>
+        <p:blipFill>
+          <a:blip r:embed="rId2"/>
+          <a:stretch>
+            <a:fillRect/>
+          </a:stretch>
+        </p:blipFill>
+        <p:spPr>
+          <a:xfrm>
+            <a:off x="1445340" y="1685660"/>
+            <a:ext cx="3683164" cy="3658445"/>
+          </a:xfrm>
+          <a:prstGeom prst="rect">
+            <a:avLst/>
+          </a:prstGeom>
+        </p:spPr>
+      </p:pic>
+      <p:sp>
+        <p:nvSpPr>
+          <p:cNvPr id="8" name="文字方塊 7"/>
+          <p:cNvSpPr txBox="1"/>
+          <p:nvPr/>
+        </p:nvSpPr>
+        <p:spPr>
+          <a:xfrm>
+            <a:off x="5643495" y="2388420"/>
+            <a:ext cx="4418197" cy="2252924"/>
+          </a:xfrm>
+          <a:prstGeom prst="rect">
+            <a:avLst/>
+          </a:prstGeom>
+          <a:noFill/>
+        </p:spPr>
+        <p:txBody>
+          <a:bodyPr wrap="none" rtlCol="0">
+            <a:spAutoFit/>
+          </a:bodyPr>
+          <a:lstStyle/>
+          <a:p>
+            <a:pPr>
+              <a:lnSpc>
+                <a:spcPct val="130000"/>
+              </a:lnSpc>
+            </a:pPr>
+            <a:r>
+              <a:rPr lang="zh-TW" altLang="en-US" sz="3600" dirty="0" smtClean="0">
+                <a:latin typeface="微軟正黑體" panose="020B0604030504040204" pitchFamily="34" charset="-120"/>
+                <a:ea typeface="微軟正黑體" panose="020B0604030504040204" pitchFamily="34" charset="-120"/>
+              </a:rPr>
+              <a:t>遊戲人數：</a:t>
+            </a:r>
+            <a:r>
+              <a:rPr lang="en-US" altLang="zh-TW" sz="3600" dirty="0" smtClean="0">
+                <a:latin typeface="微軟正黑體" panose="020B0604030504040204" pitchFamily="34" charset="-120"/>
+                <a:ea typeface="微軟正黑體" panose="020B0604030504040204" pitchFamily="34" charset="-120"/>
+              </a:rPr>
+              <a:t>2</a:t>
+            </a:r>
+            <a:r>
+              <a:rPr lang="zh-TW" altLang="en-US" sz="3600" dirty="0" smtClean="0">
+                <a:latin typeface="微軟正黑體" panose="020B0604030504040204" pitchFamily="34" charset="-120"/>
+                <a:ea typeface="微軟正黑體" panose="020B0604030504040204" pitchFamily="34" charset="-120"/>
+              </a:rPr>
+              <a:t>人</a:t>
+            </a:r>
+            <a:endParaRPr lang="en-US" altLang="zh-TW" sz="3600" dirty="0" smtClean="0">
+              <a:latin typeface="微軟正黑體" panose="020B0604030504040204" pitchFamily="34" charset="-120"/>
+              <a:ea typeface="微軟正黑體" panose="020B0604030504040204" pitchFamily="34" charset="-120"/>
+            </a:endParaRPr>
+          </a:p>
+          <a:p>
+            <a:pPr>
+              <a:lnSpc>
+                <a:spcPct val="130000"/>
+              </a:lnSpc>
+            </a:pPr>
+            <a:r>
+              <a:rPr lang="zh-TW" altLang="en-US" sz="3600" dirty="0">
+                <a:latin typeface="微軟正黑體" panose="020B0604030504040204" pitchFamily="34" charset="-120"/>
+                <a:ea typeface="微軟正黑體" panose="020B0604030504040204" pitchFamily="34" charset="-120"/>
+              </a:rPr>
+              <a:t>遊戲</a:t>
+            </a:r>
+            <a:r>
+              <a:rPr lang="zh-TW" altLang="en-US" sz="3600" dirty="0" smtClean="0">
+                <a:latin typeface="微軟正黑體" panose="020B0604030504040204" pitchFamily="34" charset="-120"/>
+                <a:ea typeface="微軟正黑體" panose="020B0604030504040204" pitchFamily="34" charset="-120"/>
+              </a:rPr>
+              <a:t>時間：</a:t>
+            </a:r>
+            <a:r>
+              <a:rPr lang="en-US" altLang="zh-TW" sz="3600" dirty="0" smtClean="0">
+                <a:latin typeface="微軟正黑體" panose="020B0604030504040204" pitchFamily="34" charset="-120"/>
+                <a:ea typeface="微軟正黑體" panose="020B0604030504040204" pitchFamily="34" charset="-120"/>
+              </a:rPr>
+              <a:t>5-10</a:t>
+            </a:r>
+            <a:r>
+              <a:rPr lang="zh-TW" altLang="en-US" sz="3600" dirty="0" smtClean="0">
+                <a:latin typeface="微軟正黑體" panose="020B0604030504040204" pitchFamily="34" charset="-120"/>
+                <a:ea typeface="微軟正黑體" panose="020B0604030504040204" pitchFamily="34" charset="-120"/>
+              </a:rPr>
+              <a:t>分鐘</a:t>
+            </a:r>
+            <a:endParaRPr lang="en-US" altLang="zh-TW" sz="3600" dirty="0" smtClean="0">
+              <a:latin typeface="微軟正黑體" panose="020B0604030504040204" pitchFamily="34" charset="-120"/>
+              <a:ea typeface="微軟正黑體" panose="020B0604030504040204" pitchFamily="34" charset="-120"/>
+            </a:endParaRPr>
+          </a:p>
+          <a:p>
+            <a:pPr>
+              <a:lnSpc>
+                <a:spcPct val="130000"/>
+              </a:lnSpc>
+            </a:pPr>
+            <a:r>
+              <a:rPr lang="zh-TW" altLang="en-US" sz="3600" dirty="0" smtClean="0">
+                <a:latin typeface="微軟正黑體" panose="020B0604030504040204" pitchFamily="34" charset="-120"/>
+                <a:ea typeface="微軟正黑體" panose="020B0604030504040204" pitchFamily="34" charset="-120"/>
+              </a:rPr>
+              <a:t>難易度：★</a:t>
+            </a:r>
+            <a:r>
+              <a:rPr lang="zh-TW" altLang="en-US" sz="3600" dirty="0">
+                <a:latin typeface="微軟正黑體" panose="020B0604030504040204" pitchFamily="34" charset="-120"/>
+                <a:ea typeface="微軟正黑體" panose="020B0604030504040204" pitchFamily="34" charset="-120"/>
+              </a:rPr>
+              <a:t> ★</a:t>
+            </a:r>
+            <a:endParaRPr lang="en-US" altLang="zh-TW" sz="3600" dirty="0" smtClean="0">
+              <a:latin typeface="微軟正黑體" panose="020B0604030504040204" pitchFamily="34" charset="-120"/>
+              <a:ea typeface="微軟正黑體" panose="020B0604030504040204" pitchFamily="34" charset="-120"/>
+            </a:endParaRPr>
+          </a:p>
+        </p:txBody>
+      </p:sp>
+    </p:spTree>
+    <p:extLst>
+      <p:ext uri="{BB962C8B-B14F-4D97-AF65-F5344CB8AC3E}">
+        <p14:creationId xmlns:p14="http://schemas.microsoft.com/office/powerpoint/2010/main" val="1713599051"/>
+      </p:ext>
+    </p:extLst>
+  </p:cSld>
+  <p:clrMapOvr>
+    <a:masterClrMapping/>
+  </p:clrMapOvr>
+</p:sld>
+</file>
+
 <file path=ppt/theme/theme1.xml><?xml version="1.0" encoding="utf-8"?>
 <a:theme xmlns:a="http://schemas.openxmlformats.org/drawingml/2006/main" name="Office 佈景主題">
   <a:themeElements>

</xml_diff>

<commit_message>
add StorageConnectionHub and clean HeartConnectGame
</commit_message>
<xml_diff>
--- a/tutorial.pptx
+++ b/tutorial.pptx
@@ -5,21 +5,28 @@
     <p:sldMasterId id="2147483648" r:id="rId1"/>
   </p:sldMasterIdLst>
   <p:sldIdLst>
-    <p:sldId id="268" r:id="rId2"/>
-    <p:sldId id="269" r:id="rId3"/>
-    <p:sldId id="271" r:id="rId4"/>
-    <p:sldId id="272" r:id="rId5"/>
-    <p:sldId id="273" r:id="rId6"/>
-    <p:sldId id="270" r:id="rId7"/>
-    <p:sldId id="258" r:id="rId8"/>
-    <p:sldId id="267" r:id="rId9"/>
-    <p:sldId id="265" r:id="rId10"/>
-    <p:sldId id="264" r:id="rId11"/>
-    <p:sldId id="260" r:id="rId12"/>
-    <p:sldId id="261" r:id="rId13"/>
-    <p:sldId id="262" r:id="rId14"/>
-    <p:sldId id="263" r:id="rId15"/>
-    <p:sldId id="266" r:id="rId16"/>
+    <p:sldId id="274" r:id="rId2"/>
+    <p:sldId id="276" r:id="rId3"/>
+    <p:sldId id="275" r:id="rId4"/>
+    <p:sldId id="277" r:id="rId5"/>
+    <p:sldId id="278" r:id="rId6"/>
+    <p:sldId id="279" r:id="rId7"/>
+    <p:sldId id="280" r:id="rId8"/>
+    <p:sldId id="268" r:id="rId9"/>
+    <p:sldId id="269" r:id="rId10"/>
+    <p:sldId id="271" r:id="rId11"/>
+    <p:sldId id="272" r:id="rId12"/>
+    <p:sldId id="273" r:id="rId13"/>
+    <p:sldId id="270" r:id="rId14"/>
+    <p:sldId id="258" r:id="rId15"/>
+    <p:sldId id="267" r:id="rId16"/>
+    <p:sldId id="265" r:id="rId17"/>
+    <p:sldId id="264" r:id="rId18"/>
+    <p:sldId id="260" r:id="rId19"/>
+    <p:sldId id="261" r:id="rId20"/>
+    <p:sldId id="262" r:id="rId21"/>
+    <p:sldId id="263" r:id="rId22"/>
+    <p:sldId id="266" r:id="rId23"/>
   </p:sldIdLst>
   <p:sldSz cx="12192000" cy="6858000"/>
   <p:notesSz cx="6858000" cy="9144000"/>
@@ -123,6 +130,17 @@
       <p14:sectionLst xmlns:p14="http://schemas.microsoft.com/office/powerpoint/2010/main">
         <p14:section name="預設章節" id="{F7342470-C2D2-4549-B5FF-759974171638}">
           <p14:sldIdLst>
+            <p14:sldId id="274"/>
+            <p14:sldId id="276"/>
+            <p14:sldId id="275"/>
+            <p14:sldId id="277"/>
+            <p14:sldId id="278"/>
+            <p14:sldId id="279"/>
+            <p14:sldId id="280"/>
+          </p14:sldIdLst>
+        </p14:section>
+        <p14:section name="海戰棋" id="{B7DA85AF-C423-4923-837E-089534B74297}">
+          <p14:sldIdLst>
             <p14:sldId id="268"/>
             <p14:sldId id="269"/>
             <p14:sldId id="271"/>
@@ -288,7 +306,7 @@
           <a:p>
             <a:fld id="{60F4A83D-2D3B-48AC-A900-77C718F04BD5}" type="datetimeFigureOut">
               <a:rPr lang="zh-TW" altLang="en-US" smtClean="0"/>
-              <a:t>2024/6/25</a:t>
+              <a:t>2024/6/29</a:t>
             </a:fld>
             <a:endParaRPr lang="zh-TW" altLang="en-US"/>
           </a:p>
@@ -458,7 +476,7 @@
           <a:p>
             <a:fld id="{60F4A83D-2D3B-48AC-A900-77C718F04BD5}" type="datetimeFigureOut">
               <a:rPr lang="zh-TW" altLang="en-US" smtClean="0"/>
-              <a:t>2024/6/25</a:t>
+              <a:t>2024/6/29</a:t>
             </a:fld>
             <a:endParaRPr lang="zh-TW" altLang="en-US"/>
           </a:p>
@@ -638,7 +656,7 @@
           <a:p>
             <a:fld id="{60F4A83D-2D3B-48AC-A900-77C718F04BD5}" type="datetimeFigureOut">
               <a:rPr lang="zh-TW" altLang="en-US" smtClean="0"/>
-              <a:t>2024/6/25</a:t>
+              <a:t>2024/6/29</a:t>
             </a:fld>
             <a:endParaRPr lang="zh-TW" altLang="en-US"/>
           </a:p>
@@ -808,7 +826,7 @@
           <a:p>
             <a:fld id="{60F4A83D-2D3B-48AC-A900-77C718F04BD5}" type="datetimeFigureOut">
               <a:rPr lang="zh-TW" altLang="en-US" smtClean="0"/>
-              <a:t>2024/6/25</a:t>
+              <a:t>2024/6/29</a:t>
             </a:fld>
             <a:endParaRPr lang="zh-TW" altLang="en-US"/>
           </a:p>
@@ -1054,7 +1072,7 @@
           <a:p>
             <a:fld id="{60F4A83D-2D3B-48AC-A900-77C718F04BD5}" type="datetimeFigureOut">
               <a:rPr lang="zh-TW" altLang="en-US" smtClean="0"/>
-              <a:t>2024/6/25</a:t>
+              <a:t>2024/6/29</a:t>
             </a:fld>
             <a:endParaRPr lang="zh-TW" altLang="en-US"/>
           </a:p>
@@ -1286,7 +1304,7 @@
           <a:p>
             <a:fld id="{60F4A83D-2D3B-48AC-A900-77C718F04BD5}" type="datetimeFigureOut">
               <a:rPr lang="zh-TW" altLang="en-US" smtClean="0"/>
-              <a:t>2024/6/25</a:t>
+              <a:t>2024/6/29</a:t>
             </a:fld>
             <a:endParaRPr lang="zh-TW" altLang="en-US"/>
           </a:p>
@@ -1653,7 +1671,7 @@
           <a:p>
             <a:fld id="{60F4A83D-2D3B-48AC-A900-77C718F04BD5}" type="datetimeFigureOut">
               <a:rPr lang="zh-TW" altLang="en-US" smtClean="0"/>
-              <a:t>2024/6/25</a:t>
+              <a:t>2024/6/29</a:t>
             </a:fld>
             <a:endParaRPr lang="zh-TW" altLang="en-US"/>
           </a:p>
@@ -1771,7 +1789,7 @@
           <a:p>
             <a:fld id="{60F4A83D-2D3B-48AC-A900-77C718F04BD5}" type="datetimeFigureOut">
               <a:rPr lang="zh-TW" altLang="en-US" smtClean="0"/>
-              <a:t>2024/6/25</a:t>
+              <a:t>2024/6/29</a:t>
             </a:fld>
             <a:endParaRPr lang="zh-TW" altLang="en-US"/>
           </a:p>
@@ -1866,7 +1884,7 @@
           <a:p>
             <a:fld id="{60F4A83D-2D3B-48AC-A900-77C718F04BD5}" type="datetimeFigureOut">
               <a:rPr lang="zh-TW" altLang="en-US" smtClean="0"/>
-              <a:t>2024/6/25</a:t>
+              <a:t>2024/6/29</a:t>
             </a:fld>
             <a:endParaRPr lang="zh-TW" altLang="en-US"/>
           </a:p>
@@ -2143,7 +2161,7 @@
           <a:p>
             <a:fld id="{60F4A83D-2D3B-48AC-A900-77C718F04BD5}" type="datetimeFigureOut">
               <a:rPr lang="zh-TW" altLang="en-US" smtClean="0"/>
-              <a:t>2024/6/25</a:t>
+              <a:t>2024/6/29</a:t>
             </a:fld>
             <a:endParaRPr lang="zh-TW" altLang="en-US"/>
           </a:p>
@@ -2396,7 +2414,7 @@
           <a:p>
             <a:fld id="{60F4A83D-2D3B-48AC-A900-77C718F04BD5}" type="datetimeFigureOut">
               <a:rPr lang="zh-TW" altLang="en-US" smtClean="0"/>
-              <a:t>2024/6/25</a:t>
+              <a:t>2024/6/29</a:t>
             </a:fld>
             <a:endParaRPr lang="zh-TW" altLang="en-US"/>
           </a:p>
@@ -2609,7 +2627,7 @@
           <a:p>
             <a:fld id="{60F4A83D-2D3B-48AC-A900-77C718F04BD5}" type="datetimeFigureOut">
               <a:rPr lang="zh-TW" altLang="en-US" smtClean="0"/>
-              <a:t>2024/6/25</a:t>
+              <a:t>2024/6/29</a:t>
             </a:fld>
             <a:endParaRPr lang="zh-TW" altLang="en-US"/>
           </a:p>
@@ -3022,8 +3040,8 @@
         </p:nvSpPr>
         <p:spPr>
           <a:xfrm>
-            <a:off x="5295423" y="650009"/>
-            <a:ext cx="1723549" cy="707886"/>
+            <a:off x="5038945" y="650009"/>
+            <a:ext cx="2236510" cy="707886"/>
           </a:xfrm>
           <a:prstGeom prst="rect">
             <a:avLst/>
@@ -3042,7 +3060,7 @@
                 <a:latin typeface="微軟正黑體" panose="020B0604030504040204" pitchFamily="34" charset="-120"/>
                 <a:ea typeface="微軟正黑體" panose="020B0604030504040204" pitchFamily="34" charset="-120"/>
               </a:rPr>
-              <a:t>海戰棋</a:t>
+              <a:t>心電感應</a:t>
             </a:r>
             <a:endParaRPr lang="zh-TW" altLang="en-US" sz="4000" b="1" dirty="0">
               <a:latin typeface="微軟正黑體" panose="020B0604030504040204" pitchFamily="34" charset="-120"/>
@@ -3161,7 +3179,14 @@
                 <a:latin typeface="微軟正黑體" panose="020B0604030504040204" pitchFamily="34" charset="-120"/>
                 <a:ea typeface="微軟正黑體" panose="020B0604030504040204" pitchFamily="34" charset="-120"/>
               </a:rPr>
-              <a:t>★ ★ </a:t>
+              <a:t>★ </a:t>
+            </a:r>
+            <a:r>
+              <a:rPr lang="zh-TW" altLang="en-US" sz="3600" dirty="0" smtClean="0">
+                <a:latin typeface="微軟正黑體" panose="020B0604030504040204" pitchFamily="34" charset="-120"/>
+                <a:ea typeface="微軟正黑體" panose="020B0604030504040204" pitchFamily="34" charset="-120"/>
+              </a:rPr>
+              <a:t>★</a:t>
             </a:r>
             <a:endParaRPr lang="en-US" altLang="zh-TW" sz="3600" dirty="0" smtClean="0">
               <a:latin typeface="微軟正黑體" panose="020B0604030504040204" pitchFamily="34" charset="-120"/>
@@ -3172,22 +3197,21 @@
       </p:sp>
       <p:pic>
         <p:nvPicPr>
-          <p:cNvPr id="2" name="圖片 1"/>
+          <p:cNvPr id="4" name="圖片 3"/>
           <p:cNvPicPr>
             <a:picLocks noChangeAspect="1"/>
           </p:cNvPicPr>
           <p:nvPr/>
         </p:nvPicPr>
-        <p:blipFill>
+        <p:blipFill rotWithShape="1">
           <a:blip r:embed="rId2"/>
-          <a:stretch>
-            <a:fillRect/>
-          </a:stretch>
+          <a:srcRect t="19317"/>
+          <a:stretch/>
         </p:blipFill>
         <p:spPr>
           <a:xfrm>
-            <a:off x="972766" y="1913763"/>
-            <a:ext cx="5101098" cy="3358628"/>
+            <a:off x="561603" y="2482706"/>
+            <a:ext cx="5645233" cy="2419711"/>
           </a:xfrm>
           <a:prstGeom prst="rect">
             <a:avLst/>
@@ -3197,7 +3221,7 @@
     </p:spTree>
     <p:extLst>
       <p:ext uri="{BB962C8B-B14F-4D97-AF65-F5344CB8AC3E}">
-        <p14:creationId xmlns:p14="http://schemas.microsoft.com/office/powerpoint/2010/main" val="1332306982"/>
+        <p14:creationId xmlns:p14="http://schemas.microsoft.com/office/powerpoint/2010/main" val="3043034406"/>
       </p:ext>
     </p:extLst>
   </p:cSld>
@@ -3224,77 +3248,6 @@
           <a:chExt cx="0" cy="0"/>
         </a:xfrm>
       </p:grpSpPr>
-      <p:pic>
-        <p:nvPicPr>
-          <p:cNvPr id="3" name="圖片 2"/>
-          <p:cNvPicPr>
-            <a:picLocks noChangeAspect="1"/>
-          </p:cNvPicPr>
-          <p:nvPr/>
-        </p:nvPicPr>
-        <p:blipFill rotWithShape="1">
-          <a:blip r:embed="rId2"/>
-          <a:srcRect t="1813" b="2924"/>
-          <a:stretch/>
-        </p:blipFill>
-        <p:spPr>
-          <a:xfrm>
-            <a:off x="314915" y="2623126"/>
-            <a:ext cx="3858163" cy="3639129"/>
-          </a:xfrm>
-          <a:prstGeom prst="rect">
-            <a:avLst/>
-          </a:prstGeom>
-        </p:spPr>
-      </p:pic>
-      <p:pic>
-        <p:nvPicPr>
-          <p:cNvPr id="4" name="圖片 3"/>
-          <p:cNvPicPr>
-            <a:picLocks noChangeAspect="1"/>
-          </p:cNvPicPr>
-          <p:nvPr/>
-        </p:nvPicPr>
-        <p:blipFill>
-          <a:blip r:embed="rId3"/>
-          <a:stretch>
-            <a:fillRect/>
-          </a:stretch>
-        </p:blipFill>
-        <p:spPr>
-          <a:xfrm>
-            <a:off x="4309083" y="2606273"/>
-            <a:ext cx="3696216" cy="3686689"/>
-          </a:xfrm>
-          <a:prstGeom prst="rect">
-            <a:avLst/>
-          </a:prstGeom>
-        </p:spPr>
-      </p:pic>
-      <p:pic>
-        <p:nvPicPr>
-          <p:cNvPr id="5" name="圖片 4"/>
-          <p:cNvPicPr>
-            <a:picLocks noChangeAspect="1"/>
-          </p:cNvPicPr>
-          <p:nvPr/>
-        </p:nvPicPr>
-        <p:blipFill>
-          <a:blip r:embed="rId4"/>
-          <a:stretch>
-            <a:fillRect/>
-          </a:stretch>
-        </p:blipFill>
-        <p:spPr>
-          <a:xfrm>
-            <a:off x="8141304" y="2606273"/>
-            <a:ext cx="3753374" cy="3715268"/>
-          </a:xfrm>
-          <a:prstGeom prst="rect">
-            <a:avLst/>
-          </a:prstGeom>
-        </p:spPr>
-      </p:pic>
       <p:sp>
         <p:nvSpPr>
           <p:cNvPr id="6" name="文字方塊 5"/>
@@ -3303,8 +3256,8 @@
         </p:nvSpPr>
         <p:spPr>
           <a:xfrm>
-            <a:off x="4525975" y="650009"/>
-            <a:ext cx="3262432" cy="1323439"/>
+            <a:off x="1136149" y="802409"/>
+            <a:ext cx="4166525" cy="2252924"/>
           </a:xfrm>
           <a:prstGeom prst="rect">
             <a:avLst/>
@@ -3317,85 +3270,67 @@
           </a:bodyPr>
           <a:lstStyle/>
           <a:p>
-            <a:pPr algn="ctr"/>
-            <a:r>
-              <a:rPr lang="zh-TW" altLang="en-US" sz="4000" dirty="0" smtClean="0">
-                <a:latin typeface="微軟正黑體" panose="020B0604030504040204" pitchFamily="34" charset="-120"/>
-                <a:ea typeface="微軟正黑體" panose="020B0604030504040204" pitchFamily="34" charset="-120"/>
-              </a:rPr>
-              <a:t>遊戲勝利條件</a:t>
-            </a:r>
-            <a:endParaRPr lang="en-US" altLang="zh-TW" sz="4000" dirty="0" smtClean="0">
+            <a:pPr>
+              <a:lnSpc>
+                <a:spcPct val="130000"/>
+              </a:lnSpc>
+            </a:pPr>
+            <a:r>
+              <a:rPr lang="zh-TW" altLang="en-US" sz="3600" b="1" dirty="0" smtClean="0">
+                <a:latin typeface="微軟正黑體" panose="020B0604030504040204" pitchFamily="34" charset="-120"/>
+                <a:ea typeface="微軟正黑體" panose="020B0604030504040204" pitchFamily="34" charset="-120"/>
+              </a:rPr>
+              <a:t>遊戲步驟</a:t>
+            </a:r>
+            <a:endParaRPr lang="en-US" altLang="zh-TW" sz="3600" b="1" dirty="0" smtClean="0">
               <a:latin typeface="微軟正黑體" panose="020B0604030504040204" pitchFamily="34" charset="-120"/>
               <a:ea typeface="微軟正黑體" panose="020B0604030504040204" pitchFamily="34" charset="-120"/>
             </a:endParaRPr>
           </a:p>
           <a:p>
-            <a:pPr algn="ctr"/>
-            <a:r>
-              <a:rPr lang="zh-TW" altLang="en-US" sz="4000" b="1" dirty="0" smtClean="0">
-                <a:latin typeface="微軟正黑體" panose="020B0604030504040204" pitchFamily="34" charset="-120"/>
-                <a:ea typeface="微軟正黑體" panose="020B0604030504040204" pitchFamily="34" charset="-120"/>
-              </a:rPr>
-              <a:t>四點連線</a:t>
-            </a:r>
-            <a:endParaRPr lang="zh-TW" altLang="en-US" sz="4000" b="1" dirty="0">
+            <a:pPr marL="742950" indent="-742950">
+              <a:lnSpc>
+                <a:spcPct val="130000"/>
+              </a:lnSpc>
+              <a:buAutoNum type="arabicPeriod"/>
+            </a:pPr>
+            <a:r>
+              <a:rPr lang="zh-TW" altLang="en-US" sz="3600" dirty="0" smtClean="0">
+                <a:latin typeface="微軟正黑體" panose="020B0604030504040204" pitchFamily="34" charset="-120"/>
+                <a:ea typeface="微軟正黑體" panose="020B0604030504040204" pitchFamily="34" charset="-120"/>
+              </a:rPr>
+              <a:t>放置船艦</a:t>
+            </a:r>
+            <a:endParaRPr lang="en-US" altLang="zh-TW" sz="3600" dirty="0" smtClean="0">
               <a:latin typeface="微軟正黑體" panose="020B0604030504040204" pitchFamily="34" charset="-120"/>
               <a:ea typeface="微軟正黑體" panose="020B0604030504040204" pitchFamily="34" charset="-120"/>
             </a:endParaRPr>
           </a:p>
-        </p:txBody>
-      </p:sp>
-      <p:sp>
-        <p:nvSpPr>
-          <p:cNvPr id="2" name="矩形 1"/>
-          <p:cNvSpPr/>
-          <p:nvPr/>
-        </p:nvSpPr>
-        <p:spPr>
-          <a:xfrm>
-            <a:off x="18473" y="6262255"/>
-            <a:ext cx="12192000" cy="498763"/>
-          </a:xfrm>
-          <a:prstGeom prst="rect">
-            <a:avLst/>
-          </a:prstGeom>
-          <a:solidFill>
-            <a:schemeClr val="bg1"/>
-          </a:solidFill>
-          <a:ln>
-            <a:noFill/>
-          </a:ln>
-        </p:spPr>
-        <p:style>
-          <a:lnRef idx="2">
-            <a:schemeClr val="accent1">
-              <a:shade val="50000"/>
-            </a:schemeClr>
-          </a:lnRef>
-          <a:fillRef idx="1">
-            <a:schemeClr val="accent1"/>
-          </a:fillRef>
-          <a:effectRef idx="0">
-            <a:schemeClr val="accent1"/>
-          </a:effectRef>
-          <a:fontRef idx="minor">
-            <a:schemeClr val="lt1"/>
-          </a:fontRef>
-        </p:style>
-        <p:txBody>
-          <a:bodyPr rtlCol="0" anchor="ctr"/>
-          <a:lstStyle/>
-          <a:p>
-            <a:pPr algn="ctr"/>
-            <a:endParaRPr lang="zh-TW" altLang="en-US"/>
+          <a:p>
+            <a:pPr marL="742950" indent="-742950">
+              <a:lnSpc>
+                <a:spcPct val="130000"/>
+              </a:lnSpc>
+              <a:buAutoNum type="arabicPeriod"/>
+            </a:pPr>
+            <a:r>
+              <a:rPr lang="zh-TW" altLang="en-US" sz="3600" dirty="0" smtClean="0">
+                <a:latin typeface="微軟正黑體" panose="020B0604030504040204" pitchFamily="34" charset="-120"/>
+                <a:ea typeface="微軟正黑體" panose="020B0604030504040204" pitchFamily="34" charset="-120"/>
+              </a:rPr>
+              <a:t>放置炸彈並引爆</a:t>
+            </a:r>
+            <a:endParaRPr lang="en-US" altLang="zh-TW" sz="3600" dirty="0" smtClean="0">
+              <a:latin typeface="微軟正黑體" panose="020B0604030504040204" pitchFamily="34" charset="-120"/>
+              <a:ea typeface="微軟正黑體" panose="020B0604030504040204" pitchFamily="34" charset="-120"/>
+            </a:endParaRPr>
           </a:p>
         </p:txBody>
       </p:sp>
     </p:spTree>
     <p:extLst>
       <p:ext uri="{BB962C8B-B14F-4D97-AF65-F5344CB8AC3E}">
-        <p14:creationId xmlns:p14="http://schemas.microsoft.com/office/powerpoint/2010/main" val="1596167989"/>
+        <p14:creationId xmlns:p14="http://schemas.microsoft.com/office/powerpoint/2010/main" val="2383523182"/>
       </p:ext>
     </p:extLst>
   </p:cSld>
@@ -3431,1489 +3366,6 @@
         <p:spPr>
           <a:xfrm>
             <a:off x="1136149" y="802409"/>
-            <a:ext cx="9919703" cy="3693319"/>
-          </a:xfrm>
-          <a:prstGeom prst="rect">
-            <a:avLst/>
-          </a:prstGeom>
-          <a:noFill/>
-        </p:spPr>
-        <p:txBody>
-          <a:bodyPr wrap="none" rtlCol="0">
-            <a:spAutoFit/>
-          </a:bodyPr>
-          <a:lstStyle/>
-          <a:p>
-            <a:pPr>
-              <a:lnSpc>
-                <a:spcPct val="130000"/>
-              </a:lnSpc>
-            </a:pPr>
-            <a:r>
-              <a:rPr lang="zh-TW" altLang="en-US" sz="3600" b="1" dirty="0" smtClean="0">
-                <a:latin typeface="微軟正黑體" panose="020B0604030504040204" pitchFamily="34" charset="-120"/>
-                <a:ea typeface="微軟正黑體" panose="020B0604030504040204" pitchFamily="34" charset="-120"/>
-              </a:rPr>
-              <a:t>遊戲步驟</a:t>
-            </a:r>
-            <a:endParaRPr lang="en-US" altLang="zh-TW" sz="3600" b="1" dirty="0" smtClean="0">
-              <a:latin typeface="微軟正黑體" panose="020B0604030504040204" pitchFamily="34" charset="-120"/>
-              <a:ea typeface="微軟正黑體" panose="020B0604030504040204" pitchFamily="34" charset="-120"/>
-            </a:endParaRPr>
-          </a:p>
-          <a:p>
-            <a:pPr marL="742950" indent="-742950">
-              <a:lnSpc>
-                <a:spcPct val="130000"/>
-              </a:lnSpc>
-              <a:buAutoNum type="arabicPeriod"/>
-            </a:pPr>
-            <a:r>
-              <a:rPr lang="en-US" altLang="zh-TW" sz="3600" dirty="0" smtClean="0">
-                <a:latin typeface="微軟正黑體" panose="020B0604030504040204" pitchFamily="34" charset="-120"/>
-                <a:ea typeface="微軟正黑體" panose="020B0604030504040204" pitchFamily="34" charset="-120"/>
-              </a:rPr>
-              <a:t>(optional) </a:t>
-            </a:r>
-            <a:r>
-              <a:rPr lang="zh-TW" altLang="en-US" sz="3600" dirty="0" smtClean="0">
-                <a:latin typeface="微軟正黑體" panose="020B0604030504040204" pitchFamily="34" charset="-120"/>
-                <a:ea typeface="微軟正黑體" panose="020B0604030504040204" pitchFamily="34" charset="-120"/>
-              </a:rPr>
-              <a:t>移動別人的棋子</a:t>
-            </a:r>
-            <a:r>
-              <a:rPr lang="en-US" altLang="zh-TW" sz="3600" dirty="0" smtClean="0">
-                <a:latin typeface="微軟正黑體" panose="020B0604030504040204" pitchFamily="34" charset="-120"/>
-                <a:ea typeface="微軟正黑體" panose="020B0604030504040204" pitchFamily="34" charset="-120"/>
-              </a:rPr>
-              <a:t>(</a:t>
-            </a:r>
-            <a:r>
-              <a:rPr lang="zh-TW" altLang="en-US" sz="3600" dirty="0" smtClean="0">
-                <a:latin typeface="微軟正黑體" panose="020B0604030504040204" pitchFamily="34" charset="-120"/>
-                <a:ea typeface="微軟正黑體" panose="020B0604030504040204" pitchFamily="34" charset="-120"/>
-              </a:rPr>
-              <a:t>僅上下左右一格</a:t>
-            </a:r>
-            <a:r>
-              <a:rPr lang="en-US" altLang="zh-TW" sz="3600" dirty="0" smtClean="0">
-                <a:latin typeface="微軟正黑體" panose="020B0604030504040204" pitchFamily="34" charset="-120"/>
-                <a:ea typeface="微軟正黑體" panose="020B0604030504040204" pitchFamily="34" charset="-120"/>
-              </a:rPr>
-              <a:t>)</a:t>
-            </a:r>
-          </a:p>
-          <a:p>
-            <a:pPr marL="742950" indent="-742950">
-              <a:lnSpc>
-                <a:spcPct val="130000"/>
-              </a:lnSpc>
-              <a:buAutoNum type="arabicPeriod"/>
-            </a:pPr>
-            <a:r>
-              <a:rPr lang="zh-TW" altLang="en-US" sz="3600" dirty="0" smtClean="0">
-                <a:latin typeface="微軟正黑體" panose="020B0604030504040204" pitchFamily="34" charset="-120"/>
-                <a:ea typeface="微軟正黑體" panose="020B0604030504040204" pitchFamily="34" charset="-120"/>
-              </a:rPr>
-              <a:t>放一個自己的棋子</a:t>
-            </a:r>
-            <a:endParaRPr lang="en-US" altLang="zh-TW" sz="3600" dirty="0" smtClean="0">
-              <a:latin typeface="微軟正黑體" panose="020B0604030504040204" pitchFamily="34" charset="-120"/>
-              <a:ea typeface="微軟正黑體" panose="020B0604030504040204" pitchFamily="34" charset="-120"/>
-            </a:endParaRPr>
-          </a:p>
-          <a:p>
-            <a:pPr marL="742950" indent="-742950">
-              <a:lnSpc>
-                <a:spcPct val="130000"/>
-              </a:lnSpc>
-              <a:buAutoNum type="arabicPeriod"/>
-            </a:pPr>
-            <a:r>
-              <a:rPr lang="en-US" altLang="zh-TW" sz="3600" dirty="0" smtClean="0">
-                <a:latin typeface="微軟正黑體" panose="020B0604030504040204" pitchFamily="34" charset="-120"/>
-                <a:ea typeface="微軟正黑體" panose="020B0604030504040204" pitchFamily="34" charset="-120"/>
-              </a:rPr>
-              <a:t>(must)</a:t>
-            </a:r>
-            <a:r>
-              <a:rPr lang="zh-TW" altLang="en-US" sz="3600" dirty="0" smtClean="0">
-                <a:latin typeface="微軟正黑體" panose="020B0604030504040204" pitchFamily="34" charset="-120"/>
-                <a:ea typeface="微軟正黑體" panose="020B0604030504040204" pitchFamily="34" charset="-120"/>
-              </a:rPr>
-              <a:t> 旋轉棋盤</a:t>
-            </a:r>
-            <a:endParaRPr lang="en-US" altLang="zh-TW" sz="3600" dirty="0" smtClean="0">
-              <a:latin typeface="微軟正黑體" panose="020B0604030504040204" pitchFamily="34" charset="-120"/>
-              <a:ea typeface="微軟正黑體" panose="020B0604030504040204" pitchFamily="34" charset="-120"/>
-            </a:endParaRPr>
-          </a:p>
-          <a:p>
-            <a:pPr marL="742950" indent="-742950">
-              <a:lnSpc>
-                <a:spcPct val="130000"/>
-              </a:lnSpc>
-              <a:buAutoNum type="arabicPeriod"/>
-            </a:pPr>
-            <a:endParaRPr lang="zh-TW" altLang="en-US" sz="3600" dirty="0">
-              <a:latin typeface="微軟正黑體" panose="020B0604030504040204" pitchFamily="34" charset="-120"/>
-              <a:ea typeface="微軟正黑體" panose="020B0604030504040204" pitchFamily="34" charset="-120"/>
-            </a:endParaRPr>
-          </a:p>
-        </p:txBody>
-      </p:sp>
-    </p:spTree>
-    <p:extLst>
-      <p:ext uri="{BB962C8B-B14F-4D97-AF65-F5344CB8AC3E}">
-        <p14:creationId xmlns:p14="http://schemas.microsoft.com/office/powerpoint/2010/main" val="2571292258"/>
-      </p:ext>
-    </p:extLst>
-  </p:cSld>
-  <p:clrMapOvr>
-    <a:masterClrMapping/>
-  </p:clrMapOvr>
-</p:sld>
-</file>
-
-<file path=ppt/slides/slide12.xml><?xml version="1.0" encoding="utf-8"?>
-<p:sld xmlns:a="http://schemas.openxmlformats.org/drawingml/2006/main" xmlns:r="http://schemas.openxmlformats.org/officeDocument/2006/relationships" xmlns:p="http://schemas.openxmlformats.org/presentationml/2006/main">
-  <p:cSld>
-    <p:spTree>
-      <p:nvGrpSpPr>
-        <p:cNvPr id="1" name=""/>
-        <p:cNvGrpSpPr/>
-        <p:nvPr/>
-      </p:nvGrpSpPr>
-      <p:grpSpPr>
-        <a:xfrm>
-          <a:off x="0" y="0"/>
-          <a:ext cx="0" cy="0"/>
-          <a:chOff x="0" y="0"/>
-          <a:chExt cx="0" cy="0"/>
-        </a:xfrm>
-      </p:grpSpPr>
-      <p:sp>
-        <p:nvSpPr>
-          <p:cNvPr id="6" name="文字方塊 5"/>
-          <p:cNvSpPr txBox="1"/>
-          <p:nvPr/>
-        </p:nvSpPr>
-        <p:spPr>
-          <a:xfrm>
-            <a:off x="1136149" y="802409"/>
-            <a:ext cx="9919703" cy="2252924"/>
-          </a:xfrm>
-          <a:prstGeom prst="rect">
-            <a:avLst/>
-          </a:prstGeom>
-          <a:noFill/>
-        </p:spPr>
-        <p:txBody>
-          <a:bodyPr wrap="none" rtlCol="0">
-            <a:spAutoFit/>
-          </a:bodyPr>
-          <a:lstStyle/>
-          <a:p>
-            <a:pPr>
-              <a:lnSpc>
-                <a:spcPct val="130000"/>
-              </a:lnSpc>
-            </a:pPr>
-            <a:r>
-              <a:rPr lang="zh-TW" altLang="en-US" sz="3600" b="1" dirty="0" smtClean="0">
-                <a:latin typeface="微軟正黑體" panose="020B0604030504040204" pitchFamily="34" charset="-120"/>
-                <a:ea typeface="微軟正黑體" panose="020B0604030504040204" pitchFamily="34" charset="-120"/>
-              </a:rPr>
-              <a:t>遊戲步驟</a:t>
-            </a:r>
-            <a:endParaRPr lang="en-US" altLang="zh-TW" sz="3600" b="1" dirty="0" smtClean="0">
-              <a:latin typeface="微軟正黑體" panose="020B0604030504040204" pitchFamily="34" charset="-120"/>
-              <a:ea typeface="微軟正黑體" panose="020B0604030504040204" pitchFamily="34" charset="-120"/>
-            </a:endParaRPr>
-          </a:p>
-          <a:p>
-            <a:pPr marL="742950" indent="-742950">
-              <a:lnSpc>
-                <a:spcPct val="130000"/>
-              </a:lnSpc>
-              <a:buAutoNum type="arabicPeriod"/>
-            </a:pPr>
-            <a:r>
-              <a:rPr lang="en-US" altLang="zh-TW" sz="3600" dirty="0" smtClean="0">
-                <a:latin typeface="微軟正黑體" panose="020B0604030504040204" pitchFamily="34" charset="-120"/>
-                <a:ea typeface="微軟正黑體" panose="020B0604030504040204" pitchFamily="34" charset="-120"/>
-              </a:rPr>
-              <a:t>(optional) </a:t>
-            </a:r>
-            <a:r>
-              <a:rPr lang="zh-TW" altLang="en-US" sz="3600" dirty="0" smtClean="0">
-                <a:latin typeface="微軟正黑體" panose="020B0604030504040204" pitchFamily="34" charset="-120"/>
-                <a:ea typeface="微軟正黑體" panose="020B0604030504040204" pitchFamily="34" charset="-120"/>
-              </a:rPr>
-              <a:t>移動別人的棋子</a:t>
-            </a:r>
-            <a:r>
-              <a:rPr lang="en-US" altLang="zh-TW" sz="3600" dirty="0" smtClean="0">
-                <a:latin typeface="微軟正黑體" panose="020B0604030504040204" pitchFamily="34" charset="-120"/>
-                <a:ea typeface="微軟正黑體" panose="020B0604030504040204" pitchFamily="34" charset="-120"/>
-              </a:rPr>
-              <a:t>(</a:t>
-            </a:r>
-            <a:r>
-              <a:rPr lang="zh-TW" altLang="en-US" sz="3600" dirty="0" smtClean="0">
-                <a:latin typeface="微軟正黑體" panose="020B0604030504040204" pitchFamily="34" charset="-120"/>
-                <a:ea typeface="微軟正黑體" panose="020B0604030504040204" pitchFamily="34" charset="-120"/>
-              </a:rPr>
-              <a:t>僅上下左右一格</a:t>
-            </a:r>
-            <a:r>
-              <a:rPr lang="en-US" altLang="zh-TW" sz="3600" dirty="0" smtClean="0">
-                <a:latin typeface="微軟正黑體" panose="020B0604030504040204" pitchFamily="34" charset="-120"/>
-                <a:ea typeface="微軟正黑體" panose="020B0604030504040204" pitchFamily="34" charset="-120"/>
-              </a:rPr>
-              <a:t>)</a:t>
-            </a:r>
-          </a:p>
-          <a:p>
-            <a:pPr marL="742950" indent="-742950">
-              <a:lnSpc>
-                <a:spcPct val="130000"/>
-              </a:lnSpc>
-              <a:buAutoNum type="arabicPeriod"/>
-            </a:pPr>
-            <a:endParaRPr lang="zh-TW" altLang="en-US" sz="3600" dirty="0">
-              <a:latin typeface="微軟正黑體" panose="020B0604030504040204" pitchFamily="34" charset="-120"/>
-              <a:ea typeface="微軟正黑體" panose="020B0604030504040204" pitchFamily="34" charset="-120"/>
-            </a:endParaRPr>
-          </a:p>
-        </p:txBody>
-      </p:sp>
-      <p:grpSp>
-        <p:nvGrpSpPr>
-          <p:cNvPr id="4" name="群組 3"/>
-          <p:cNvGrpSpPr/>
-          <p:nvPr/>
-        </p:nvGrpSpPr>
-        <p:grpSpPr>
-          <a:xfrm>
-            <a:off x="2405484" y="2471487"/>
-            <a:ext cx="7381032" cy="3591426"/>
-            <a:chOff x="1809249" y="2471487"/>
-            <a:chExt cx="7381032" cy="3591426"/>
-          </a:xfrm>
-        </p:grpSpPr>
-        <p:pic>
-          <p:nvPicPr>
-            <p:cNvPr id="2" name="圖片 1"/>
-            <p:cNvPicPr>
-              <a:picLocks noChangeAspect="1"/>
-            </p:cNvPicPr>
-            <p:nvPr/>
-          </p:nvPicPr>
-          <p:blipFill>
-            <a:blip r:embed="rId2"/>
-            <a:stretch>
-              <a:fillRect/>
-            </a:stretch>
-          </p:blipFill>
-          <p:spPr>
-            <a:xfrm>
-              <a:off x="1809249" y="2471487"/>
-              <a:ext cx="3572374" cy="3591426"/>
-            </a:xfrm>
-            <a:prstGeom prst="rect">
-              <a:avLst/>
-            </a:prstGeom>
-          </p:spPr>
-        </p:pic>
-        <p:pic>
-          <p:nvPicPr>
-            <p:cNvPr id="3" name="圖片 2"/>
-            <p:cNvPicPr>
-              <a:picLocks noChangeAspect="1"/>
-            </p:cNvPicPr>
-            <p:nvPr/>
-          </p:nvPicPr>
-          <p:blipFill>
-            <a:blip r:embed="rId3"/>
-            <a:stretch>
-              <a:fillRect/>
-            </a:stretch>
-          </p:blipFill>
-          <p:spPr>
-            <a:xfrm>
-              <a:off x="5694118" y="2471487"/>
-              <a:ext cx="3496163" cy="3524742"/>
-            </a:xfrm>
-            <a:prstGeom prst="rect">
-              <a:avLst/>
-            </a:prstGeom>
-          </p:spPr>
-        </p:pic>
-      </p:grpSp>
-    </p:spTree>
-    <p:extLst>
-      <p:ext uri="{BB962C8B-B14F-4D97-AF65-F5344CB8AC3E}">
-        <p14:creationId xmlns:p14="http://schemas.microsoft.com/office/powerpoint/2010/main" val="2800153044"/>
-      </p:ext>
-    </p:extLst>
-  </p:cSld>
-  <p:clrMapOvr>
-    <a:masterClrMapping/>
-  </p:clrMapOvr>
-</p:sld>
-</file>
-
-<file path=ppt/slides/slide13.xml><?xml version="1.0" encoding="utf-8"?>
-<p:sld xmlns:a="http://schemas.openxmlformats.org/drawingml/2006/main" xmlns:r="http://schemas.openxmlformats.org/officeDocument/2006/relationships" xmlns:p="http://schemas.openxmlformats.org/presentationml/2006/main">
-  <p:cSld>
-    <p:spTree>
-      <p:nvGrpSpPr>
-        <p:cNvPr id="1" name=""/>
-        <p:cNvGrpSpPr/>
-        <p:nvPr/>
-      </p:nvGrpSpPr>
-      <p:grpSpPr>
-        <a:xfrm>
-          <a:off x="0" y="0"/>
-          <a:ext cx="0" cy="0"/>
-          <a:chOff x="0" y="0"/>
-          <a:chExt cx="0" cy="0"/>
-        </a:xfrm>
-      </p:grpSpPr>
-      <p:sp>
-        <p:nvSpPr>
-          <p:cNvPr id="6" name="文字方塊 5"/>
-          <p:cNvSpPr txBox="1"/>
-          <p:nvPr/>
-        </p:nvSpPr>
-        <p:spPr>
-          <a:xfrm>
-            <a:off x="1136149" y="802409"/>
-            <a:ext cx="4628190" cy="2252924"/>
-          </a:xfrm>
-          <a:prstGeom prst="rect">
-            <a:avLst/>
-          </a:prstGeom>
-          <a:noFill/>
-        </p:spPr>
-        <p:txBody>
-          <a:bodyPr wrap="none" rtlCol="0">
-            <a:spAutoFit/>
-          </a:bodyPr>
-          <a:lstStyle/>
-          <a:p>
-            <a:pPr>
-              <a:lnSpc>
-                <a:spcPct val="130000"/>
-              </a:lnSpc>
-            </a:pPr>
-            <a:r>
-              <a:rPr lang="zh-TW" altLang="en-US" sz="3600" b="1" dirty="0" smtClean="0">
-                <a:latin typeface="微軟正黑體" panose="020B0604030504040204" pitchFamily="34" charset="-120"/>
-                <a:ea typeface="微軟正黑體" panose="020B0604030504040204" pitchFamily="34" charset="-120"/>
-              </a:rPr>
-              <a:t>遊戲步驟</a:t>
-            </a:r>
-            <a:endParaRPr lang="en-US" altLang="zh-TW" sz="3600" b="1" dirty="0" smtClean="0">
-              <a:latin typeface="微軟正黑體" panose="020B0604030504040204" pitchFamily="34" charset="-120"/>
-              <a:ea typeface="微軟正黑體" panose="020B0604030504040204" pitchFamily="34" charset="-120"/>
-            </a:endParaRPr>
-          </a:p>
-          <a:p>
-            <a:pPr marL="742950" indent="-742950">
-              <a:lnSpc>
-                <a:spcPct val="130000"/>
-              </a:lnSpc>
-              <a:buFont typeface="+mj-lt"/>
-              <a:buAutoNum type="arabicPeriod" startAt="2"/>
-            </a:pPr>
-            <a:r>
-              <a:rPr lang="zh-TW" altLang="en-US" sz="3600" dirty="0" smtClean="0">
-                <a:latin typeface="微軟正黑體" panose="020B0604030504040204" pitchFamily="34" charset="-120"/>
-                <a:ea typeface="微軟正黑體" panose="020B0604030504040204" pitchFamily="34" charset="-120"/>
-              </a:rPr>
-              <a:t>放一個自己的棋子</a:t>
-            </a:r>
-            <a:endParaRPr lang="en-US" altLang="zh-TW" sz="3600" dirty="0" smtClean="0">
-              <a:latin typeface="微軟正黑體" panose="020B0604030504040204" pitchFamily="34" charset="-120"/>
-              <a:ea typeface="微軟正黑體" panose="020B0604030504040204" pitchFamily="34" charset="-120"/>
-            </a:endParaRPr>
-          </a:p>
-          <a:p>
-            <a:pPr>
-              <a:lnSpc>
-                <a:spcPct val="130000"/>
-              </a:lnSpc>
-            </a:pPr>
-            <a:endParaRPr lang="zh-TW" altLang="en-US" sz="3600" dirty="0">
-              <a:latin typeface="微軟正黑體" panose="020B0604030504040204" pitchFamily="34" charset="-120"/>
-              <a:ea typeface="微軟正黑體" panose="020B0604030504040204" pitchFamily="34" charset="-120"/>
-            </a:endParaRPr>
-          </a:p>
-        </p:txBody>
-      </p:sp>
-      <p:pic>
-        <p:nvPicPr>
-          <p:cNvPr id="2" name="圖片 1"/>
-          <p:cNvPicPr>
-            <a:picLocks noChangeAspect="1"/>
-          </p:cNvPicPr>
-          <p:nvPr/>
-        </p:nvPicPr>
-        <p:blipFill>
-          <a:blip r:embed="rId2"/>
-          <a:stretch>
-            <a:fillRect/>
-          </a:stretch>
-        </p:blipFill>
-        <p:spPr>
-          <a:xfrm>
-            <a:off x="4324103" y="2487366"/>
-            <a:ext cx="3543795" cy="3534268"/>
-          </a:xfrm>
-          <a:prstGeom prst="rect">
-            <a:avLst/>
-          </a:prstGeom>
-        </p:spPr>
-      </p:pic>
-    </p:spTree>
-    <p:extLst>
-      <p:ext uri="{BB962C8B-B14F-4D97-AF65-F5344CB8AC3E}">
-        <p14:creationId xmlns:p14="http://schemas.microsoft.com/office/powerpoint/2010/main" val="1077873990"/>
-      </p:ext>
-    </p:extLst>
-  </p:cSld>
-  <p:clrMapOvr>
-    <a:masterClrMapping/>
-  </p:clrMapOvr>
-</p:sld>
-</file>
-
-<file path=ppt/slides/slide14.xml><?xml version="1.0" encoding="utf-8"?>
-<p:sld xmlns:a="http://schemas.openxmlformats.org/drawingml/2006/main" xmlns:r="http://schemas.openxmlformats.org/officeDocument/2006/relationships" xmlns:p="http://schemas.openxmlformats.org/presentationml/2006/main">
-  <p:cSld>
-    <p:spTree>
-      <p:nvGrpSpPr>
-        <p:cNvPr id="1" name=""/>
-        <p:cNvGrpSpPr/>
-        <p:nvPr/>
-      </p:nvGrpSpPr>
-      <p:grpSpPr>
-        <a:xfrm>
-          <a:off x="0" y="0"/>
-          <a:ext cx="0" cy="0"/>
-          <a:chOff x="0" y="0"/>
-          <a:chExt cx="0" cy="0"/>
-        </a:xfrm>
-      </p:grpSpPr>
-      <p:sp>
-        <p:nvSpPr>
-          <p:cNvPr id="6" name="文字方塊 5"/>
-          <p:cNvSpPr txBox="1"/>
-          <p:nvPr/>
-        </p:nvSpPr>
-        <p:spPr>
-          <a:xfrm>
-            <a:off x="1136149" y="802409"/>
-            <a:ext cx="4277133" cy="2252924"/>
-          </a:xfrm>
-          <a:prstGeom prst="rect">
-            <a:avLst/>
-          </a:prstGeom>
-          <a:noFill/>
-        </p:spPr>
-        <p:txBody>
-          <a:bodyPr wrap="none" rtlCol="0">
-            <a:spAutoFit/>
-          </a:bodyPr>
-          <a:lstStyle/>
-          <a:p>
-            <a:pPr>
-              <a:lnSpc>
-                <a:spcPct val="130000"/>
-              </a:lnSpc>
-            </a:pPr>
-            <a:r>
-              <a:rPr lang="zh-TW" altLang="en-US" sz="3600" b="1" dirty="0" smtClean="0">
-                <a:latin typeface="微軟正黑體" panose="020B0604030504040204" pitchFamily="34" charset="-120"/>
-                <a:ea typeface="微軟正黑體" panose="020B0604030504040204" pitchFamily="34" charset="-120"/>
-              </a:rPr>
-              <a:t>遊戲步驟</a:t>
-            </a:r>
-            <a:endParaRPr lang="en-US" altLang="zh-TW" sz="3600" b="1" dirty="0" smtClean="0">
-              <a:latin typeface="微軟正黑體" panose="020B0604030504040204" pitchFamily="34" charset="-120"/>
-              <a:ea typeface="微軟正黑體" panose="020B0604030504040204" pitchFamily="34" charset="-120"/>
-            </a:endParaRPr>
-          </a:p>
-          <a:p>
-            <a:pPr marL="742950" indent="-742950">
-              <a:lnSpc>
-                <a:spcPct val="130000"/>
-              </a:lnSpc>
-              <a:buFont typeface="+mj-lt"/>
-              <a:buAutoNum type="arabicPeriod" startAt="3"/>
-            </a:pPr>
-            <a:r>
-              <a:rPr lang="en-US" altLang="zh-TW" sz="3600" dirty="0" smtClean="0">
-                <a:latin typeface="微軟正黑體" panose="020B0604030504040204" pitchFamily="34" charset="-120"/>
-                <a:ea typeface="微軟正黑體" panose="020B0604030504040204" pitchFamily="34" charset="-120"/>
-              </a:rPr>
-              <a:t>(must)</a:t>
-            </a:r>
-            <a:r>
-              <a:rPr lang="zh-TW" altLang="en-US" sz="3600" dirty="0" smtClean="0">
-                <a:latin typeface="微軟正黑體" panose="020B0604030504040204" pitchFamily="34" charset="-120"/>
-                <a:ea typeface="微軟正黑體" panose="020B0604030504040204" pitchFamily="34" charset="-120"/>
-              </a:rPr>
-              <a:t> 旋轉棋盤</a:t>
-            </a:r>
-            <a:endParaRPr lang="en-US" altLang="zh-TW" sz="3600" dirty="0" smtClean="0">
-              <a:latin typeface="微軟正黑體" panose="020B0604030504040204" pitchFamily="34" charset="-120"/>
-              <a:ea typeface="微軟正黑體" panose="020B0604030504040204" pitchFamily="34" charset="-120"/>
-            </a:endParaRPr>
-          </a:p>
-          <a:p>
-            <a:pPr>
-              <a:lnSpc>
-                <a:spcPct val="130000"/>
-              </a:lnSpc>
-            </a:pPr>
-            <a:endParaRPr lang="zh-TW" altLang="en-US" sz="3600" dirty="0">
-              <a:latin typeface="微軟正黑體" panose="020B0604030504040204" pitchFamily="34" charset="-120"/>
-              <a:ea typeface="微軟正黑體" panose="020B0604030504040204" pitchFamily="34" charset="-120"/>
-            </a:endParaRPr>
-          </a:p>
-        </p:txBody>
-      </p:sp>
-      <p:grpSp>
-        <p:nvGrpSpPr>
-          <p:cNvPr id="5" name="群組 4"/>
-          <p:cNvGrpSpPr/>
-          <p:nvPr/>
-        </p:nvGrpSpPr>
-        <p:grpSpPr>
-          <a:xfrm>
-            <a:off x="2262297" y="2482602"/>
-            <a:ext cx="7667406" cy="3543795"/>
-            <a:chOff x="1982539" y="2482602"/>
-            <a:chExt cx="7667406" cy="3543795"/>
-          </a:xfrm>
-        </p:grpSpPr>
-        <p:pic>
-          <p:nvPicPr>
-            <p:cNvPr id="3" name="圖片 2"/>
-            <p:cNvPicPr>
-              <a:picLocks noChangeAspect="1"/>
-            </p:cNvPicPr>
-            <p:nvPr/>
-          </p:nvPicPr>
-          <p:blipFill>
-            <a:blip r:embed="rId2"/>
-            <a:stretch>
-              <a:fillRect/>
-            </a:stretch>
-          </p:blipFill>
-          <p:spPr>
-            <a:xfrm>
-              <a:off x="1982539" y="2482602"/>
-              <a:ext cx="3553321" cy="3543795"/>
-            </a:xfrm>
-            <a:prstGeom prst="rect">
-              <a:avLst/>
-            </a:prstGeom>
-          </p:spPr>
-        </p:pic>
-        <p:pic>
-          <p:nvPicPr>
-            <p:cNvPr id="4" name="圖片 3"/>
-            <p:cNvPicPr>
-              <a:picLocks noChangeAspect="1"/>
-            </p:cNvPicPr>
-            <p:nvPr/>
-          </p:nvPicPr>
-          <p:blipFill>
-            <a:blip r:embed="rId3"/>
-            <a:stretch>
-              <a:fillRect/>
-            </a:stretch>
-          </p:blipFill>
-          <p:spPr>
-            <a:xfrm>
-              <a:off x="6144256" y="2496891"/>
-              <a:ext cx="3505689" cy="3515216"/>
-            </a:xfrm>
-            <a:prstGeom prst="rect">
-              <a:avLst/>
-            </a:prstGeom>
-          </p:spPr>
-        </p:pic>
-      </p:grpSp>
-      <p:sp>
-        <p:nvSpPr>
-          <p:cNvPr id="2" name="向右箭號 1"/>
-          <p:cNvSpPr/>
-          <p:nvPr/>
-        </p:nvSpPr>
-        <p:spPr>
-          <a:xfrm>
-            <a:off x="5900390" y="3971057"/>
-            <a:ext cx="475796" cy="566883"/>
-          </a:xfrm>
-          <a:prstGeom prst="rightArrow">
-            <a:avLst/>
-          </a:prstGeom>
-          <a:solidFill>
-            <a:srgbClr val="25AEF2"/>
-          </a:solidFill>
-          <a:ln>
-            <a:noFill/>
-          </a:ln>
-        </p:spPr>
-        <p:style>
-          <a:lnRef idx="2">
-            <a:schemeClr val="accent1">
-              <a:shade val="50000"/>
-            </a:schemeClr>
-          </a:lnRef>
-          <a:fillRef idx="1">
-            <a:schemeClr val="accent1"/>
-          </a:fillRef>
-          <a:effectRef idx="0">
-            <a:schemeClr val="accent1"/>
-          </a:effectRef>
-          <a:fontRef idx="minor">
-            <a:schemeClr val="lt1"/>
-          </a:fontRef>
-        </p:style>
-        <p:txBody>
-          <a:bodyPr rtlCol="0" anchor="ctr"/>
-          <a:lstStyle/>
-          <a:p>
-            <a:pPr algn="ctr"/>
-            <a:endParaRPr lang="zh-TW" altLang="en-US"/>
-          </a:p>
-        </p:txBody>
-      </p:sp>
-    </p:spTree>
-    <p:extLst>
-      <p:ext uri="{BB962C8B-B14F-4D97-AF65-F5344CB8AC3E}">
-        <p14:creationId xmlns:p14="http://schemas.microsoft.com/office/powerpoint/2010/main" val="3026181878"/>
-      </p:ext>
-    </p:extLst>
-  </p:cSld>
-  <p:clrMapOvr>
-    <a:masterClrMapping/>
-  </p:clrMapOvr>
-</p:sld>
-</file>
-
-<file path=ppt/slides/slide15.xml><?xml version="1.0" encoding="utf-8"?>
-<p:sld xmlns:a="http://schemas.openxmlformats.org/drawingml/2006/main" xmlns:r="http://schemas.openxmlformats.org/officeDocument/2006/relationships" xmlns:p="http://schemas.openxmlformats.org/presentationml/2006/main">
-  <p:cSld>
-    <p:spTree>
-      <p:nvGrpSpPr>
-        <p:cNvPr id="1" name=""/>
-        <p:cNvGrpSpPr/>
-        <p:nvPr/>
-      </p:nvGrpSpPr>
-      <p:grpSpPr>
-        <a:xfrm>
-          <a:off x="0" y="0"/>
-          <a:ext cx="0" cy="0"/>
-          <a:chOff x="0" y="0"/>
-          <a:chExt cx="0" cy="0"/>
-        </a:xfrm>
-      </p:grpSpPr>
-      <p:sp>
-        <p:nvSpPr>
-          <p:cNvPr id="6" name="文字方塊 5"/>
-          <p:cNvSpPr txBox="1"/>
-          <p:nvPr/>
-        </p:nvSpPr>
-        <p:spPr>
-          <a:xfrm>
-            <a:off x="1136149" y="802409"/>
-            <a:ext cx="1285929" cy="738472"/>
-          </a:xfrm>
-          <a:prstGeom prst="rect">
-            <a:avLst/>
-          </a:prstGeom>
-          <a:noFill/>
-        </p:spPr>
-        <p:txBody>
-          <a:bodyPr wrap="none" rtlCol="0">
-            <a:spAutoFit/>
-          </a:bodyPr>
-          <a:lstStyle/>
-          <a:p>
-            <a:pPr>
-              <a:lnSpc>
-                <a:spcPct val="130000"/>
-              </a:lnSpc>
-            </a:pPr>
-            <a:r>
-              <a:rPr lang="en-US" altLang="zh-TW" sz="3600" dirty="0" smtClean="0">
-                <a:latin typeface="微軟正黑體" panose="020B0604030504040204" pitchFamily="34" charset="-120"/>
-                <a:ea typeface="微軟正黑體" panose="020B0604030504040204" pitchFamily="34" charset="-120"/>
-              </a:rPr>
-              <a:t>SPEC</a:t>
-            </a:r>
-            <a:endParaRPr lang="zh-TW" altLang="en-US" sz="3600" dirty="0">
-              <a:latin typeface="微軟正黑體" panose="020B0604030504040204" pitchFamily="34" charset="-120"/>
-              <a:ea typeface="微軟正黑體" panose="020B0604030504040204" pitchFamily="34" charset="-120"/>
-            </a:endParaRPr>
-          </a:p>
-        </p:txBody>
-      </p:sp>
-      <p:pic>
-        <p:nvPicPr>
-          <p:cNvPr id="7" name="圖片 6"/>
-          <p:cNvPicPr>
-            <a:picLocks noChangeAspect="1"/>
-          </p:cNvPicPr>
-          <p:nvPr/>
-        </p:nvPicPr>
-        <p:blipFill>
-          <a:blip r:embed="rId2"/>
-          <a:stretch>
-            <a:fillRect/>
-          </a:stretch>
-        </p:blipFill>
-        <p:spPr>
-          <a:xfrm>
-            <a:off x="1205193" y="2009640"/>
-            <a:ext cx="3683164" cy="3658445"/>
-          </a:xfrm>
-          <a:prstGeom prst="rect">
-            <a:avLst/>
-          </a:prstGeom>
-        </p:spPr>
-      </p:pic>
-      <p:graphicFrame>
-        <p:nvGraphicFramePr>
-          <p:cNvPr id="8" name="表格 7"/>
-          <p:cNvGraphicFramePr>
-            <a:graphicFrameLocks noGrp="1"/>
-          </p:cNvGraphicFramePr>
-          <p:nvPr>
-            <p:extLst>
-              <p:ext uri="{D42A27DB-BD31-4B8C-83A1-F6EECF244321}">
-                <p14:modId xmlns:p14="http://schemas.microsoft.com/office/powerpoint/2010/main" val="2583368440"/>
-              </p:ext>
-            </p:extLst>
-          </p:nvPr>
-        </p:nvGraphicFramePr>
-        <p:xfrm>
-          <a:off x="5504872" y="2230158"/>
-          <a:ext cx="3240000" cy="3240000"/>
-        </p:xfrm>
-        <a:graphic>
-          <a:graphicData uri="http://schemas.openxmlformats.org/drawingml/2006/table">
-            <a:tbl>
-              <a:tblPr firstRow="1" bandRow="1">
-                <a:tableStyleId>{5940675A-B579-460E-94D1-54222C63F5DA}</a:tableStyleId>
-              </a:tblPr>
-              <a:tblGrid>
-                <a:gridCol w="810000">
-                  <a:extLst>
-                    <a:ext uri="{9D8B030D-6E8A-4147-A177-3AD203B41FA5}">
-                      <a16:colId xmlns:a16="http://schemas.microsoft.com/office/drawing/2014/main" val="4154758723"/>
-                    </a:ext>
-                  </a:extLst>
-                </a:gridCol>
-                <a:gridCol w="810000">
-                  <a:extLst>
-                    <a:ext uri="{9D8B030D-6E8A-4147-A177-3AD203B41FA5}">
-                      <a16:colId xmlns:a16="http://schemas.microsoft.com/office/drawing/2014/main" val="2413484256"/>
-                    </a:ext>
-                  </a:extLst>
-                </a:gridCol>
-                <a:gridCol w="810000">
-                  <a:extLst>
-                    <a:ext uri="{9D8B030D-6E8A-4147-A177-3AD203B41FA5}">
-                      <a16:colId xmlns:a16="http://schemas.microsoft.com/office/drawing/2014/main" val="232552660"/>
-                    </a:ext>
-                  </a:extLst>
-                </a:gridCol>
-                <a:gridCol w="810000">
-                  <a:extLst>
-                    <a:ext uri="{9D8B030D-6E8A-4147-A177-3AD203B41FA5}">
-                      <a16:colId xmlns:a16="http://schemas.microsoft.com/office/drawing/2014/main" val="645051837"/>
-                    </a:ext>
-                  </a:extLst>
-                </a:gridCol>
-              </a:tblGrid>
-              <a:tr h="810000">
-                <a:tc>
-                  <a:txBody>
-                    <a:bodyPr/>
-                    <a:lstStyle/>
-                    <a:p>
-                      <a:pPr algn="ctr"/>
-                      <a:r>
-                        <a:rPr lang="en-US" altLang="zh-TW" dirty="0" smtClean="0"/>
-                        <a:t>0</a:t>
-                      </a:r>
-                      <a:endParaRPr lang="zh-TW" altLang="en-US" dirty="0"/>
-                    </a:p>
-                  </a:txBody>
-                  <a:tcPr anchor="ctr"/>
-                </a:tc>
-                <a:tc>
-                  <a:txBody>
-                    <a:bodyPr/>
-                    <a:lstStyle/>
-                    <a:p>
-                      <a:pPr algn="ctr"/>
-                      <a:r>
-                        <a:rPr lang="en-US" altLang="zh-TW" dirty="0" smtClean="0"/>
-                        <a:t>1</a:t>
-                      </a:r>
-                      <a:endParaRPr lang="zh-TW" altLang="en-US" dirty="0"/>
-                    </a:p>
-                  </a:txBody>
-                  <a:tcPr anchor="ctr"/>
-                </a:tc>
-                <a:tc>
-                  <a:txBody>
-                    <a:bodyPr/>
-                    <a:lstStyle/>
-                    <a:p>
-                      <a:pPr algn="ctr"/>
-                      <a:r>
-                        <a:rPr lang="en-US" altLang="zh-TW" dirty="0" smtClean="0"/>
-                        <a:t>2</a:t>
-                      </a:r>
-                      <a:endParaRPr lang="zh-TW" altLang="en-US" dirty="0"/>
-                    </a:p>
-                  </a:txBody>
-                  <a:tcPr anchor="ctr"/>
-                </a:tc>
-                <a:tc>
-                  <a:txBody>
-                    <a:bodyPr/>
-                    <a:lstStyle/>
-                    <a:p>
-                      <a:pPr algn="ctr"/>
-                      <a:r>
-                        <a:rPr lang="en-US" altLang="zh-TW" dirty="0" smtClean="0"/>
-                        <a:t>3</a:t>
-                      </a:r>
-                      <a:endParaRPr lang="zh-TW" altLang="en-US" dirty="0"/>
-                    </a:p>
-                  </a:txBody>
-                  <a:tcPr anchor="ctr"/>
-                </a:tc>
-                <a:extLst>
-                  <a:ext uri="{0D108BD9-81ED-4DB2-BD59-A6C34878D82A}">
-                    <a16:rowId xmlns:a16="http://schemas.microsoft.com/office/drawing/2014/main" val="959135872"/>
-                  </a:ext>
-                </a:extLst>
-              </a:tr>
-              <a:tr h="810000">
-                <a:tc>
-                  <a:txBody>
-                    <a:bodyPr/>
-                    <a:lstStyle/>
-                    <a:p>
-                      <a:pPr algn="ctr"/>
-                      <a:r>
-                        <a:rPr lang="en-US" altLang="zh-TW" dirty="0" smtClean="0"/>
-                        <a:t>11</a:t>
-                      </a:r>
-                      <a:endParaRPr lang="zh-TW" altLang="en-US" dirty="0"/>
-                    </a:p>
-                  </a:txBody>
-                  <a:tcPr anchor="ctr"/>
-                </a:tc>
-                <a:tc>
-                  <a:txBody>
-                    <a:bodyPr/>
-                    <a:lstStyle/>
-                    <a:p>
-                      <a:pPr algn="ctr"/>
-                      <a:r>
-                        <a:rPr lang="en-US" altLang="zh-TW" dirty="0" smtClean="0"/>
-                        <a:t>0</a:t>
-                      </a:r>
-                      <a:endParaRPr lang="zh-TW" altLang="en-US" dirty="0"/>
-                    </a:p>
-                  </a:txBody>
-                  <a:tcPr anchor="ctr">
-                    <a:solidFill>
-                      <a:schemeClr val="bg2">
-                        <a:lumMod val="90000"/>
-                      </a:schemeClr>
-                    </a:solidFill>
-                  </a:tcPr>
-                </a:tc>
-                <a:tc>
-                  <a:txBody>
-                    <a:bodyPr/>
-                    <a:lstStyle/>
-                    <a:p>
-                      <a:pPr algn="ctr"/>
-                      <a:r>
-                        <a:rPr lang="en-US" altLang="zh-TW" dirty="0" smtClean="0"/>
-                        <a:t>1</a:t>
-                      </a:r>
-                      <a:endParaRPr lang="zh-TW" altLang="en-US" dirty="0"/>
-                    </a:p>
-                  </a:txBody>
-                  <a:tcPr anchor="ctr">
-                    <a:solidFill>
-                      <a:schemeClr val="bg2">
-                        <a:lumMod val="90000"/>
-                      </a:schemeClr>
-                    </a:solidFill>
-                  </a:tcPr>
-                </a:tc>
-                <a:tc>
-                  <a:txBody>
-                    <a:bodyPr/>
-                    <a:lstStyle/>
-                    <a:p>
-                      <a:pPr algn="ctr"/>
-                      <a:r>
-                        <a:rPr lang="en-US" altLang="zh-TW" dirty="0" smtClean="0"/>
-                        <a:t>4</a:t>
-                      </a:r>
-                      <a:endParaRPr lang="zh-TW" altLang="en-US" dirty="0"/>
-                    </a:p>
-                  </a:txBody>
-                  <a:tcPr anchor="ctr"/>
-                </a:tc>
-                <a:extLst>
-                  <a:ext uri="{0D108BD9-81ED-4DB2-BD59-A6C34878D82A}">
-                    <a16:rowId xmlns:a16="http://schemas.microsoft.com/office/drawing/2014/main" val="801912394"/>
-                  </a:ext>
-                </a:extLst>
-              </a:tr>
-              <a:tr h="810000">
-                <a:tc>
-                  <a:txBody>
-                    <a:bodyPr/>
-                    <a:lstStyle/>
-                    <a:p>
-                      <a:pPr algn="ctr"/>
-                      <a:r>
-                        <a:rPr lang="en-US" altLang="zh-TW" dirty="0" smtClean="0"/>
-                        <a:t>10</a:t>
-                      </a:r>
-                      <a:endParaRPr lang="zh-TW" altLang="en-US" dirty="0"/>
-                    </a:p>
-                  </a:txBody>
-                  <a:tcPr anchor="ctr"/>
-                </a:tc>
-                <a:tc>
-                  <a:txBody>
-                    <a:bodyPr/>
-                    <a:lstStyle/>
-                    <a:p>
-                      <a:pPr algn="ctr"/>
-                      <a:r>
-                        <a:rPr lang="en-US" altLang="zh-TW" dirty="0" smtClean="0"/>
-                        <a:t>3</a:t>
-                      </a:r>
-                      <a:endParaRPr lang="zh-TW" altLang="en-US" dirty="0"/>
-                    </a:p>
-                  </a:txBody>
-                  <a:tcPr anchor="ctr">
-                    <a:solidFill>
-                      <a:schemeClr val="bg2">
-                        <a:lumMod val="90000"/>
-                      </a:schemeClr>
-                    </a:solidFill>
-                  </a:tcPr>
-                </a:tc>
-                <a:tc>
-                  <a:txBody>
-                    <a:bodyPr/>
-                    <a:lstStyle/>
-                    <a:p>
-                      <a:pPr algn="ctr"/>
-                      <a:r>
-                        <a:rPr lang="en-US" altLang="zh-TW" dirty="0" smtClean="0"/>
-                        <a:t>2</a:t>
-                      </a:r>
-                      <a:endParaRPr lang="zh-TW" altLang="en-US" dirty="0"/>
-                    </a:p>
-                  </a:txBody>
-                  <a:tcPr anchor="ctr">
-                    <a:solidFill>
-                      <a:schemeClr val="bg2">
-                        <a:lumMod val="90000"/>
-                      </a:schemeClr>
-                    </a:solidFill>
-                  </a:tcPr>
-                </a:tc>
-                <a:tc>
-                  <a:txBody>
-                    <a:bodyPr/>
-                    <a:lstStyle/>
-                    <a:p>
-                      <a:pPr algn="ctr"/>
-                      <a:r>
-                        <a:rPr lang="en-US" altLang="zh-TW" dirty="0" smtClean="0"/>
-                        <a:t>5</a:t>
-                      </a:r>
-                      <a:endParaRPr lang="zh-TW" altLang="en-US" dirty="0"/>
-                    </a:p>
-                  </a:txBody>
-                  <a:tcPr anchor="ctr"/>
-                </a:tc>
-                <a:extLst>
-                  <a:ext uri="{0D108BD9-81ED-4DB2-BD59-A6C34878D82A}">
-                    <a16:rowId xmlns:a16="http://schemas.microsoft.com/office/drawing/2014/main" val="3403392571"/>
-                  </a:ext>
-                </a:extLst>
-              </a:tr>
-              <a:tr h="810000">
-                <a:tc>
-                  <a:txBody>
-                    <a:bodyPr/>
-                    <a:lstStyle/>
-                    <a:p>
-                      <a:pPr algn="ctr"/>
-                      <a:r>
-                        <a:rPr lang="en-US" altLang="zh-TW" dirty="0" smtClean="0"/>
-                        <a:t>9</a:t>
-                      </a:r>
-                      <a:endParaRPr lang="zh-TW" altLang="en-US" dirty="0"/>
-                    </a:p>
-                  </a:txBody>
-                  <a:tcPr anchor="ctr"/>
-                </a:tc>
-                <a:tc>
-                  <a:txBody>
-                    <a:bodyPr/>
-                    <a:lstStyle/>
-                    <a:p>
-                      <a:pPr algn="ctr"/>
-                      <a:r>
-                        <a:rPr lang="en-US" altLang="zh-TW" dirty="0" smtClean="0"/>
-                        <a:t>8</a:t>
-                      </a:r>
-                      <a:endParaRPr lang="zh-TW" altLang="en-US" dirty="0"/>
-                    </a:p>
-                  </a:txBody>
-                  <a:tcPr anchor="ctr"/>
-                </a:tc>
-                <a:tc>
-                  <a:txBody>
-                    <a:bodyPr/>
-                    <a:lstStyle/>
-                    <a:p>
-                      <a:pPr algn="ctr"/>
-                      <a:r>
-                        <a:rPr lang="en-US" altLang="zh-TW" dirty="0" smtClean="0"/>
-                        <a:t>7</a:t>
-                      </a:r>
-                      <a:endParaRPr lang="zh-TW" altLang="en-US" dirty="0"/>
-                    </a:p>
-                  </a:txBody>
-                  <a:tcPr anchor="ctr"/>
-                </a:tc>
-                <a:tc>
-                  <a:txBody>
-                    <a:bodyPr/>
-                    <a:lstStyle/>
-                    <a:p>
-                      <a:pPr algn="ctr"/>
-                      <a:r>
-                        <a:rPr lang="en-US" altLang="zh-TW" dirty="0" smtClean="0"/>
-                        <a:t>6</a:t>
-                      </a:r>
-                      <a:endParaRPr lang="zh-TW" altLang="en-US" dirty="0"/>
-                    </a:p>
-                  </a:txBody>
-                  <a:tcPr anchor="ctr"/>
-                </a:tc>
-                <a:extLst>
-                  <a:ext uri="{0D108BD9-81ED-4DB2-BD59-A6C34878D82A}">
-                    <a16:rowId xmlns:a16="http://schemas.microsoft.com/office/drawing/2014/main" val="937172180"/>
-                  </a:ext>
-                </a:extLst>
-              </a:tr>
-            </a:tbl>
-          </a:graphicData>
-        </a:graphic>
-      </p:graphicFrame>
-      <p:sp>
-        <p:nvSpPr>
-          <p:cNvPr id="9" name="文字方塊 8"/>
-          <p:cNvSpPr txBox="1"/>
-          <p:nvPr/>
-        </p:nvSpPr>
-        <p:spPr>
-          <a:xfrm>
-            <a:off x="8839200" y="2475346"/>
-            <a:ext cx="812800" cy="369332"/>
-          </a:xfrm>
-          <a:prstGeom prst="rect">
-            <a:avLst/>
-          </a:prstGeom>
-          <a:noFill/>
-        </p:spPr>
-        <p:txBody>
-          <a:bodyPr wrap="square" rtlCol="0">
-            <a:spAutoFit/>
-          </a:bodyPr>
-          <a:lstStyle/>
-          <a:p>
-            <a:r>
-              <a:rPr lang="en-US" altLang="zh-TW" dirty="0" smtClean="0"/>
-              <a:t>outer</a:t>
-            </a:r>
-            <a:endParaRPr lang="zh-TW" altLang="en-US" dirty="0"/>
-          </a:p>
-        </p:txBody>
-      </p:sp>
-      <p:sp>
-        <p:nvSpPr>
-          <p:cNvPr id="10" name="文字方塊 9"/>
-          <p:cNvSpPr txBox="1"/>
-          <p:nvPr/>
-        </p:nvSpPr>
-        <p:spPr>
-          <a:xfrm>
-            <a:off x="7124872" y="3480826"/>
-            <a:ext cx="812800" cy="369332"/>
-          </a:xfrm>
-          <a:prstGeom prst="rect">
-            <a:avLst/>
-          </a:prstGeom>
-          <a:noFill/>
-        </p:spPr>
-        <p:txBody>
-          <a:bodyPr wrap="square" rtlCol="0">
-            <a:spAutoFit/>
-          </a:bodyPr>
-          <a:lstStyle/>
-          <a:p>
-            <a:r>
-              <a:rPr lang="en-US" altLang="zh-TW" dirty="0" smtClean="0"/>
-              <a:t>inner</a:t>
-            </a:r>
-            <a:endParaRPr lang="zh-TW" altLang="en-US" dirty="0"/>
-          </a:p>
-        </p:txBody>
-      </p:sp>
-    </p:spTree>
-    <p:extLst>
-      <p:ext uri="{BB962C8B-B14F-4D97-AF65-F5344CB8AC3E}">
-        <p14:creationId xmlns:p14="http://schemas.microsoft.com/office/powerpoint/2010/main" val="3351523311"/>
-      </p:ext>
-    </p:extLst>
-  </p:cSld>
-  <p:clrMapOvr>
-    <a:masterClrMapping/>
-  </p:clrMapOvr>
-</p:sld>
-</file>
-
-<file path=ppt/slides/slide2.xml><?xml version="1.0" encoding="utf-8"?>
-<p:sld xmlns:a="http://schemas.openxmlformats.org/drawingml/2006/main" xmlns:r="http://schemas.openxmlformats.org/officeDocument/2006/relationships" xmlns:p="http://schemas.openxmlformats.org/presentationml/2006/main">
-  <p:cSld>
-    <p:spTree>
-      <p:nvGrpSpPr>
-        <p:cNvPr id="1" name=""/>
-        <p:cNvGrpSpPr/>
-        <p:nvPr/>
-      </p:nvGrpSpPr>
-      <p:grpSpPr>
-        <a:xfrm>
-          <a:off x="0" y="0"/>
-          <a:ext cx="0" cy="0"/>
-          <a:chOff x="0" y="0"/>
-          <a:chExt cx="0" cy="0"/>
-        </a:xfrm>
-      </p:grpSpPr>
-      <p:sp>
-        <p:nvSpPr>
-          <p:cNvPr id="6" name="文字方塊 5"/>
-          <p:cNvSpPr txBox="1"/>
-          <p:nvPr/>
-        </p:nvSpPr>
-        <p:spPr>
-          <a:xfrm>
-            <a:off x="3603450" y="650009"/>
-            <a:ext cx="5107488" cy="1323439"/>
-          </a:xfrm>
-          <a:prstGeom prst="rect">
-            <a:avLst/>
-          </a:prstGeom>
-          <a:noFill/>
-        </p:spPr>
-        <p:txBody>
-          <a:bodyPr wrap="none" rtlCol="0">
-            <a:spAutoFit/>
-          </a:bodyPr>
-          <a:lstStyle/>
-          <a:p>
-            <a:pPr algn="ctr"/>
-            <a:r>
-              <a:rPr lang="zh-TW" altLang="en-US" sz="4000" dirty="0" smtClean="0">
-                <a:latin typeface="微軟正黑體" panose="020B0604030504040204" pitchFamily="34" charset="-120"/>
-                <a:ea typeface="微軟正黑體" panose="020B0604030504040204" pitchFamily="34" charset="-120"/>
-              </a:rPr>
-              <a:t>遊戲勝利條件</a:t>
-            </a:r>
-            <a:endParaRPr lang="en-US" altLang="zh-TW" sz="4000" dirty="0" smtClean="0">
-              <a:latin typeface="微軟正黑體" panose="020B0604030504040204" pitchFamily="34" charset="-120"/>
-              <a:ea typeface="微軟正黑體" panose="020B0604030504040204" pitchFamily="34" charset="-120"/>
-            </a:endParaRPr>
-          </a:p>
-          <a:p>
-            <a:pPr algn="ctr"/>
-            <a:r>
-              <a:rPr lang="zh-TW" altLang="en-US" sz="4000" b="1" dirty="0" smtClean="0">
-                <a:latin typeface="微軟正黑體" panose="020B0604030504040204" pitchFamily="34" charset="-120"/>
-                <a:ea typeface="微軟正黑體" panose="020B0604030504040204" pitchFamily="34" charset="-120"/>
-              </a:rPr>
-              <a:t>擊沉對方</a:t>
-            </a:r>
-            <a:r>
-              <a:rPr lang="en-US" altLang="zh-TW" sz="4000" b="1" dirty="0" smtClean="0">
-                <a:latin typeface="微軟正黑體" panose="020B0604030504040204" pitchFamily="34" charset="-120"/>
-                <a:ea typeface="微軟正黑體" panose="020B0604030504040204" pitchFamily="34" charset="-120"/>
-              </a:rPr>
-              <a:t>3</a:t>
-            </a:r>
-            <a:r>
-              <a:rPr lang="zh-TW" altLang="en-US" sz="4000" b="1" dirty="0" smtClean="0">
-                <a:latin typeface="微軟正黑體" panose="020B0604030504040204" pitchFamily="34" charset="-120"/>
-                <a:ea typeface="微軟正黑體" panose="020B0604030504040204" pitchFamily="34" charset="-120"/>
-              </a:rPr>
-              <a:t>艘以上船艦</a:t>
-            </a:r>
-            <a:endParaRPr lang="zh-TW" altLang="en-US" sz="4000" b="1" dirty="0">
-              <a:latin typeface="微軟正黑體" panose="020B0604030504040204" pitchFamily="34" charset="-120"/>
-              <a:ea typeface="微軟正黑體" panose="020B0604030504040204" pitchFamily="34" charset="-120"/>
-            </a:endParaRPr>
-          </a:p>
-        </p:txBody>
-      </p:sp>
-      <p:sp>
-        <p:nvSpPr>
-          <p:cNvPr id="2" name="矩形 1"/>
-          <p:cNvSpPr/>
-          <p:nvPr/>
-        </p:nvSpPr>
-        <p:spPr>
-          <a:xfrm>
-            <a:off x="18473" y="6262255"/>
-            <a:ext cx="12192000" cy="498763"/>
-          </a:xfrm>
-          <a:prstGeom prst="rect">
-            <a:avLst/>
-          </a:prstGeom>
-          <a:solidFill>
-            <a:schemeClr val="bg1"/>
-          </a:solidFill>
-          <a:ln>
-            <a:noFill/>
-          </a:ln>
-        </p:spPr>
-        <p:style>
-          <a:lnRef idx="2">
-            <a:schemeClr val="accent1">
-              <a:shade val="50000"/>
-            </a:schemeClr>
-          </a:lnRef>
-          <a:fillRef idx="1">
-            <a:schemeClr val="accent1"/>
-          </a:fillRef>
-          <a:effectRef idx="0">
-            <a:schemeClr val="accent1"/>
-          </a:effectRef>
-          <a:fontRef idx="minor">
-            <a:schemeClr val="lt1"/>
-          </a:fontRef>
-        </p:style>
-        <p:txBody>
-          <a:bodyPr rtlCol="0" anchor="ctr"/>
-          <a:lstStyle/>
-          <a:p>
-            <a:pPr algn="ctr"/>
-            <a:endParaRPr lang="zh-TW" altLang="en-US"/>
-          </a:p>
-        </p:txBody>
-      </p:sp>
-      <p:pic>
-        <p:nvPicPr>
-          <p:cNvPr id="3" name="圖片 2"/>
-          <p:cNvPicPr>
-            <a:picLocks noChangeAspect="1"/>
-          </p:cNvPicPr>
-          <p:nvPr/>
-        </p:nvPicPr>
-        <p:blipFill>
-          <a:blip r:embed="rId2"/>
-          <a:stretch>
-            <a:fillRect/>
-          </a:stretch>
-        </p:blipFill>
-        <p:spPr>
-          <a:xfrm>
-            <a:off x="2267410" y="2320164"/>
-            <a:ext cx="7779567" cy="3942091"/>
-          </a:xfrm>
-          <a:prstGeom prst="rect">
-            <a:avLst/>
-          </a:prstGeom>
-        </p:spPr>
-      </p:pic>
-    </p:spTree>
-    <p:extLst>
-      <p:ext uri="{BB962C8B-B14F-4D97-AF65-F5344CB8AC3E}">
-        <p14:creationId xmlns:p14="http://schemas.microsoft.com/office/powerpoint/2010/main" val="4242682005"/>
-      </p:ext>
-    </p:extLst>
-  </p:cSld>
-  <p:clrMapOvr>
-    <a:masterClrMapping/>
-  </p:clrMapOvr>
-</p:sld>
-</file>
-
-<file path=ppt/slides/slide3.xml><?xml version="1.0" encoding="utf-8"?>
-<p:sld xmlns:a="http://schemas.openxmlformats.org/drawingml/2006/main" xmlns:r="http://schemas.openxmlformats.org/officeDocument/2006/relationships" xmlns:p="http://schemas.openxmlformats.org/presentationml/2006/main">
-  <p:cSld>
-    <p:spTree>
-      <p:nvGrpSpPr>
-        <p:cNvPr id="1" name=""/>
-        <p:cNvGrpSpPr/>
-        <p:nvPr/>
-      </p:nvGrpSpPr>
-      <p:grpSpPr>
-        <a:xfrm>
-          <a:off x="0" y="0"/>
-          <a:ext cx="0" cy="0"/>
-          <a:chOff x="0" y="0"/>
-          <a:chExt cx="0" cy="0"/>
-        </a:xfrm>
-      </p:grpSpPr>
-      <p:sp>
-        <p:nvSpPr>
-          <p:cNvPr id="6" name="文字方塊 5"/>
-          <p:cNvSpPr txBox="1"/>
-          <p:nvPr/>
-        </p:nvSpPr>
-        <p:spPr>
-          <a:xfrm>
-            <a:off x="1136149" y="802409"/>
-            <a:ext cx="4166525" cy="2252924"/>
-          </a:xfrm>
-          <a:prstGeom prst="rect">
-            <a:avLst/>
-          </a:prstGeom>
-          <a:noFill/>
-        </p:spPr>
-        <p:txBody>
-          <a:bodyPr wrap="none" rtlCol="0">
-            <a:spAutoFit/>
-          </a:bodyPr>
-          <a:lstStyle/>
-          <a:p>
-            <a:pPr>
-              <a:lnSpc>
-                <a:spcPct val="130000"/>
-              </a:lnSpc>
-            </a:pPr>
-            <a:r>
-              <a:rPr lang="zh-TW" altLang="en-US" sz="3600" b="1" dirty="0" smtClean="0">
-                <a:latin typeface="微軟正黑體" panose="020B0604030504040204" pitchFamily="34" charset="-120"/>
-                <a:ea typeface="微軟正黑體" panose="020B0604030504040204" pitchFamily="34" charset="-120"/>
-              </a:rPr>
-              <a:t>遊戲步驟</a:t>
-            </a:r>
-            <a:endParaRPr lang="en-US" altLang="zh-TW" sz="3600" b="1" dirty="0" smtClean="0">
-              <a:latin typeface="微軟正黑體" panose="020B0604030504040204" pitchFamily="34" charset="-120"/>
-              <a:ea typeface="微軟正黑體" panose="020B0604030504040204" pitchFamily="34" charset="-120"/>
-            </a:endParaRPr>
-          </a:p>
-          <a:p>
-            <a:pPr marL="742950" indent="-742950">
-              <a:lnSpc>
-                <a:spcPct val="130000"/>
-              </a:lnSpc>
-              <a:buAutoNum type="arabicPeriod"/>
-            </a:pPr>
-            <a:r>
-              <a:rPr lang="zh-TW" altLang="en-US" sz="3600" dirty="0" smtClean="0">
-                <a:latin typeface="微軟正黑體" panose="020B0604030504040204" pitchFamily="34" charset="-120"/>
-                <a:ea typeface="微軟正黑體" panose="020B0604030504040204" pitchFamily="34" charset="-120"/>
-              </a:rPr>
-              <a:t>放置船艦</a:t>
-            </a:r>
-            <a:endParaRPr lang="en-US" altLang="zh-TW" sz="3600" dirty="0" smtClean="0">
-              <a:latin typeface="微軟正黑體" panose="020B0604030504040204" pitchFamily="34" charset="-120"/>
-              <a:ea typeface="微軟正黑體" panose="020B0604030504040204" pitchFamily="34" charset="-120"/>
-            </a:endParaRPr>
-          </a:p>
-          <a:p>
-            <a:pPr marL="742950" indent="-742950">
-              <a:lnSpc>
-                <a:spcPct val="130000"/>
-              </a:lnSpc>
-              <a:buAutoNum type="arabicPeriod"/>
-            </a:pPr>
-            <a:r>
-              <a:rPr lang="zh-TW" altLang="en-US" sz="3600" dirty="0" smtClean="0">
-                <a:latin typeface="微軟正黑體" panose="020B0604030504040204" pitchFamily="34" charset="-120"/>
-                <a:ea typeface="微軟正黑體" panose="020B0604030504040204" pitchFamily="34" charset="-120"/>
-              </a:rPr>
-              <a:t>放置炸彈並引爆</a:t>
-            </a:r>
-            <a:endParaRPr lang="en-US" altLang="zh-TW" sz="3600" dirty="0" smtClean="0">
-              <a:latin typeface="微軟正黑體" panose="020B0604030504040204" pitchFamily="34" charset="-120"/>
-              <a:ea typeface="微軟正黑體" panose="020B0604030504040204" pitchFamily="34" charset="-120"/>
-            </a:endParaRPr>
-          </a:p>
-        </p:txBody>
-      </p:sp>
-    </p:spTree>
-    <p:extLst>
-      <p:ext uri="{BB962C8B-B14F-4D97-AF65-F5344CB8AC3E}">
-        <p14:creationId xmlns:p14="http://schemas.microsoft.com/office/powerpoint/2010/main" val="2383523182"/>
-      </p:ext>
-    </p:extLst>
-  </p:cSld>
-  <p:clrMapOvr>
-    <a:masterClrMapping/>
-  </p:clrMapOvr>
-</p:sld>
-</file>
-
-<file path=ppt/slides/slide4.xml><?xml version="1.0" encoding="utf-8"?>
-<p:sld xmlns:a="http://schemas.openxmlformats.org/drawingml/2006/main" xmlns:r="http://schemas.openxmlformats.org/officeDocument/2006/relationships" xmlns:p="http://schemas.openxmlformats.org/presentationml/2006/main">
-  <p:cSld>
-    <p:spTree>
-      <p:nvGrpSpPr>
-        <p:cNvPr id="1" name=""/>
-        <p:cNvGrpSpPr/>
-        <p:nvPr/>
-      </p:nvGrpSpPr>
-      <p:grpSpPr>
-        <a:xfrm>
-          <a:off x="0" y="0"/>
-          <a:ext cx="0" cy="0"/>
-          <a:chOff x="0" y="0"/>
-          <a:chExt cx="0" cy="0"/>
-        </a:xfrm>
-      </p:grpSpPr>
-      <p:sp>
-        <p:nvSpPr>
-          <p:cNvPr id="6" name="文字方塊 5"/>
-          <p:cNvSpPr txBox="1"/>
-          <p:nvPr/>
-        </p:nvSpPr>
-        <p:spPr>
-          <a:xfrm>
-            <a:off x="1136149" y="802409"/>
             <a:ext cx="2781531" cy="1532727"/>
           </a:xfrm>
           <a:prstGeom prst="rect">
@@ -5111,7 +3563,7 @@
 </p:sld>
 </file>
 
-<file path=ppt/slides/slide5.xml><?xml version="1.0" encoding="utf-8"?>
+<file path=ppt/slides/slide12.xml><?xml version="1.0" encoding="utf-8"?>
 <p:sld xmlns:a="http://schemas.openxmlformats.org/drawingml/2006/main" xmlns:r="http://schemas.openxmlformats.org/officeDocument/2006/relationships" xmlns:p="http://schemas.openxmlformats.org/presentationml/2006/main">
   <p:cSld>
     <p:spTree>
@@ -5264,7 +3716,7 @@
 </p:sld>
 </file>
 
-<file path=ppt/slides/slide6.xml><?xml version="1.0" encoding="utf-8"?>
+<file path=ppt/slides/slide13.xml><?xml version="1.0" encoding="utf-8"?>
 <p:sld xmlns:a="http://schemas.openxmlformats.org/drawingml/2006/main" xmlns:r="http://schemas.openxmlformats.org/officeDocument/2006/relationships" xmlns:p="http://schemas.openxmlformats.org/presentationml/2006/main">
   <p:cSld>
     <p:spTree>
@@ -6600,7 +5052,7 @@
 </p:sld>
 </file>
 
-<file path=ppt/slides/slide7.xml><?xml version="1.0" encoding="utf-8"?>
+<file path=ppt/slides/slide14.xml><?xml version="1.0" encoding="utf-8"?>
 <p:sld xmlns:a="http://schemas.openxmlformats.org/drawingml/2006/main" xmlns:r="http://schemas.openxmlformats.org/officeDocument/2006/relationships" xmlns:p="http://schemas.openxmlformats.org/presentationml/2006/main">
   <p:cSld>
     <p:spTree>
@@ -6803,7 +5255,7 @@
 </p:sld>
 </file>
 
-<file path=ppt/slides/slide8.xml><?xml version="1.0" encoding="utf-8"?>
+<file path=ppt/slides/slide15.xml><?xml version="1.0" encoding="utf-8"?>
 <p:sld xmlns:a="http://schemas.openxmlformats.org/drawingml/2006/main" xmlns:r="http://schemas.openxmlformats.org/officeDocument/2006/relationships" xmlns:p="http://schemas.openxmlformats.org/presentationml/2006/main">
   <p:cSld>
     <p:spTree>
@@ -7034,7 +5486,7 @@
 </p:sld>
 </file>
 
-<file path=ppt/slides/slide9.xml><?xml version="1.0" encoding="utf-8"?>
+<file path=ppt/slides/slide16.xml><?xml version="1.0" encoding="utf-8"?>
 <p:sld xmlns:a="http://schemas.openxmlformats.org/drawingml/2006/main" xmlns:r="http://schemas.openxmlformats.org/officeDocument/2006/relationships" xmlns:p="http://schemas.openxmlformats.org/presentationml/2006/main">
   <p:cSld>
     <p:spTree>
@@ -7231,6 +5683,2637 @@
     <p:extLst>
       <p:ext uri="{BB962C8B-B14F-4D97-AF65-F5344CB8AC3E}">
         <p14:creationId xmlns:p14="http://schemas.microsoft.com/office/powerpoint/2010/main" val="1713599051"/>
+      </p:ext>
+    </p:extLst>
+  </p:cSld>
+  <p:clrMapOvr>
+    <a:masterClrMapping/>
+  </p:clrMapOvr>
+</p:sld>
+</file>
+
+<file path=ppt/slides/slide17.xml><?xml version="1.0" encoding="utf-8"?>
+<p:sld xmlns:a="http://schemas.openxmlformats.org/drawingml/2006/main" xmlns:r="http://schemas.openxmlformats.org/officeDocument/2006/relationships" xmlns:p="http://schemas.openxmlformats.org/presentationml/2006/main">
+  <p:cSld>
+    <p:spTree>
+      <p:nvGrpSpPr>
+        <p:cNvPr id="1" name=""/>
+        <p:cNvGrpSpPr/>
+        <p:nvPr/>
+      </p:nvGrpSpPr>
+      <p:grpSpPr>
+        <a:xfrm>
+          <a:off x="0" y="0"/>
+          <a:ext cx="0" cy="0"/>
+          <a:chOff x="0" y="0"/>
+          <a:chExt cx="0" cy="0"/>
+        </a:xfrm>
+      </p:grpSpPr>
+      <p:pic>
+        <p:nvPicPr>
+          <p:cNvPr id="3" name="圖片 2"/>
+          <p:cNvPicPr>
+            <a:picLocks noChangeAspect="1"/>
+          </p:cNvPicPr>
+          <p:nvPr/>
+        </p:nvPicPr>
+        <p:blipFill rotWithShape="1">
+          <a:blip r:embed="rId2"/>
+          <a:srcRect t="1813" b="2924"/>
+          <a:stretch/>
+        </p:blipFill>
+        <p:spPr>
+          <a:xfrm>
+            <a:off x="314915" y="2623126"/>
+            <a:ext cx="3858163" cy="3639129"/>
+          </a:xfrm>
+          <a:prstGeom prst="rect">
+            <a:avLst/>
+          </a:prstGeom>
+        </p:spPr>
+      </p:pic>
+      <p:pic>
+        <p:nvPicPr>
+          <p:cNvPr id="4" name="圖片 3"/>
+          <p:cNvPicPr>
+            <a:picLocks noChangeAspect="1"/>
+          </p:cNvPicPr>
+          <p:nvPr/>
+        </p:nvPicPr>
+        <p:blipFill>
+          <a:blip r:embed="rId3"/>
+          <a:stretch>
+            <a:fillRect/>
+          </a:stretch>
+        </p:blipFill>
+        <p:spPr>
+          <a:xfrm>
+            <a:off x="4309083" y="2606273"/>
+            <a:ext cx="3696216" cy="3686689"/>
+          </a:xfrm>
+          <a:prstGeom prst="rect">
+            <a:avLst/>
+          </a:prstGeom>
+        </p:spPr>
+      </p:pic>
+      <p:pic>
+        <p:nvPicPr>
+          <p:cNvPr id="5" name="圖片 4"/>
+          <p:cNvPicPr>
+            <a:picLocks noChangeAspect="1"/>
+          </p:cNvPicPr>
+          <p:nvPr/>
+        </p:nvPicPr>
+        <p:blipFill>
+          <a:blip r:embed="rId4"/>
+          <a:stretch>
+            <a:fillRect/>
+          </a:stretch>
+        </p:blipFill>
+        <p:spPr>
+          <a:xfrm>
+            <a:off x="8141304" y="2606273"/>
+            <a:ext cx="3753374" cy="3715268"/>
+          </a:xfrm>
+          <a:prstGeom prst="rect">
+            <a:avLst/>
+          </a:prstGeom>
+        </p:spPr>
+      </p:pic>
+      <p:sp>
+        <p:nvSpPr>
+          <p:cNvPr id="6" name="文字方塊 5"/>
+          <p:cNvSpPr txBox="1"/>
+          <p:nvPr/>
+        </p:nvSpPr>
+        <p:spPr>
+          <a:xfrm>
+            <a:off x="4525975" y="650009"/>
+            <a:ext cx="3262432" cy="1323439"/>
+          </a:xfrm>
+          <a:prstGeom prst="rect">
+            <a:avLst/>
+          </a:prstGeom>
+          <a:noFill/>
+        </p:spPr>
+        <p:txBody>
+          <a:bodyPr wrap="none" rtlCol="0">
+            <a:spAutoFit/>
+          </a:bodyPr>
+          <a:lstStyle/>
+          <a:p>
+            <a:pPr algn="ctr"/>
+            <a:r>
+              <a:rPr lang="zh-TW" altLang="en-US" sz="4000" dirty="0" smtClean="0">
+                <a:latin typeface="微軟正黑體" panose="020B0604030504040204" pitchFamily="34" charset="-120"/>
+                <a:ea typeface="微軟正黑體" panose="020B0604030504040204" pitchFamily="34" charset="-120"/>
+              </a:rPr>
+              <a:t>遊戲勝利條件</a:t>
+            </a:r>
+            <a:endParaRPr lang="en-US" altLang="zh-TW" sz="4000" dirty="0" smtClean="0">
+              <a:latin typeface="微軟正黑體" panose="020B0604030504040204" pitchFamily="34" charset="-120"/>
+              <a:ea typeface="微軟正黑體" panose="020B0604030504040204" pitchFamily="34" charset="-120"/>
+            </a:endParaRPr>
+          </a:p>
+          <a:p>
+            <a:pPr algn="ctr"/>
+            <a:r>
+              <a:rPr lang="zh-TW" altLang="en-US" sz="4000" b="1" dirty="0" smtClean="0">
+                <a:latin typeface="微軟正黑體" panose="020B0604030504040204" pitchFamily="34" charset="-120"/>
+                <a:ea typeface="微軟正黑體" panose="020B0604030504040204" pitchFamily="34" charset="-120"/>
+              </a:rPr>
+              <a:t>四點連線</a:t>
+            </a:r>
+            <a:endParaRPr lang="zh-TW" altLang="en-US" sz="4000" b="1" dirty="0">
+              <a:latin typeface="微軟正黑體" panose="020B0604030504040204" pitchFamily="34" charset="-120"/>
+              <a:ea typeface="微軟正黑體" panose="020B0604030504040204" pitchFamily="34" charset="-120"/>
+            </a:endParaRPr>
+          </a:p>
+        </p:txBody>
+      </p:sp>
+      <p:sp>
+        <p:nvSpPr>
+          <p:cNvPr id="2" name="矩形 1"/>
+          <p:cNvSpPr/>
+          <p:nvPr/>
+        </p:nvSpPr>
+        <p:spPr>
+          <a:xfrm>
+            <a:off x="18473" y="6262255"/>
+            <a:ext cx="12192000" cy="498763"/>
+          </a:xfrm>
+          <a:prstGeom prst="rect">
+            <a:avLst/>
+          </a:prstGeom>
+          <a:solidFill>
+            <a:schemeClr val="bg1"/>
+          </a:solidFill>
+          <a:ln>
+            <a:noFill/>
+          </a:ln>
+        </p:spPr>
+        <p:style>
+          <a:lnRef idx="2">
+            <a:schemeClr val="accent1">
+              <a:shade val="50000"/>
+            </a:schemeClr>
+          </a:lnRef>
+          <a:fillRef idx="1">
+            <a:schemeClr val="accent1"/>
+          </a:fillRef>
+          <a:effectRef idx="0">
+            <a:schemeClr val="accent1"/>
+          </a:effectRef>
+          <a:fontRef idx="minor">
+            <a:schemeClr val="lt1"/>
+          </a:fontRef>
+        </p:style>
+        <p:txBody>
+          <a:bodyPr rtlCol="0" anchor="ctr"/>
+          <a:lstStyle/>
+          <a:p>
+            <a:pPr algn="ctr"/>
+            <a:endParaRPr lang="zh-TW" altLang="en-US"/>
+          </a:p>
+        </p:txBody>
+      </p:sp>
+    </p:spTree>
+    <p:extLst>
+      <p:ext uri="{BB962C8B-B14F-4D97-AF65-F5344CB8AC3E}">
+        <p14:creationId xmlns:p14="http://schemas.microsoft.com/office/powerpoint/2010/main" val="1596167989"/>
+      </p:ext>
+    </p:extLst>
+  </p:cSld>
+  <p:clrMapOvr>
+    <a:masterClrMapping/>
+  </p:clrMapOvr>
+</p:sld>
+</file>
+
+<file path=ppt/slides/slide18.xml><?xml version="1.0" encoding="utf-8"?>
+<p:sld xmlns:a="http://schemas.openxmlformats.org/drawingml/2006/main" xmlns:r="http://schemas.openxmlformats.org/officeDocument/2006/relationships" xmlns:p="http://schemas.openxmlformats.org/presentationml/2006/main">
+  <p:cSld>
+    <p:spTree>
+      <p:nvGrpSpPr>
+        <p:cNvPr id="1" name=""/>
+        <p:cNvGrpSpPr/>
+        <p:nvPr/>
+      </p:nvGrpSpPr>
+      <p:grpSpPr>
+        <a:xfrm>
+          <a:off x="0" y="0"/>
+          <a:ext cx="0" cy="0"/>
+          <a:chOff x="0" y="0"/>
+          <a:chExt cx="0" cy="0"/>
+        </a:xfrm>
+      </p:grpSpPr>
+      <p:sp>
+        <p:nvSpPr>
+          <p:cNvPr id="6" name="文字方塊 5"/>
+          <p:cNvSpPr txBox="1"/>
+          <p:nvPr/>
+        </p:nvSpPr>
+        <p:spPr>
+          <a:xfrm>
+            <a:off x="1136149" y="802409"/>
+            <a:ext cx="9919703" cy="3693319"/>
+          </a:xfrm>
+          <a:prstGeom prst="rect">
+            <a:avLst/>
+          </a:prstGeom>
+          <a:noFill/>
+        </p:spPr>
+        <p:txBody>
+          <a:bodyPr wrap="none" rtlCol="0">
+            <a:spAutoFit/>
+          </a:bodyPr>
+          <a:lstStyle/>
+          <a:p>
+            <a:pPr>
+              <a:lnSpc>
+                <a:spcPct val="130000"/>
+              </a:lnSpc>
+            </a:pPr>
+            <a:r>
+              <a:rPr lang="zh-TW" altLang="en-US" sz="3600" b="1" dirty="0" smtClean="0">
+                <a:latin typeface="微軟正黑體" panose="020B0604030504040204" pitchFamily="34" charset="-120"/>
+                <a:ea typeface="微軟正黑體" panose="020B0604030504040204" pitchFamily="34" charset="-120"/>
+              </a:rPr>
+              <a:t>遊戲步驟</a:t>
+            </a:r>
+            <a:endParaRPr lang="en-US" altLang="zh-TW" sz="3600" b="1" dirty="0" smtClean="0">
+              <a:latin typeface="微軟正黑體" panose="020B0604030504040204" pitchFamily="34" charset="-120"/>
+              <a:ea typeface="微軟正黑體" panose="020B0604030504040204" pitchFamily="34" charset="-120"/>
+            </a:endParaRPr>
+          </a:p>
+          <a:p>
+            <a:pPr marL="742950" indent="-742950">
+              <a:lnSpc>
+                <a:spcPct val="130000"/>
+              </a:lnSpc>
+              <a:buAutoNum type="arabicPeriod"/>
+            </a:pPr>
+            <a:r>
+              <a:rPr lang="en-US" altLang="zh-TW" sz="3600" dirty="0" smtClean="0">
+                <a:latin typeface="微軟正黑體" panose="020B0604030504040204" pitchFamily="34" charset="-120"/>
+                <a:ea typeface="微軟正黑體" panose="020B0604030504040204" pitchFamily="34" charset="-120"/>
+              </a:rPr>
+              <a:t>(optional) </a:t>
+            </a:r>
+            <a:r>
+              <a:rPr lang="zh-TW" altLang="en-US" sz="3600" dirty="0" smtClean="0">
+                <a:latin typeface="微軟正黑體" panose="020B0604030504040204" pitchFamily="34" charset="-120"/>
+                <a:ea typeface="微軟正黑體" panose="020B0604030504040204" pitchFamily="34" charset="-120"/>
+              </a:rPr>
+              <a:t>移動別人的棋子</a:t>
+            </a:r>
+            <a:r>
+              <a:rPr lang="en-US" altLang="zh-TW" sz="3600" dirty="0" smtClean="0">
+                <a:latin typeface="微軟正黑體" panose="020B0604030504040204" pitchFamily="34" charset="-120"/>
+                <a:ea typeface="微軟正黑體" panose="020B0604030504040204" pitchFamily="34" charset="-120"/>
+              </a:rPr>
+              <a:t>(</a:t>
+            </a:r>
+            <a:r>
+              <a:rPr lang="zh-TW" altLang="en-US" sz="3600" dirty="0" smtClean="0">
+                <a:latin typeface="微軟正黑體" panose="020B0604030504040204" pitchFamily="34" charset="-120"/>
+                <a:ea typeface="微軟正黑體" panose="020B0604030504040204" pitchFamily="34" charset="-120"/>
+              </a:rPr>
+              <a:t>僅上下左右一格</a:t>
+            </a:r>
+            <a:r>
+              <a:rPr lang="en-US" altLang="zh-TW" sz="3600" dirty="0" smtClean="0">
+                <a:latin typeface="微軟正黑體" panose="020B0604030504040204" pitchFamily="34" charset="-120"/>
+                <a:ea typeface="微軟正黑體" panose="020B0604030504040204" pitchFamily="34" charset="-120"/>
+              </a:rPr>
+              <a:t>)</a:t>
+            </a:r>
+          </a:p>
+          <a:p>
+            <a:pPr marL="742950" indent="-742950">
+              <a:lnSpc>
+                <a:spcPct val="130000"/>
+              </a:lnSpc>
+              <a:buAutoNum type="arabicPeriod"/>
+            </a:pPr>
+            <a:r>
+              <a:rPr lang="zh-TW" altLang="en-US" sz="3600" dirty="0" smtClean="0">
+                <a:latin typeface="微軟正黑體" panose="020B0604030504040204" pitchFamily="34" charset="-120"/>
+                <a:ea typeface="微軟正黑體" panose="020B0604030504040204" pitchFamily="34" charset="-120"/>
+              </a:rPr>
+              <a:t>放一個自己的棋子</a:t>
+            </a:r>
+            <a:endParaRPr lang="en-US" altLang="zh-TW" sz="3600" dirty="0" smtClean="0">
+              <a:latin typeface="微軟正黑體" panose="020B0604030504040204" pitchFamily="34" charset="-120"/>
+              <a:ea typeface="微軟正黑體" panose="020B0604030504040204" pitchFamily="34" charset="-120"/>
+            </a:endParaRPr>
+          </a:p>
+          <a:p>
+            <a:pPr marL="742950" indent="-742950">
+              <a:lnSpc>
+                <a:spcPct val="130000"/>
+              </a:lnSpc>
+              <a:buAutoNum type="arabicPeriod"/>
+            </a:pPr>
+            <a:r>
+              <a:rPr lang="en-US" altLang="zh-TW" sz="3600" dirty="0" smtClean="0">
+                <a:latin typeface="微軟正黑體" panose="020B0604030504040204" pitchFamily="34" charset="-120"/>
+                <a:ea typeface="微軟正黑體" panose="020B0604030504040204" pitchFamily="34" charset="-120"/>
+              </a:rPr>
+              <a:t>(must)</a:t>
+            </a:r>
+            <a:r>
+              <a:rPr lang="zh-TW" altLang="en-US" sz="3600" dirty="0" smtClean="0">
+                <a:latin typeface="微軟正黑體" panose="020B0604030504040204" pitchFamily="34" charset="-120"/>
+                <a:ea typeface="微軟正黑體" panose="020B0604030504040204" pitchFamily="34" charset="-120"/>
+              </a:rPr>
+              <a:t> 旋轉棋盤</a:t>
+            </a:r>
+            <a:endParaRPr lang="en-US" altLang="zh-TW" sz="3600" dirty="0" smtClean="0">
+              <a:latin typeface="微軟正黑體" panose="020B0604030504040204" pitchFamily="34" charset="-120"/>
+              <a:ea typeface="微軟正黑體" panose="020B0604030504040204" pitchFamily="34" charset="-120"/>
+            </a:endParaRPr>
+          </a:p>
+          <a:p>
+            <a:pPr marL="742950" indent="-742950">
+              <a:lnSpc>
+                <a:spcPct val="130000"/>
+              </a:lnSpc>
+              <a:buAutoNum type="arabicPeriod"/>
+            </a:pPr>
+            <a:endParaRPr lang="zh-TW" altLang="en-US" sz="3600" dirty="0">
+              <a:latin typeface="微軟正黑體" panose="020B0604030504040204" pitchFamily="34" charset="-120"/>
+              <a:ea typeface="微軟正黑體" panose="020B0604030504040204" pitchFamily="34" charset="-120"/>
+            </a:endParaRPr>
+          </a:p>
+        </p:txBody>
+      </p:sp>
+    </p:spTree>
+    <p:extLst>
+      <p:ext uri="{BB962C8B-B14F-4D97-AF65-F5344CB8AC3E}">
+        <p14:creationId xmlns:p14="http://schemas.microsoft.com/office/powerpoint/2010/main" val="2571292258"/>
+      </p:ext>
+    </p:extLst>
+  </p:cSld>
+  <p:clrMapOvr>
+    <a:masterClrMapping/>
+  </p:clrMapOvr>
+</p:sld>
+</file>
+
+<file path=ppt/slides/slide19.xml><?xml version="1.0" encoding="utf-8"?>
+<p:sld xmlns:a="http://schemas.openxmlformats.org/drawingml/2006/main" xmlns:r="http://schemas.openxmlformats.org/officeDocument/2006/relationships" xmlns:p="http://schemas.openxmlformats.org/presentationml/2006/main">
+  <p:cSld>
+    <p:spTree>
+      <p:nvGrpSpPr>
+        <p:cNvPr id="1" name=""/>
+        <p:cNvGrpSpPr/>
+        <p:nvPr/>
+      </p:nvGrpSpPr>
+      <p:grpSpPr>
+        <a:xfrm>
+          <a:off x="0" y="0"/>
+          <a:ext cx="0" cy="0"/>
+          <a:chOff x="0" y="0"/>
+          <a:chExt cx="0" cy="0"/>
+        </a:xfrm>
+      </p:grpSpPr>
+      <p:sp>
+        <p:nvSpPr>
+          <p:cNvPr id="6" name="文字方塊 5"/>
+          <p:cNvSpPr txBox="1"/>
+          <p:nvPr/>
+        </p:nvSpPr>
+        <p:spPr>
+          <a:xfrm>
+            <a:off x="1136149" y="802409"/>
+            <a:ext cx="9919703" cy="2252924"/>
+          </a:xfrm>
+          <a:prstGeom prst="rect">
+            <a:avLst/>
+          </a:prstGeom>
+          <a:noFill/>
+        </p:spPr>
+        <p:txBody>
+          <a:bodyPr wrap="none" rtlCol="0">
+            <a:spAutoFit/>
+          </a:bodyPr>
+          <a:lstStyle/>
+          <a:p>
+            <a:pPr>
+              <a:lnSpc>
+                <a:spcPct val="130000"/>
+              </a:lnSpc>
+            </a:pPr>
+            <a:r>
+              <a:rPr lang="zh-TW" altLang="en-US" sz="3600" b="1" dirty="0" smtClean="0">
+                <a:latin typeface="微軟正黑體" panose="020B0604030504040204" pitchFamily="34" charset="-120"/>
+                <a:ea typeface="微軟正黑體" panose="020B0604030504040204" pitchFamily="34" charset="-120"/>
+              </a:rPr>
+              <a:t>遊戲步驟</a:t>
+            </a:r>
+            <a:endParaRPr lang="en-US" altLang="zh-TW" sz="3600" b="1" dirty="0" smtClean="0">
+              <a:latin typeface="微軟正黑體" panose="020B0604030504040204" pitchFamily="34" charset="-120"/>
+              <a:ea typeface="微軟正黑體" panose="020B0604030504040204" pitchFamily="34" charset="-120"/>
+            </a:endParaRPr>
+          </a:p>
+          <a:p>
+            <a:pPr marL="742950" indent="-742950">
+              <a:lnSpc>
+                <a:spcPct val="130000"/>
+              </a:lnSpc>
+              <a:buAutoNum type="arabicPeriod"/>
+            </a:pPr>
+            <a:r>
+              <a:rPr lang="en-US" altLang="zh-TW" sz="3600" dirty="0" smtClean="0">
+                <a:latin typeface="微軟正黑體" panose="020B0604030504040204" pitchFamily="34" charset="-120"/>
+                <a:ea typeface="微軟正黑體" panose="020B0604030504040204" pitchFamily="34" charset="-120"/>
+              </a:rPr>
+              <a:t>(optional) </a:t>
+            </a:r>
+            <a:r>
+              <a:rPr lang="zh-TW" altLang="en-US" sz="3600" dirty="0" smtClean="0">
+                <a:latin typeface="微軟正黑體" panose="020B0604030504040204" pitchFamily="34" charset="-120"/>
+                <a:ea typeface="微軟正黑體" panose="020B0604030504040204" pitchFamily="34" charset="-120"/>
+              </a:rPr>
+              <a:t>移動別人的棋子</a:t>
+            </a:r>
+            <a:r>
+              <a:rPr lang="en-US" altLang="zh-TW" sz="3600" dirty="0" smtClean="0">
+                <a:latin typeface="微軟正黑體" panose="020B0604030504040204" pitchFamily="34" charset="-120"/>
+                <a:ea typeface="微軟正黑體" panose="020B0604030504040204" pitchFamily="34" charset="-120"/>
+              </a:rPr>
+              <a:t>(</a:t>
+            </a:r>
+            <a:r>
+              <a:rPr lang="zh-TW" altLang="en-US" sz="3600" dirty="0" smtClean="0">
+                <a:latin typeface="微軟正黑體" panose="020B0604030504040204" pitchFamily="34" charset="-120"/>
+                <a:ea typeface="微軟正黑體" panose="020B0604030504040204" pitchFamily="34" charset="-120"/>
+              </a:rPr>
+              <a:t>僅上下左右一格</a:t>
+            </a:r>
+            <a:r>
+              <a:rPr lang="en-US" altLang="zh-TW" sz="3600" dirty="0" smtClean="0">
+                <a:latin typeface="微軟正黑體" panose="020B0604030504040204" pitchFamily="34" charset="-120"/>
+                <a:ea typeface="微軟正黑體" panose="020B0604030504040204" pitchFamily="34" charset="-120"/>
+              </a:rPr>
+              <a:t>)</a:t>
+            </a:r>
+          </a:p>
+          <a:p>
+            <a:pPr marL="742950" indent="-742950">
+              <a:lnSpc>
+                <a:spcPct val="130000"/>
+              </a:lnSpc>
+              <a:buAutoNum type="arabicPeriod"/>
+            </a:pPr>
+            <a:endParaRPr lang="zh-TW" altLang="en-US" sz="3600" dirty="0">
+              <a:latin typeface="微軟正黑體" panose="020B0604030504040204" pitchFamily="34" charset="-120"/>
+              <a:ea typeface="微軟正黑體" panose="020B0604030504040204" pitchFamily="34" charset="-120"/>
+            </a:endParaRPr>
+          </a:p>
+        </p:txBody>
+      </p:sp>
+      <p:grpSp>
+        <p:nvGrpSpPr>
+          <p:cNvPr id="4" name="群組 3"/>
+          <p:cNvGrpSpPr/>
+          <p:nvPr/>
+        </p:nvGrpSpPr>
+        <p:grpSpPr>
+          <a:xfrm>
+            <a:off x="2405484" y="2471487"/>
+            <a:ext cx="7381032" cy="3591426"/>
+            <a:chOff x="1809249" y="2471487"/>
+            <a:chExt cx="7381032" cy="3591426"/>
+          </a:xfrm>
+        </p:grpSpPr>
+        <p:pic>
+          <p:nvPicPr>
+            <p:cNvPr id="2" name="圖片 1"/>
+            <p:cNvPicPr>
+              <a:picLocks noChangeAspect="1"/>
+            </p:cNvPicPr>
+            <p:nvPr/>
+          </p:nvPicPr>
+          <p:blipFill>
+            <a:blip r:embed="rId2"/>
+            <a:stretch>
+              <a:fillRect/>
+            </a:stretch>
+          </p:blipFill>
+          <p:spPr>
+            <a:xfrm>
+              <a:off x="1809249" y="2471487"/>
+              <a:ext cx="3572374" cy="3591426"/>
+            </a:xfrm>
+            <a:prstGeom prst="rect">
+              <a:avLst/>
+            </a:prstGeom>
+          </p:spPr>
+        </p:pic>
+        <p:pic>
+          <p:nvPicPr>
+            <p:cNvPr id="3" name="圖片 2"/>
+            <p:cNvPicPr>
+              <a:picLocks noChangeAspect="1"/>
+            </p:cNvPicPr>
+            <p:nvPr/>
+          </p:nvPicPr>
+          <p:blipFill>
+            <a:blip r:embed="rId3"/>
+            <a:stretch>
+              <a:fillRect/>
+            </a:stretch>
+          </p:blipFill>
+          <p:spPr>
+            <a:xfrm>
+              <a:off x="5694118" y="2471487"/>
+              <a:ext cx="3496163" cy="3524742"/>
+            </a:xfrm>
+            <a:prstGeom prst="rect">
+              <a:avLst/>
+            </a:prstGeom>
+          </p:spPr>
+        </p:pic>
+      </p:grpSp>
+    </p:spTree>
+    <p:extLst>
+      <p:ext uri="{BB962C8B-B14F-4D97-AF65-F5344CB8AC3E}">
+        <p14:creationId xmlns:p14="http://schemas.microsoft.com/office/powerpoint/2010/main" val="2800153044"/>
+      </p:ext>
+    </p:extLst>
+  </p:cSld>
+  <p:clrMapOvr>
+    <a:masterClrMapping/>
+  </p:clrMapOvr>
+</p:sld>
+</file>
+
+<file path=ppt/slides/slide2.xml><?xml version="1.0" encoding="utf-8"?>
+<p:sld xmlns:a="http://schemas.openxmlformats.org/drawingml/2006/main" xmlns:r="http://schemas.openxmlformats.org/officeDocument/2006/relationships" xmlns:p="http://schemas.openxmlformats.org/presentationml/2006/main">
+  <p:cSld>
+    <p:spTree>
+      <p:nvGrpSpPr>
+        <p:cNvPr id="1" name=""/>
+        <p:cNvGrpSpPr/>
+        <p:nvPr/>
+      </p:nvGrpSpPr>
+      <p:grpSpPr>
+        <a:xfrm>
+          <a:off x="0" y="0"/>
+          <a:ext cx="0" cy="0"/>
+          <a:chOff x="0" y="0"/>
+          <a:chExt cx="0" cy="0"/>
+        </a:xfrm>
+      </p:grpSpPr>
+      <p:sp>
+        <p:nvSpPr>
+          <p:cNvPr id="6" name="文字方塊 5"/>
+          <p:cNvSpPr txBox="1"/>
+          <p:nvPr/>
+        </p:nvSpPr>
+        <p:spPr>
+          <a:xfrm>
+            <a:off x="1136149" y="802409"/>
+            <a:ext cx="3243196" cy="2973122"/>
+          </a:xfrm>
+          <a:prstGeom prst="rect">
+            <a:avLst/>
+          </a:prstGeom>
+          <a:noFill/>
+        </p:spPr>
+        <p:txBody>
+          <a:bodyPr wrap="none" rtlCol="0">
+            <a:spAutoFit/>
+          </a:bodyPr>
+          <a:lstStyle/>
+          <a:p>
+            <a:pPr>
+              <a:lnSpc>
+                <a:spcPct val="130000"/>
+              </a:lnSpc>
+            </a:pPr>
+            <a:r>
+              <a:rPr lang="zh-TW" altLang="en-US" sz="3600" b="1" dirty="0" smtClean="0">
+                <a:latin typeface="微軟正黑體" panose="020B0604030504040204" pitchFamily="34" charset="-120"/>
+                <a:ea typeface="微軟正黑體" panose="020B0604030504040204" pitchFamily="34" charset="-120"/>
+              </a:rPr>
+              <a:t>遊戲步驟</a:t>
+            </a:r>
+            <a:endParaRPr lang="en-US" altLang="zh-TW" sz="3600" b="1" dirty="0" smtClean="0">
+              <a:latin typeface="微軟正黑體" panose="020B0604030504040204" pitchFamily="34" charset="-120"/>
+              <a:ea typeface="微軟正黑體" panose="020B0604030504040204" pitchFamily="34" charset="-120"/>
+            </a:endParaRPr>
+          </a:p>
+          <a:p>
+            <a:pPr marL="742950" indent="-742950">
+              <a:lnSpc>
+                <a:spcPct val="130000"/>
+              </a:lnSpc>
+              <a:buAutoNum type="arabicPeriod"/>
+            </a:pPr>
+            <a:r>
+              <a:rPr lang="zh-TW" altLang="en-US" sz="3600" dirty="0" smtClean="0">
+                <a:latin typeface="微軟正黑體" panose="020B0604030504040204" pitchFamily="34" charset="-120"/>
+                <a:ea typeface="微軟正黑體" panose="020B0604030504040204" pitchFamily="34" charset="-120"/>
+              </a:rPr>
+              <a:t>隊長出題目</a:t>
+            </a:r>
+            <a:endParaRPr lang="en-US" altLang="zh-TW" sz="3600" dirty="0" smtClean="0">
+              <a:latin typeface="微軟正黑體" panose="020B0604030504040204" pitchFamily="34" charset="-120"/>
+              <a:ea typeface="微軟正黑體" panose="020B0604030504040204" pitchFamily="34" charset="-120"/>
+            </a:endParaRPr>
+          </a:p>
+          <a:p>
+            <a:pPr marL="742950" indent="-742950">
+              <a:lnSpc>
+                <a:spcPct val="130000"/>
+              </a:lnSpc>
+              <a:buAutoNum type="arabicPeriod"/>
+            </a:pPr>
+            <a:r>
+              <a:rPr lang="zh-TW" altLang="en-US" sz="3600" dirty="0" smtClean="0">
+                <a:latin typeface="微軟正黑體" panose="020B0604030504040204" pitchFamily="34" charset="-120"/>
+                <a:ea typeface="微軟正黑體" panose="020B0604030504040204" pitchFamily="34" charset="-120"/>
+              </a:rPr>
+              <a:t>隊員猜刻度</a:t>
+            </a:r>
+            <a:endParaRPr lang="en-US" altLang="zh-TW" sz="3600" dirty="0" smtClean="0">
+              <a:latin typeface="微軟正黑體" panose="020B0604030504040204" pitchFamily="34" charset="-120"/>
+              <a:ea typeface="微軟正黑體" panose="020B0604030504040204" pitchFamily="34" charset="-120"/>
+            </a:endParaRPr>
+          </a:p>
+          <a:p>
+            <a:pPr marL="742950" indent="-742950">
+              <a:lnSpc>
+                <a:spcPct val="130000"/>
+              </a:lnSpc>
+              <a:buAutoNum type="arabicPeriod"/>
+            </a:pPr>
+            <a:r>
+              <a:rPr lang="zh-TW" altLang="en-US" sz="3600" dirty="0" smtClean="0">
+                <a:latin typeface="微軟正黑體" panose="020B0604030504040204" pitchFamily="34" charset="-120"/>
+                <a:ea typeface="微軟正黑體" panose="020B0604030504040204" pitchFamily="34" charset="-120"/>
+              </a:rPr>
+              <a:t>分數結算</a:t>
+            </a:r>
+            <a:endParaRPr lang="en-US" altLang="zh-TW" sz="3600" dirty="0" smtClean="0">
+              <a:latin typeface="微軟正黑體" panose="020B0604030504040204" pitchFamily="34" charset="-120"/>
+              <a:ea typeface="微軟正黑體" panose="020B0604030504040204" pitchFamily="34" charset="-120"/>
+            </a:endParaRPr>
+          </a:p>
+        </p:txBody>
+      </p:sp>
+    </p:spTree>
+    <p:extLst>
+      <p:ext uri="{BB962C8B-B14F-4D97-AF65-F5344CB8AC3E}">
+        <p14:creationId xmlns:p14="http://schemas.microsoft.com/office/powerpoint/2010/main" val="2391942492"/>
+      </p:ext>
+    </p:extLst>
+  </p:cSld>
+  <p:clrMapOvr>
+    <a:masterClrMapping/>
+  </p:clrMapOvr>
+</p:sld>
+</file>
+
+<file path=ppt/slides/slide20.xml><?xml version="1.0" encoding="utf-8"?>
+<p:sld xmlns:a="http://schemas.openxmlformats.org/drawingml/2006/main" xmlns:r="http://schemas.openxmlformats.org/officeDocument/2006/relationships" xmlns:p="http://schemas.openxmlformats.org/presentationml/2006/main">
+  <p:cSld>
+    <p:spTree>
+      <p:nvGrpSpPr>
+        <p:cNvPr id="1" name=""/>
+        <p:cNvGrpSpPr/>
+        <p:nvPr/>
+      </p:nvGrpSpPr>
+      <p:grpSpPr>
+        <a:xfrm>
+          <a:off x="0" y="0"/>
+          <a:ext cx="0" cy="0"/>
+          <a:chOff x="0" y="0"/>
+          <a:chExt cx="0" cy="0"/>
+        </a:xfrm>
+      </p:grpSpPr>
+      <p:sp>
+        <p:nvSpPr>
+          <p:cNvPr id="6" name="文字方塊 5"/>
+          <p:cNvSpPr txBox="1"/>
+          <p:nvPr/>
+        </p:nvSpPr>
+        <p:spPr>
+          <a:xfrm>
+            <a:off x="1136149" y="802409"/>
+            <a:ext cx="4628190" cy="2252924"/>
+          </a:xfrm>
+          <a:prstGeom prst="rect">
+            <a:avLst/>
+          </a:prstGeom>
+          <a:noFill/>
+        </p:spPr>
+        <p:txBody>
+          <a:bodyPr wrap="none" rtlCol="0">
+            <a:spAutoFit/>
+          </a:bodyPr>
+          <a:lstStyle/>
+          <a:p>
+            <a:pPr>
+              <a:lnSpc>
+                <a:spcPct val="130000"/>
+              </a:lnSpc>
+            </a:pPr>
+            <a:r>
+              <a:rPr lang="zh-TW" altLang="en-US" sz="3600" b="1" dirty="0" smtClean="0">
+                <a:latin typeface="微軟正黑體" panose="020B0604030504040204" pitchFamily="34" charset="-120"/>
+                <a:ea typeface="微軟正黑體" panose="020B0604030504040204" pitchFamily="34" charset="-120"/>
+              </a:rPr>
+              <a:t>遊戲步驟</a:t>
+            </a:r>
+            <a:endParaRPr lang="en-US" altLang="zh-TW" sz="3600" b="1" dirty="0" smtClean="0">
+              <a:latin typeface="微軟正黑體" panose="020B0604030504040204" pitchFamily="34" charset="-120"/>
+              <a:ea typeface="微軟正黑體" panose="020B0604030504040204" pitchFamily="34" charset="-120"/>
+            </a:endParaRPr>
+          </a:p>
+          <a:p>
+            <a:pPr marL="742950" indent="-742950">
+              <a:lnSpc>
+                <a:spcPct val="130000"/>
+              </a:lnSpc>
+              <a:buFont typeface="+mj-lt"/>
+              <a:buAutoNum type="arabicPeriod" startAt="2"/>
+            </a:pPr>
+            <a:r>
+              <a:rPr lang="zh-TW" altLang="en-US" sz="3600" dirty="0" smtClean="0">
+                <a:latin typeface="微軟正黑體" panose="020B0604030504040204" pitchFamily="34" charset="-120"/>
+                <a:ea typeface="微軟正黑體" panose="020B0604030504040204" pitchFamily="34" charset="-120"/>
+              </a:rPr>
+              <a:t>放一個自己的棋子</a:t>
+            </a:r>
+            <a:endParaRPr lang="en-US" altLang="zh-TW" sz="3600" dirty="0" smtClean="0">
+              <a:latin typeface="微軟正黑體" panose="020B0604030504040204" pitchFamily="34" charset="-120"/>
+              <a:ea typeface="微軟正黑體" panose="020B0604030504040204" pitchFamily="34" charset="-120"/>
+            </a:endParaRPr>
+          </a:p>
+          <a:p>
+            <a:pPr>
+              <a:lnSpc>
+                <a:spcPct val="130000"/>
+              </a:lnSpc>
+            </a:pPr>
+            <a:endParaRPr lang="zh-TW" altLang="en-US" sz="3600" dirty="0">
+              <a:latin typeface="微軟正黑體" panose="020B0604030504040204" pitchFamily="34" charset="-120"/>
+              <a:ea typeface="微軟正黑體" panose="020B0604030504040204" pitchFamily="34" charset="-120"/>
+            </a:endParaRPr>
+          </a:p>
+        </p:txBody>
+      </p:sp>
+      <p:pic>
+        <p:nvPicPr>
+          <p:cNvPr id="2" name="圖片 1"/>
+          <p:cNvPicPr>
+            <a:picLocks noChangeAspect="1"/>
+          </p:cNvPicPr>
+          <p:nvPr/>
+        </p:nvPicPr>
+        <p:blipFill>
+          <a:blip r:embed="rId2"/>
+          <a:stretch>
+            <a:fillRect/>
+          </a:stretch>
+        </p:blipFill>
+        <p:spPr>
+          <a:xfrm>
+            <a:off x="4324103" y="2487366"/>
+            <a:ext cx="3543795" cy="3534268"/>
+          </a:xfrm>
+          <a:prstGeom prst="rect">
+            <a:avLst/>
+          </a:prstGeom>
+        </p:spPr>
+      </p:pic>
+    </p:spTree>
+    <p:extLst>
+      <p:ext uri="{BB962C8B-B14F-4D97-AF65-F5344CB8AC3E}">
+        <p14:creationId xmlns:p14="http://schemas.microsoft.com/office/powerpoint/2010/main" val="1077873990"/>
+      </p:ext>
+    </p:extLst>
+  </p:cSld>
+  <p:clrMapOvr>
+    <a:masterClrMapping/>
+  </p:clrMapOvr>
+</p:sld>
+</file>
+
+<file path=ppt/slides/slide21.xml><?xml version="1.0" encoding="utf-8"?>
+<p:sld xmlns:a="http://schemas.openxmlformats.org/drawingml/2006/main" xmlns:r="http://schemas.openxmlformats.org/officeDocument/2006/relationships" xmlns:p="http://schemas.openxmlformats.org/presentationml/2006/main">
+  <p:cSld>
+    <p:spTree>
+      <p:nvGrpSpPr>
+        <p:cNvPr id="1" name=""/>
+        <p:cNvGrpSpPr/>
+        <p:nvPr/>
+      </p:nvGrpSpPr>
+      <p:grpSpPr>
+        <a:xfrm>
+          <a:off x="0" y="0"/>
+          <a:ext cx="0" cy="0"/>
+          <a:chOff x="0" y="0"/>
+          <a:chExt cx="0" cy="0"/>
+        </a:xfrm>
+      </p:grpSpPr>
+      <p:sp>
+        <p:nvSpPr>
+          <p:cNvPr id="6" name="文字方塊 5"/>
+          <p:cNvSpPr txBox="1"/>
+          <p:nvPr/>
+        </p:nvSpPr>
+        <p:spPr>
+          <a:xfrm>
+            <a:off x="1136149" y="802409"/>
+            <a:ext cx="4277133" cy="2252924"/>
+          </a:xfrm>
+          <a:prstGeom prst="rect">
+            <a:avLst/>
+          </a:prstGeom>
+          <a:noFill/>
+        </p:spPr>
+        <p:txBody>
+          <a:bodyPr wrap="none" rtlCol="0">
+            <a:spAutoFit/>
+          </a:bodyPr>
+          <a:lstStyle/>
+          <a:p>
+            <a:pPr>
+              <a:lnSpc>
+                <a:spcPct val="130000"/>
+              </a:lnSpc>
+            </a:pPr>
+            <a:r>
+              <a:rPr lang="zh-TW" altLang="en-US" sz="3600" b="1" dirty="0" smtClean="0">
+                <a:latin typeface="微軟正黑體" panose="020B0604030504040204" pitchFamily="34" charset="-120"/>
+                <a:ea typeface="微軟正黑體" panose="020B0604030504040204" pitchFamily="34" charset="-120"/>
+              </a:rPr>
+              <a:t>遊戲步驟</a:t>
+            </a:r>
+            <a:endParaRPr lang="en-US" altLang="zh-TW" sz="3600" b="1" dirty="0" smtClean="0">
+              <a:latin typeface="微軟正黑體" panose="020B0604030504040204" pitchFamily="34" charset="-120"/>
+              <a:ea typeface="微軟正黑體" panose="020B0604030504040204" pitchFamily="34" charset="-120"/>
+            </a:endParaRPr>
+          </a:p>
+          <a:p>
+            <a:pPr marL="742950" indent="-742950">
+              <a:lnSpc>
+                <a:spcPct val="130000"/>
+              </a:lnSpc>
+              <a:buFont typeface="+mj-lt"/>
+              <a:buAutoNum type="arabicPeriod" startAt="3"/>
+            </a:pPr>
+            <a:r>
+              <a:rPr lang="en-US" altLang="zh-TW" sz="3600" dirty="0" smtClean="0">
+                <a:latin typeface="微軟正黑體" panose="020B0604030504040204" pitchFamily="34" charset="-120"/>
+                <a:ea typeface="微軟正黑體" panose="020B0604030504040204" pitchFamily="34" charset="-120"/>
+              </a:rPr>
+              <a:t>(must)</a:t>
+            </a:r>
+            <a:r>
+              <a:rPr lang="zh-TW" altLang="en-US" sz="3600" dirty="0" smtClean="0">
+                <a:latin typeface="微軟正黑體" panose="020B0604030504040204" pitchFamily="34" charset="-120"/>
+                <a:ea typeface="微軟正黑體" panose="020B0604030504040204" pitchFamily="34" charset="-120"/>
+              </a:rPr>
+              <a:t> 旋轉棋盤</a:t>
+            </a:r>
+            <a:endParaRPr lang="en-US" altLang="zh-TW" sz="3600" dirty="0" smtClean="0">
+              <a:latin typeface="微軟正黑體" panose="020B0604030504040204" pitchFamily="34" charset="-120"/>
+              <a:ea typeface="微軟正黑體" panose="020B0604030504040204" pitchFamily="34" charset="-120"/>
+            </a:endParaRPr>
+          </a:p>
+          <a:p>
+            <a:pPr>
+              <a:lnSpc>
+                <a:spcPct val="130000"/>
+              </a:lnSpc>
+            </a:pPr>
+            <a:endParaRPr lang="zh-TW" altLang="en-US" sz="3600" dirty="0">
+              <a:latin typeface="微軟正黑體" panose="020B0604030504040204" pitchFamily="34" charset="-120"/>
+              <a:ea typeface="微軟正黑體" panose="020B0604030504040204" pitchFamily="34" charset="-120"/>
+            </a:endParaRPr>
+          </a:p>
+        </p:txBody>
+      </p:sp>
+      <p:grpSp>
+        <p:nvGrpSpPr>
+          <p:cNvPr id="5" name="群組 4"/>
+          <p:cNvGrpSpPr/>
+          <p:nvPr/>
+        </p:nvGrpSpPr>
+        <p:grpSpPr>
+          <a:xfrm>
+            <a:off x="2262297" y="2482602"/>
+            <a:ext cx="7667406" cy="3543795"/>
+            <a:chOff x="1982539" y="2482602"/>
+            <a:chExt cx="7667406" cy="3543795"/>
+          </a:xfrm>
+        </p:grpSpPr>
+        <p:pic>
+          <p:nvPicPr>
+            <p:cNvPr id="3" name="圖片 2"/>
+            <p:cNvPicPr>
+              <a:picLocks noChangeAspect="1"/>
+            </p:cNvPicPr>
+            <p:nvPr/>
+          </p:nvPicPr>
+          <p:blipFill>
+            <a:blip r:embed="rId2"/>
+            <a:stretch>
+              <a:fillRect/>
+            </a:stretch>
+          </p:blipFill>
+          <p:spPr>
+            <a:xfrm>
+              <a:off x="1982539" y="2482602"/>
+              <a:ext cx="3553321" cy="3543795"/>
+            </a:xfrm>
+            <a:prstGeom prst="rect">
+              <a:avLst/>
+            </a:prstGeom>
+          </p:spPr>
+        </p:pic>
+        <p:pic>
+          <p:nvPicPr>
+            <p:cNvPr id="4" name="圖片 3"/>
+            <p:cNvPicPr>
+              <a:picLocks noChangeAspect="1"/>
+            </p:cNvPicPr>
+            <p:nvPr/>
+          </p:nvPicPr>
+          <p:blipFill>
+            <a:blip r:embed="rId3"/>
+            <a:stretch>
+              <a:fillRect/>
+            </a:stretch>
+          </p:blipFill>
+          <p:spPr>
+            <a:xfrm>
+              <a:off x="6144256" y="2496891"/>
+              <a:ext cx="3505689" cy="3515216"/>
+            </a:xfrm>
+            <a:prstGeom prst="rect">
+              <a:avLst/>
+            </a:prstGeom>
+          </p:spPr>
+        </p:pic>
+      </p:grpSp>
+      <p:sp>
+        <p:nvSpPr>
+          <p:cNvPr id="2" name="向右箭號 1"/>
+          <p:cNvSpPr/>
+          <p:nvPr/>
+        </p:nvSpPr>
+        <p:spPr>
+          <a:xfrm>
+            <a:off x="5900390" y="3971057"/>
+            <a:ext cx="475796" cy="566883"/>
+          </a:xfrm>
+          <a:prstGeom prst="rightArrow">
+            <a:avLst/>
+          </a:prstGeom>
+          <a:solidFill>
+            <a:srgbClr val="25AEF2"/>
+          </a:solidFill>
+          <a:ln>
+            <a:noFill/>
+          </a:ln>
+        </p:spPr>
+        <p:style>
+          <a:lnRef idx="2">
+            <a:schemeClr val="accent1">
+              <a:shade val="50000"/>
+            </a:schemeClr>
+          </a:lnRef>
+          <a:fillRef idx="1">
+            <a:schemeClr val="accent1"/>
+          </a:fillRef>
+          <a:effectRef idx="0">
+            <a:schemeClr val="accent1"/>
+          </a:effectRef>
+          <a:fontRef idx="minor">
+            <a:schemeClr val="lt1"/>
+          </a:fontRef>
+        </p:style>
+        <p:txBody>
+          <a:bodyPr rtlCol="0" anchor="ctr"/>
+          <a:lstStyle/>
+          <a:p>
+            <a:pPr algn="ctr"/>
+            <a:endParaRPr lang="zh-TW" altLang="en-US"/>
+          </a:p>
+        </p:txBody>
+      </p:sp>
+    </p:spTree>
+    <p:extLst>
+      <p:ext uri="{BB962C8B-B14F-4D97-AF65-F5344CB8AC3E}">
+        <p14:creationId xmlns:p14="http://schemas.microsoft.com/office/powerpoint/2010/main" val="3026181878"/>
+      </p:ext>
+    </p:extLst>
+  </p:cSld>
+  <p:clrMapOvr>
+    <a:masterClrMapping/>
+  </p:clrMapOvr>
+</p:sld>
+</file>
+
+<file path=ppt/slides/slide22.xml><?xml version="1.0" encoding="utf-8"?>
+<p:sld xmlns:a="http://schemas.openxmlformats.org/drawingml/2006/main" xmlns:r="http://schemas.openxmlformats.org/officeDocument/2006/relationships" xmlns:p="http://schemas.openxmlformats.org/presentationml/2006/main">
+  <p:cSld>
+    <p:spTree>
+      <p:nvGrpSpPr>
+        <p:cNvPr id="1" name=""/>
+        <p:cNvGrpSpPr/>
+        <p:nvPr/>
+      </p:nvGrpSpPr>
+      <p:grpSpPr>
+        <a:xfrm>
+          <a:off x="0" y="0"/>
+          <a:ext cx="0" cy="0"/>
+          <a:chOff x="0" y="0"/>
+          <a:chExt cx="0" cy="0"/>
+        </a:xfrm>
+      </p:grpSpPr>
+      <p:sp>
+        <p:nvSpPr>
+          <p:cNvPr id="6" name="文字方塊 5"/>
+          <p:cNvSpPr txBox="1"/>
+          <p:nvPr/>
+        </p:nvSpPr>
+        <p:spPr>
+          <a:xfrm>
+            <a:off x="1136149" y="802409"/>
+            <a:ext cx="1285929" cy="738472"/>
+          </a:xfrm>
+          <a:prstGeom prst="rect">
+            <a:avLst/>
+          </a:prstGeom>
+          <a:noFill/>
+        </p:spPr>
+        <p:txBody>
+          <a:bodyPr wrap="none" rtlCol="0">
+            <a:spAutoFit/>
+          </a:bodyPr>
+          <a:lstStyle/>
+          <a:p>
+            <a:pPr>
+              <a:lnSpc>
+                <a:spcPct val="130000"/>
+              </a:lnSpc>
+            </a:pPr>
+            <a:r>
+              <a:rPr lang="en-US" altLang="zh-TW" sz="3600" dirty="0" smtClean="0">
+                <a:latin typeface="微軟正黑體" panose="020B0604030504040204" pitchFamily="34" charset="-120"/>
+                <a:ea typeface="微軟正黑體" panose="020B0604030504040204" pitchFamily="34" charset="-120"/>
+              </a:rPr>
+              <a:t>SPEC</a:t>
+            </a:r>
+            <a:endParaRPr lang="zh-TW" altLang="en-US" sz="3600" dirty="0">
+              <a:latin typeface="微軟正黑體" panose="020B0604030504040204" pitchFamily="34" charset="-120"/>
+              <a:ea typeface="微軟正黑體" panose="020B0604030504040204" pitchFamily="34" charset="-120"/>
+            </a:endParaRPr>
+          </a:p>
+        </p:txBody>
+      </p:sp>
+      <p:pic>
+        <p:nvPicPr>
+          <p:cNvPr id="7" name="圖片 6"/>
+          <p:cNvPicPr>
+            <a:picLocks noChangeAspect="1"/>
+          </p:cNvPicPr>
+          <p:nvPr/>
+        </p:nvPicPr>
+        <p:blipFill>
+          <a:blip r:embed="rId2"/>
+          <a:stretch>
+            <a:fillRect/>
+          </a:stretch>
+        </p:blipFill>
+        <p:spPr>
+          <a:xfrm>
+            <a:off x="1205193" y="2009640"/>
+            <a:ext cx="3683164" cy="3658445"/>
+          </a:xfrm>
+          <a:prstGeom prst="rect">
+            <a:avLst/>
+          </a:prstGeom>
+        </p:spPr>
+      </p:pic>
+      <p:graphicFrame>
+        <p:nvGraphicFramePr>
+          <p:cNvPr id="8" name="表格 7"/>
+          <p:cNvGraphicFramePr>
+            <a:graphicFrameLocks noGrp="1"/>
+          </p:cNvGraphicFramePr>
+          <p:nvPr>
+            <p:extLst>
+              <p:ext uri="{D42A27DB-BD31-4B8C-83A1-F6EECF244321}">
+                <p14:modId xmlns:p14="http://schemas.microsoft.com/office/powerpoint/2010/main" val="2583368440"/>
+              </p:ext>
+            </p:extLst>
+          </p:nvPr>
+        </p:nvGraphicFramePr>
+        <p:xfrm>
+          <a:off x="5504872" y="2230158"/>
+          <a:ext cx="3240000" cy="3240000"/>
+        </p:xfrm>
+        <a:graphic>
+          <a:graphicData uri="http://schemas.openxmlformats.org/drawingml/2006/table">
+            <a:tbl>
+              <a:tblPr firstRow="1" bandRow="1">
+                <a:tableStyleId>{5940675A-B579-460E-94D1-54222C63F5DA}</a:tableStyleId>
+              </a:tblPr>
+              <a:tblGrid>
+                <a:gridCol w="810000">
+                  <a:extLst>
+                    <a:ext uri="{9D8B030D-6E8A-4147-A177-3AD203B41FA5}">
+                      <a16:colId xmlns:a16="http://schemas.microsoft.com/office/drawing/2014/main" val="4154758723"/>
+                    </a:ext>
+                  </a:extLst>
+                </a:gridCol>
+                <a:gridCol w="810000">
+                  <a:extLst>
+                    <a:ext uri="{9D8B030D-6E8A-4147-A177-3AD203B41FA5}">
+                      <a16:colId xmlns:a16="http://schemas.microsoft.com/office/drawing/2014/main" val="2413484256"/>
+                    </a:ext>
+                  </a:extLst>
+                </a:gridCol>
+                <a:gridCol w="810000">
+                  <a:extLst>
+                    <a:ext uri="{9D8B030D-6E8A-4147-A177-3AD203B41FA5}">
+                      <a16:colId xmlns:a16="http://schemas.microsoft.com/office/drawing/2014/main" val="232552660"/>
+                    </a:ext>
+                  </a:extLst>
+                </a:gridCol>
+                <a:gridCol w="810000">
+                  <a:extLst>
+                    <a:ext uri="{9D8B030D-6E8A-4147-A177-3AD203B41FA5}">
+                      <a16:colId xmlns:a16="http://schemas.microsoft.com/office/drawing/2014/main" val="645051837"/>
+                    </a:ext>
+                  </a:extLst>
+                </a:gridCol>
+              </a:tblGrid>
+              <a:tr h="810000">
+                <a:tc>
+                  <a:txBody>
+                    <a:bodyPr/>
+                    <a:lstStyle/>
+                    <a:p>
+                      <a:pPr algn="ctr"/>
+                      <a:r>
+                        <a:rPr lang="en-US" altLang="zh-TW" dirty="0" smtClean="0"/>
+                        <a:t>0</a:t>
+                      </a:r>
+                      <a:endParaRPr lang="zh-TW" altLang="en-US" dirty="0"/>
+                    </a:p>
+                  </a:txBody>
+                  <a:tcPr anchor="ctr"/>
+                </a:tc>
+                <a:tc>
+                  <a:txBody>
+                    <a:bodyPr/>
+                    <a:lstStyle/>
+                    <a:p>
+                      <a:pPr algn="ctr"/>
+                      <a:r>
+                        <a:rPr lang="en-US" altLang="zh-TW" dirty="0" smtClean="0"/>
+                        <a:t>1</a:t>
+                      </a:r>
+                      <a:endParaRPr lang="zh-TW" altLang="en-US" dirty="0"/>
+                    </a:p>
+                  </a:txBody>
+                  <a:tcPr anchor="ctr"/>
+                </a:tc>
+                <a:tc>
+                  <a:txBody>
+                    <a:bodyPr/>
+                    <a:lstStyle/>
+                    <a:p>
+                      <a:pPr algn="ctr"/>
+                      <a:r>
+                        <a:rPr lang="en-US" altLang="zh-TW" dirty="0" smtClean="0"/>
+                        <a:t>2</a:t>
+                      </a:r>
+                      <a:endParaRPr lang="zh-TW" altLang="en-US" dirty="0"/>
+                    </a:p>
+                  </a:txBody>
+                  <a:tcPr anchor="ctr"/>
+                </a:tc>
+                <a:tc>
+                  <a:txBody>
+                    <a:bodyPr/>
+                    <a:lstStyle/>
+                    <a:p>
+                      <a:pPr algn="ctr"/>
+                      <a:r>
+                        <a:rPr lang="en-US" altLang="zh-TW" dirty="0" smtClean="0"/>
+                        <a:t>3</a:t>
+                      </a:r>
+                      <a:endParaRPr lang="zh-TW" altLang="en-US" dirty="0"/>
+                    </a:p>
+                  </a:txBody>
+                  <a:tcPr anchor="ctr"/>
+                </a:tc>
+                <a:extLst>
+                  <a:ext uri="{0D108BD9-81ED-4DB2-BD59-A6C34878D82A}">
+                    <a16:rowId xmlns:a16="http://schemas.microsoft.com/office/drawing/2014/main" val="959135872"/>
+                  </a:ext>
+                </a:extLst>
+              </a:tr>
+              <a:tr h="810000">
+                <a:tc>
+                  <a:txBody>
+                    <a:bodyPr/>
+                    <a:lstStyle/>
+                    <a:p>
+                      <a:pPr algn="ctr"/>
+                      <a:r>
+                        <a:rPr lang="en-US" altLang="zh-TW" dirty="0" smtClean="0"/>
+                        <a:t>11</a:t>
+                      </a:r>
+                      <a:endParaRPr lang="zh-TW" altLang="en-US" dirty="0"/>
+                    </a:p>
+                  </a:txBody>
+                  <a:tcPr anchor="ctr"/>
+                </a:tc>
+                <a:tc>
+                  <a:txBody>
+                    <a:bodyPr/>
+                    <a:lstStyle/>
+                    <a:p>
+                      <a:pPr algn="ctr"/>
+                      <a:r>
+                        <a:rPr lang="en-US" altLang="zh-TW" dirty="0" smtClean="0"/>
+                        <a:t>0</a:t>
+                      </a:r>
+                      <a:endParaRPr lang="zh-TW" altLang="en-US" dirty="0"/>
+                    </a:p>
+                  </a:txBody>
+                  <a:tcPr anchor="ctr">
+                    <a:solidFill>
+                      <a:schemeClr val="bg2">
+                        <a:lumMod val="90000"/>
+                      </a:schemeClr>
+                    </a:solidFill>
+                  </a:tcPr>
+                </a:tc>
+                <a:tc>
+                  <a:txBody>
+                    <a:bodyPr/>
+                    <a:lstStyle/>
+                    <a:p>
+                      <a:pPr algn="ctr"/>
+                      <a:r>
+                        <a:rPr lang="en-US" altLang="zh-TW" dirty="0" smtClean="0"/>
+                        <a:t>1</a:t>
+                      </a:r>
+                      <a:endParaRPr lang="zh-TW" altLang="en-US" dirty="0"/>
+                    </a:p>
+                  </a:txBody>
+                  <a:tcPr anchor="ctr">
+                    <a:solidFill>
+                      <a:schemeClr val="bg2">
+                        <a:lumMod val="90000"/>
+                      </a:schemeClr>
+                    </a:solidFill>
+                  </a:tcPr>
+                </a:tc>
+                <a:tc>
+                  <a:txBody>
+                    <a:bodyPr/>
+                    <a:lstStyle/>
+                    <a:p>
+                      <a:pPr algn="ctr"/>
+                      <a:r>
+                        <a:rPr lang="en-US" altLang="zh-TW" dirty="0" smtClean="0"/>
+                        <a:t>4</a:t>
+                      </a:r>
+                      <a:endParaRPr lang="zh-TW" altLang="en-US" dirty="0"/>
+                    </a:p>
+                  </a:txBody>
+                  <a:tcPr anchor="ctr"/>
+                </a:tc>
+                <a:extLst>
+                  <a:ext uri="{0D108BD9-81ED-4DB2-BD59-A6C34878D82A}">
+                    <a16:rowId xmlns:a16="http://schemas.microsoft.com/office/drawing/2014/main" val="801912394"/>
+                  </a:ext>
+                </a:extLst>
+              </a:tr>
+              <a:tr h="810000">
+                <a:tc>
+                  <a:txBody>
+                    <a:bodyPr/>
+                    <a:lstStyle/>
+                    <a:p>
+                      <a:pPr algn="ctr"/>
+                      <a:r>
+                        <a:rPr lang="en-US" altLang="zh-TW" dirty="0" smtClean="0"/>
+                        <a:t>10</a:t>
+                      </a:r>
+                      <a:endParaRPr lang="zh-TW" altLang="en-US" dirty="0"/>
+                    </a:p>
+                  </a:txBody>
+                  <a:tcPr anchor="ctr"/>
+                </a:tc>
+                <a:tc>
+                  <a:txBody>
+                    <a:bodyPr/>
+                    <a:lstStyle/>
+                    <a:p>
+                      <a:pPr algn="ctr"/>
+                      <a:r>
+                        <a:rPr lang="en-US" altLang="zh-TW" dirty="0" smtClean="0"/>
+                        <a:t>3</a:t>
+                      </a:r>
+                      <a:endParaRPr lang="zh-TW" altLang="en-US" dirty="0"/>
+                    </a:p>
+                  </a:txBody>
+                  <a:tcPr anchor="ctr">
+                    <a:solidFill>
+                      <a:schemeClr val="bg2">
+                        <a:lumMod val="90000"/>
+                      </a:schemeClr>
+                    </a:solidFill>
+                  </a:tcPr>
+                </a:tc>
+                <a:tc>
+                  <a:txBody>
+                    <a:bodyPr/>
+                    <a:lstStyle/>
+                    <a:p>
+                      <a:pPr algn="ctr"/>
+                      <a:r>
+                        <a:rPr lang="en-US" altLang="zh-TW" dirty="0" smtClean="0"/>
+                        <a:t>2</a:t>
+                      </a:r>
+                      <a:endParaRPr lang="zh-TW" altLang="en-US" dirty="0"/>
+                    </a:p>
+                  </a:txBody>
+                  <a:tcPr anchor="ctr">
+                    <a:solidFill>
+                      <a:schemeClr val="bg2">
+                        <a:lumMod val="90000"/>
+                      </a:schemeClr>
+                    </a:solidFill>
+                  </a:tcPr>
+                </a:tc>
+                <a:tc>
+                  <a:txBody>
+                    <a:bodyPr/>
+                    <a:lstStyle/>
+                    <a:p>
+                      <a:pPr algn="ctr"/>
+                      <a:r>
+                        <a:rPr lang="en-US" altLang="zh-TW" dirty="0" smtClean="0"/>
+                        <a:t>5</a:t>
+                      </a:r>
+                      <a:endParaRPr lang="zh-TW" altLang="en-US" dirty="0"/>
+                    </a:p>
+                  </a:txBody>
+                  <a:tcPr anchor="ctr"/>
+                </a:tc>
+                <a:extLst>
+                  <a:ext uri="{0D108BD9-81ED-4DB2-BD59-A6C34878D82A}">
+                    <a16:rowId xmlns:a16="http://schemas.microsoft.com/office/drawing/2014/main" val="3403392571"/>
+                  </a:ext>
+                </a:extLst>
+              </a:tr>
+              <a:tr h="810000">
+                <a:tc>
+                  <a:txBody>
+                    <a:bodyPr/>
+                    <a:lstStyle/>
+                    <a:p>
+                      <a:pPr algn="ctr"/>
+                      <a:r>
+                        <a:rPr lang="en-US" altLang="zh-TW" dirty="0" smtClean="0"/>
+                        <a:t>9</a:t>
+                      </a:r>
+                      <a:endParaRPr lang="zh-TW" altLang="en-US" dirty="0"/>
+                    </a:p>
+                  </a:txBody>
+                  <a:tcPr anchor="ctr"/>
+                </a:tc>
+                <a:tc>
+                  <a:txBody>
+                    <a:bodyPr/>
+                    <a:lstStyle/>
+                    <a:p>
+                      <a:pPr algn="ctr"/>
+                      <a:r>
+                        <a:rPr lang="en-US" altLang="zh-TW" dirty="0" smtClean="0"/>
+                        <a:t>8</a:t>
+                      </a:r>
+                      <a:endParaRPr lang="zh-TW" altLang="en-US" dirty="0"/>
+                    </a:p>
+                  </a:txBody>
+                  <a:tcPr anchor="ctr"/>
+                </a:tc>
+                <a:tc>
+                  <a:txBody>
+                    <a:bodyPr/>
+                    <a:lstStyle/>
+                    <a:p>
+                      <a:pPr algn="ctr"/>
+                      <a:r>
+                        <a:rPr lang="en-US" altLang="zh-TW" dirty="0" smtClean="0"/>
+                        <a:t>7</a:t>
+                      </a:r>
+                      <a:endParaRPr lang="zh-TW" altLang="en-US" dirty="0"/>
+                    </a:p>
+                  </a:txBody>
+                  <a:tcPr anchor="ctr"/>
+                </a:tc>
+                <a:tc>
+                  <a:txBody>
+                    <a:bodyPr/>
+                    <a:lstStyle/>
+                    <a:p>
+                      <a:pPr algn="ctr"/>
+                      <a:r>
+                        <a:rPr lang="en-US" altLang="zh-TW" dirty="0" smtClean="0"/>
+                        <a:t>6</a:t>
+                      </a:r>
+                      <a:endParaRPr lang="zh-TW" altLang="en-US" dirty="0"/>
+                    </a:p>
+                  </a:txBody>
+                  <a:tcPr anchor="ctr"/>
+                </a:tc>
+                <a:extLst>
+                  <a:ext uri="{0D108BD9-81ED-4DB2-BD59-A6C34878D82A}">
+                    <a16:rowId xmlns:a16="http://schemas.microsoft.com/office/drawing/2014/main" val="937172180"/>
+                  </a:ext>
+                </a:extLst>
+              </a:tr>
+            </a:tbl>
+          </a:graphicData>
+        </a:graphic>
+      </p:graphicFrame>
+      <p:sp>
+        <p:nvSpPr>
+          <p:cNvPr id="9" name="文字方塊 8"/>
+          <p:cNvSpPr txBox="1"/>
+          <p:nvPr/>
+        </p:nvSpPr>
+        <p:spPr>
+          <a:xfrm>
+            <a:off x="8839200" y="2475346"/>
+            <a:ext cx="812800" cy="369332"/>
+          </a:xfrm>
+          <a:prstGeom prst="rect">
+            <a:avLst/>
+          </a:prstGeom>
+          <a:noFill/>
+        </p:spPr>
+        <p:txBody>
+          <a:bodyPr wrap="square" rtlCol="0">
+            <a:spAutoFit/>
+          </a:bodyPr>
+          <a:lstStyle/>
+          <a:p>
+            <a:r>
+              <a:rPr lang="en-US" altLang="zh-TW" dirty="0" smtClean="0"/>
+              <a:t>outer</a:t>
+            </a:r>
+            <a:endParaRPr lang="zh-TW" altLang="en-US" dirty="0"/>
+          </a:p>
+        </p:txBody>
+      </p:sp>
+      <p:sp>
+        <p:nvSpPr>
+          <p:cNvPr id="10" name="文字方塊 9"/>
+          <p:cNvSpPr txBox="1"/>
+          <p:nvPr/>
+        </p:nvSpPr>
+        <p:spPr>
+          <a:xfrm>
+            <a:off x="7124872" y="3480826"/>
+            <a:ext cx="812800" cy="369332"/>
+          </a:xfrm>
+          <a:prstGeom prst="rect">
+            <a:avLst/>
+          </a:prstGeom>
+          <a:noFill/>
+        </p:spPr>
+        <p:txBody>
+          <a:bodyPr wrap="square" rtlCol="0">
+            <a:spAutoFit/>
+          </a:bodyPr>
+          <a:lstStyle/>
+          <a:p>
+            <a:r>
+              <a:rPr lang="en-US" altLang="zh-TW" dirty="0" smtClean="0"/>
+              <a:t>inner</a:t>
+            </a:r>
+            <a:endParaRPr lang="zh-TW" altLang="en-US" dirty="0"/>
+          </a:p>
+        </p:txBody>
+      </p:sp>
+    </p:spTree>
+    <p:extLst>
+      <p:ext uri="{BB962C8B-B14F-4D97-AF65-F5344CB8AC3E}">
+        <p14:creationId xmlns:p14="http://schemas.microsoft.com/office/powerpoint/2010/main" val="3351523311"/>
+      </p:ext>
+    </p:extLst>
+  </p:cSld>
+  <p:clrMapOvr>
+    <a:masterClrMapping/>
+  </p:clrMapOvr>
+</p:sld>
+</file>
+
+<file path=ppt/slides/slide3.xml><?xml version="1.0" encoding="utf-8"?>
+<p:sld xmlns:a="http://schemas.openxmlformats.org/drawingml/2006/main" xmlns:r="http://schemas.openxmlformats.org/officeDocument/2006/relationships" xmlns:p="http://schemas.openxmlformats.org/presentationml/2006/main">
+  <p:cSld>
+    <p:spTree>
+      <p:nvGrpSpPr>
+        <p:cNvPr id="1" name=""/>
+        <p:cNvGrpSpPr/>
+        <p:nvPr/>
+      </p:nvGrpSpPr>
+      <p:grpSpPr>
+        <a:xfrm>
+          <a:off x="0" y="0"/>
+          <a:ext cx="0" cy="0"/>
+          <a:chOff x="0" y="0"/>
+          <a:chExt cx="0" cy="0"/>
+        </a:xfrm>
+      </p:grpSpPr>
+      <p:sp>
+        <p:nvSpPr>
+          <p:cNvPr id="6" name="文字方塊 5"/>
+          <p:cNvSpPr txBox="1"/>
+          <p:nvPr/>
+        </p:nvSpPr>
+        <p:spPr>
+          <a:xfrm>
+            <a:off x="2474136" y="650009"/>
+            <a:ext cx="7366119" cy="1323439"/>
+          </a:xfrm>
+          <a:prstGeom prst="rect">
+            <a:avLst/>
+          </a:prstGeom>
+          <a:noFill/>
+        </p:spPr>
+        <p:txBody>
+          <a:bodyPr wrap="none" rtlCol="0">
+            <a:spAutoFit/>
+          </a:bodyPr>
+          <a:lstStyle/>
+          <a:p>
+            <a:pPr algn="ctr"/>
+            <a:r>
+              <a:rPr lang="zh-TW" altLang="en-US" sz="4000" dirty="0" smtClean="0">
+                <a:latin typeface="微軟正黑體" panose="020B0604030504040204" pitchFamily="34" charset="-120"/>
+                <a:ea typeface="微軟正黑體" panose="020B0604030504040204" pitchFamily="34" charset="-120"/>
+              </a:rPr>
+              <a:t>遊戲勝利條件</a:t>
+            </a:r>
+            <a:endParaRPr lang="en-US" altLang="zh-TW" sz="4000" dirty="0" smtClean="0">
+              <a:latin typeface="微軟正黑體" panose="020B0604030504040204" pitchFamily="34" charset="-120"/>
+              <a:ea typeface="微軟正黑體" panose="020B0604030504040204" pitchFamily="34" charset="-120"/>
+            </a:endParaRPr>
+          </a:p>
+          <a:p>
+            <a:pPr algn="ctr"/>
+            <a:r>
+              <a:rPr lang="zh-TW" altLang="en-US" sz="4000" b="1" dirty="0" smtClean="0">
+                <a:latin typeface="微軟正黑體" panose="020B0604030504040204" pitchFamily="34" charset="-120"/>
+                <a:ea typeface="微軟正黑體" panose="020B0604030504040204" pitchFamily="34" charset="-120"/>
+              </a:rPr>
+              <a:t>猜中指定區域得分，分數多者勝</a:t>
+            </a:r>
+            <a:endParaRPr lang="zh-TW" altLang="en-US" sz="4000" b="1" dirty="0">
+              <a:latin typeface="微軟正黑體" panose="020B0604030504040204" pitchFamily="34" charset="-120"/>
+              <a:ea typeface="微軟正黑體" panose="020B0604030504040204" pitchFamily="34" charset="-120"/>
+            </a:endParaRPr>
+          </a:p>
+        </p:txBody>
+      </p:sp>
+      <p:sp>
+        <p:nvSpPr>
+          <p:cNvPr id="2" name="矩形 1"/>
+          <p:cNvSpPr/>
+          <p:nvPr/>
+        </p:nvSpPr>
+        <p:spPr>
+          <a:xfrm>
+            <a:off x="18473" y="6262255"/>
+            <a:ext cx="12192000" cy="498763"/>
+          </a:xfrm>
+          <a:prstGeom prst="rect">
+            <a:avLst/>
+          </a:prstGeom>
+          <a:solidFill>
+            <a:schemeClr val="bg1"/>
+          </a:solidFill>
+          <a:ln>
+            <a:noFill/>
+          </a:ln>
+        </p:spPr>
+        <p:style>
+          <a:lnRef idx="2">
+            <a:schemeClr val="accent1">
+              <a:shade val="50000"/>
+            </a:schemeClr>
+          </a:lnRef>
+          <a:fillRef idx="1">
+            <a:schemeClr val="accent1"/>
+          </a:fillRef>
+          <a:effectRef idx="0">
+            <a:schemeClr val="accent1"/>
+          </a:effectRef>
+          <a:fontRef idx="minor">
+            <a:schemeClr val="lt1"/>
+          </a:fontRef>
+        </p:style>
+        <p:txBody>
+          <a:bodyPr rtlCol="0" anchor="ctr"/>
+          <a:lstStyle/>
+          <a:p>
+            <a:pPr algn="ctr"/>
+            <a:endParaRPr lang="zh-TW" altLang="en-US"/>
+          </a:p>
+        </p:txBody>
+      </p:sp>
+      <p:pic>
+        <p:nvPicPr>
+          <p:cNvPr id="4" name="圖片 3"/>
+          <p:cNvPicPr>
+            <a:picLocks noChangeAspect="1"/>
+          </p:cNvPicPr>
+          <p:nvPr/>
+        </p:nvPicPr>
+        <p:blipFill rotWithShape="1">
+          <a:blip r:embed="rId2"/>
+          <a:srcRect t="18416"/>
+          <a:stretch/>
+        </p:blipFill>
+        <p:spPr>
+          <a:xfrm>
+            <a:off x="1596000" y="2492943"/>
+            <a:ext cx="9000000" cy="3900712"/>
+          </a:xfrm>
+          <a:prstGeom prst="rect">
+            <a:avLst/>
+          </a:prstGeom>
+        </p:spPr>
+      </p:pic>
+    </p:spTree>
+    <p:extLst>
+      <p:ext uri="{BB962C8B-B14F-4D97-AF65-F5344CB8AC3E}">
+        <p14:creationId xmlns:p14="http://schemas.microsoft.com/office/powerpoint/2010/main" val="1021891020"/>
+      </p:ext>
+    </p:extLst>
+  </p:cSld>
+  <p:clrMapOvr>
+    <a:masterClrMapping/>
+  </p:clrMapOvr>
+</p:sld>
+</file>
+
+<file path=ppt/slides/slide4.xml><?xml version="1.0" encoding="utf-8"?>
+<p:sld xmlns:a="http://schemas.openxmlformats.org/drawingml/2006/main" xmlns:r="http://schemas.openxmlformats.org/officeDocument/2006/relationships" xmlns:p="http://schemas.openxmlformats.org/presentationml/2006/main">
+  <p:cSld>
+    <p:spTree>
+      <p:nvGrpSpPr>
+        <p:cNvPr id="1" name=""/>
+        <p:cNvGrpSpPr/>
+        <p:nvPr/>
+      </p:nvGrpSpPr>
+      <p:grpSpPr>
+        <a:xfrm>
+          <a:off x="0" y="0"/>
+          <a:ext cx="0" cy="0"/>
+          <a:chOff x="0" y="0"/>
+          <a:chExt cx="0" cy="0"/>
+        </a:xfrm>
+      </p:grpSpPr>
+      <p:sp>
+        <p:nvSpPr>
+          <p:cNvPr id="6" name="文字方塊 5"/>
+          <p:cNvSpPr txBox="1"/>
+          <p:nvPr/>
+        </p:nvSpPr>
+        <p:spPr>
+          <a:xfrm>
+            <a:off x="1136149" y="802409"/>
+            <a:ext cx="3243196" cy="1532727"/>
+          </a:xfrm>
+          <a:prstGeom prst="rect">
+            <a:avLst/>
+          </a:prstGeom>
+          <a:noFill/>
+        </p:spPr>
+        <p:txBody>
+          <a:bodyPr wrap="none" rtlCol="0">
+            <a:spAutoFit/>
+          </a:bodyPr>
+          <a:lstStyle/>
+          <a:p>
+            <a:pPr>
+              <a:lnSpc>
+                <a:spcPct val="130000"/>
+              </a:lnSpc>
+            </a:pPr>
+            <a:r>
+              <a:rPr lang="zh-TW" altLang="en-US" sz="3600" b="1" dirty="0" smtClean="0">
+                <a:latin typeface="微軟正黑體" panose="020B0604030504040204" pitchFamily="34" charset="-120"/>
+                <a:ea typeface="微軟正黑體" panose="020B0604030504040204" pitchFamily="34" charset="-120"/>
+              </a:rPr>
+              <a:t>遊戲步驟</a:t>
+            </a:r>
+            <a:endParaRPr lang="en-US" altLang="zh-TW" sz="3600" b="1" dirty="0" smtClean="0">
+              <a:latin typeface="微軟正黑體" panose="020B0604030504040204" pitchFamily="34" charset="-120"/>
+              <a:ea typeface="微軟正黑體" panose="020B0604030504040204" pitchFamily="34" charset="-120"/>
+            </a:endParaRPr>
+          </a:p>
+          <a:p>
+            <a:pPr marL="742950" indent="-742950">
+              <a:lnSpc>
+                <a:spcPct val="130000"/>
+              </a:lnSpc>
+              <a:buAutoNum type="arabicPeriod"/>
+            </a:pPr>
+            <a:r>
+              <a:rPr lang="zh-TW" altLang="en-US" sz="3600" dirty="0">
+                <a:latin typeface="微軟正黑體" panose="020B0604030504040204" pitchFamily="34" charset="-120"/>
+                <a:ea typeface="微軟正黑體" panose="020B0604030504040204" pitchFamily="34" charset="-120"/>
+              </a:rPr>
+              <a:t>隊長出題目</a:t>
+            </a:r>
+          </a:p>
+        </p:txBody>
+      </p:sp>
+      <p:pic>
+        <p:nvPicPr>
+          <p:cNvPr id="3" name="圖片 2"/>
+          <p:cNvPicPr>
+            <a:picLocks noChangeAspect="1"/>
+          </p:cNvPicPr>
+          <p:nvPr/>
+        </p:nvPicPr>
+        <p:blipFill rotWithShape="1">
+          <a:blip r:embed="rId2"/>
+          <a:srcRect t="19317"/>
+          <a:stretch/>
+        </p:blipFill>
+        <p:spPr>
+          <a:xfrm>
+            <a:off x="1596000" y="2550284"/>
+            <a:ext cx="9000000" cy="3857661"/>
+          </a:xfrm>
+          <a:prstGeom prst="rect">
+            <a:avLst/>
+          </a:prstGeom>
+        </p:spPr>
+      </p:pic>
+    </p:spTree>
+    <p:extLst>
+      <p:ext uri="{BB962C8B-B14F-4D97-AF65-F5344CB8AC3E}">
+        <p14:creationId xmlns:p14="http://schemas.microsoft.com/office/powerpoint/2010/main" val="508220632"/>
+      </p:ext>
+    </p:extLst>
+  </p:cSld>
+  <p:clrMapOvr>
+    <a:masterClrMapping/>
+  </p:clrMapOvr>
+</p:sld>
+</file>
+
+<file path=ppt/slides/slide5.xml><?xml version="1.0" encoding="utf-8"?>
+<p:sld xmlns:a="http://schemas.openxmlformats.org/drawingml/2006/main" xmlns:r="http://schemas.openxmlformats.org/officeDocument/2006/relationships" xmlns:p="http://schemas.openxmlformats.org/presentationml/2006/main">
+  <p:cSld>
+    <p:spTree>
+      <p:nvGrpSpPr>
+        <p:cNvPr id="1" name=""/>
+        <p:cNvGrpSpPr/>
+        <p:nvPr/>
+      </p:nvGrpSpPr>
+      <p:grpSpPr>
+        <a:xfrm>
+          <a:off x="0" y="0"/>
+          <a:ext cx="0" cy="0"/>
+          <a:chOff x="0" y="0"/>
+          <a:chExt cx="0" cy="0"/>
+        </a:xfrm>
+      </p:grpSpPr>
+      <p:sp>
+        <p:nvSpPr>
+          <p:cNvPr id="6" name="文字方塊 5"/>
+          <p:cNvSpPr txBox="1"/>
+          <p:nvPr/>
+        </p:nvSpPr>
+        <p:spPr>
+          <a:xfrm>
+            <a:off x="1136149" y="802409"/>
+            <a:ext cx="7887737" cy="1532727"/>
+          </a:xfrm>
+          <a:prstGeom prst="rect">
+            <a:avLst/>
+          </a:prstGeom>
+          <a:noFill/>
+        </p:spPr>
+        <p:txBody>
+          <a:bodyPr wrap="none" rtlCol="0">
+            <a:spAutoFit/>
+          </a:bodyPr>
+          <a:lstStyle/>
+          <a:p>
+            <a:pPr>
+              <a:lnSpc>
+                <a:spcPct val="130000"/>
+              </a:lnSpc>
+            </a:pPr>
+            <a:r>
+              <a:rPr lang="zh-TW" altLang="en-US" sz="3600" b="1" dirty="0" smtClean="0">
+                <a:latin typeface="微軟正黑體" panose="020B0604030504040204" pitchFamily="34" charset="-120"/>
+                <a:ea typeface="微軟正黑體" panose="020B0604030504040204" pitchFamily="34" charset="-120"/>
+              </a:rPr>
+              <a:t>遊戲步驟</a:t>
+            </a:r>
+            <a:endParaRPr lang="en-US" altLang="zh-TW" sz="3600" b="1" dirty="0" smtClean="0">
+              <a:latin typeface="微軟正黑體" panose="020B0604030504040204" pitchFamily="34" charset="-120"/>
+              <a:ea typeface="微軟正黑體" panose="020B0604030504040204" pitchFamily="34" charset="-120"/>
+            </a:endParaRPr>
+          </a:p>
+          <a:p>
+            <a:pPr marL="742950" indent="-742950">
+              <a:lnSpc>
+                <a:spcPct val="130000"/>
+              </a:lnSpc>
+              <a:buFont typeface="+mj-lt"/>
+              <a:buAutoNum type="arabicPeriod" startAt="2"/>
+            </a:pPr>
+            <a:r>
+              <a:rPr lang="zh-TW" altLang="en-US" sz="3600" dirty="0">
+                <a:latin typeface="微軟正黑體" panose="020B0604030504040204" pitchFamily="34" charset="-120"/>
+                <a:ea typeface="微軟正黑體" panose="020B0604030504040204" pitchFamily="34" charset="-120"/>
+              </a:rPr>
+              <a:t>隊員猜</a:t>
+            </a:r>
+            <a:r>
+              <a:rPr lang="zh-TW" altLang="en-US" sz="3600" dirty="0" smtClean="0">
+                <a:latin typeface="微軟正黑體" panose="020B0604030504040204" pitchFamily="34" charset="-120"/>
+                <a:ea typeface="微軟正黑體" panose="020B0604030504040204" pitchFamily="34" charset="-120"/>
+              </a:rPr>
+              <a:t>刻度</a:t>
+            </a:r>
+            <a:r>
+              <a:rPr lang="en-US" altLang="zh-TW" sz="2400" dirty="0" smtClean="0">
+                <a:latin typeface="微軟正黑體" panose="020B0604030504040204" pitchFamily="34" charset="-120"/>
+                <a:ea typeface="微軟正黑體" panose="020B0604030504040204" pitchFamily="34" charset="-120"/>
+              </a:rPr>
+              <a:t>(</a:t>
+            </a:r>
+            <a:r>
+              <a:rPr lang="zh-TW" altLang="en-US" sz="2400" dirty="0" smtClean="0">
+                <a:latin typeface="微軟正黑體" panose="020B0604030504040204" pitchFamily="34" charset="-120"/>
+                <a:ea typeface="微軟正黑體" panose="020B0604030504040204" pitchFamily="34" charset="-120"/>
+              </a:rPr>
+              <a:t>左右鍵移動指針，</a:t>
+            </a:r>
+            <a:r>
+              <a:rPr lang="en-US" altLang="zh-TW" sz="2400" dirty="0" smtClean="0">
+                <a:latin typeface="微軟正黑體" panose="020B0604030504040204" pitchFamily="34" charset="-120"/>
+                <a:ea typeface="微軟正黑體" panose="020B0604030504040204" pitchFamily="34" charset="-120"/>
+              </a:rPr>
+              <a:t>Enter</a:t>
+            </a:r>
+            <a:r>
+              <a:rPr lang="zh-TW" altLang="en-US" sz="2400" dirty="0" smtClean="0">
+                <a:latin typeface="微軟正黑體" panose="020B0604030504040204" pitchFamily="34" charset="-120"/>
+                <a:ea typeface="微軟正黑體" panose="020B0604030504040204" pitchFamily="34" charset="-120"/>
+              </a:rPr>
+              <a:t>鍵秀結果</a:t>
+            </a:r>
+            <a:r>
+              <a:rPr lang="en-US" altLang="zh-TW" sz="2400" dirty="0" smtClean="0">
+                <a:latin typeface="微軟正黑體" panose="020B0604030504040204" pitchFamily="34" charset="-120"/>
+                <a:ea typeface="微軟正黑體" panose="020B0604030504040204" pitchFamily="34" charset="-120"/>
+              </a:rPr>
+              <a:t>)</a:t>
+            </a:r>
+            <a:endParaRPr lang="zh-TW" altLang="en-US" sz="2400" dirty="0">
+              <a:latin typeface="微軟正黑體" panose="020B0604030504040204" pitchFamily="34" charset="-120"/>
+              <a:ea typeface="微軟正黑體" panose="020B0604030504040204" pitchFamily="34" charset="-120"/>
+            </a:endParaRPr>
+          </a:p>
+        </p:txBody>
+      </p:sp>
+      <p:pic>
+        <p:nvPicPr>
+          <p:cNvPr id="5" name="圖片 4"/>
+          <p:cNvPicPr>
+            <a:picLocks noChangeAspect="1"/>
+          </p:cNvPicPr>
+          <p:nvPr/>
+        </p:nvPicPr>
+        <p:blipFill rotWithShape="1">
+          <a:blip r:embed="rId2"/>
+          <a:srcRect t="18019"/>
+          <a:stretch/>
+        </p:blipFill>
+        <p:spPr>
+          <a:xfrm>
+            <a:off x="1753728" y="2502567"/>
+            <a:ext cx="9000000" cy="3919713"/>
+          </a:xfrm>
+          <a:prstGeom prst="rect">
+            <a:avLst/>
+          </a:prstGeom>
+        </p:spPr>
+      </p:pic>
+    </p:spTree>
+    <p:extLst>
+      <p:ext uri="{BB962C8B-B14F-4D97-AF65-F5344CB8AC3E}">
+        <p14:creationId xmlns:p14="http://schemas.microsoft.com/office/powerpoint/2010/main" val="376176121"/>
+      </p:ext>
+    </p:extLst>
+  </p:cSld>
+  <p:clrMapOvr>
+    <a:masterClrMapping/>
+  </p:clrMapOvr>
+</p:sld>
+</file>
+
+<file path=ppt/slides/slide6.xml><?xml version="1.0" encoding="utf-8"?>
+<p:sld xmlns:a="http://schemas.openxmlformats.org/drawingml/2006/main" xmlns:r="http://schemas.openxmlformats.org/officeDocument/2006/relationships" xmlns:p="http://schemas.openxmlformats.org/presentationml/2006/main">
+  <p:cSld>
+    <p:spTree>
+      <p:nvGrpSpPr>
+        <p:cNvPr id="1" name=""/>
+        <p:cNvGrpSpPr/>
+        <p:nvPr/>
+      </p:nvGrpSpPr>
+      <p:grpSpPr>
+        <a:xfrm>
+          <a:off x="0" y="0"/>
+          <a:ext cx="0" cy="0"/>
+          <a:chOff x="0" y="0"/>
+          <a:chExt cx="0" cy="0"/>
+        </a:xfrm>
+      </p:grpSpPr>
+      <p:sp>
+        <p:nvSpPr>
+          <p:cNvPr id="6" name="文字方塊 5"/>
+          <p:cNvSpPr txBox="1"/>
+          <p:nvPr/>
+        </p:nvSpPr>
+        <p:spPr>
+          <a:xfrm>
+            <a:off x="1136149" y="802409"/>
+            <a:ext cx="8387232" cy="1532727"/>
+          </a:xfrm>
+          <a:prstGeom prst="rect">
+            <a:avLst/>
+          </a:prstGeom>
+          <a:noFill/>
+        </p:spPr>
+        <p:txBody>
+          <a:bodyPr wrap="none" rtlCol="0">
+            <a:spAutoFit/>
+          </a:bodyPr>
+          <a:lstStyle/>
+          <a:p>
+            <a:pPr>
+              <a:lnSpc>
+                <a:spcPct val="130000"/>
+              </a:lnSpc>
+            </a:pPr>
+            <a:r>
+              <a:rPr lang="zh-TW" altLang="en-US" sz="3600" b="1" dirty="0" smtClean="0">
+                <a:latin typeface="微軟正黑體" panose="020B0604030504040204" pitchFamily="34" charset="-120"/>
+                <a:ea typeface="微軟正黑體" panose="020B0604030504040204" pitchFamily="34" charset="-120"/>
+              </a:rPr>
+              <a:t>遊戲步驟</a:t>
+            </a:r>
+            <a:endParaRPr lang="en-US" altLang="zh-TW" sz="3600" b="1" dirty="0" smtClean="0">
+              <a:latin typeface="微軟正黑體" panose="020B0604030504040204" pitchFamily="34" charset="-120"/>
+              <a:ea typeface="微軟正黑體" panose="020B0604030504040204" pitchFamily="34" charset="-120"/>
+            </a:endParaRPr>
+          </a:p>
+          <a:p>
+            <a:pPr marL="742950" indent="-742950">
+              <a:lnSpc>
+                <a:spcPct val="130000"/>
+              </a:lnSpc>
+              <a:buFont typeface="+mj-lt"/>
+              <a:buAutoNum type="arabicPeriod" startAt="3"/>
+            </a:pPr>
+            <a:r>
+              <a:rPr lang="zh-TW" altLang="en-US" sz="3600" dirty="0">
+                <a:latin typeface="微軟正黑體" panose="020B0604030504040204" pitchFamily="34" charset="-120"/>
+                <a:ea typeface="微軟正黑體" panose="020B0604030504040204" pitchFamily="34" charset="-120"/>
+              </a:rPr>
+              <a:t>分數</a:t>
+            </a:r>
+            <a:r>
+              <a:rPr lang="zh-TW" altLang="en-US" sz="3600" dirty="0" smtClean="0">
+                <a:latin typeface="微軟正黑體" panose="020B0604030504040204" pitchFamily="34" charset="-120"/>
+                <a:ea typeface="微軟正黑體" panose="020B0604030504040204" pitchFamily="34" charset="-120"/>
+              </a:rPr>
+              <a:t>結算</a:t>
+            </a:r>
+            <a:r>
+              <a:rPr lang="en-US" altLang="zh-TW" sz="3600" dirty="0" smtClean="0">
+                <a:latin typeface="微軟正黑體" panose="020B0604030504040204" pitchFamily="34" charset="-120"/>
+                <a:ea typeface="微軟正黑體" panose="020B0604030504040204" pitchFamily="34" charset="-120"/>
+              </a:rPr>
+              <a:t>(+1, +2, +3)</a:t>
+            </a:r>
+            <a:r>
+              <a:rPr lang="zh-TW" altLang="en-US" sz="2400" dirty="0" smtClean="0">
+                <a:latin typeface="微軟正黑體" panose="020B0604030504040204" pitchFamily="34" charset="-120"/>
+                <a:ea typeface="微軟正黑體" panose="020B0604030504040204" pitchFamily="34" charset="-120"/>
+              </a:rPr>
+              <a:t> </a:t>
+            </a:r>
+            <a:r>
+              <a:rPr lang="en-US" altLang="zh-TW" sz="2400" dirty="0" smtClean="0">
+                <a:latin typeface="微軟正黑體" panose="020B0604030504040204" pitchFamily="34" charset="-120"/>
+                <a:ea typeface="微軟正黑體" panose="020B0604030504040204" pitchFamily="34" charset="-120"/>
+              </a:rPr>
+              <a:t>(</a:t>
+            </a:r>
+            <a:r>
+              <a:rPr lang="zh-TW" altLang="en-US" sz="2400" dirty="0" smtClean="0">
+                <a:latin typeface="微軟正黑體" panose="020B0604030504040204" pitchFamily="34" charset="-120"/>
+                <a:ea typeface="微軟正黑體" panose="020B0604030504040204" pitchFamily="34" charset="-120"/>
+              </a:rPr>
+              <a:t>加減號按鍵變更分數</a:t>
+            </a:r>
+            <a:r>
+              <a:rPr lang="en-US" altLang="zh-TW" sz="2400" dirty="0" smtClean="0">
+                <a:latin typeface="微軟正黑體" panose="020B0604030504040204" pitchFamily="34" charset="-120"/>
+                <a:ea typeface="微軟正黑體" panose="020B0604030504040204" pitchFamily="34" charset="-120"/>
+              </a:rPr>
+              <a:t>)</a:t>
+            </a:r>
+            <a:endParaRPr lang="zh-TW" altLang="en-US" sz="2400" dirty="0">
+              <a:latin typeface="微軟正黑體" panose="020B0604030504040204" pitchFamily="34" charset="-120"/>
+              <a:ea typeface="微軟正黑體" panose="020B0604030504040204" pitchFamily="34" charset="-120"/>
+            </a:endParaRPr>
+          </a:p>
+        </p:txBody>
+      </p:sp>
+      <p:pic>
+        <p:nvPicPr>
+          <p:cNvPr id="2" name="圖片 1"/>
+          <p:cNvPicPr>
+            <a:picLocks noChangeAspect="1"/>
+          </p:cNvPicPr>
+          <p:nvPr/>
+        </p:nvPicPr>
+        <p:blipFill rotWithShape="1">
+          <a:blip r:embed="rId2"/>
+          <a:srcRect t="18422"/>
+          <a:stretch/>
+        </p:blipFill>
+        <p:spPr>
+          <a:xfrm>
+            <a:off x="1830731" y="2656573"/>
+            <a:ext cx="9000000" cy="3900462"/>
+          </a:xfrm>
+          <a:prstGeom prst="rect">
+            <a:avLst/>
+          </a:prstGeom>
+        </p:spPr>
+      </p:pic>
+    </p:spTree>
+    <p:extLst>
+      <p:ext uri="{BB962C8B-B14F-4D97-AF65-F5344CB8AC3E}">
+        <p14:creationId xmlns:p14="http://schemas.microsoft.com/office/powerpoint/2010/main" val="2248663762"/>
+      </p:ext>
+    </p:extLst>
+  </p:cSld>
+  <p:clrMapOvr>
+    <a:masterClrMapping/>
+  </p:clrMapOvr>
+</p:sld>
+</file>
+
+<file path=ppt/slides/slide7.xml><?xml version="1.0" encoding="utf-8"?>
+<p:sld xmlns:a="http://schemas.openxmlformats.org/drawingml/2006/main" xmlns:r="http://schemas.openxmlformats.org/officeDocument/2006/relationships" xmlns:p="http://schemas.openxmlformats.org/presentationml/2006/main">
+  <p:cSld>
+    <p:spTree>
+      <p:nvGrpSpPr>
+        <p:cNvPr id="1" name=""/>
+        <p:cNvGrpSpPr/>
+        <p:nvPr/>
+      </p:nvGrpSpPr>
+      <p:grpSpPr>
+        <a:xfrm>
+          <a:off x="0" y="0"/>
+          <a:ext cx="0" cy="0"/>
+          <a:chOff x="0" y="0"/>
+          <a:chExt cx="0" cy="0"/>
+        </a:xfrm>
+      </p:grpSpPr>
+      <p:sp>
+        <p:nvSpPr>
+          <p:cNvPr id="6" name="文字方塊 5"/>
+          <p:cNvSpPr txBox="1"/>
+          <p:nvPr/>
+        </p:nvSpPr>
+        <p:spPr>
+          <a:xfrm>
+            <a:off x="4013021" y="650009"/>
+            <a:ext cx="4288353" cy="1323439"/>
+          </a:xfrm>
+          <a:prstGeom prst="rect">
+            <a:avLst/>
+          </a:prstGeom>
+          <a:noFill/>
+        </p:spPr>
+        <p:txBody>
+          <a:bodyPr wrap="none" rtlCol="0">
+            <a:spAutoFit/>
+          </a:bodyPr>
+          <a:lstStyle/>
+          <a:p>
+            <a:pPr algn="ctr"/>
+            <a:r>
+              <a:rPr lang="zh-TW" altLang="en-US" sz="4000" dirty="0" smtClean="0">
+                <a:latin typeface="微軟正黑體" panose="020B0604030504040204" pitchFamily="34" charset="-120"/>
+                <a:ea typeface="微軟正黑體" panose="020B0604030504040204" pitchFamily="34" charset="-120"/>
+              </a:rPr>
+              <a:t>特殊情況</a:t>
+            </a:r>
+            <a:endParaRPr lang="en-US" altLang="zh-TW" sz="4000" dirty="0" smtClean="0">
+              <a:latin typeface="微軟正黑體" panose="020B0604030504040204" pitchFamily="34" charset="-120"/>
+              <a:ea typeface="微軟正黑體" panose="020B0604030504040204" pitchFamily="34" charset="-120"/>
+            </a:endParaRPr>
+          </a:p>
+          <a:p>
+            <a:pPr algn="ctr"/>
+            <a:r>
+              <a:rPr lang="zh-TW" altLang="en-US" sz="4000" b="1" dirty="0" smtClean="0">
+                <a:latin typeface="微軟正黑體" panose="020B0604030504040204" pitchFamily="34" charset="-120"/>
+                <a:ea typeface="微軟正黑體" panose="020B0604030504040204" pitchFamily="34" charset="-120"/>
+              </a:rPr>
+              <a:t>兩邊都有得分區域</a:t>
+            </a:r>
+            <a:endParaRPr lang="zh-TW" altLang="en-US" sz="4000" b="1" dirty="0">
+              <a:latin typeface="微軟正黑體" panose="020B0604030504040204" pitchFamily="34" charset="-120"/>
+              <a:ea typeface="微軟正黑體" panose="020B0604030504040204" pitchFamily="34" charset="-120"/>
+            </a:endParaRPr>
+          </a:p>
+        </p:txBody>
+      </p:sp>
+      <p:sp>
+        <p:nvSpPr>
+          <p:cNvPr id="2" name="矩形 1"/>
+          <p:cNvSpPr/>
+          <p:nvPr/>
+        </p:nvSpPr>
+        <p:spPr>
+          <a:xfrm>
+            <a:off x="18473" y="6262255"/>
+            <a:ext cx="12192000" cy="498763"/>
+          </a:xfrm>
+          <a:prstGeom prst="rect">
+            <a:avLst/>
+          </a:prstGeom>
+          <a:solidFill>
+            <a:schemeClr val="bg1"/>
+          </a:solidFill>
+          <a:ln>
+            <a:noFill/>
+          </a:ln>
+        </p:spPr>
+        <p:style>
+          <a:lnRef idx="2">
+            <a:schemeClr val="accent1">
+              <a:shade val="50000"/>
+            </a:schemeClr>
+          </a:lnRef>
+          <a:fillRef idx="1">
+            <a:schemeClr val="accent1"/>
+          </a:fillRef>
+          <a:effectRef idx="0">
+            <a:schemeClr val="accent1"/>
+          </a:effectRef>
+          <a:fontRef idx="minor">
+            <a:schemeClr val="lt1"/>
+          </a:fontRef>
+        </p:style>
+        <p:txBody>
+          <a:bodyPr rtlCol="0" anchor="ctr"/>
+          <a:lstStyle/>
+          <a:p>
+            <a:pPr algn="ctr"/>
+            <a:endParaRPr lang="zh-TW" altLang="en-US"/>
+          </a:p>
+        </p:txBody>
+      </p:sp>
+      <p:pic>
+        <p:nvPicPr>
+          <p:cNvPr id="3" name="圖片 2"/>
+          <p:cNvPicPr>
+            <a:picLocks noChangeAspect="1"/>
+          </p:cNvPicPr>
+          <p:nvPr/>
+        </p:nvPicPr>
+        <p:blipFill rotWithShape="1">
+          <a:blip r:embed="rId2"/>
+          <a:srcRect t="18163"/>
+          <a:stretch/>
+        </p:blipFill>
+        <p:spPr>
+          <a:xfrm>
+            <a:off x="1657197" y="2349440"/>
+            <a:ext cx="9000000" cy="3912815"/>
+          </a:xfrm>
+          <a:prstGeom prst="rect">
+            <a:avLst/>
+          </a:prstGeom>
+        </p:spPr>
+      </p:pic>
+    </p:spTree>
+    <p:extLst>
+      <p:ext uri="{BB962C8B-B14F-4D97-AF65-F5344CB8AC3E}">
+        <p14:creationId xmlns:p14="http://schemas.microsoft.com/office/powerpoint/2010/main" val="2084995661"/>
+      </p:ext>
+    </p:extLst>
+  </p:cSld>
+  <p:clrMapOvr>
+    <a:masterClrMapping/>
+  </p:clrMapOvr>
+</p:sld>
+</file>
+
+<file path=ppt/slides/slide8.xml><?xml version="1.0" encoding="utf-8"?>
+<p:sld xmlns:a="http://schemas.openxmlformats.org/drawingml/2006/main" xmlns:r="http://schemas.openxmlformats.org/officeDocument/2006/relationships" xmlns:p="http://schemas.openxmlformats.org/presentationml/2006/main">
+  <p:cSld>
+    <p:spTree>
+      <p:nvGrpSpPr>
+        <p:cNvPr id="1" name=""/>
+        <p:cNvGrpSpPr/>
+        <p:nvPr/>
+      </p:nvGrpSpPr>
+      <p:grpSpPr>
+        <a:xfrm>
+          <a:off x="0" y="0"/>
+          <a:ext cx="0" cy="0"/>
+          <a:chOff x="0" y="0"/>
+          <a:chExt cx="0" cy="0"/>
+        </a:xfrm>
+      </p:grpSpPr>
+      <p:sp>
+        <p:nvSpPr>
+          <p:cNvPr id="6" name="文字方塊 5"/>
+          <p:cNvSpPr txBox="1"/>
+          <p:nvPr/>
+        </p:nvSpPr>
+        <p:spPr>
+          <a:xfrm>
+            <a:off x="5295423" y="650009"/>
+            <a:ext cx="1723549" cy="707886"/>
+          </a:xfrm>
+          <a:prstGeom prst="rect">
+            <a:avLst/>
+          </a:prstGeom>
+          <a:noFill/>
+        </p:spPr>
+        <p:txBody>
+          <a:bodyPr wrap="none" rtlCol="0">
+            <a:spAutoFit/>
+          </a:bodyPr>
+          <a:lstStyle/>
+          <a:p>
+            <a:pPr algn="ctr"/>
+            <a:r>
+              <a:rPr lang="zh-TW" altLang="en-US" sz="4000" b="1" dirty="0" smtClean="0">
+                <a:latin typeface="微軟正黑體" panose="020B0604030504040204" pitchFamily="34" charset="-120"/>
+                <a:ea typeface="微軟正黑體" panose="020B0604030504040204" pitchFamily="34" charset="-120"/>
+              </a:rPr>
+              <a:t>海戰棋</a:t>
+            </a:r>
+            <a:endParaRPr lang="zh-TW" altLang="en-US" sz="4000" b="1" dirty="0">
+              <a:latin typeface="微軟正黑體" panose="020B0604030504040204" pitchFamily="34" charset="-120"/>
+              <a:ea typeface="微軟正黑體" panose="020B0604030504040204" pitchFamily="34" charset="-120"/>
+            </a:endParaRPr>
+          </a:p>
+        </p:txBody>
+      </p:sp>
+      <p:sp>
+        <p:nvSpPr>
+          <p:cNvPr id="8" name="文字方塊 7"/>
+          <p:cNvSpPr txBox="1"/>
+          <p:nvPr/>
+        </p:nvSpPr>
+        <p:spPr>
+          <a:xfrm>
+            <a:off x="6567131" y="2388420"/>
+            <a:ext cx="4418197" cy="2252924"/>
+          </a:xfrm>
+          <a:prstGeom prst="rect">
+            <a:avLst/>
+          </a:prstGeom>
+          <a:noFill/>
+        </p:spPr>
+        <p:txBody>
+          <a:bodyPr wrap="none" rtlCol="0">
+            <a:spAutoFit/>
+          </a:bodyPr>
+          <a:lstStyle/>
+          <a:p>
+            <a:pPr>
+              <a:lnSpc>
+                <a:spcPct val="130000"/>
+              </a:lnSpc>
+            </a:pPr>
+            <a:r>
+              <a:rPr lang="zh-TW" altLang="en-US" sz="3600" dirty="0" smtClean="0">
+                <a:latin typeface="微軟正黑體" panose="020B0604030504040204" pitchFamily="34" charset="-120"/>
+                <a:ea typeface="微軟正黑體" panose="020B0604030504040204" pitchFamily="34" charset="-120"/>
+              </a:rPr>
+              <a:t>遊戲人數：</a:t>
+            </a:r>
+            <a:r>
+              <a:rPr lang="en-US" altLang="zh-TW" sz="3600" dirty="0" smtClean="0">
+                <a:latin typeface="微軟正黑體" panose="020B0604030504040204" pitchFamily="34" charset="-120"/>
+                <a:ea typeface="微軟正黑體" panose="020B0604030504040204" pitchFamily="34" charset="-120"/>
+              </a:rPr>
+              <a:t>2</a:t>
+            </a:r>
+            <a:r>
+              <a:rPr lang="zh-TW" altLang="en-US" sz="3600" dirty="0" smtClean="0">
+                <a:latin typeface="微軟正黑體" panose="020B0604030504040204" pitchFamily="34" charset="-120"/>
+                <a:ea typeface="微軟正黑體" panose="020B0604030504040204" pitchFamily="34" charset="-120"/>
+              </a:rPr>
+              <a:t>人</a:t>
+            </a:r>
+            <a:endParaRPr lang="en-US" altLang="zh-TW" sz="3600" dirty="0" smtClean="0">
+              <a:latin typeface="微軟正黑體" panose="020B0604030504040204" pitchFamily="34" charset="-120"/>
+              <a:ea typeface="微軟正黑體" panose="020B0604030504040204" pitchFamily="34" charset="-120"/>
+            </a:endParaRPr>
+          </a:p>
+          <a:p>
+            <a:pPr>
+              <a:lnSpc>
+                <a:spcPct val="130000"/>
+              </a:lnSpc>
+            </a:pPr>
+            <a:r>
+              <a:rPr lang="zh-TW" altLang="en-US" sz="3600" dirty="0">
+                <a:latin typeface="微軟正黑體" panose="020B0604030504040204" pitchFamily="34" charset="-120"/>
+                <a:ea typeface="微軟正黑體" panose="020B0604030504040204" pitchFamily="34" charset="-120"/>
+              </a:rPr>
+              <a:t>遊戲</a:t>
+            </a:r>
+            <a:r>
+              <a:rPr lang="zh-TW" altLang="en-US" sz="3600" dirty="0" smtClean="0">
+                <a:latin typeface="微軟正黑體" panose="020B0604030504040204" pitchFamily="34" charset="-120"/>
+                <a:ea typeface="微軟正黑體" panose="020B0604030504040204" pitchFamily="34" charset="-120"/>
+              </a:rPr>
+              <a:t>時間：</a:t>
+            </a:r>
+            <a:r>
+              <a:rPr lang="en-US" altLang="zh-TW" sz="3600" dirty="0" smtClean="0">
+                <a:latin typeface="微軟正黑體" panose="020B0604030504040204" pitchFamily="34" charset="-120"/>
+                <a:ea typeface="微軟正黑體" panose="020B0604030504040204" pitchFamily="34" charset="-120"/>
+              </a:rPr>
+              <a:t>5-10</a:t>
+            </a:r>
+            <a:r>
+              <a:rPr lang="zh-TW" altLang="en-US" sz="3600" dirty="0" smtClean="0">
+                <a:latin typeface="微軟正黑體" panose="020B0604030504040204" pitchFamily="34" charset="-120"/>
+                <a:ea typeface="微軟正黑體" panose="020B0604030504040204" pitchFamily="34" charset="-120"/>
+              </a:rPr>
+              <a:t>分鐘</a:t>
+            </a:r>
+            <a:endParaRPr lang="en-US" altLang="zh-TW" sz="3600" dirty="0" smtClean="0">
+              <a:latin typeface="微軟正黑體" panose="020B0604030504040204" pitchFamily="34" charset="-120"/>
+              <a:ea typeface="微軟正黑體" panose="020B0604030504040204" pitchFamily="34" charset="-120"/>
+            </a:endParaRPr>
+          </a:p>
+          <a:p>
+            <a:pPr>
+              <a:lnSpc>
+                <a:spcPct val="130000"/>
+              </a:lnSpc>
+            </a:pPr>
+            <a:r>
+              <a:rPr lang="zh-TW" altLang="en-US" sz="3600" dirty="0" smtClean="0">
+                <a:latin typeface="微軟正黑體" panose="020B0604030504040204" pitchFamily="34" charset="-120"/>
+                <a:ea typeface="微軟正黑體" panose="020B0604030504040204" pitchFamily="34" charset="-120"/>
+              </a:rPr>
+              <a:t>難易度：</a:t>
+            </a:r>
+            <a:r>
+              <a:rPr lang="zh-TW" altLang="en-US" sz="3600" dirty="0">
+                <a:latin typeface="微軟正黑體" panose="020B0604030504040204" pitchFamily="34" charset="-120"/>
+                <a:ea typeface="微軟正黑體" panose="020B0604030504040204" pitchFamily="34" charset="-120"/>
+              </a:rPr>
+              <a:t>★ ★ </a:t>
+            </a:r>
+            <a:endParaRPr lang="en-US" altLang="zh-TW" sz="3600" dirty="0" smtClean="0">
+              <a:latin typeface="微軟正黑體" panose="020B0604030504040204" pitchFamily="34" charset="-120"/>
+              <a:ea typeface="微軟正黑體" panose="020B0604030504040204" pitchFamily="34" charset="-120"/>
+            </a:endParaRPr>
+          </a:p>
+        </p:txBody>
+      </p:sp>
+      <p:pic>
+        <p:nvPicPr>
+          <p:cNvPr id="2" name="圖片 1"/>
+          <p:cNvPicPr>
+            <a:picLocks noChangeAspect="1"/>
+          </p:cNvPicPr>
+          <p:nvPr/>
+        </p:nvPicPr>
+        <p:blipFill>
+          <a:blip r:embed="rId2"/>
+          <a:stretch>
+            <a:fillRect/>
+          </a:stretch>
+        </p:blipFill>
+        <p:spPr>
+          <a:xfrm>
+            <a:off x="972766" y="1913763"/>
+            <a:ext cx="5101098" cy="3358628"/>
+          </a:xfrm>
+          <a:prstGeom prst="rect">
+            <a:avLst/>
+          </a:prstGeom>
+        </p:spPr>
+      </p:pic>
+    </p:spTree>
+    <p:extLst>
+      <p:ext uri="{BB962C8B-B14F-4D97-AF65-F5344CB8AC3E}">
+        <p14:creationId xmlns:p14="http://schemas.microsoft.com/office/powerpoint/2010/main" val="1332306982"/>
+      </p:ext>
+    </p:extLst>
+  </p:cSld>
+  <p:clrMapOvr>
+    <a:masterClrMapping/>
+  </p:clrMapOvr>
+</p:sld>
+</file>
+
+<file path=ppt/slides/slide9.xml><?xml version="1.0" encoding="utf-8"?>
+<p:sld xmlns:a="http://schemas.openxmlformats.org/drawingml/2006/main" xmlns:r="http://schemas.openxmlformats.org/officeDocument/2006/relationships" xmlns:p="http://schemas.openxmlformats.org/presentationml/2006/main">
+  <p:cSld>
+    <p:spTree>
+      <p:nvGrpSpPr>
+        <p:cNvPr id="1" name=""/>
+        <p:cNvGrpSpPr/>
+        <p:nvPr/>
+      </p:nvGrpSpPr>
+      <p:grpSpPr>
+        <a:xfrm>
+          <a:off x="0" y="0"/>
+          <a:ext cx="0" cy="0"/>
+          <a:chOff x="0" y="0"/>
+          <a:chExt cx="0" cy="0"/>
+        </a:xfrm>
+      </p:grpSpPr>
+      <p:sp>
+        <p:nvSpPr>
+          <p:cNvPr id="6" name="文字方塊 5"/>
+          <p:cNvSpPr txBox="1"/>
+          <p:nvPr/>
+        </p:nvSpPr>
+        <p:spPr>
+          <a:xfrm>
+            <a:off x="3603450" y="650009"/>
+            <a:ext cx="5107488" cy="1323439"/>
+          </a:xfrm>
+          <a:prstGeom prst="rect">
+            <a:avLst/>
+          </a:prstGeom>
+          <a:noFill/>
+        </p:spPr>
+        <p:txBody>
+          <a:bodyPr wrap="none" rtlCol="0">
+            <a:spAutoFit/>
+          </a:bodyPr>
+          <a:lstStyle/>
+          <a:p>
+            <a:pPr algn="ctr"/>
+            <a:r>
+              <a:rPr lang="zh-TW" altLang="en-US" sz="4000" dirty="0" smtClean="0">
+                <a:latin typeface="微軟正黑體" panose="020B0604030504040204" pitchFamily="34" charset="-120"/>
+                <a:ea typeface="微軟正黑體" panose="020B0604030504040204" pitchFamily="34" charset="-120"/>
+              </a:rPr>
+              <a:t>遊戲勝利條件</a:t>
+            </a:r>
+            <a:endParaRPr lang="en-US" altLang="zh-TW" sz="4000" dirty="0" smtClean="0">
+              <a:latin typeface="微軟正黑體" panose="020B0604030504040204" pitchFamily="34" charset="-120"/>
+              <a:ea typeface="微軟正黑體" panose="020B0604030504040204" pitchFamily="34" charset="-120"/>
+            </a:endParaRPr>
+          </a:p>
+          <a:p>
+            <a:pPr algn="ctr"/>
+            <a:r>
+              <a:rPr lang="zh-TW" altLang="en-US" sz="4000" b="1" dirty="0" smtClean="0">
+                <a:latin typeface="微軟正黑體" panose="020B0604030504040204" pitchFamily="34" charset="-120"/>
+                <a:ea typeface="微軟正黑體" panose="020B0604030504040204" pitchFamily="34" charset="-120"/>
+              </a:rPr>
+              <a:t>擊沉對方</a:t>
+            </a:r>
+            <a:r>
+              <a:rPr lang="en-US" altLang="zh-TW" sz="4000" b="1" dirty="0" smtClean="0">
+                <a:latin typeface="微軟正黑體" panose="020B0604030504040204" pitchFamily="34" charset="-120"/>
+                <a:ea typeface="微軟正黑體" panose="020B0604030504040204" pitchFamily="34" charset="-120"/>
+              </a:rPr>
+              <a:t>3</a:t>
+            </a:r>
+            <a:r>
+              <a:rPr lang="zh-TW" altLang="en-US" sz="4000" b="1" dirty="0" smtClean="0">
+                <a:latin typeface="微軟正黑體" panose="020B0604030504040204" pitchFamily="34" charset="-120"/>
+                <a:ea typeface="微軟正黑體" panose="020B0604030504040204" pitchFamily="34" charset="-120"/>
+              </a:rPr>
+              <a:t>艘以上船艦</a:t>
+            </a:r>
+            <a:endParaRPr lang="zh-TW" altLang="en-US" sz="4000" b="1" dirty="0">
+              <a:latin typeface="微軟正黑體" panose="020B0604030504040204" pitchFamily="34" charset="-120"/>
+              <a:ea typeface="微軟正黑體" panose="020B0604030504040204" pitchFamily="34" charset="-120"/>
+            </a:endParaRPr>
+          </a:p>
+        </p:txBody>
+      </p:sp>
+      <p:sp>
+        <p:nvSpPr>
+          <p:cNvPr id="2" name="矩形 1"/>
+          <p:cNvSpPr/>
+          <p:nvPr/>
+        </p:nvSpPr>
+        <p:spPr>
+          <a:xfrm>
+            <a:off x="18473" y="6262255"/>
+            <a:ext cx="12192000" cy="498763"/>
+          </a:xfrm>
+          <a:prstGeom prst="rect">
+            <a:avLst/>
+          </a:prstGeom>
+          <a:solidFill>
+            <a:schemeClr val="bg1"/>
+          </a:solidFill>
+          <a:ln>
+            <a:noFill/>
+          </a:ln>
+        </p:spPr>
+        <p:style>
+          <a:lnRef idx="2">
+            <a:schemeClr val="accent1">
+              <a:shade val="50000"/>
+            </a:schemeClr>
+          </a:lnRef>
+          <a:fillRef idx="1">
+            <a:schemeClr val="accent1"/>
+          </a:fillRef>
+          <a:effectRef idx="0">
+            <a:schemeClr val="accent1"/>
+          </a:effectRef>
+          <a:fontRef idx="minor">
+            <a:schemeClr val="lt1"/>
+          </a:fontRef>
+        </p:style>
+        <p:txBody>
+          <a:bodyPr rtlCol="0" anchor="ctr"/>
+          <a:lstStyle/>
+          <a:p>
+            <a:pPr algn="ctr"/>
+            <a:endParaRPr lang="zh-TW" altLang="en-US"/>
+          </a:p>
+        </p:txBody>
+      </p:sp>
+      <p:pic>
+        <p:nvPicPr>
+          <p:cNvPr id="3" name="圖片 2"/>
+          <p:cNvPicPr>
+            <a:picLocks noChangeAspect="1"/>
+          </p:cNvPicPr>
+          <p:nvPr/>
+        </p:nvPicPr>
+        <p:blipFill>
+          <a:blip r:embed="rId2"/>
+          <a:stretch>
+            <a:fillRect/>
+          </a:stretch>
+        </p:blipFill>
+        <p:spPr>
+          <a:xfrm>
+            <a:off x="2267410" y="2320164"/>
+            <a:ext cx="7779567" cy="3942091"/>
+          </a:xfrm>
+          <a:prstGeom prst="rect">
+            <a:avLst/>
+          </a:prstGeom>
+        </p:spPr>
+      </p:pic>
+    </p:spTree>
+    <p:extLst>
+      <p:ext uri="{BB962C8B-B14F-4D97-AF65-F5344CB8AC3E}">
+        <p14:creationId xmlns:p14="http://schemas.microsoft.com/office/powerpoint/2010/main" val="4242682005"/>
       </p:ext>
     </p:extLst>
   </p:cSld>

</xml_diff>